<commit_message>
fix NIST data leakage links
</commit_message>
<xml_diff>
--- a/Basic_Computer_Skills_for_Forensics/0_Number_Systems.pptx
+++ b/Basic_Computer_Skills_for_Forensics/0_Number_Systems.pptx
@@ -5,7 +5,7 @@
     <p:sldMasterId id="2147483648" r:id="rId1"/>
   </p:sldMasterIdLst>
   <p:notesMasterIdLst>
-    <p:notesMasterId r:id="rId17"/>
+    <p:notesMasterId r:id="rId23"/>
   </p:notesMasterIdLst>
   <p:sldIdLst>
     <p:sldId id="256" r:id="rId2"/>
@@ -22,7 +22,13 @@
     <p:sldId id="265" r:id="rId13"/>
     <p:sldId id="269" r:id="rId14"/>
     <p:sldId id="270" r:id="rId15"/>
-    <p:sldId id="268" r:id="rId16"/>
+    <p:sldId id="273" r:id="rId16"/>
+    <p:sldId id="268" r:id="rId17"/>
+    <p:sldId id="271" r:id="rId18"/>
+    <p:sldId id="272" r:id="rId19"/>
+    <p:sldId id="274" r:id="rId20"/>
+    <p:sldId id="275" r:id="rId21"/>
+    <p:sldId id="276" r:id="rId22"/>
   </p:sldIdLst>
   <p:sldSz cx="12192000" cy="6858000"/>
   <p:notesSz cx="6858000" cy="9144000"/>
@@ -132,7 +138,7 @@
 <file path=ppt/revisionInfo.xml><?xml version="1.0" encoding="utf-8"?>
 <p1510:revInfo xmlns:a="http://schemas.openxmlformats.org/drawingml/2006/main" xmlns:r="http://schemas.openxmlformats.org/officeDocument/2006/relationships" xmlns:p1510="http://schemas.microsoft.com/office/powerpoint/2015/10/main">
   <p1510:revLst>
-    <p1510:client id="{BC6292C7-23F4-4ED4-A77E-013F6C63BF9B}" v="176" dt="2021-08-26T18:40:11.208"/>
+    <p1510:client id="{BC6292C7-23F4-4ED4-A77E-013F6C63BF9B}" v="250" dt="2022-01-31T15:48:16.106"/>
   </p1510:revLst>
 </p1510:revInfo>
 </file>
@@ -4585,7 +4591,7 @@
   <pc:docChgLst>
     <pc:chgData name="Weifeng Xu" userId="e7aed605-a3dd-4d5a-a692-a87037af107b" providerId="ADAL" clId="{BC6292C7-23F4-4ED4-A77E-013F6C63BF9B}"/>
     <pc:docChg chg="undo custSel addSld delSld modSld sldOrd">
-      <pc:chgData name="Weifeng Xu" userId="e7aed605-a3dd-4d5a-a692-a87037af107b" providerId="ADAL" clId="{BC6292C7-23F4-4ED4-A77E-013F6C63BF9B}" dt="2021-08-30T22:40:55.965" v="892" actId="6549"/>
+      <pc:chgData name="Weifeng Xu" userId="e7aed605-a3dd-4d5a-a692-a87037af107b" providerId="ADAL" clId="{BC6292C7-23F4-4ED4-A77E-013F6C63BF9B}" dt="2022-01-31T16:33:48.303" v="1507" actId="20577"/>
       <pc:docMkLst>
         <pc:docMk/>
       </pc:docMkLst>
@@ -4605,7 +4611,7 @@
         </pc:spChg>
       </pc:sldChg>
       <pc:sldChg chg="addSp delSp modSp new mod setBg modClrScheme chgLayout">
-        <pc:chgData name="Weifeng Xu" userId="e7aed605-a3dd-4d5a-a692-a87037af107b" providerId="ADAL" clId="{BC6292C7-23F4-4ED4-A77E-013F6C63BF9B}" dt="2021-08-26T13:54:02.892" v="248" actId="14100"/>
+        <pc:chgData name="Weifeng Xu" userId="e7aed605-a3dd-4d5a-a692-a87037af107b" providerId="ADAL" clId="{BC6292C7-23F4-4ED4-A77E-013F6C63BF9B}" dt="2022-01-31T13:21:14.404" v="1301" actId="9405"/>
         <pc:sldMkLst>
           <pc:docMk/>
           <pc:sldMk cId="1421300646" sldId="257"/>
@@ -4650,6 +4656,38 @@
             <ac:spMk id="9" creationId="{53F29798-D584-4792-9B62-3F5F5C36D619}"/>
           </ac:spMkLst>
         </pc:spChg>
+        <pc:grpChg chg="add del mod">
+          <ac:chgData name="Weifeng Xu" userId="e7aed605-a3dd-4d5a-a692-a87037af107b" providerId="ADAL" clId="{BC6292C7-23F4-4ED4-A77E-013F6C63BF9B}" dt="2022-01-31T13:21:12.318" v="1297"/>
+          <ac:grpSpMkLst>
+            <pc:docMk/>
+            <pc:sldMk cId="1421300646" sldId="257"/>
+            <ac:grpSpMk id="9" creationId="{23383E75-B0BB-4F11-BCD5-B096552A04B7}"/>
+          </ac:grpSpMkLst>
+        </pc:grpChg>
+        <pc:grpChg chg="add del mod">
+          <ac:chgData name="Weifeng Xu" userId="e7aed605-a3dd-4d5a-a692-a87037af107b" providerId="ADAL" clId="{BC6292C7-23F4-4ED4-A77E-013F6C63BF9B}" dt="2022-01-31T13:21:12.103" v="1295"/>
+          <ac:grpSpMkLst>
+            <pc:docMk/>
+            <pc:sldMk cId="1421300646" sldId="257"/>
+            <ac:grpSpMk id="14" creationId="{752C0467-917B-472A-8E74-FF2DC2A72C39}"/>
+          </ac:grpSpMkLst>
+        </pc:grpChg>
+        <pc:grpChg chg="add del mod">
+          <ac:chgData name="Weifeng Xu" userId="e7aed605-a3dd-4d5a-a692-a87037af107b" providerId="ADAL" clId="{BC6292C7-23F4-4ED4-A77E-013F6C63BF9B}" dt="2022-01-31T13:21:11.766" v="1293"/>
+          <ac:grpSpMkLst>
+            <pc:docMk/>
+            <pc:sldMk cId="1421300646" sldId="257"/>
+            <ac:grpSpMk id="16" creationId="{E6C4FF75-F891-4AC3-A4A1-C8B3010CE7F9}"/>
+          </ac:grpSpMkLst>
+        </pc:grpChg>
+        <pc:grpChg chg="mod">
+          <ac:chgData name="Weifeng Xu" userId="e7aed605-a3dd-4d5a-a692-a87037af107b" providerId="ADAL" clId="{BC6292C7-23F4-4ED4-A77E-013F6C63BF9B}" dt="2022-01-31T13:21:10.912" v="1289"/>
+          <ac:grpSpMkLst>
+            <pc:docMk/>
+            <pc:sldMk cId="1421300646" sldId="257"/>
+            <ac:grpSpMk id="21" creationId="{08061E56-2714-4455-9CA0-9DAFC49DF0F8}"/>
+          </ac:grpSpMkLst>
+        </pc:grpChg>
         <pc:graphicFrameChg chg="add del mod modGraphic">
           <ac:chgData name="Weifeng Xu" userId="e7aed605-a3dd-4d5a-a692-a87037af107b" providerId="ADAL" clId="{BC6292C7-23F4-4ED4-A77E-013F6C63BF9B}" dt="2021-08-26T13:48:49.328" v="229" actId="207"/>
           <ac:graphicFrameMkLst>
@@ -4682,6 +4720,110 @@
             <ac:picMk id="2050" creationId="{CC3F984C-3E31-45ED-866D-7DD1C6798DD5}"/>
           </ac:picMkLst>
         </pc:picChg>
+        <pc:inkChg chg="add del">
+          <ac:chgData name="Weifeng Xu" userId="e7aed605-a3dd-4d5a-a692-a87037af107b" providerId="ADAL" clId="{BC6292C7-23F4-4ED4-A77E-013F6C63BF9B}" dt="2022-01-31T13:21:12.951" v="1299" actId="9405"/>
+          <ac:inkMkLst>
+            <pc:docMk/>
+            <pc:sldMk cId="1421300646" sldId="257"/>
+            <ac:inkMk id="3" creationId="{BF53E6FD-A602-422C-962E-FE30E4183E45}"/>
+          </ac:inkMkLst>
+        </pc:inkChg>
+        <pc:inkChg chg="add del mod">
+          <ac:chgData name="Weifeng Xu" userId="e7aed605-a3dd-4d5a-a692-a87037af107b" providerId="ADAL" clId="{BC6292C7-23F4-4ED4-A77E-013F6C63BF9B}" dt="2022-01-31T13:21:12.558" v="1298" actId="9405"/>
+          <ac:inkMkLst>
+            <pc:docMk/>
+            <pc:sldMk cId="1421300646" sldId="257"/>
+            <ac:inkMk id="6" creationId="{88ECED9C-BAE0-4F21-B128-72FA09C7C995}"/>
+          </ac:inkMkLst>
+        </pc:inkChg>
+        <pc:inkChg chg="add del mod">
+          <ac:chgData name="Weifeng Xu" userId="e7aed605-a3dd-4d5a-a692-a87037af107b" providerId="ADAL" clId="{BC6292C7-23F4-4ED4-A77E-013F6C63BF9B}" dt="2022-01-31T13:21:12.318" v="1297"/>
+          <ac:inkMkLst>
+            <pc:docMk/>
+            <pc:sldMk cId="1421300646" sldId="257"/>
+            <ac:inkMk id="8" creationId="{352ABADB-93EE-4F38-9FE3-6160B9F864E8}"/>
+          </ac:inkMkLst>
+        </pc:inkChg>
+        <pc:inkChg chg="add del mod">
+          <ac:chgData name="Weifeng Xu" userId="e7aed605-a3dd-4d5a-a692-a87037af107b" providerId="ADAL" clId="{BC6292C7-23F4-4ED4-A77E-013F6C63BF9B}" dt="2022-01-31T13:21:12.103" v="1295"/>
+          <ac:inkMkLst>
+            <pc:docMk/>
+            <pc:sldMk cId="1421300646" sldId="257"/>
+            <ac:inkMk id="11" creationId="{BAEF82C8-6A53-4580-B476-C68E37451E9C}"/>
+          </ac:inkMkLst>
+        </pc:inkChg>
+        <pc:inkChg chg="add del mod">
+          <ac:chgData name="Weifeng Xu" userId="e7aed605-a3dd-4d5a-a692-a87037af107b" providerId="ADAL" clId="{BC6292C7-23F4-4ED4-A77E-013F6C63BF9B}" dt="2022-01-31T13:21:11.766" v="1293"/>
+          <ac:inkMkLst>
+            <pc:docMk/>
+            <pc:sldMk cId="1421300646" sldId="257"/>
+            <ac:inkMk id="15" creationId="{88A8F9E8-A164-4B83-8602-90E956B12625}"/>
+          </ac:inkMkLst>
+        </pc:inkChg>
+        <pc:inkChg chg="add del">
+          <ac:chgData name="Weifeng Xu" userId="e7aed605-a3dd-4d5a-a692-a87037af107b" providerId="ADAL" clId="{BC6292C7-23F4-4ED4-A77E-013F6C63BF9B}" dt="2022-01-31T13:21:11.366" v="1291" actId="9405"/>
+          <ac:inkMkLst>
+            <pc:docMk/>
+            <pc:sldMk cId="1421300646" sldId="257"/>
+            <ac:inkMk id="17" creationId="{8BA78695-6677-4472-82C1-DF2747782F5A}"/>
+          </ac:inkMkLst>
+        </pc:inkChg>
+        <pc:inkChg chg="add del">
+          <ac:chgData name="Weifeng Xu" userId="e7aed605-a3dd-4d5a-a692-a87037af107b" providerId="ADAL" clId="{BC6292C7-23F4-4ED4-A77E-013F6C63BF9B}" dt="2022-01-31T13:21:11.125" v="1290" actId="9405"/>
+          <ac:inkMkLst>
+            <pc:docMk/>
+            <pc:sldMk cId="1421300646" sldId="257"/>
+            <ac:inkMk id="19" creationId="{71969B79-668D-4404-ACFE-2ED43A0EDD5E}"/>
+          </ac:inkMkLst>
+        </pc:inkChg>
+        <pc:inkChg chg="add del mod">
+          <ac:chgData name="Weifeng Xu" userId="e7aed605-a3dd-4d5a-a692-a87037af107b" providerId="ADAL" clId="{BC6292C7-23F4-4ED4-A77E-013F6C63BF9B}" dt="2022-01-31T13:21:10.912" v="1289"/>
+          <ac:inkMkLst>
+            <pc:docMk/>
+            <pc:sldMk cId="1421300646" sldId="257"/>
+            <ac:inkMk id="20" creationId="{B3447831-9373-4057-8AFF-BE0A241864BE}"/>
+          </ac:inkMkLst>
+        </pc:inkChg>
+        <pc:inkChg chg="add del">
+          <ac:chgData name="Weifeng Xu" userId="e7aed605-a3dd-4d5a-a692-a87037af107b" providerId="ADAL" clId="{BC6292C7-23F4-4ED4-A77E-013F6C63BF9B}" dt="2022-01-31T13:21:10.630" v="1287" actId="9405"/>
+          <ac:inkMkLst>
+            <pc:docMk/>
+            <pc:sldMk cId="1421300646" sldId="257"/>
+            <ac:inkMk id="22" creationId="{878D81DB-8935-4AA9-98DC-34A784F1F6E5}"/>
+          </ac:inkMkLst>
+        </pc:inkChg>
+        <pc:inkChg chg="add del">
+          <ac:chgData name="Weifeng Xu" userId="e7aed605-a3dd-4d5a-a692-a87037af107b" providerId="ADAL" clId="{BC6292C7-23F4-4ED4-A77E-013F6C63BF9B}" dt="2022-01-31T13:21:09.822" v="1286" actId="9405"/>
+          <ac:inkMkLst>
+            <pc:docMk/>
+            <pc:sldMk cId="1421300646" sldId="257"/>
+            <ac:inkMk id="23" creationId="{3C9FE4CC-E775-43BC-9BDC-A75AA60F55E9}"/>
+          </ac:inkMkLst>
+        </pc:inkChg>
+        <pc:inkChg chg="add del">
+          <ac:chgData name="Weifeng Xu" userId="e7aed605-a3dd-4d5a-a692-a87037af107b" providerId="ADAL" clId="{BC6292C7-23F4-4ED4-A77E-013F6C63BF9B}" dt="2022-01-31T13:21:09.465" v="1285" actId="9405"/>
+          <ac:inkMkLst>
+            <pc:docMk/>
+            <pc:sldMk cId="1421300646" sldId="257"/>
+            <ac:inkMk id="24" creationId="{566AFB4A-903D-4F15-AB69-3263D7DB61AD}"/>
+          </ac:inkMkLst>
+        </pc:inkChg>
+        <pc:inkChg chg="add">
+          <ac:chgData name="Weifeng Xu" userId="e7aed605-a3dd-4d5a-a692-a87037af107b" providerId="ADAL" clId="{BC6292C7-23F4-4ED4-A77E-013F6C63BF9B}" dt="2022-01-31T13:21:14.024" v="1300" actId="9405"/>
+          <ac:inkMkLst>
+            <pc:docMk/>
+            <pc:sldMk cId="1421300646" sldId="257"/>
+            <ac:inkMk id="25" creationId="{69FDBA92-2CD2-480D-A9F0-586873370AA8}"/>
+          </ac:inkMkLst>
+        </pc:inkChg>
+        <pc:inkChg chg="add">
+          <ac:chgData name="Weifeng Xu" userId="e7aed605-a3dd-4d5a-a692-a87037af107b" providerId="ADAL" clId="{BC6292C7-23F4-4ED4-A77E-013F6C63BF9B}" dt="2022-01-31T13:21:14.404" v="1301" actId="9405"/>
+          <ac:inkMkLst>
+            <pc:docMk/>
+            <pc:sldMk cId="1421300646" sldId="257"/>
+            <ac:inkMk id="26" creationId="{874106CC-D99A-46BF-A3B5-3B7C9F9091D1}"/>
+          </ac:inkMkLst>
+        </pc:inkChg>
         <pc:cxnChg chg="add mod">
           <ac:chgData name="Weifeng Xu" userId="e7aed605-a3dd-4d5a-a692-a87037af107b" providerId="ADAL" clId="{BC6292C7-23F4-4ED4-A77E-013F6C63BF9B}" dt="2021-08-26T13:53:41.141" v="238" actId="14100"/>
           <ac:cxnSpMkLst>
@@ -4817,7 +4959,7 @@
         </pc:spChg>
       </pc:sldChg>
       <pc:sldChg chg="addSp modSp new mod ord">
-        <pc:chgData name="Weifeng Xu" userId="e7aed605-a3dd-4d5a-a692-a87037af107b" providerId="ADAL" clId="{BC6292C7-23F4-4ED4-A77E-013F6C63BF9B}" dt="2021-08-26T13:58:05.738" v="300"/>
+        <pc:chgData name="Weifeng Xu" userId="e7aed605-a3dd-4d5a-a692-a87037af107b" providerId="ADAL" clId="{BC6292C7-23F4-4ED4-A77E-013F6C63BF9B}" dt="2022-01-31T13:22:06.271" v="1302" actId="9405"/>
         <pc:sldMkLst>
           <pc:docMk/>
           <pc:sldMk cId="3593987998" sldId="259"/>
@@ -4846,6 +4988,14 @@
             <ac:graphicFrameMk id="4" creationId="{CA261B89-3E8E-4584-86C2-C170CCFCB4FF}"/>
           </ac:graphicFrameMkLst>
         </pc:graphicFrameChg>
+        <pc:inkChg chg="add">
+          <ac:chgData name="Weifeng Xu" userId="e7aed605-a3dd-4d5a-a692-a87037af107b" providerId="ADAL" clId="{BC6292C7-23F4-4ED4-A77E-013F6C63BF9B}" dt="2022-01-31T13:22:06.271" v="1302" actId="9405"/>
+          <ac:inkMkLst>
+            <pc:docMk/>
+            <pc:sldMk cId="3593987998" sldId="259"/>
+            <ac:inkMk id="5" creationId="{BDB25615-A17A-4913-B636-42B32AD24BB6}"/>
+          </ac:inkMkLst>
+        </pc:inkChg>
       </pc:sldChg>
       <pc:sldChg chg="del">
         <pc:chgData name="Weifeng Xu" userId="e7aed605-a3dd-4d5a-a692-a87037af107b" providerId="ADAL" clId="{BC6292C7-23F4-4ED4-A77E-013F6C63BF9B}" dt="2021-08-26T13:19:53.698" v="17" actId="47"/>
@@ -4855,7 +5005,7 @@
         </pc:sldMkLst>
       </pc:sldChg>
       <pc:sldChg chg="addSp delSp modSp new mod">
-        <pc:chgData name="Weifeng Xu" userId="e7aed605-a3dd-4d5a-a692-a87037af107b" providerId="ADAL" clId="{BC6292C7-23F4-4ED4-A77E-013F6C63BF9B}" dt="2021-08-26T14:18:05.502" v="444" actId="207"/>
+        <pc:chgData name="Weifeng Xu" userId="e7aed605-a3dd-4d5a-a692-a87037af107b" providerId="ADAL" clId="{BC6292C7-23F4-4ED4-A77E-013F6C63BF9B}" dt="2022-01-31T13:26:16.723" v="1303" actId="9405"/>
         <pc:sldMkLst>
           <pc:docMk/>
           <pc:sldMk cId="3796464813" sldId="260"/>
@@ -4948,9 +5098,17 @@
             <ac:spMk id="12" creationId="{DC2BC01C-FB5B-4C27-A208-B1DD75AE698D}"/>
           </ac:spMkLst>
         </pc:spChg>
+        <pc:inkChg chg="add">
+          <ac:chgData name="Weifeng Xu" userId="e7aed605-a3dd-4d5a-a692-a87037af107b" providerId="ADAL" clId="{BC6292C7-23F4-4ED4-A77E-013F6C63BF9B}" dt="2022-01-31T13:26:16.723" v="1303" actId="9405"/>
+          <ac:inkMkLst>
+            <pc:docMk/>
+            <pc:sldMk cId="3796464813" sldId="260"/>
+            <ac:inkMk id="3" creationId="{7D314D81-37EB-4649-98B4-3BA004A9B9CE}"/>
+          </ac:inkMkLst>
+        </pc:inkChg>
       </pc:sldChg>
-      <pc:sldChg chg="addSp delSp modSp new mod modClrScheme chgLayout">
-        <pc:chgData name="Weifeng Xu" userId="e7aed605-a3dd-4d5a-a692-a87037af107b" providerId="ADAL" clId="{BC6292C7-23F4-4ED4-A77E-013F6C63BF9B}" dt="2021-08-26T14:25:48.515" v="519" actId="207"/>
+      <pc:sldChg chg="addSp delSp modSp new mod modClrScheme chgLayout modNotesTx">
+        <pc:chgData name="Weifeng Xu" userId="e7aed605-a3dd-4d5a-a692-a87037af107b" providerId="ADAL" clId="{BC6292C7-23F4-4ED4-A77E-013F6C63BF9B}" dt="2021-12-20T22:54:21.222" v="952" actId="11529"/>
         <pc:sldMkLst>
           <pc:docMk/>
           <pc:sldMk cId="40448527" sldId="261"/>
@@ -4964,7 +5122,7 @@
           </ac:spMkLst>
         </pc:spChg>
         <pc:spChg chg="add mod ord">
-          <ac:chgData name="Weifeng Xu" userId="e7aed605-a3dd-4d5a-a692-a87037af107b" providerId="ADAL" clId="{BC6292C7-23F4-4ED4-A77E-013F6C63BF9B}" dt="2021-08-26T14:21:22.563" v="459" actId="207"/>
+          <ac:chgData name="Weifeng Xu" userId="e7aed605-a3dd-4d5a-a692-a87037af107b" providerId="ADAL" clId="{BC6292C7-23F4-4ED4-A77E-013F6C63BF9B}" dt="2021-12-20T19:51:10.871" v="917" actId="14100"/>
           <ac:spMkLst>
             <pc:docMk/>
             <pc:sldMk cId="40448527" sldId="261"/>
@@ -4972,7 +5130,7 @@
           </ac:spMkLst>
         </pc:spChg>
         <pc:spChg chg="add mod">
-          <ac:chgData name="Weifeng Xu" userId="e7aed605-a3dd-4d5a-a692-a87037af107b" providerId="ADAL" clId="{BC6292C7-23F4-4ED4-A77E-013F6C63BF9B}" dt="2021-08-26T14:25:48.515" v="519" actId="207"/>
+          <ac:chgData name="Weifeng Xu" userId="e7aed605-a3dd-4d5a-a692-a87037af107b" providerId="ADAL" clId="{BC6292C7-23F4-4ED4-A77E-013F6C63BF9B}" dt="2021-12-20T19:50:26.221" v="910" actId="6549"/>
           <ac:spMkLst>
             <pc:docMk/>
             <pc:sldMk cId="40448527" sldId="261"/>
@@ -4980,7 +5138,7 @@
           </ac:spMkLst>
         </pc:spChg>
         <pc:spChg chg="add mod">
-          <ac:chgData name="Weifeng Xu" userId="e7aed605-a3dd-4d5a-a692-a87037af107b" providerId="ADAL" clId="{BC6292C7-23F4-4ED4-A77E-013F6C63BF9B}" dt="2021-08-26T14:24:46.464" v="510" actId="1076"/>
+          <ac:chgData name="Weifeng Xu" userId="e7aed605-a3dd-4d5a-a692-a87037af107b" providerId="ADAL" clId="{BC6292C7-23F4-4ED4-A77E-013F6C63BF9B}" dt="2021-12-20T19:50:29.862" v="911" actId="1076"/>
           <ac:spMkLst>
             <pc:docMk/>
             <pc:sldMk cId="40448527" sldId="261"/>
@@ -5011,15 +5169,71 @@
             <ac:spMk id="8" creationId="{C13307AA-935F-49B1-997F-DF5E26C04AAA}"/>
           </ac:spMkLst>
         </pc:spChg>
+        <pc:spChg chg="add mod">
+          <ac:chgData name="Weifeng Xu" userId="e7aed605-a3dd-4d5a-a692-a87037af107b" providerId="ADAL" clId="{BC6292C7-23F4-4ED4-A77E-013F6C63BF9B}" dt="2021-12-20T22:54:09.342" v="951" actId="1076"/>
+          <ac:spMkLst>
+            <pc:docMk/>
+            <pc:sldMk cId="40448527" sldId="261"/>
+            <ac:spMk id="9" creationId="{68071F5E-E1F3-4080-9432-87DFE966BCBA}"/>
+          </ac:spMkLst>
+        </pc:spChg>
+        <pc:spChg chg="add">
+          <ac:chgData name="Weifeng Xu" userId="e7aed605-a3dd-4d5a-a692-a87037af107b" providerId="ADAL" clId="{BC6292C7-23F4-4ED4-A77E-013F6C63BF9B}" dt="2021-12-20T22:54:21.222" v="952" actId="11529"/>
+          <ac:spMkLst>
+            <pc:docMk/>
+            <pc:sldMk cId="40448527" sldId="261"/>
+            <ac:spMk id="18" creationId="{3C80ED41-0993-44D7-A825-6581EE4636F4}"/>
+          </ac:spMkLst>
+        </pc:spChg>
+        <pc:picChg chg="add mod">
+          <ac:chgData name="Weifeng Xu" userId="e7aed605-a3dd-4d5a-a692-a87037af107b" providerId="ADAL" clId="{BC6292C7-23F4-4ED4-A77E-013F6C63BF9B}" dt="2021-12-20T22:54:09.342" v="951" actId="1076"/>
+          <ac:picMkLst>
+            <pc:docMk/>
+            <pc:sldMk cId="40448527" sldId="261"/>
+            <ac:picMk id="7" creationId="{194E9B75-5BB8-4A05-B9B4-8A1F9F25DF90}"/>
+          </ac:picMkLst>
+        </pc:picChg>
+        <pc:picChg chg="add mod">
+          <ac:chgData name="Weifeng Xu" userId="e7aed605-a3dd-4d5a-a692-a87037af107b" providerId="ADAL" clId="{BC6292C7-23F4-4ED4-A77E-013F6C63BF9B}" dt="2021-12-20T22:54:09.342" v="951" actId="1076"/>
+          <ac:picMkLst>
+            <pc:docMk/>
+            <pc:sldMk cId="40448527" sldId="261"/>
+            <ac:picMk id="17" creationId="{706E799A-9C7C-450B-80CA-9F31CB6E836D}"/>
+          </ac:picMkLst>
+        </pc:picChg>
+        <pc:cxnChg chg="add del">
+          <ac:chgData name="Weifeng Xu" userId="e7aed605-a3dd-4d5a-a692-a87037af107b" providerId="ADAL" clId="{BC6292C7-23F4-4ED4-A77E-013F6C63BF9B}" dt="2021-12-20T19:52:05.157" v="933" actId="11529"/>
+          <ac:cxnSpMkLst>
+            <pc:docMk/>
+            <pc:sldMk cId="40448527" sldId="261"/>
+            <ac:cxnSpMk id="11" creationId="{34A8DF76-6BEC-4CB0-A90A-89B7E8AC872A}"/>
+          </ac:cxnSpMkLst>
+        </pc:cxnChg>
+        <pc:cxnChg chg="add mod">
+          <ac:chgData name="Weifeng Xu" userId="e7aed605-a3dd-4d5a-a692-a87037af107b" providerId="ADAL" clId="{BC6292C7-23F4-4ED4-A77E-013F6C63BF9B}" dt="2021-12-20T22:54:09.342" v="951" actId="1076"/>
+          <ac:cxnSpMkLst>
+            <pc:docMk/>
+            <pc:sldMk cId="40448527" sldId="261"/>
+            <ac:cxnSpMk id="13" creationId="{28A1D5AE-6B30-4F17-830F-EC5EBF833DB5}"/>
+          </ac:cxnSpMkLst>
+        </pc:cxnChg>
+        <pc:cxnChg chg="add mod">
+          <ac:chgData name="Weifeng Xu" userId="e7aed605-a3dd-4d5a-a692-a87037af107b" providerId="ADAL" clId="{BC6292C7-23F4-4ED4-A77E-013F6C63BF9B}" dt="2021-12-20T22:54:09.342" v="951" actId="1076"/>
+          <ac:cxnSpMkLst>
+            <pc:docMk/>
+            <pc:sldMk cId="40448527" sldId="261"/>
+            <ac:cxnSpMk id="15" creationId="{9C633FCA-C20D-4F68-80E8-16106B0803FA}"/>
+          </ac:cxnSpMkLst>
+        </pc:cxnChg>
       </pc:sldChg>
-      <pc:sldChg chg="addSp modSp new mod ord modClrScheme chgLayout">
-        <pc:chgData name="Weifeng Xu" userId="e7aed605-a3dd-4d5a-a692-a87037af107b" providerId="ADAL" clId="{BC6292C7-23F4-4ED4-A77E-013F6C63BF9B}" dt="2021-08-26T14:21:16.412" v="458" actId="207"/>
+      <pc:sldChg chg="addSp delSp modSp new mod ord modClrScheme chgLayout">
+        <pc:chgData name="Weifeng Xu" userId="e7aed605-a3dd-4d5a-a692-a87037af107b" providerId="ADAL" clId="{BC6292C7-23F4-4ED4-A77E-013F6C63BF9B}" dt="2022-01-31T13:30:57.447" v="1354"/>
         <pc:sldMkLst>
           <pc:docMk/>
           <pc:sldMk cId="1777162073" sldId="262"/>
         </pc:sldMkLst>
         <pc:spChg chg="mod ord">
-          <ac:chgData name="Weifeng Xu" userId="e7aed605-a3dd-4d5a-a692-a87037af107b" providerId="ADAL" clId="{BC6292C7-23F4-4ED4-A77E-013F6C63BF9B}" dt="2021-08-26T14:10:23.201" v="387" actId="700"/>
+          <ac:chgData name="Weifeng Xu" userId="e7aed605-a3dd-4d5a-a692-a87037af107b" providerId="ADAL" clId="{BC6292C7-23F4-4ED4-A77E-013F6C63BF9B}" dt="2022-01-31T13:29:27.474" v="1352" actId="1076"/>
           <ac:spMkLst>
             <pc:docMk/>
             <pc:sldMk cId="1777162073" sldId="262"/>
@@ -5027,7 +5241,7 @@
           </ac:spMkLst>
         </pc:spChg>
         <pc:spChg chg="add mod ord">
-          <ac:chgData name="Weifeng Xu" userId="e7aed605-a3dd-4d5a-a692-a87037af107b" providerId="ADAL" clId="{BC6292C7-23F4-4ED4-A77E-013F6C63BF9B}" dt="2021-08-26T14:21:16.412" v="458" actId="207"/>
+          <ac:chgData name="Weifeng Xu" userId="e7aed605-a3dd-4d5a-a692-a87037af107b" providerId="ADAL" clId="{BC6292C7-23F4-4ED4-A77E-013F6C63BF9B}" dt="2022-01-31T13:29:30.997" v="1353" actId="1076"/>
           <ac:spMkLst>
             <pc:docMk/>
             <pc:sldMk cId="1777162073" sldId="262"/>
@@ -5035,7 +5249,7 @@
           </ac:spMkLst>
         </pc:spChg>
         <pc:spChg chg="add mod">
-          <ac:chgData name="Weifeng Xu" userId="e7aed605-a3dd-4d5a-a692-a87037af107b" providerId="ADAL" clId="{BC6292C7-23F4-4ED4-A77E-013F6C63BF9B}" dt="2021-08-26T14:20:18.372" v="452" actId="6549"/>
+          <ac:chgData name="Weifeng Xu" userId="e7aed605-a3dd-4d5a-a692-a87037af107b" providerId="ADAL" clId="{BC6292C7-23F4-4ED4-A77E-013F6C63BF9B}" dt="2021-12-20T21:01:05.522" v="940" actId="1076"/>
           <ac:spMkLst>
             <pc:docMk/>
             <pc:sldMk cId="1777162073" sldId="262"/>
@@ -5043,7 +5257,7 @@
           </ac:spMkLst>
         </pc:spChg>
         <pc:spChg chg="add mod">
-          <ac:chgData name="Weifeng Xu" userId="e7aed605-a3dd-4d5a-a692-a87037af107b" providerId="ADAL" clId="{BC6292C7-23F4-4ED4-A77E-013F6C63BF9B}" dt="2021-08-26T14:13:53.085" v="406" actId="1076"/>
+          <ac:chgData name="Weifeng Xu" userId="e7aed605-a3dd-4d5a-a692-a87037af107b" providerId="ADAL" clId="{BC6292C7-23F4-4ED4-A77E-013F6C63BF9B}" dt="2021-12-20T21:01:05.522" v="940" actId="1076"/>
           <ac:spMkLst>
             <pc:docMk/>
             <pc:sldMk cId="1777162073" sldId="262"/>
@@ -5051,7 +5265,7 @@
           </ac:spMkLst>
         </pc:spChg>
         <pc:spChg chg="add mod">
-          <ac:chgData name="Weifeng Xu" userId="e7aed605-a3dd-4d5a-a692-a87037af107b" providerId="ADAL" clId="{BC6292C7-23F4-4ED4-A77E-013F6C63BF9B}" dt="2021-08-26T14:14:50.807" v="415" actId="207"/>
+          <ac:chgData name="Weifeng Xu" userId="e7aed605-a3dd-4d5a-a692-a87037af107b" providerId="ADAL" clId="{BC6292C7-23F4-4ED4-A77E-013F6C63BF9B}" dt="2022-01-31T13:30:57.447" v="1354"/>
           <ac:spMkLst>
             <pc:docMk/>
             <pc:sldMk cId="1777162073" sldId="262"/>
@@ -5059,7 +5273,7 @@
           </ac:spMkLst>
         </pc:spChg>
         <pc:spChg chg="add mod">
-          <ac:chgData name="Weifeng Xu" userId="e7aed605-a3dd-4d5a-a692-a87037af107b" providerId="ADAL" clId="{BC6292C7-23F4-4ED4-A77E-013F6C63BF9B}" dt="2021-08-26T14:15:40.123" v="426" actId="1076"/>
+          <ac:chgData name="Weifeng Xu" userId="e7aed605-a3dd-4d5a-a692-a87037af107b" providerId="ADAL" clId="{BC6292C7-23F4-4ED4-A77E-013F6C63BF9B}" dt="2021-12-20T21:01:05.522" v="940" actId="1076"/>
           <ac:spMkLst>
             <pc:docMk/>
             <pc:sldMk cId="1777162073" sldId="262"/>
@@ -5067,22 +5281,206 @@
           </ac:spMkLst>
         </pc:spChg>
         <pc:spChg chg="add mod">
-          <ac:chgData name="Weifeng Xu" userId="e7aed605-a3dd-4d5a-a692-a87037af107b" providerId="ADAL" clId="{BC6292C7-23F4-4ED4-A77E-013F6C63BF9B}" dt="2021-08-26T14:15:30.246" v="423" actId="1076"/>
+          <ac:chgData name="Weifeng Xu" userId="e7aed605-a3dd-4d5a-a692-a87037af107b" providerId="ADAL" clId="{BC6292C7-23F4-4ED4-A77E-013F6C63BF9B}" dt="2021-12-20T21:01:05.522" v="940" actId="1076"/>
           <ac:spMkLst>
             <pc:docMk/>
             <pc:sldMk cId="1777162073" sldId="262"/>
             <ac:spMk id="8" creationId="{B77CF059-C5D4-49F0-B53E-B30DCD31793D}"/>
           </ac:spMkLst>
         </pc:spChg>
+        <pc:spChg chg="add mod">
+          <ac:chgData name="Weifeng Xu" userId="e7aed605-a3dd-4d5a-a692-a87037af107b" providerId="ADAL" clId="{BC6292C7-23F4-4ED4-A77E-013F6C63BF9B}" dt="2021-12-20T22:55:42.664" v="970" actId="1035"/>
+          <ac:spMkLst>
+            <pc:docMk/>
+            <pc:sldMk cId="1777162073" sldId="262"/>
+            <ac:spMk id="11" creationId="{C934F1A0-1DFB-4533-B0D2-370D2DCC082D}"/>
+          </ac:spMkLst>
+        </pc:spChg>
+        <pc:grpChg chg="mod">
+          <ac:chgData name="Weifeng Xu" userId="e7aed605-a3dd-4d5a-a692-a87037af107b" providerId="ADAL" clId="{BC6292C7-23F4-4ED4-A77E-013F6C63BF9B}" dt="2022-01-31T13:27:41.312" v="1331"/>
+          <ac:grpSpMkLst>
+            <pc:docMk/>
+            <pc:sldMk cId="1777162073" sldId="262"/>
+            <ac:grpSpMk id="29" creationId="{480A6F68-CE4A-4E42-9596-409468199AAB}"/>
+          </ac:grpSpMkLst>
+        </pc:grpChg>
+        <pc:grpChg chg="mod">
+          <ac:chgData name="Weifeng Xu" userId="e7aed605-a3dd-4d5a-a692-a87037af107b" providerId="ADAL" clId="{BC6292C7-23F4-4ED4-A77E-013F6C63BF9B}" dt="2022-01-31T13:28:38.159" v="1339"/>
+          <ac:grpSpMkLst>
+            <pc:docMk/>
+            <pc:sldMk cId="1777162073" sldId="262"/>
+            <ac:grpSpMk id="31" creationId="{769C9D36-D858-4CC4-B7D7-24B61E2F9749}"/>
+          </ac:grpSpMkLst>
+        </pc:grpChg>
+        <pc:picChg chg="add mod">
+          <ac:chgData name="Weifeng Xu" userId="e7aed605-a3dd-4d5a-a692-a87037af107b" providerId="ADAL" clId="{BC6292C7-23F4-4ED4-A77E-013F6C63BF9B}" dt="2021-12-20T21:02:48.920" v="948" actId="14100"/>
+          <ac:picMkLst>
+            <pc:docMk/>
+            <pc:sldMk cId="1777162073" sldId="262"/>
+            <ac:picMk id="10" creationId="{715D01BF-50B3-4C1F-A943-AB2FB8F91FFF}"/>
+          </ac:picMkLst>
+        </pc:picChg>
+        <pc:inkChg chg="add del mod">
+          <ac:chgData name="Weifeng Xu" userId="e7aed605-a3dd-4d5a-a692-a87037af107b" providerId="ADAL" clId="{BC6292C7-23F4-4ED4-A77E-013F6C63BF9B}" dt="2022-01-31T13:28:46.188" v="1342" actId="478"/>
+          <ac:inkMkLst>
+            <pc:docMk/>
+            <pc:sldMk cId="1777162073" sldId="262"/>
+            <ac:inkMk id="9" creationId="{839A0844-803A-44FB-82DA-667794BE30EE}"/>
+          </ac:inkMkLst>
+        </pc:inkChg>
+        <pc:inkChg chg="add del mod">
+          <ac:chgData name="Weifeng Xu" userId="e7aed605-a3dd-4d5a-a692-a87037af107b" providerId="ADAL" clId="{BC6292C7-23F4-4ED4-A77E-013F6C63BF9B}" dt="2022-01-31T13:29:04.124" v="1347" actId="478"/>
+          <ac:inkMkLst>
+            <pc:docMk/>
+            <pc:sldMk cId="1777162073" sldId="262"/>
+            <ac:inkMk id="12" creationId="{E071EA7E-EBE6-4B47-B17B-512361867547}"/>
+          </ac:inkMkLst>
+        </pc:inkChg>
+        <pc:inkChg chg="add del mod">
+          <ac:chgData name="Weifeng Xu" userId="e7aed605-a3dd-4d5a-a692-a87037af107b" providerId="ADAL" clId="{BC6292C7-23F4-4ED4-A77E-013F6C63BF9B}" dt="2022-01-31T13:29:06.069" v="1348" actId="478"/>
+          <ac:inkMkLst>
+            <pc:docMk/>
+            <pc:sldMk cId="1777162073" sldId="262"/>
+            <ac:inkMk id="14" creationId="{3C0A4CD7-D6CD-40D0-BA93-F987EAE4D8BC}"/>
+          </ac:inkMkLst>
+        </pc:inkChg>
+        <pc:inkChg chg="add del">
+          <ac:chgData name="Weifeng Xu" userId="e7aed605-a3dd-4d5a-a692-a87037af107b" providerId="ADAL" clId="{BC6292C7-23F4-4ED4-A77E-013F6C63BF9B}" dt="2022-01-31T13:28:58.325" v="1345" actId="478"/>
+          <ac:inkMkLst>
+            <pc:docMk/>
+            <pc:sldMk cId="1777162073" sldId="262"/>
+            <ac:inkMk id="15" creationId="{E5BD51BB-1A8E-40D5-BD1A-0579DF99965C}"/>
+          </ac:inkMkLst>
+        </pc:inkChg>
+        <pc:inkChg chg="add del">
+          <ac:chgData name="Weifeng Xu" userId="e7aed605-a3dd-4d5a-a692-a87037af107b" providerId="ADAL" clId="{BC6292C7-23F4-4ED4-A77E-013F6C63BF9B}" dt="2022-01-31T13:27:14.184" v="1323" actId="9405"/>
+          <ac:inkMkLst>
+            <pc:docMk/>
+            <pc:sldMk cId="1777162073" sldId="262"/>
+            <ac:inkMk id="16" creationId="{52F67C0D-31BF-4A4E-B70E-6142A7023672}"/>
+          </ac:inkMkLst>
+        </pc:inkChg>
+        <pc:inkChg chg="add del">
+          <ac:chgData name="Weifeng Xu" userId="e7aed605-a3dd-4d5a-a692-a87037af107b" providerId="ADAL" clId="{BC6292C7-23F4-4ED4-A77E-013F6C63BF9B}" dt="2022-01-31T13:27:12.928" v="1322" actId="9405"/>
+          <ac:inkMkLst>
+            <pc:docMk/>
+            <pc:sldMk cId="1777162073" sldId="262"/>
+            <ac:inkMk id="17" creationId="{1D0DCD7D-F25C-4DBB-B019-2F0049B0CFC2}"/>
+          </ac:inkMkLst>
+        </pc:inkChg>
+        <pc:inkChg chg="add del">
+          <ac:chgData name="Weifeng Xu" userId="e7aed605-a3dd-4d5a-a692-a87037af107b" providerId="ADAL" clId="{BC6292C7-23F4-4ED4-A77E-013F6C63BF9B}" dt="2022-01-31T13:27:03.504" v="1313" actId="9405"/>
+          <ac:inkMkLst>
+            <pc:docMk/>
+            <pc:sldMk cId="1777162073" sldId="262"/>
+            <ac:inkMk id="18" creationId="{07AE646B-1232-4084-9260-4F5D8FB676A4}"/>
+          </ac:inkMkLst>
+        </pc:inkChg>
+        <pc:inkChg chg="add del">
+          <ac:chgData name="Weifeng Xu" userId="e7aed605-a3dd-4d5a-a692-a87037af107b" providerId="ADAL" clId="{BC6292C7-23F4-4ED4-A77E-013F6C63BF9B}" dt="2022-01-31T13:27:03.071" v="1312" actId="9405"/>
+          <ac:inkMkLst>
+            <pc:docMk/>
+            <pc:sldMk cId="1777162073" sldId="262"/>
+            <ac:inkMk id="19" creationId="{47AD8E2D-946E-4AE6-88C0-584B76D2281E}"/>
+          </ac:inkMkLst>
+        </pc:inkChg>
+        <pc:inkChg chg="add del">
+          <ac:chgData name="Weifeng Xu" userId="e7aed605-a3dd-4d5a-a692-a87037af107b" providerId="ADAL" clId="{BC6292C7-23F4-4ED4-A77E-013F6C63BF9B}" dt="2022-01-31T13:27:12.672" v="1321" actId="9405"/>
+          <ac:inkMkLst>
+            <pc:docMk/>
+            <pc:sldMk cId="1777162073" sldId="262"/>
+            <ac:inkMk id="20" creationId="{21B9BB52-69EB-4FAD-AD9A-89565E9D04A3}"/>
+          </ac:inkMkLst>
+        </pc:inkChg>
+        <pc:inkChg chg="add del">
+          <ac:chgData name="Weifeng Xu" userId="e7aed605-a3dd-4d5a-a692-a87037af107b" providerId="ADAL" clId="{BC6292C7-23F4-4ED4-A77E-013F6C63BF9B}" dt="2022-01-31T13:27:11.176" v="1318" actId="9405"/>
+          <ac:inkMkLst>
+            <pc:docMk/>
+            <pc:sldMk cId="1777162073" sldId="262"/>
+            <ac:inkMk id="21" creationId="{048D1A13-1511-47EC-ADE3-77E9D3619B0C}"/>
+          </ac:inkMkLst>
+        </pc:inkChg>
+        <pc:inkChg chg="add del">
+          <ac:chgData name="Weifeng Xu" userId="e7aed605-a3dd-4d5a-a692-a87037af107b" providerId="ADAL" clId="{BC6292C7-23F4-4ED4-A77E-013F6C63BF9B}" dt="2022-01-31T13:27:10.128" v="1317" actId="9405"/>
+          <ac:inkMkLst>
+            <pc:docMk/>
+            <pc:sldMk cId="1777162073" sldId="262"/>
+            <ac:inkMk id="22" creationId="{F21B7FA4-9852-4DA1-A1FB-9EE1FDB8CFF0}"/>
+          </ac:inkMkLst>
+        </pc:inkChg>
+        <pc:inkChg chg="add del">
+          <ac:chgData name="Weifeng Xu" userId="e7aed605-a3dd-4d5a-a692-a87037af107b" providerId="ADAL" clId="{BC6292C7-23F4-4ED4-A77E-013F6C63BF9B}" dt="2022-01-31T13:27:12.296" v="1320" actId="9405"/>
+          <ac:inkMkLst>
+            <pc:docMk/>
+            <pc:sldMk cId="1777162073" sldId="262"/>
+            <ac:inkMk id="23" creationId="{88000099-EB0E-48D9-97B3-600271F856F0}"/>
+          </ac:inkMkLst>
+        </pc:inkChg>
+        <pc:inkChg chg="add del mod">
+          <ac:chgData name="Weifeng Xu" userId="e7aed605-a3dd-4d5a-a692-a87037af107b" providerId="ADAL" clId="{BC6292C7-23F4-4ED4-A77E-013F6C63BF9B}" dt="2022-01-31T13:28:53.869" v="1344" actId="478"/>
+          <ac:inkMkLst>
+            <pc:docMk/>
+            <pc:sldMk cId="1777162073" sldId="262"/>
+            <ac:inkMk id="24" creationId="{2BEE59B2-B473-4505-93C9-7C181B46E451}"/>
+          </ac:inkMkLst>
+        </pc:inkChg>
+        <pc:inkChg chg="add del mod">
+          <ac:chgData name="Weifeng Xu" userId="e7aed605-a3dd-4d5a-a692-a87037af107b" providerId="ADAL" clId="{BC6292C7-23F4-4ED4-A77E-013F6C63BF9B}" dt="2022-01-31T13:28:50.581" v="1343" actId="478"/>
+          <ac:inkMkLst>
+            <pc:docMk/>
+            <pc:sldMk cId="1777162073" sldId="262"/>
+            <ac:inkMk id="25" creationId="{7F9B5761-8286-4B40-9500-F97347524050}"/>
+          </ac:inkMkLst>
+        </pc:inkChg>
+        <pc:inkChg chg="add">
+          <ac:chgData name="Weifeng Xu" userId="e7aed605-a3dd-4d5a-a692-a87037af107b" providerId="ADAL" clId="{BC6292C7-23F4-4ED4-A77E-013F6C63BF9B}" dt="2022-01-31T13:27:39.127" v="1326" actId="9405"/>
+          <ac:inkMkLst>
+            <pc:docMk/>
+            <pc:sldMk cId="1777162073" sldId="262"/>
+            <ac:inkMk id="26" creationId="{9CC61299-270D-4B70-BFF6-F8C97F3328D5}"/>
+          </ac:inkMkLst>
+        </pc:inkChg>
+        <pc:inkChg chg="add del mod">
+          <ac:chgData name="Weifeng Xu" userId="e7aed605-a3dd-4d5a-a692-a87037af107b" providerId="ADAL" clId="{BC6292C7-23F4-4ED4-A77E-013F6C63BF9B}" dt="2022-01-31T13:27:42.359" v="1332" actId="9405"/>
+          <ac:inkMkLst>
+            <pc:docMk/>
+            <pc:sldMk cId="1777162073" sldId="262"/>
+            <ac:inkMk id="27" creationId="{EFD5D4E1-397B-4238-9320-B07530E5264D}"/>
+          </ac:inkMkLst>
+        </pc:inkChg>
+        <pc:inkChg chg="add del mod">
+          <ac:chgData name="Weifeng Xu" userId="e7aed605-a3dd-4d5a-a692-a87037af107b" providerId="ADAL" clId="{BC6292C7-23F4-4ED4-A77E-013F6C63BF9B}" dt="2022-01-31T13:27:41.312" v="1331"/>
+          <ac:inkMkLst>
+            <pc:docMk/>
+            <pc:sldMk cId="1777162073" sldId="262"/>
+            <ac:inkMk id="28" creationId="{001C5CFD-3FA1-4A4E-9200-6F43E297B708}"/>
+          </ac:inkMkLst>
+        </pc:inkChg>
+        <pc:inkChg chg="add del mod">
+          <ac:chgData name="Weifeng Xu" userId="e7aed605-a3dd-4d5a-a692-a87037af107b" providerId="ADAL" clId="{BC6292C7-23F4-4ED4-A77E-013F6C63BF9B}" dt="2022-01-31T13:28:38.159" v="1339"/>
+          <ac:inkMkLst>
+            <pc:docMk/>
+            <pc:sldMk cId="1777162073" sldId="262"/>
+            <ac:inkMk id="30" creationId="{412ADA6B-248D-4471-9F09-B6965C6E6D9A}"/>
+          </ac:inkMkLst>
+        </pc:inkChg>
+        <pc:cxnChg chg="add mod">
+          <ac:chgData name="Weifeng Xu" userId="e7aed605-a3dd-4d5a-a692-a87037af107b" providerId="ADAL" clId="{BC6292C7-23F4-4ED4-A77E-013F6C63BF9B}" dt="2021-12-20T22:55:42.664" v="970" actId="1035"/>
+          <ac:cxnSpMkLst>
+            <pc:docMk/>
+            <pc:sldMk cId="1777162073" sldId="262"/>
+            <ac:cxnSpMk id="13" creationId="{6B4F433A-FCF6-4195-8AB6-ADC64B0901D8}"/>
+          </ac:cxnSpMkLst>
+        </pc:cxnChg>
       </pc:sldChg>
-      <pc:sldChg chg="addSp delSp modSp new mod modAnim">
-        <pc:chgData name="Weifeng Xu" userId="e7aed605-a3dd-4d5a-a692-a87037af107b" providerId="ADAL" clId="{BC6292C7-23F4-4ED4-A77E-013F6C63BF9B}" dt="2021-08-26T14:51:53.617" v="608" actId="20577"/>
+      <pc:sldChg chg="addSp delSp modSp new mod modAnim modNotesTx">
+        <pc:chgData name="Weifeng Xu" userId="e7aed605-a3dd-4d5a-a692-a87037af107b" providerId="ADAL" clId="{BC6292C7-23F4-4ED4-A77E-013F6C63BF9B}" dt="2021-12-20T23:29:04.479" v="1034"/>
         <pc:sldMkLst>
           <pc:docMk/>
           <pc:sldMk cId="1561560363" sldId="263"/>
         </pc:sldMkLst>
         <pc:spChg chg="mod">
-          <ac:chgData name="Weifeng Xu" userId="e7aed605-a3dd-4d5a-a692-a87037af107b" providerId="ADAL" clId="{BC6292C7-23F4-4ED4-A77E-013F6C63BF9B}" dt="2021-08-26T14:26:26.123" v="521"/>
+          <ac:chgData name="Weifeng Xu" userId="e7aed605-a3dd-4d5a-a692-a87037af107b" providerId="ADAL" clId="{BC6292C7-23F4-4ED4-A77E-013F6C63BF9B}" dt="2021-12-20T23:25:57.711" v="973" actId="1076"/>
           <ac:spMkLst>
             <pc:docMk/>
             <pc:sldMk cId="1561560363" sldId="263"/>
@@ -5090,7 +5488,7 @@
           </ac:spMkLst>
         </pc:spChg>
         <pc:spChg chg="mod">
-          <ac:chgData name="Weifeng Xu" userId="e7aed605-a3dd-4d5a-a692-a87037af107b" providerId="ADAL" clId="{BC6292C7-23F4-4ED4-A77E-013F6C63BF9B}" dt="2021-08-26T14:31:59.004" v="577" actId="207"/>
+          <ac:chgData name="Weifeng Xu" userId="e7aed605-a3dd-4d5a-a692-a87037af107b" providerId="ADAL" clId="{BC6292C7-23F4-4ED4-A77E-013F6C63BF9B}" dt="2021-12-20T23:27:00.300" v="1028" actId="14100"/>
           <ac:spMkLst>
             <pc:docMk/>
             <pc:sldMk cId="1561560363" sldId="263"/>
@@ -5098,7 +5496,7 @@
           </ac:spMkLst>
         </pc:spChg>
         <pc:spChg chg="mod">
-          <ac:chgData name="Weifeng Xu" userId="e7aed605-a3dd-4d5a-a692-a87037af107b" providerId="ADAL" clId="{BC6292C7-23F4-4ED4-A77E-013F6C63BF9B}" dt="2021-08-26T14:32:46.418" v="585" actId="207"/>
+          <ac:chgData name="Weifeng Xu" userId="e7aed605-a3dd-4d5a-a692-a87037af107b" providerId="ADAL" clId="{BC6292C7-23F4-4ED4-A77E-013F6C63BF9B}" dt="2021-12-20T23:26:03.695" v="1016" actId="1036"/>
           <ac:spMkLst>
             <pc:docMk/>
             <pc:sldMk cId="1561560363" sldId="263"/>
@@ -5106,7 +5504,7 @@
           </ac:spMkLst>
         </pc:spChg>
         <pc:spChg chg="mod">
-          <ac:chgData name="Weifeng Xu" userId="e7aed605-a3dd-4d5a-a692-a87037af107b" providerId="ADAL" clId="{BC6292C7-23F4-4ED4-A77E-013F6C63BF9B}" dt="2021-08-26T14:28:17.669" v="533" actId="1076"/>
+          <ac:chgData name="Weifeng Xu" userId="e7aed605-a3dd-4d5a-a692-a87037af107b" providerId="ADAL" clId="{BC6292C7-23F4-4ED4-A77E-013F6C63BF9B}" dt="2021-12-20T23:26:03.695" v="1016" actId="1036"/>
           <ac:spMkLst>
             <pc:docMk/>
             <pc:sldMk cId="1561560363" sldId="263"/>
@@ -5114,7 +5512,7 @@
           </ac:spMkLst>
         </pc:spChg>
         <pc:spChg chg="mod">
-          <ac:chgData name="Weifeng Xu" userId="e7aed605-a3dd-4d5a-a692-a87037af107b" providerId="ADAL" clId="{BC6292C7-23F4-4ED4-A77E-013F6C63BF9B}" dt="2021-08-26T14:28:17.669" v="533" actId="1076"/>
+          <ac:chgData name="Weifeng Xu" userId="e7aed605-a3dd-4d5a-a692-a87037af107b" providerId="ADAL" clId="{BC6292C7-23F4-4ED4-A77E-013F6C63BF9B}" dt="2021-12-20T23:26:03.695" v="1016" actId="1036"/>
           <ac:spMkLst>
             <pc:docMk/>
             <pc:sldMk cId="1561560363" sldId="263"/>
@@ -5122,7 +5520,7 @@
           </ac:spMkLst>
         </pc:spChg>
         <pc:spChg chg="mod">
-          <ac:chgData name="Weifeng Xu" userId="e7aed605-a3dd-4d5a-a692-a87037af107b" providerId="ADAL" clId="{BC6292C7-23F4-4ED4-A77E-013F6C63BF9B}" dt="2021-08-26T14:32:49.171" v="586" actId="207"/>
+          <ac:chgData name="Weifeng Xu" userId="e7aed605-a3dd-4d5a-a692-a87037af107b" providerId="ADAL" clId="{BC6292C7-23F4-4ED4-A77E-013F6C63BF9B}" dt="2021-12-20T23:26:03.695" v="1016" actId="1036"/>
           <ac:spMkLst>
             <pc:docMk/>
             <pc:sldMk cId="1561560363" sldId="263"/>
@@ -5130,7 +5528,7 @@
           </ac:spMkLst>
         </pc:spChg>
         <pc:spChg chg="mod">
-          <ac:chgData name="Weifeng Xu" userId="e7aed605-a3dd-4d5a-a692-a87037af107b" providerId="ADAL" clId="{BC6292C7-23F4-4ED4-A77E-013F6C63BF9B}" dt="2021-08-26T14:28:17.669" v="533" actId="1076"/>
+          <ac:chgData name="Weifeng Xu" userId="e7aed605-a3dd-4d5a-a692-a87037af107b" providerId="ADAL" clId="{BC6292C7-23F4-4ED4-A77E-013F6C63BF9B}" dt="2021-12-20T23:26:03.695" v="1016" actId="1036"/>
           <ac:spMkLst>
             <pc:docMk/>
             <pc:sldMk cId="1561560363" sldId="263"/>
@@ -5138,7 +5536,7 @@
           </ac:spMkLst>
         </pc:spChg>
         <pc:spChg chg="mod">
-          <ac:chgData name="Weifeng Xu" userId="e7aed605-a3dd-4d5a-a692-a87037af107b" providerId="ADAL" clId="{BC6292C7-23F4-4ED4-A77E-013F6C63BF9B}" dt="2021-08-26T14:28:17.669" v="533" actId="1076"/>
+          <ac:chgData name="Weifeng Xu" userId="e7aed605-a3dd-4d5a-a692-a87037af107b" providerId="ADAL" clId="{BC6292C7-23F4-4ED4-A77E-013F6C63BF9B}" dt="2021-12-20T23:26:03.695" v="1016" actId="1036"/>
           <ac:spMkLst>
             <pc:docMk/>
             <pc:sldMk cId="1561560363" sldId="263"/>
@@ -5146,7 +5544,7 @@
           </ac:spMkLst>
         </pc:spChg>
         <pc:spChg chg="mod">
-          <ac:chgData name="Weifeng Xu" userId="e7aed605-a3dd-4d5a-a692-a87037af107b" providerId="ADAL" clId="{BC6292C7-23F4-4ED4-A77E-013F6C63BF9B}" dt="2021-08-26T14:32:52.329" v="587" actId="207"/>
+          <ac:chgData name="Weifeng Xu" userId="e7aed605-a3dd-4d5a-a692-a87037af107b" providerId="ADAL" clId="{BC6292C7-23F4-4ED4-A77E-013F6C63BF9B}" dt="2021-12-20T23:26:03.695" v="1016" actId="1036"/>
           <ac:spMkLst>
             <pc:docMk/>
             <pc:sldMk cId="1561560363" sldId="263"/>
@@ -5154,7 +5552,7 @@
           </ac:spMkLst>
         </pc:spChg>
         <pc:spChg chg="mod">
-          <ac:chgData name="Weifeng Xu" userId="e7aed605-a3dd-4d5a-a692-a87037af107b" providerId="ADAL" clId="{BC6292C7-23F4-4ED4-A77E-013F6C63BF9B}" dt="2021-08-26T14:28:17.669" v="533" actId="1076"/>
+          <ac:chgData name="Weifeng Xu" userId="e7aed605-a3dd-4d5a-a692-a87037af107b" providerId="ADAL" clId="{BC6292C7-23F4-4ED4-A77E-013F6C63BF9B}" dt="2021-12-20T23:26:03.695" v="1016" actId="1036"/>
           <ac:spMkLst>
             <pc:docMk/>
             <pc:sldMk cId="1561560363" sldId="263"/>
@@ -5162,7 +5560,7 @@
           </ac:spMkLst>
         </pc:spChg>
         <pc:spChg chg="mod">
-          <ac:chgData name="Weifeng Xu" userId="e7aed605-a3dd-4d5a-a692-a87037af107b" providerId="ADAL" clId="{BC6292C7-23F4-4ED4-A77E-013F6C63BF9B}" dt="2021-08-26T14:28:17.669" v="533" actId="1076"/>
+          <ac:chgData name="Weifeng Xu" userId="e7aed605-a3dd-4d5a-a692-a87037af107b" providerId="ADAL" clId="{BC6292C7-23F4-4ED4-A77E-013F6C63BF9B}" dt="2021-12-20T23:26:03.695" v="1016" actId="1036"/>
           <ac:spMkLst>
             <pc:docMk/>
             <pc:sldMk cId="1561560363" sldId="263"/>
@@ -5170,7 +5568,7 @@
           </ac:spMkLst>
         </pc:spChg>
         <pc:spChg chg="mod">
-          <ac:chgData name="Weifeng Xu" userId="e7aed605-a3dd-4d5a-a692-a87037af107b" providerId="ADAL" clId="{BC6292C7-23F4-4ED4-A77E-013F6C63BF9B}" dt="2021-08-26T14:32:55.541" v="588" actId="207"/>
+          <ac:chgData name="Weifeng Xu" userId="e7aed605-a3dd-4d5a-a692-a87037af107b" providerId="ADAL" clId="{BC6292C7-23F4-4ED4-A77E-013F6C63BF9B}" dt="2021-12-20T23:26:03.695" v="1016" actId="1036"/>
           <ac:spMkLst>
             <pc:docMk/>
             <pc:sldMk cId="1561560363" sldId="263"/>
@@ -5178,7 +5576,7 @@
           </ac:spMkLst>
         </pc:spChg>
         <pc:spChg chg="mod">
-          <ac:chgData name="Weifeng Xu" userId="e7aed605-a3dd-4d5a-a692-a87037af107b" providerId="ADAL" clId="{BC6292C7-23F4-4ED4-A77E-013F6C63BF9B}" dt="2021-08-26T14:28:17.669" v="533" actId="1076"/>
+          <ac:chgData name="Weifeng Xu" userId="e7aed605-a3dd-4d5a-a692-a87037af107b" providerId="ADAL" clId="{BC6292C7-23F4-4ED4-A77E-013F6C63BF9B}" dt="2021-12-20T23:26:03.695" v="1016" actId="1036"/>
           <ac:spMkLst>
             <pc:docMk/>
             <pc:sldMk cId="1561560363" sldId="263"/>
@@ -5186,7 +5584,7 @@
           </ac:spMkLst>
         </pc:spChg>
         <pc:spChg chg="mod">
-          <ac:chgData name="Weifeng Xu" userId="e7aed605-a3dd-4d5a-a692-a87037af107b" providerId="ADAL" clId="{BC6292C7-23F4-4ED4-A77E-013F6C63BF9B}" dt="2021-08-26T14:28:17.669" v="533" actId="1076"/>
+          <ac:chgData name="Weifeng Xu" userId="e7aed605-a3dd-4d5a-a692-a87037af107b" providerId="ADAL" clId="{BC6292C7-23F4-4ED4-A77E-013F6C63BF9B}" dt="2021-12-20T23:26:03.695" v="1016" actId="1036"/>
           <ac:spMkLst>
             <pc:docMk/>
             <pc:sldMk cId="1561560363" sldId="263"/>
@@ -5194,7 +5592,7 @@
           </ac:spMkLst>
         </pc:spChg>
         <pc:spChg chg="mod">
-          <ac:chgData name="Weifeng Xu" userId="e7aed605-a3dd-4d5a-a692-a87037af107b" providerId="ADAL" clId="{BC6292C7-23F4-4ED4-A77E-013F6C63BF9B}" dt="2021-08-26T14:32:58.690" v="589" actId="207"/>
+          <ac:chgData name="Weifeng Xu" userId="e7aed605-a3dd-4d5a-a692-a87037af107b" providerId="ADAL" clId="{BC6292C7-23F4-4ED4-A77E-013F6C63BF9B}" dt="2021-12-20T23:26:03.695" v="1016" actId="1036"/>
           <ac:spMkLst>
             <pc:docMk/>
             <pc:sldMk cId="1561560363" sldId="263"/>
@@ -5202,7 +5600,7 @@
           </ac:spMkLst>
         </pc:spChg>
         <pc:spChg chg="mod">
-          <ac:chgData name="Weifeng Xu" userId="e7aed605-a3dd-4d5a-a692-a87037af107b" providerId="ADAL" clId="{BC6292C7-23F4-4ED4-A77E-013F6C63BF9B}" dt="2021-08-26T14:28:17.669" v="533" actId="1076"/>
+          <ac:chgData name="Weifeng Xu" userId="e7aed605-a3dd-4d5a-a692-a87037af107b" providerId="ADAL" clId="{BC6292C7-23F4-4ED4-A77E-013F6C63BF9B}" dt="2021-12-20T23:26:03.695" v="1016" actId="1036"/>
           <ac:spMkLst>
             <pc:docMk/>
             <pc:sldMk cId="1561560363" sldId="263"/>
@@ -5210,7 +5608,7 @@
           </ac:spMkLst>
         </pc:spChg>
         <pc:spChg chg="mod">
-          <ac:chgData name="Weifeng Xu" userId="e7aed605-a3dd-4d5a-a692-a87037af107b" providerId="ADAL" clId="{BC6292C7-23F4-4ED4-A77E-013F6C63BF9B}" dt="2021-08-26T14:28:17.669" v="533" actId="1076"/>
+          <ac:chgData name="Weifeng Xu" userId="e7aed605-a3dd-4d5a-a692-a87037af107b" providerId="ADAL" clId="{BC6292C7-23F4-4ED4-A77E-013F6C63BF9B}" dt="2021-12-20T23:26:03.695" v="1016" actId="1036"/>
           <ac:spMkLst>
             <pc:docMk/>
             <pc:sldMk cId="1561560363" sldId="263"/>
@@ -5218,7 +5616,7 @@
           </ac:spMkLst>
         </pc:spChg>
         <pc:spChg chg="mod">
-          <ac:chgData name="Weifeng Xu" userId="e7aed605-a3dd-4d5a-a692-a87037af107b" providerId="ADAL" clId="{BC6292C7-23F4-4ED4-A77E-013F6C63BF9B}" dt="2021-08-26T14:33:02.933" v="590" actId="207"/>
+          <ac:chgData name="Weifeng Xu" userId="e7aed605-a3dd-4d5a-a692-a87037af107b" providerId="ADAL" clId="{BC6292C7-23F4-4ED4-A77E-013F6C63BF9B}" dt="2021-12-20T23:26:03.695" v="1016" actId="1036"/>
           <ac:spMkLst>
             <pc:docMk/>
             <pc:sldMk cId="1561560363" sldId="263"/>
@@ -5226,7 +5624,7 @@
           </ac:spMkLst>
         </pc:spChg>
         <pc:spChg chg="mod">
-          <ac:chgData name="Weifeng Xu" userId="e7aed605-a3dd-4d5a-a692-a87037af107b" providerId="ADAL" clId="{BC6292C7-23F4-4ED4-A77E-013F6C63BF9B}" dt="2021-08-26T14:28:17.669" v="533" actId="1076"/>
+          <ac:chgData name="Weifeng Xu" userId="e7aed605-a3dd-4d5a-a692-a87037af107b" providerId="ADAL" clId="{BC6292C7-23F4-4ED4-A77E-013F6C63BF9B}" dt="2021-12-20T23:26:03.695" v="1016" actId="1036"/>
           <ac:spMkLst>
             <pc:docMk/>
             <pc:sldMk cId="1561560363" sldId="263"/>
@@ -5234,7 +5632,7 @@
           </ac:spMkLst>
         </pc:spChg>
         <pc:spChg chg="mod">
-          <ac:chgData name="Weifeng Xu" userId="e7aed605-a3dd-4d5a-a692-a87037af107b" providerId="ADAL" clId="{BC6292C7-23F4-4ED4-A77E-013F6C63BF9B}" dt="2021-08-26T14:28:17.669" v="533" actId="1076"/>
+          <ac:chgData name="Weifeng Xu" userId="e7aed605-a3dd-4d5a-a692-a87037af107b" providerId="ADAL" clId="{BC6292C7-23F4-4ED4-A77E-013F6C63BF9B}" dt="2021-12-20T23:26:03.695" v="1016" actId="1036"/>
           <ac:spMkLst>
             <pc:docMk/>
             <pc:sldMk cId="1561560363" sldId="263"/>
@@ -5242,7 +5640,7 @@
           </ac:spMkLst>
         </pc:spChg>
         <pc:spChg chg="mod">
-          <ac:chgData name="Weifeng Xu" userId="e7aed605-a3dd-4d5a-a692-a87037af107b" providerId="ADAL" clId="{BC6292C7-23F4-4ED4-A77E-013F6C63BF9B}" dt="2021-08-26T14:33:06.106" v="591" actId="207"/>
+          <ac:chgData name="Weifeng Xu" userId="e7aed605-a3dd-4d5a-a692-a87037af107b" providerId="ADAL" clId="{BC6292C7-23F4-4ED4-A77E-013F6C63BF9B}" dt="2021-12-20T23:26:03.695" v="1016" actId="1036"/>
           <ac:spMkLst>
             <pc:docMk/>
             <pc:sldMk cId="1561560363" sldId="263"/>
@@ -5250,7 +5648,7 @@
           </ac:spMkLst>
         </pc:spChg>
         <pc:spChg chg="mod">
-          <ac:chgData name="Weifeng Xu" userId="e7aed605-a3dd-4d5a-a692-a87037af107b" providerId="ADAL" clId="{BC6292C7-23F4-4ED4-A77E-013F6C63BF9B}" dt="2021-08-26T14:28:17.669" v="533" actId="1076"/>
+          <ac:chgData name="Weifeng Xu" userId="e7aed605-a3dd-4d5a-a692-a87037af107b" providerId="ADAL" clId="{BC6292C7-23F4-4ED4-A77E-013F6C63BF9B}" dt="2021-12-20T23:26:03.695" v="1016" actId="1036"/>
           <ac:spMkLst>
             <pc:docMk/>
             <pc:sldMk cId="1561560363" sldId="263"/>
@@ -5258,7 +5656,7 @@
           </ac:spMkLst>
         </pc:spChg>
         <pc:spChg chg="mod">
-          <ac:chgData name="Weifeng Xu" userId="e7aed605-a3dd-4d5a-a692-a87037af107b" providerId="ADAL" clId="{BC6292C7-23F4-4ED4-A77E-013F6C63BF9B}" dt="2021-08-26T14:28:17.669" v="533" actId="1076"/>
+          <ac:chgData name="Weifeng Xu" userId="e7aed605-a3dd-4d5a-a692-a87037af107b" providerId="ADAL" clId="{BC6292C7-23F4-4ED4-A77E-013F6C63BF9B}" dt="2021-12-20T23:26:03.695" v="1016" actId="1036"/>
           <ac:spMkLst>
             <pc:docMk/>
             <pc:sldMk cId="1561560363" sldId="263"/>
@@ -5266,7 +5664,7 @@
           </ac:spMkLst>
         </pc:spChg>
         <pc:spChg chg="add mod">
-          <ac:chgData name="Weifeng Xu" userId="e7aed605-a3dd-4d5a-a692-a87037af107b" providerId="ADAL" clId="{BC6292C7-23F4-4ED4-A77E-013F6C63BF9B}" dt="2021-08-26T14:31:05.200" v="575" actId="1076"/>
+          <ac:chgData name="Weifeng Xu" userId="e7aed605-a3dd-4d5a-a692-a87037af107b" providerId="ADAL" clId="{BC6292C7-23F4-4ED4-A77E-013F6C63BF9B}" dt="2021-12-20T23:26:03.695" v="1016" actId="1036"/>
           <ac:spMkLst>
             <pc:docMk/>
             <pc:sldMk cId="1561560363" sldId="263"/>
@@ -5298,7 +5696,7 @@
           </ac:spMkLst>
         </pc:spChg>
         <pc:spChg chg="add mod">
-          <ac:chgData name="Weifeng Xu" userId="e7aed605-a3dd-4d5a-a692-a87037af107b" providerId="ADAL" clId="{BC6292C7-23F4-4ED4-A77E-013F6C63BF9B}" dt="2021-08-26T14:28:51.514" v="542" actId="208"/>
+          <ac:chgData name="Weifeng Xu" userId="e7aed605-a3dd-4d5a-a692-a87037af107b" providerId="ADAL" clId="{BC6292C7-23F4-4ED4-A77E-013F6C63BF9B}" dt="2021-12-20T23:26:03.695" v="1016" actId="1036"/>
           <ac:spMkLst>
             <pc:docMk/>
             <pc:sldMk cId="1561560363" sldId="263"/>
@@ -5306,7 +5704,7 @@
           </ac:spMkLst>
         </pc:spChg>
         <pc:spChg chg="add mod">
-          <ac:chgData name="Weifeng Xu" userId="e7aed605-a3dd-4d5a-a692-a87037af107b" providerId="ADAL" clId="{BC6292C7-23F4-4ED4-A77E-013F6C63BF9B}" dt="2021-08-26T14:47:27.526" v="600" actId="1076"/>
+          <ac:chgData name="Weifeng Xu" userId="e7aed605-a3dd-4d5a-a692-a87037af107b" providerId="ADAL" clId="{BC6292C7-23F4-4ED4-A77E-013F6C63BF9B}" dt="2021-12-20T23:26:03.695" v="1016" actId="1036"/>
           <ac:spMkLst>
             <pc:docMk/>
             <pc:sldMk cId="1561560363" sldId="263"/>
@@ -5321,8 +5719,16 @@
             <ac:spMk id="40" creationId="{CB8508A7-73C5-4599-ABBE-0204D8D6C8E6}"/>
           </ac:spMkLst>
         </pc:spChg>
+        <pc:spChg chg="add mod">
+          <ac:chgData name="Weifeng Xu" userId="e7aed605-a3dd-4d5a-a692-a87037af107b" providerId="ADAL" clId="{BC6292C7-23F4-4ED4-A77E-013F6C63BF9B}" dt="2021-12-20T23:27:06.758" v="1029" actId="1076"/>
+          <ac:spMkLst>
+            <pc:docMk/>
+            <pc:sldMk cId="1561560363" sldId="263"/>
+            <ac:spMk id="41" creationId="{CAD544CE-399D-47CE-A3BB-2D2B7B27A656}"/>
+          </ac:spMkLst>
+        </pc:spChg>
         <pc:grpChg chg="add mod">
-          <ac:chgData name="Weifeng Xu" userId="e7aed605-a3dd-4d5a-a692-a87037af107b" providerId="ADAL" clId="{BC6292C7-23F4-4ED4-A77E-013F6C63BF9B}" dt="2021-08-26T14:28:17.669" v="533" actId="1076"/>
+          <ac:chgData name="Weifeng Xu" userId="e7aed605-a3dd-4d5a-a692-a87037af107b" providerId="ADAL" clId="{BC6292C7-23F4-4ED4-A77E-013F6C63BF9B}" dt="2021-12-20T23:26:03.695" v="1016" actId="1036"/>
           <ac:grpSpMkLst>
             <pc:docMk/>
             <pc:sldMk cId="1561560363" sldId="263"/>
@@ -5330,7 +5736,7 @@
           </ac:grpSpMkLst>
         </pc:grpChg>
         <pc:grpChg chg="add mod">
-          <ac:chgData name="Weifeng Xu" userId="e7aed605-a3dd-4d5a-a692-a87037af107b" providerId="ADAL" clId="{BC6292C7-23F4-4ED4-A77E-013F6C63BF9B}" dt="2021-08-26T14:28:17.669" v="533" actId="1076"/>
+          <ac:chgData name="Weifeng Xu" userId="e7aed605-a3dd-4d5a-a692-a87037af107b" providerId="ADAL" clId="{BC6292C7-23F4-4ED4-A77E-013F6C63BF9B}" dt="2021-12-20T23:26:03.695" v="1016" actId="1036"/>
           <ac:grpSpMkLst>
             <pc:docMk/>
             <pc:sldMk cId="1561560363" sldId="263"/>
@@ -5338,7 +5744,7 @@
           </ac:grpSpMkLst>
         </pc:grpChg>
         <pc:grpChg chg="add mod">
-          <ac:chgData name="Weifeng Xu" userId="e7aed605-a3dd-4d5a-a692-a87037af107b" providerId="ADAL" clId="{BC6292C7-23F4-4ED4-A77E-013F6C63BF9B}" dt="2021-08-26T14:28:17.669" v="533" actId="1076"/>
+          <ac:chgData name="Weifeng Xu" userId="e7aed605-a3dd-4d5a-a692-a87037af107b" providerId="ADAL" clId="{BC6292C7-23F4-4ED4-A77E-013F6C63BF9B}" dt="2021-12-20T23:26:03.695" v="1016" actId="1036"/>
           <ac:grpSpMkLst>
             <pc:docMk/>
             <pc:sldMk cId="1561560363" sldId="263"/>
@@ -5346,7 +5752,7 @@
           </ac:grpSpMkLst>
         </pc:grpChg>
         <pc:grpChg chg="add mod">
-          <ac:chgData name="Weifeng Xu" userId="e7aed605-a3dd-4d5a-a692-a87037af107b" providerId="ADAL" clId="{BC6292C7-23F4-4ED4-A77E-013F6C63BF9B}" dt="2021-08-26T14:28:17.669" v="533" actId="1076"/>
+          <ac:chgData name="Weifeng Xu" userId="e7aed605-a3dd-4d5a-a692-a87037af107b" providerId="ADAL" clId="{BC6292C7-23F4-4ED4-A77E-013F6C63BF9B}" dt="2021-12-20T23:26:03.695" v="1016" actId="1036"/>
           <ac:grpSpMkLst>
             <pc:docMk/>
             <pc:sldMk cId="1561560363" sldId="263"/>
@@ -5354,7 +5760,7 @@
           </ac:grpSpMkLst>
         </pc:grpChg>
         <pc:grpChg chg="add mod">
-          <ac:chgData name="Weifeng Xu" userId="e7aed605-a3dd-4d5a-a692-a87037af107b" providerId="ADAL" clId="{BC6292C7-23F4-4ED4-A77E-013F6C63BF9B}" dt="2021-08-26T14:28:17.669" v="533" actId="1076"/>
+          <ac:chgData name="Weifeng Xu" userId="e7aed605-a3dd-4d5a-a692-a87037af107b" providerId="ADAL" clId="{BC6292C7-23F4-4ED4-A77E-013F6C63BF9B}" dt="2021-12-20T23:26:03.695" v="1016" actId="1036"/>
           <ac:grpSpMkLst>
             <pc:docMk/>
             <pc:sldMk cId="1561560363" sldId="263"/>
@@ -5362,7 +5768,7 @@
           </ac:grpSpMkLst>
         </pc:grpChg>
         <pc:grpChg chg="add mod">
-          <ac:chgData name="Weifeng Xu" userId="e7aed605-a3dd-4d5a-a692-a87037af107b" providerId="ADAL" clId="{BC6292C7-23F4-4ED4-A77E-013F6C63BF9B}" dt="2021-08-26T14:28:17.669" v="533" actId="1076"/>
+          <ac:chgData name="Weifeng Xu" userId="e7aed605-a3dd-4d5a-a692-a87037af107b" providerId="ADAL" clId="{BC6292C7-23F4-4ED4-A77E-013F6C63BF9B}" dt="2021-12-20T23:26:03.695" v="1016" actId="1036"/>
           <ac:grpSpMkLst>
             <pc:docMk/>
             <pc:sldMk cId="1561560363" sldId="263"/>
@@ -5370,24 +5776,48 @@
           </ac:grpSpMkLst>
         </pc:grpChg>
         <pc:grpChg chg="add mod">
-          <ac:chgData name="Weifeng Xu" userId="e7aed605-a3dd-4d5a-a692-a87037af107b" providerId="ADAL" clId="{BC6292C7-23F4-4ED4-A77E-013F6C63BF9B}" dt="2021-08-26T14:28:17.669" v="533" actId="1076"/>
+          <ac:chgData name="Weifeng Xu" userId="e7aed605-a3dd-4d5a-a692-a87037af107b" providerId="ADAL" clId="{BC6292C7-23F4-4ED4-A77E-013F6C63BF9B}" dt="2021-12-20T23:26:03.695" v="1016" actId="1036"/>
           <ac:grpSpMkLst>
             <pc:docMk/>
             <pc:sldMk cId="1561560363" sldId="263"/>
             <ac:grpSpMk id="28" creationId="{32E6487F-7188-44E1-9516-430F2236627B}"/>
           </ac:grpSpMkLst>
         </pc:grpChg>
+        <pc:picChg chg="add mod">
+          <ac:chgData name="Weifeng Xu" userId="e7aed605-a3dd-4d5a-a692-a87037af107b" providerId="ADAL" clId="{BC6292C7-23F4-4ED4-A77E-013F6C63BF9B}" dt="2021-12-20T23:26:56.621" v="1027" actId="14100"/>
+          <ac:picMkLst>
+            <pc:docMk/>
+            <pc:sldMk cId="1561560363" sldId="263"/>
+            <ac:picMk id="34" creationId="{16B41702-FF15-4F4F-BA1E-390256313C1C}"/>
+          </ac:picMkLst>
+        </pc:picChg>
+        <pc:picChg chg="add mod">
+          <ac:chgData name="Weifeng Xu" userId="e7aed605-a3dd-4d5a-a692-a87037af107b" providerId="ADAL" clId="{BC6292C7-23F4-4ED4-A77E-013F6C63BF9B}" dt="2021-12-20T23:28:54.025" v="1033" actId="14100"/>
+          <ac:picMkLst>
+            <pc:docMk/>
+            <pc:sldMk cId="1561560363" sldId="263"/>
+            <ac:picMk id="44" creationId="{5EB7E3CA-C154-44B1-90F7-E2EA341D477F}"/>
+          </ac:picMkLst>
+        </pc:picChg>
         <pc:cxnChg chg="add mod">
-          <ac:chgData name="Weifeng Xu" userId="e7aed605-a3dd-4d5a-a692-a87037af107b" providerId="ADAL" clId="{BC6292C7-23F4-4ED4-A77E-013F6C63BF9B}" dt="2021-08-26T14:33:31.233" v="593" actId="208"/>
+          <ac:chgData name="Weifeng Xu" userId="e7aed605-a3dd-4d5a-a692-a87037af107b" providerId="ADAL" clId="{BC6292C7-23F4-4ED4-A77E-013F6C63BF9B}" dt="2021-12-20T23:26:03.695" v="1016" actId="1036"/>
           <ac:cxnSpMkLst>
             <pc:docMk/>
             <pc:sldMk cId="1561560363" sldId="263"/>
             <ac:cxnSpMk id="38" creationId="{FA1C22AE-FB84-4BB1-BCAD-5CD7846EEED3}"/>
           </ac:cxnSpMkLst>
         </pc:cxnChg>
+        <pc:cxnChg chg="add">
+          <ac:chgData name="Weifeng Xu" userId="e7aed605-a3dd-4d5a-a692-a87037af107b" providerId="ADAL" clId="{BC6292C7-23F4-4ED4-A77E-013F6C63BF9B}" dt="2021-12-20T23:27:10.430" v="1030" actId="11529"/>
+          <ac:cxnSpMkLst>
+            <pc:docMk/>
+            <pc:sldMk cId="1561560363" sldId="263"/>
+            <ac:cxnSpMk id="42" creationId="{EB3D095B-1D75-4C11-BA8F-7E0FD9F64767}"/>
+          </ac:cxnSpMkLst>
+        </pc:cxnChg>
       </pc:sldChg>
-      <pc:sldChg chg="addSp delSp modSp new mod modAnim">
-        <pc:chgData name="Weifeng Xu" userId="e7aed605-a3dd-4d5a-a692-a87037af107b" providerId="ADAL" clId="{BC6292C7-23F4-4ED4-A77E-013F6C63BF9B}" dt="2021-08-26T15:00:37.097" v="673" actId="207"/>
+      <pc:sldChg chg="addSp delSp modSp new mod modAnim modNotesTx">
+        <pc:chgData name="Weifeng Xu" userId="e7aed605-a3dd-4d5a-a692-a87037af107b" providerId="ADAL" clId="{BC6292C7-23F4-4ED4-A77E-013F6C63BF9B}" dt="2022-01-26T14:13:34.901" v="1265" actId="478"/>
         <pc:sldMkLst>
           <pc:docMk/>
           <pc:sldMk cId="177740071" sldId="264"/>
@@ -5401,13 +5831,21 @@
           </ac:spMkLst>
         </pc:spChg>
         <pc:spChg chg="mod">
-          <ac:chgData name="Weifeng Xu" userId="e7aed605-a3dd-4d5a-a692-a87037af107b" providerId="ADAL" clId="{BC6292C7-23F4-4ED4-A77E-013F6C63BF9B}" dt="2021-08-26T14:54:54.570" v="613" actId="207"/>
+          <ac:chgData name="Weifeng Xu" userId="e7aed605-a3dd-4d5a-a692-a87037af107b" providerId="ADAL" clId="{BC6292C7-23F4-4ED4-A77E-013F6C63BF9B}" dt="2021-12-20T19:34:45.678" v="906" actId="14100"/>
           <ac:spMkLst>
             <pc:docMk/>
             <pc:sldMk cId="177740071" sldId="264"/>
             <ac:spMk id="3" creationId="{948476F6-5505-4F21-96F0-A791C4381836}"/>
           </ac:spMkLst>
         </pc:spChg>
+        <pc:spChg chg="add del">
+          <ac:chgData name="Weifeng Xu" userId="e7aed605-a3dd-4d5a-a692-a87037af107b" providerId="ADAL" clId="{BC6292C7-23F4-4ED4-A77E-013F6C63BF9B}" dt="2022-01-26T14:06:41.985" v="1230"/>
+          <ac:spMkLst>
+            <pc:docMk/>
+            <pc:sldMk cId="177740071" sldId="264"/>
+            <ac:spMk id="4" creationId="{3E3E723E-A7F6-46D6-8659-623AF4827573}"/>
+          </ac:spMkLst>
+        </pc:spChg>
         <pc:spChg chg="add del mod">
           <ac:chgData name="Weifeng Xu" userId="e7aed605-a3dd-4d5a-a692-a87037af107b" providerId="ADAL" clId="{BC6292C7-23F4-4ED4-A77E-013F6C63BF9B}" dt="2021-08-26T14:55:40.133" v="616" actId="478"/>
           <ac:spMkLst>
@@ -5489,7 +5927,7 @@
           </ac:spMkLst>
         </pc:spChg>
         <pc:spChg chg="add mod">
-          <ac:chgData name="Weifeng Xu" userId="e7aed605-a3dd-4d5a-a692-a87037af107b" providerId="ADAL" clId="{BC6292C7-23F4-4ED4-A77E-013F6C63BF9B}" dt="2021-08-26T15:00:02.553" v="664" actId="20577"/>
+          <ac:chgData name="Weifeng Xu" userId="e7aed605-a3dd-4d5a-a692-a87037af107b" providerId="ADAL" clId="{BC6292C7-23F4-4ED4-A77E-013F6C63BF9B}" dt="2022-01-26T14:06:34.623" v="1227" actId="1076"/>
           <ac:spMkLst>
             <pc:docMk/>
             <pc:sldMk cId="177740071" sldId="264"/>
@@ -5502,6 +5940,22 @@
             <pc:docMk/>
             <pc:sldMk cId="177740071" sldId="264"/>
             <ac:spMk id="18" creationId="{20624040-ADEE-402A-BEE2-118AE56F5F11}"/>
+          </ac:spMkLst>
+        </pc:spChg>
+        <pc:spChg chg="add del mod">
+          <ac:chgData name="Weifeng Xu" userId="e7aed605-a3dd-4d5a-a692-a87037af107b" providerId="ADAL" clId="{BC6292C7-23F4-4ED4-A77E-013F6C63BF9B}" dt="2022-01-26T14:13:34.901" v="1265" actId="478"/>
+          <ac:spMkLst>
+            <pc:docMk/>
+            <pc:sldMk cId="177740071" sldId="264"/>
+            <ac:spMk id="20" creationId="{767FE56B-1848-4C5C-A946-CB897C5292F0}"/>
+          </ac:spMkLst>
+        </pc:spChg>
+        <pc:spChg chg="add mod">
+          <ac:chgData name="Weifeng Xu" userId="e7aed605-a3dd-4d5a-a692-a87037af107b" providerId="ADAL" clId="{BC6292C7-23F4-4ED4-A77E-013F6C63BF9B}" dt="2022-01-26T14:08:46.265" v="1263" actId="14100"/>
+          <ac:spMkLst>
+            <pc:docMk/>
+            <pc:sldMk cId="177740071" sldId="264"/>
+            <ac:spMk id="23" creationId="{B1D51253-22FB-4DF1-91DF-9BE3FBAA196A}"/>
           </ac:spMkLst>
         </pc:spChg>
         <pc:grpChg chg="add mod">
@@ -5528,6 +5982,38 @@
             <ac:grpSpMk id="10" creationId="{09BA94A8-90D7-4DA1-99D5-1819382330A4}"/>
           </ac:grpSpMkLst>
         </pc:grpChg>
+        <pc:picChg chg="add mod modCrop">
+          <ac:chgData name="Weifeng Xu" userId="e7aed605-a3dd-4d5a-a692-a87037af107b" providerId="ADAL" clId="{BC6292C7-23F4-4ED4-A77E-013F6C63BF9B}" dt="2021-12-21T00:12:25.163" v="1041" actId="732"/>
+          <ac:picMkLst>
+            <pc:docMk/>
+            <pc:sldMk cId="177740071" sldId="264"/>
+            <ac:picMk id="19" creationId="{FDD98927-560D-4667-AE41-98F920887A4E}"/>
+          </ac:picMkLst>
+        </pc:picChg>
+        <pc:picChg chg="add del">
+          <ac:chgData name="Weifeng Xu" userId="e7aed605-a3dd-4d5a-a692-a87037af107b" providerId="ADAL" clId="{BC6292C7-23F4-4ED4-A77E-013F6C63BF9B}" dt="2021-12-20T19:32:55.688" v="897" actId="22"/>
+          <ac:picMkLst>
+            <pc:docMk/>
+            <pc:sldMk cId="177740071" sldId="264"/>
+            <ac:picMk id="21" creationId="{2EBEA234-5D8D-41CF-97D5-ED6D3C24CC99}"/>
+          </ac:picMkLst>
+        </pc:picChg>
+        <pc:picChg chg="add mod">
+          <ac:chgData name="Weifeng Xu" userId="e7aed605-a3dd-4d5a-a692-a87037af107b" providerId="ADAL" clId="{BC6292C7-23F4-4ED4-A77E-013F6C63BF9B}" dt="2021-12-21T00:12:36.328" v="1043" actId="14100"/>
+          <ac:picMkLst>
+            <pc:docMk/>
+            <pc:sldMk cId="177740071" sldId="264"/>
+            <ac:picMk id="27" creationId="{68FF8FB9-13A9-481E-8EEF-22645987AEF8}"/>
+          </ac:picMkLst>
+        </pc:picChg>
+        <pc:cxnChg chg="add mod">
+          <ac:chgData name="Weifeng Xu" userId="e7aed605-a3dd-4d5a-a692-a87037af107b" providerId="ADAL" clId="{BC6292C7-23F4-4ED4-A77E-013F6C63BF9B}" dt="2021-12-21T00:12:25.163" v="1041" actId="732"/>
+          <ac:cxnSpMkLst>
+            <pc:docMk/>
+            <pc:sldMk cId="177740071" sldId="264"/>
+            <ac:cxnSpMk id="25" creationId="{99A9F88D-4755-468F-A2AF-E445878C7079}"/>
+          </ac:cxnSpMkLst>
+        </pc:cxnChg>
       </pc:sldChg>
       <pc:sldChg chg="addSp delSp modSp new mod">
         <pc:chgData name="Weifeng Xu" userId="e7aed605-a3dd-4d5a-a692-a87037af107b" providerId="ADAL" clId="{BC6292C7-23F4-4ED4-A77E-013F6C63BF9B}" dt="2021-08-26T15:35:46.194" v="815" actId="207"/>
@@ -5758,7 +6244,7 @@
         </pc:picChg>
       </pc:sldChg>
       <pc:sldChg chg="modSp new mod ord">
-        <pc:chgData name="Weifeng Xu" userId="e7aed605-a3dd-4d5a-a692-a87037af107b" providerId="ADAL" clId="{BC6292C7-23F4-4ED4-A77E-013F6C63BF9B}" dt="2021-08-26T18:39:03.198" v="879" actId="15"/>
+        <pc:chgData name="Weifeng Xu" userId="e7aed605-a3dd-4d5a-a692-a87037af107b" providerId="ADAL" clId="{BC6292C7-23F4-4ED4-A77E-013F6C63BF9B}" dt="2021-12-21T01:38:06.917" v="1225" actId="20577"/>
         <pc:sldMkLst>
           <pc:docMk/>
           <pc:sldMk cId="555243388" sldId="269"/>
@@ -5772,7 +6258,7 @@
           </ac:spMkLst>
         </pc:spChg>
         <pc:spChg chg="mod">
-          <ac:chgData name="Weifeng Xu" userId="e7aed605-a3dd-4d5a-a692-a87037af107b" providerId="ADAL" clId="{BC6292C7-23F4-4ED4-A77E-013F6C63BF9B}" dt="2021-08-26T18:39:03.198" v="879" actId="15"/>
+          <ac:chgData name="Weifeng Xu" userId="e7aed605-a3dd-4d5a-a692-a87037af107b" providerId="ADAL" clId="{BC6292C7-23F4-4ED4-A77E-013F6C63BF9B}" dt="2021-12-21T01:38:06.917" v="1225" actId="20577"/>
           <ac:spMkLst>
             <pc:docMk/>
             <pc:sldMk cId="555243388" sldId="269"/>
@@ -5818,6 +6304,287 @@
             <ac:picMk id="4" creationId="{89648C6E-822A-460A-AA89-D862C9853BE4}"/>
           </ac:picMkLst>
         </pc:picChg>
+      </pc:sldChg>
+      <pc:sldChg chg="addSp delSp modSp new mod modClrScheme chgLayout">
+        <pc:chgData name="Weifeng Xu" userId="e7aed605-a3dd-4d5a-a692-a87037af107b" providerId="ADAL" clId="{BC6292C7-23F4-4ED4-A77E-013F6C63BF9B}" dt="2021-12-21T00:26:53.513" v="1054" actId="1076"/>
+        <pc:sldMkLst>
+          <pc:docMk/>
+          <pc:sldMk cId="4218427973" sldId="271"/>
+        </pc:sldMkLst>
+        <pc:spChg chg="del">
+          <ac:chgData name="Weifeng Xu" userId="e7aed605-a3dd-4d5a-a692-a87037af107b" providerId="ADAL" clId="{BC6292C7-23F4-4ED4-A77E-013F6C63BF9B}" dt="2021-12-21T00:26:05.435" v="1045" actId="700"/>
+          <ac:spMkLst>
+            <pc:docMk/>
+            <pc:sldMk cId="4218427973" sldId="271"/>
+            <ac:spMk id="2" creationId="{16759899-B558-4A3C-851E-9A10283D9597}"/>
+          </ac:spMkLst>
+        </pc:spChg>
+        <pc:spChg chg="del">
+          <ac:chgData name="Weifeng Xu" userId="e7aed605-a3dd-4d5a-a692-a87037af107b" providerId="ADAL" clId="{BC6292C7-23F4-4ED4-A77E-013F6C63BF9B}" dt="2021-12-21T00:26:05.435" v="1045" actId="700"/>
+          <ac:spMkLst>
+            <pc:docMk/>
+            <pc:sldMk cId="4218427973" sldId="271"/>
+            <ac:spMk id="3" creationId="{42EF7844-591B-466E-80F9-FBDBAA60F668}"/>
+          </ac:spMkLst>
+        </pc:spChg>
+        <pc:spChg chg="add mod">
+          <ac:chgData name="Weifeng Xu" userId="e7aed605-a3dd-4d5a-a692-a87037af107b" providerId="ADAL" clId="{BC6292C7-23F4-4ED4-A77E-013F6C63BF9B}" dt="2021-12-21T00:26:50.986" v="1053" actId="1076"/>
+          <ac:spMkLst>
+            <pc:docMk/>
+            <pc:sldMk cId="4218427973" sldId="271"/>
+            <ac:spMk id="8" creationId="{6DBDB9C1-0A26-4CF9-B127-A55BEF3A647E}"/>
+          </ac:spMkLst>
+        </pc:spChg>
+        <pc:picChg chg="add mod">
+          <ac:chgData name="Weifeng Xu" userId="e7aed605-a3dd-4d5a-a692-a87037af107b" providerId="ADAL" clId="{BC6292C7-23F4-4ED4-A77E-013F6C63BF9B}" dt="2021-12-21T00:26:43.734" v="1051" actId="1076"/>
+          <ac:picMkLst>
+            <pc:docMk/>
+            <pc:sldMk cId="4218427973" sldId="271"/>
+            <ac:picMk id="5" creationId="{DBFCFC3C-50A2-4E27-84D9-502AB698B590}"/>
+          </ac:picMkLst>
+        </pc:picChg>
+        <pc:picChg chg="add mod">
+          <ac:chgData name="Weifeng Xu" userId="e7aed605-a3dd-4d5a-a692-a87037af107b" providerId="ADAL" clId="{BC6292C7-23F4-4ED4-A77E-013F6C63BF9B}" dt="2021-12-21T00:26:53.513" v="1054" actId="1076"/>
+          <ac:picMkLst>
+            <pc:docMk/>
+            <pc:sldMk cId="4218427973" sldId="271"/>
+            <ac:picMk id="7" creationId="{57DB3D4B-A019-46A4-97BC-99E53114A6AE}"/>
+          </ac:picMkLst>
+        </pc:picChg>
+      </pc:sldChg>
+      <pc:sldChg chg="addSp modSp new mod modClrScheme chgLayout modNotesTx">
+        <pc:chgData name="Weifeng Xu" userId="e7aed605-a3dd-4d5a-a692-a87037af107b" providerId="ADAL" clId="{BC6292C7-23F4-4ED4-A77E-013F6C63BF9B}" dt="2022-01-26T14:18:54.430" v="1269" actId="6549"/>
+        <pc:sldMkLst>
+          <pc:docMk/>
+          <pc:sldMk cId="1324712681" sldId="272"/>
+        </pc:sldMkLst>
+        <pc:spChg chg="add mod">
+          <ac:chgData name="Weifeng Xu" userId="e7aed605-a3dd-4d5a-a692-a87037af107b" providerId="ADAL" clId="{BC6292C7-23F4-4ED4-A77E-013F6C63BF9B}" dt="2022-01-26T14:18:29.629" v="1268" actId="20577"/>
+          <ac:spMkLst>
+            <pc:docMk/>
+            <pc:sldMk cId="1324712681" sldId="272"/>
+            <ac:spMk id="2" creationId="{AFC1A7BA-7685-444F-857C-61C577903823}"/>
+          </ac:spMkLst>
+        </pc:spChg>
+        <pc:spChg chg="add mod">
+          <ac:chgData name="Weifeng Xu" userId="e7aed605-a3dd-4d5a-a692-a87037af107b" providerId="ADAL" clId="{BC6292C7-23F4-4ED4-A77E-013F6C63BF9B}" dt="2021-12-21T01:31:57.508" v="1177" actId="20577"/>
+          <ac:spMkLst>
+            <pc:docMk/>
+            <pc:sldMk cId="1324712681" sldId="272"/>
+            <ac:spMk id="5" creationId="{415B57A5-1BD6-413C-96E9-176F8C2895BE}"/>
+          </ac:spMkLst>
+        </pc:spChg>
+        <pc:spChg chg="add mod">
+          <ac:chgData name="Weifeng Xu" userId="e7aed605-a3dd-4d5a-a692-a87037af107b" providerId="ADAL" clId="{BC6292C7-23F4-4ED4-A77E-013F6C63BF9B}" dt="2021-12-21T01:32:04.524" v="1183" actId="20577"/>
+          <ac:spMkLst>
+            <pc:docMk/>
+            <pc:sldMk cId="1324712681" sldId="272"/>
+            <ac:spMk id="8" creationId="{EB5CE0EB-8D15-4E49-8E6C-D40A55F67FA1}"/>
+          </ac:spMkLst>
+        </pc:spChg>
+        <pc:spChg chg="add mod">
+          <ac:chgData name="Weifeng Xu" userId="e7aed605-a3dd-4d5a-a692-a87037af107b" providerId="ADAL" clId="{BC6292C7-23F4-4ED4-A77E-013F6C63BF9B}" dt="2022-01-26T14:18:54.430" v="1269" actId="6549"/>
+          <ac:spMkLst>
+            <pc:docMk/>
+            <pc:sldMk cId="1324712681" sldId="272"/>
+            <ac:spMk id="11" creationId="{F1B5F1E5-6327-42E9-9A3A-003CF6C77E29}"/>
+          </ac:spMkLst>
+        </pc:spChg>
+        <pc:picChg chg="add mod">
+          <ac:chgData name="Weifeng Xu" userId="e7aed605-a3dd-4d5a-a692-a87037af107b" providerId="ADAL" clId="{BC6292C7-23F4-4ED4-A77E-013F6C63BF9B}" dt="2021-12-21T01:31:11.605" v="1154" actId="14100"/>
+          <ac:picMkLst>
+            <pc:docMk/>
+            <pc:sldMk cId="1324712681" sldId="272"/>
+            <ac:picMk id="4" creationId="{42D45F63-2DF1-4EC4-BADA-005EA22E2150}"/>
+          </ac:picMkLst>
+        </pc:picChg>
+        <pc:picChg chg="add mod">
+          <ac:chgData name="Weifeng Xu" userId="e7aed605-a3dd-4d5a-a692-a87037af107b" providerId="ADAL" clId="{BC6292C7-23F4-4ED4-A77E-013F6C63BF9B}" dt="2021-12-21T01:24:51.137" v="1144" actId="1076"/>
+          <ac:picMkLst>
+            <pc:docMk/>
+            <pc:sldMk cId="1324712681" sldId="272"/>
+            <ac:picMk id="7" creationId="{BDACB289-4944-4585-B8A1-AA600B7BC249}"/>
+          </ac:picMkLst>
+        </pc:picChg>
+        <pc:picChg chg="add mod">
+          <ac:chgData name="Weifeng Xu" userId="e7aed605-a3dd-4d5a-a692-a87037af107b" providerId="ADAL" clId="{BC6292C7-23F4-4ED4-A77E-013F6C63BF9B}" dt="2021-12-21T01:31:06.641" v="1153" actId="1076"/>
+          <ac:picMkLst>
+            <pc:docMk/>
+            <pc:sldMk cId="1324712681" sldId="272"/>
+            <ac:picMk id="10" creationId="{514FB793-7020-434C-9CBE-934F371E387F}"/>
+          </ac:picMkLst>
+        </pc:picChg>
+      </pc:sldChg>
+      <pc:sldChg chg="addSp modSp new mod">
+        <pc:chgData name="Weifeng Xu" userId="e7aed605-a3dd-4d5a-a692-a87037af107b" providerId="ADAL" clId="{BC6292C7-23F4-4ED4-A77E-013F6C63BF9B}" dt="2021-12-21T01:37:40.830" v="1212" actId="20577"/>
+        <pc:sldMkLst>
+          <pc:docMk/>
+          <pc:sldMk cId="1515556541" sldId="273"/>
+        </pc:sldMkLst>
+        <pc:spChg chg="add mod">
+          <ac:chgData name="Weifeng Xu" userId="e7aed605-a3dd-4d5a-a692-a87037af107b" providerId="ADAL" clId="{BC6292C7-23F4-4ED4-A77E-013F6C63BF9B}" dt="2021-12-21T01:37:40.830" v="1212" actId="20577"/>
+          <ac:spMkLst>
+            <pc:docMk/>
+            <pc:sldMk cId="1515556541" sldId="273"/>
+            <ac:spMk id="4" creationId="{575B0C08-4C42-4366-A7A7-2AE24A9C821E}"/>
+          </ac:spMkLst>
+        </pc:spChg>
+        <pc:picChg chg="add mod">
+          <ac:chgData name="Weifeng Xu" userId="e7aed605-a3dd-4d5a-a692-a87037af107b" providerId="ADAL" clId="{BC6292C7-23F4-4ED4-A77E-013F6C63BF9B}" dt="2021-12-21T01:37:05.389" v="1194" actId="1076"/>
+          <ac:picMkLst>
+            <pc:docMk/>
+            <pc:sldMk cId="1515556541" sldId="273"/>
+            <ac:picMk id="3" creationId="{8FD9840B-B109-40DC-9234-D2B228531696}"/>
+          </ac:picMkLst>
+        </pc:picChg>
+      </pc:sldChg>
+      <pc:sldChg chg="addSp delSp modSp new mod modClrScheme chgLayout">
+        <pc:chgData name="Weifeng Xu" userId="e7aed605-a3dd-4d5a-a692-a87037af107b" providerId="ADAL" clId="{BC6292C7-23F4-4ED4-A77E-013F6C63BF9B}" dt="2022-01-31T15:32:06.148" v="1371" actId="20577"/>
+        <pc:sldMkLst>
+          <pc:docMk/>
+          <pc:sldMk cId="2476286752" sldId="274"/>
+        </pc:sldMkLst>
+        <pc:spChg chg="del mod ord">
+          <ac:chgData name="Weifeng Xu" userId="e7aed605-a3dd-4d5a-a692-a87037af107b" providerId="ADAL" clId="{BC6292C7-23F4-4ED4-A77E-013F6C63BF9B}" dt="2022-01-31T15:31:58.589" v="1356" actId="700"/>
+          <ac:spMkLst>
+            <pc:docMk/>
+            <pc:sldMk cId="2476286752" sldId="274"/>
+            <ac:spMk id="2" creationId="{D7056C79-4604-4D3D-A85A-2BA9E8D996A3}"/>
+          </ac:spMkLst>
+        </pc:spChg>
+        <pc:spChg chg="add mod ord">
+          <ac:chgData name="Weifeng Xu" userId="e7aed605-a3dd-4d5a-a692-a87037af107b" providerId="ADAL" clId="{BC6292C7-23F4-4ED4-A77E-013F6C63BF9B}" dt="2022-01-31T15:32:06.148" v="1371" actId="20577"/>
+          <ac:spMkLst>
+            <pc:docMk/>
+            <pc:sldMk cId="2476286752" sldId="274"/>
+            <ac:spMk id="3" creationId="{C8C7F65F-793A-4F87-A760-845F7B6630C1}"/>
+          </ac:spMkLst>
+        </pc:spChg>
+        <pc:spChg chg="add mod ord">
+          <ac:chgData name="Weifeng Xu" userId="e7aed605-a3dd-4d5a-a692-a87037af107b" providerId="ADAL" clId="{BC6292C7-23F4-4ED4-A77E-013F6C63BF9B}" dt="2022-01-31T15:31:58.589" v="1356" actId="700"/>
+          <ac:spMkLst>
+            <pc:docMk/>
+            <pc:sldMk cId="2476286752" sldId="274"/>
+            <ac:spMk id="4" creationId="{70C8E395-1569-4B57-B814-E3908C509EA6}"/>
+          </ac:spMkLst>
+        </pc:spChg>
+      </pc:sldChg>
+      <pc:sldChg chg="addSp delSp modSp new mod modClrScheme chgLayout modNotesTx">
+        <pc:chgData name="Weifeng Xu" userId="e7aed605-a3dd-4d5a-a692-a87037af107b" providerId="ADAL" clId="{BC6292C7-23F4-4ED4-A77E-013F6C63BF9B}" dt="2022-01-31T15:48:43.981" v="1452" actId="14100"/>
+        <pc:sldMkLst>
+          <pc:docMk/>
+          <pc:sldMk cId="3972243169" sldId="275"/>
+        </pc:sldMkLst>
+        <pc:spChg chg="del mod ord">
+          <ac:chgData name="Weifeng Xu" userId="e7aed605-a3dd-4d5a-a692-a87037af107b" providerId="ADAL" clId="{BC6292C7-23F4-4ED4-A77E-013F6C63BF9B}" dt="2022-01-31T15:32:13.467" v="1373" actId="700"/>
+          <ac:spMkLst>
+            <pc:docMk/>
+            <pc:sldMk cId="3972243169" sldId="275"/>
+            <ac:spMk id="2" creationId="{6E12C013-6013-47AC-AC9A-AE6132C99C89}"/>
+          </ac:spMkLst>
+        </pc:spChg>
+        <pc:spChg chg="del">
+          <ac:chgData name="Weifeng Xu" userId="e7aed605-a3dd-4d5a-a692-a87037af107b" providerId="ADAL" clId="{BC6292C7-23F4-4ED4-A77E-013F6C63BF9B}" dt="2022-01-31T15:32:13.467" v="1373" actId="700"/>
+          <ac:spMkLst>
+            <pc:docMk/>
+            <pc:sldMk cId="3972243169" sldId="275"/>
+            <ac:spMk id="3" creationId="{724155F7-0560-4373-9E83-26BE67B9DCBD}"/>
+          </ac:spMkLst>
+        </pc:spChg>
+        <pc:spChg chg="add del mod ord">
+          <ac:chgData name="Weifeng Xu" userId="e7aed605-a3dd-4d5a-a692-a87037af107b" providerId="ADAL" clId="{BC6292C7-23F4-4ED4-A77E-013F6C63BF9B}" dt="2022-01-31T15:33:11.288" v="1374" actId="700"/>
+          <ac:spMkLst>
+            <pc:docMk/>
+            <pc:sldMk cId="3972243169" sldId="275"/>
+            <ac:spMk id="4" creationId="{BC147E6A-8A38-4986-B0BF-05265AAF3ED2}"/>
+          </ac:spMkLst>
+        </pc:spChg>
+        <pc:spChg chg="add mod ord">
+          <ac:chgData name="Weifeng Xu" userId="e7aed605-a3dd-4d5a-a692-a87037af107b" providerId="ADAL" clId="{BC6292C7-23F4-4ED4-A77E-013F6C63BF9B}" dt="2022-01-31T15:33:18.528" v="1376"/>
+          <ac:spMkLst>
+            <pc:docMk/>
+            <pc:sldMk cId="3972243169" sldId="275"/>
+            <ac:spMk id="5" creationId="{F7C85A65-85F6-4869-ABF4-66ECE9F4E7F5}"/>
+          </ac:spMkLst>
+        </pc:spChg>
+        <pc:spChg chg="add mod ord">
+          <ac:chgData name="Weifeng Xu" userId="e7aed605-a3dd-4d5a-a692-a87037af107b" providerId="ADAL" clId="{BC6292C7-23F4-4ED4-A77E-013F6C63BF9B}" dt="2022-01-31T15:48:43.981" v="1452" actId="14100"/>
+          <ac:spMkLst>
+            <pc:docMk/>
+            <pc:sldMk cId="3972243169" sldId="275"/>
+            <ac:spMk id="6" creationId="{23BFB659-95F8-4F0B-8232-6515C6879CE9}"/>
+          </ac:spMkLst>
+        </pc:spChg>
+        <pc:spChg chg="add mod">
+          <ac:chgData name="Weifeng Xu" userId="e7aed605-a3dd-4d5a-a692-a87037af107b" providerId="ADAL" clId="{BC6292C7-23F4-4ED4-A77E-013F6C63BF9B}" dt="2022-01-31T15:48:04.857" v="1430" actId="1076"/>
+          <ac:spMkLst>
+            <pc:docMk/>
+            <pc:sldMk cId="3972243169" sldId="275"/>
+            <ac:spMk id="11" creationId="{EAA7B474-0ADF-4310-9AAD-F48A44972498}"/>
+          </ac:spMkLst>
+        </pc:spChg>
+        <pc:spChg chg="add mod">
+          <ac:chgData name="Weifeng Xu" userId="e7aed605-a3dd-4d5a-a692-a87037af107b" providerId="ADAL" clId="{BC6292C7-23F4-4ED4-A77E-013F6C63BF9B}" dt="2022-01-31T15:48:38.721" v="1451" actId="20577"/>
+          <ac:spMkLst>
+            <pc:docMk/>
+            <pc:sldMk cId="3972243169" sldId="275"/>
+            <ac:spMk id="12" creationId="{0D8CFFCA-9681-4B33-88B1-0D682032CEA5}"/>
+          </ac:spMkLst>
+        </pc:spChg>
+        <pc:picChg chg="add mod">
+          <ac:chgData name="Weifeng Xu" userId="e7aed605-a3dd-4d5a-a692-a87037af107b" providerId="ADAL" clId="{BC6292C7-23F4-4ED4-A77E-013F6C63BF9B}" dt="2022-01-31T15:39:18.934" v="1395" actId="1076"/>
+          <ac:picMkLst>
+            <pc:docMk/>
+            <pc:sldMk cId="3972243169" sldId="275"/>
+            <ac:picMk id="8" creationId="{624A0C72-2EC3-4A4F-9E88-34123ABA7E76}"/>
+          </ac:picMkLst>
+        </pc:picChg>
+        <pc:picChg chg="add mod">
+          <ac:chgData name="Weifeng Xu" userId="e7aed605-a3dd-4d5a-a692-a87037af107b" providerId="ADAL" clId="{BC6292C7-23F4-4ED4-A77E-013F6C63BF9B}" dt="2022-01-31T15:48:12.148" v="1431" actId="1076"/>
+          <ac:picMkLst>
+            <pc:docMk/>
+            <pc:sldMk cId="3972243169" sldId="275"/>
+            <ac:picMk id="10" creationId="{F638BD0D-3CCB-4D36-AD59-F18C1E11EEAB}"/>
+          </ac:picMkLst>
+        </pc:picChg>
+      </pc:sldChg>
+      <pc:sldChg chg="modSp new mod">
+        <pc:chgData name="Weifeng Xu" userId="e7aed605-a3dd-4d5a-a692-a87037af107b" providerId="ADAL" clId="{BC6292C7-23F4-4ED4-A77E-013F6C63BF9B}" dt="2022-01-31T16:33:48.303" v="1507" actId="20577"/>
+        <pc:sldMkLst>
+          <pc:docMk/>
+          <pc:sldMk cId="930520840" sldId="276"/>
+        </pc:sldMkLst>
+        <pc:spChg chg="mod">
+          <ac:chgData name="Weifeng Xu" userId="e7aed605-a3dd-4d5a-a692-a87037af107b" providerId="ADAL" clId="{BC6292C7-23F4-4ED4-A77E-013F6C63BF9B}" dt="2022-01-31T16:32:40.269" v="1480" actId="21"/>
+          <ac:spMkLst>
+            <pc:docMk/>
+            <pc:sldMk cId="930520840" sldId="276"/>
+            <ac:spMk id="2" creationId="{01324B60-4399-4B03-A2B0-1AD626B9B860}"/>
+          </ac:spMkLst>
+        </pc:spChg>
+        <pc:spChg chg="mod">
+          <ac:chgData name="Weifeng Xu" userId="e7aed605-a3dd-4d5a-a692-a87037af107b" providerId="ADAL" clId="{BC6292C7-23F4-4ED4-A77E-013F6C63BF9B}" dt="2022-01-31T16:33:48.303" v="1507" actId="20577"/>
+          <ac:spMkLst>
+            <pc:docMk/>
+            <pc:sldMk cId="930520840" sldId="276"/>
+            <ac:spMk id="3" creationId="{2500F15C-7111-422D-9384-11B217932593}"/>
+          </ac:spMkLst>
+        </pc:spChg>
+      </pc:sldChg>
+      <pc:sldChg chg="modSp new del mod">
+        <pc:chgData name="Weifeng Xu" userId="e7aed605-a3dd-4d5a-a692-a87037af107b" providerId="ADAL" clId="{BC6292C7-23F4-4ED4-A77E-013F6C63BF9B}" dt="2022-01-31T16:27:37.460" v="1475" actId="47"/>
+        <pc:sldMkLst>
+          <pc:docMk/>
+          <pc:sldMk cId="3290993918" sldId="276"/>
+        </pc:sldMkLst>
+        <pc:spChg chg="mod">
+          <ac:chgData name="Weifeng Xu" userId="e7aed605-a3dd-4d5a-a692-a87037af107b" providerId="ADAL" clId="{BC6292C7-23F4-4ED4-A77E-013F6C63BF9B}" dt="2022-01-31T16:26:44.135" v="1474" actId="20577"/>
+          <ac:spMkLst>
+            <pc:docMk/>
+            <pc:sldMk cId="3290993918" sldId="276"/>
+            <ac:spMk id="2" creationId="{A02A8E9C-7A74-41D8-B53D-7D3443FFE2A2}"/>
+          </ac:spMkLst>
+        </pc:spChg>
       </pc:sldChg>
       <pc:sldChg chg="del">
         <pc:chgData name="Weifeng Xu" userId="e7aed605-a3dd-4d5a-a692-a87037af107b" providerId="ADAL" clId="{BC6292C7-23F4-4ED4-A77E-013F6C63BF9B}" dt="2021-08-26T13:19:54.875" v="24" actId="47"/>
@@ -6554,6 +7321,146 @@
 </pc:chgInfo>
 </file>
 
+<file path=ppt/ink/ink1.xml><?xml version="1.0" encoding="utf-8"?>
+<inkml:ink xmlns:inkml="http://www.w3.org/2003/InkML">
+  <inkml:definitions>
+    <inkml:context xml:id="ctx0">
+      <inkml:inkSource xml:id="inkSrc0">
+        <inkml:traceFormat>
+          <inkml:channel name="X" type="integer" min="-2.14748E9" max="2.14748E9" units="cm"/>
+          <inkml:channel name="Y" type="integer" min="-2.14748E9" max="2.14748E9" units="cm"/>
+          <inkml:channel name="F" type="integer" max="32767" units="dev"/>
+        </inkml:traceFormat>
+        <inkml:channelProperties>
+          <inkml:channelProperty channel="X" name="resolution" value="1000" units="1/cm"/>
+          <inkml:channelProperty channel="Y" name="resolution" value="1000" units="1/cm"/>
+          <inkml:channelProperty channel="F" name="resolution" value="0" units="1/dev"/>
+        </inkml:channelProperties>
+      </inkml:inkSource>
+      <inkml:timestamp xml:id="ts0" timeString="2022-01-31T13:21:14.023"/>
+    </inkml:context>
+    <inkml:brush xml:id="br0">
+      <inkml:brushProperty name="width" value="0.05" units="cm"/>
+      <inkml:brushProperty name="height" value="0.05" units="cm"/>
+      <inkml:brushProperty name="color" value="#E71224"/>
+    </inkml:brush>
+  </inkml:definitions>
+  <inkml:trace contextRef="#ctx0" brushRef="#br0">0 0 24575,'0'0'-8191</inkml:trace>
+</inkml:ink>
+</file>
+
+<file path=ppt/ink/ink2.xml><?xml version="1.0" encoding="utf-8"?>
+<inkml:ink xmlns:inkml="http://www.w3.org/2003/InkML">
+  <inkml:definitions>
+    <inkml:context xml:id="ctx0">
+      <inkml:inkSource xml:id="inkSrc0">
+        <inkml:traceFormat>
+          <inkml:channel name="X" type="integer" min="-2.14748E9" max="2.14748E9" units="cm"/>
+          <inkml:channel name="Y" type="integer" min="-2.14748E9" max="2.14748E9" units="cm"/>
+          <inkml:channel name="F" type="integer" max="32767" units="dev"/>
+        </inkml:traceFormat>
+        <inkml:channelProperties>
+          <inkml:channelProperty channel="X" name="resolution" value="1000" units="1/cm"/>
+          <inkml:channelProperty channel="Y" name="resolution" value="1000" units="1/cm"/>
+          <inkml:channelProperty channel="F" name="resolution" value="0" units="1/dev"/>
+        </inkml:channelProperties>
+      </inkml:inkSource>
+      <inkml:timestamp xml:id="ts0" timeString="2022-01-31T13:21:14.403"/>
+    </inkml:context>
+    <inkml:brush xml:id="br0">
+      <inkml:brushProperty name="width" value="0.05" units="cm"/>
+      <inkml:brushProperty name="height" value="0.05" units="cm"/>
+      <inkml:brushProperty name="color" value="#E71224"/>
+    </inkml:brush>
+  </inkml:definitions>
+  <inkml:trace contextRef="#ctx0" brushRef="#br0">0 1 24575</inkml:trace>
+</inkml:ink>
+</file>
+
+<file path=ppt/ink/ink3.xml><?xml version="1.0" encoding="utf-8"?>
+<inkml:ink xmlns:inkml="http://www.w3.org/2003/InkML">
+  <inkml:definitions>
+    <inkml:context xml:id="ctx0">
+      <inkml:inkSource xml:id="inkSrc0">
+        <inkml:traceFormat>
+          <inkml:channel name="X" type="integer" min="-2.14748E9" max="2.14748E9" units="cm"/>
+          <inkml:channel name="Y" type="integer" min="-2.14748E9" max="2.14748E9" units="cm"/>
+          <inkml:channel name="F" type="integer" max="32767" units="dev"/>
+        </inkml:traceFormat>
+        <inkml:channelProperties>
+          <inkml:channelProperty channel="X" name="resolution" value="1000" units="1/cm"/>
+          <inkml:channelProperty channel="Y" name="resolution" value="1000" units="1/cm"/>
+          <inkml:channelProperty channel="F" name="resolution" value="0" units="1/dev"/>
+        </inkml:channelProperties>
+      </inkml:inkSource>
+      <inkml:timestamp xml:id="ts0" timeString="2022-01-31T13:22:06.270"/>
+    </inkml:context>
+    <inkml:brush xml:id="br0">
+      <inkml:brushProperty name="width" value="0.05" units="cm"/>
+      <inkml:brushProperty name="height" value="0.05" units="cm"/>
+      <inkml:brushProperty name="color" value="#E71224"/>
+    </inkml:brush>
+  </inkml:definitions>
+  <inkml:trace contextRef="#ctx0" brushRef="#br0">0 0 24575,'0'0'-8191</inkml:trace>
+</inkml:ink>
+</file>
+
+<file path=ppt/ink/ink4.xml><?xml version="1.0" encoding="utf-8"?>
+<inkml:ink xmlns:inkml="http://www.w3.org/2003/InkML">
+  <inkml:definitions>
+    <inkml:context xml:id="ctx0">
+      <inkml:inkSource xml:id="inkSrc0">
+        <inkml:traceFormat>
+          <inkml:channel name="X" type="integer" min="-2.14748E9" max="2.14748E9" units="cm"/>
+          <inkml:channel name="Y" type="integer" min="-2.14748E9" max="2.14748E9" units="cm"/>
+          <inkml:channel name="F" type="integer" max="32767" units="dev"/>
+        </inkml:traceFormat>
+        <inkml:channelProperties>
+          <inkml:channelProperty channel="X" name="resolution" value="1000" units="1/cm"/>
+          <inkml:channelProperty channel="Y" name="resolution" value="1000" units="1/cm"/>
+          <inkml:channelProperty channel="F" name="resolution" value="0" units="1/dev"/>
+        </inkml:channelProperties>
+      </inkml:inkSource>
+      <inkml:timestamp xml:id="ts0" timeString="2022-01-31T13:26:16.722"/>
+    </inkml:context>
+    <inkml:brush xml:id="br0">
+      <inkml:brushProperty name="width" value="0.05" units="cm"/>
+      <inkml:brushProperty name="height" value="0.05" units="cm"/>
+      <inkml:brushProperty name="color" value="#E71224"/>
+    </inkml:brush>
+  </inkml:definitions>
+  <inkml:trace contextRef="#ctx0" brushRef="#br0">0 0 24575</inkml:trace>
+</inkml:ink>
+</file>
+
+<file path=ppt/ink/ink5.xml><?xml version="1.0" encoding="utf-8"?>
+<inkml:ink xmlns:inkml="http://www.w3.org/2003/InkML">
+  <inkml:definitions>
+    <inkml:context xml:id="ctx0">
+      <inkml:inkSource xml:id="inkSrc0">
+        <inkml:traceFormat>
+          <inkml:channel name="X" type="integer" min="-2.14748E9" max="2.14748E9" units="cm"/>
+          <inkml:channel name="Y" type="integer" min="-2.14748E9" max="2.14748E9" units="cm"/>
+          <inkml:channel name="F" type="integer" max="32767" units="dev"/>
+        </inkml:traceFormat>
+        <inkml:channelProperties>
+          <inkml:channelProperty channel="X" name="resolution" value="1000" units="1/cm"/>
+          <inkml:channelProperty channel="Y" name="resolution" value="1000" units="1/cm"/>
+          <inkml:channelProperty channel="F" name="resolution" value="0" units="1/dev"/>
+        </inkml:channelProperties>
+      </inkml:inkSource>
+      <inkml:timestamp xml:id="ts0" timeString="2022-01-31T13:27:39.126"/>
+    </inkml:context>
+    <inkml:brush xml:id="br0">
+      <inkml:brushProperty name="width" value="0.05" units="cm"/>
+      <inkml:brushProperty name="height" value="0.05" units="cm"/>
+      <inkml:brushProperty name="color" value="#E71224"/>
+    </inkml:brush>
+  </inkml:definitions>
+  <inkml:trace contextRef="#ctx0" brushRef="#br0">0 1 24575,'0'0'-8191</inkml:trace>
+</inkml:ink>
+</file>
+
 <file path=ppt/notesMasters/notesMaster1.xml><?xml version="1.0" encoding="utf-8"?>
 <p:notesMaster xmlns:a="http://schemas.openxmlformats.org/drawingml/2006/main" xmlns:r="http://schemas.openxmlformats.org/officeDocument/2006/relationships" xmlns:p="http://schemas.openxmlformats.org/presentationml/2006/main">
   <p:cSld>
@@ -6636,7 +7543,7 @@
           <a:p>
             <a:fld id="{B9658D5F-65FB-4E17-9D5B-8CF1DE5A98DF}" type="datetimeFigureOut">
               <a:rPr lang="en-US" smtClean="0"/>
-              <a:t>8/30/2021</a:t>
+              <a:t>1/31/2022</a:t>
             </a:fld>
             <a:endParaRPr lang="en-US"/>
           </a:p>
@@ -6903,6 +7810,464 @@
 </p:notesMaster>
 </file>
 
+<file path=ppt/notesSlides/notesSlide1.xml><?xml version="1.0" encoding="utf-8"?>
+<p:notes xmlns:a="http://schemas.openxmlformats.org/drawingml/2006/main" xmlns:r="http://schemas.openxmlformats.org/officeDocument/2006/relationships" xmlns:p="http://schemas.openxmlformats.org/presentationml/2006/main">
+  <p:cSld>
+    <p:spTree>
+      <p:nvGrpSpPr>
+        <p:cNvPr id="1" name=""/>
+        <p:cNvGrpSpPr/>
+        <p:nvPr/>
+      </p:nvGrpSpPr>
+      <p:grpSpPr>
+        <a:xfrm>
+          <a:off x="0" y="0"/>
+          <a:ext cx="0" cy="0"/>
+          <a:chOff x="0" y="0"/>
+          <a:chExt cx="0" cy="0"/>
+        </a:xfrm>
+      </p:grpSpPr>
+      <p:sp>
+        <p:nvSpPr>
+          <p:cNvPr id="2" name="Slide Image Placeholder 1"/>
+          <p:cNvSpPr>
+            <a:spLocks noGrp="1" noRot="1" noChangeAspect="1"/>
+          </p:cNvSpPr>
+          <p:nvPr>
+            <p:ph type="sldImg"/>
+          </p:nvPr>
+        </p:nvSpPr>
+        <p:spPr/>
+      </p:sp>
+      <p:sp>
+        <p:nvSpPr>
+          <p:cNvPr id="3" name="Notes Placeholder 2"/>
+          <p:cNvSpPr>
+            <a:spLocks noGrp="1"/>
+          </p:cNvSpPr>
+          <p:nvPr>
+            <p:ph type="body" idx="1"/>
+          </p:nvPr>
+        </p:nvSpPr>
+        <p:spPr/>
+        <p:txBody>
+          <a:bodyPr/>
+          <a:lstStyle/>
+          <a:p>
+            <a:r>
+              <a:rPr lang="en-US" dirty="0"/>
+              <a:t>https://www.gnu.org/software/bash/manual/html_node/Shell-Arithmetic.html</a:t>
+            </a:r>
+          </a:p>
+        </p:txBody>
+      </p:sp>
+      <p:sp>
+        <p:nvSpPr>
+          <p:cNvPr id="4" name="Slide Number Placeholder 3"/>
+          <p:cNvSpPr>
+            <a:spLocks noGrp="1"/>
+          </p:cNvSpPr>
+          <p:nvPr>
+            <p:ph type="sldNum" sz="quarter" idx="5"/>
+          </p:nvPr>
+        </p:nvSpPr>
+        <p:spPr/>
+        <p:txBody>
+          <a:bodyPr/>
+          <a:lstStyle/>
+          <a:p>
+            <a:fld id="{8349544B-F866-4ED0-8997-24601187AE87}" type="slidenum">
+              <a:rPr lang="en-US" smtClean="0"/>
+              <a:t>7</a:t>
+            </a:fld>
+            <a:endParaRPr lang="en-US"/>
+          </a:p>
+        </p:txBody>
+      </p:sp>
+    </p:spTree>
+    <p:extLst>
+      <p:ext uri="{BB962C8B-B14F-4D97-AF65-F5344CB8AC3E}">
+        <p14:creationId xmlns:p14="http://schemas.microsoft.com/office/powerpoint/2010/main" val="1114031522"/>
+      </p:ext>
+    </p:extLst>
+  </p:cSld>
+  <p:clrMapOvr>
+    <a:masterClrMapping/>
+  </p:clrMapOvr>
+</p:notes>
+</file>
+
+<file path=ppt/notesSlides/notesSlide2.xml><?xml version="1.0" encoding="utf-8"?>
+<p:notes xmlns:a="http://schemas.openxmlformats.org/drawingml/2006/main" xmlns:r="http://schemas.openxmlformats.org/officeDocument/2006/relationships" xmlns:p="http://schemas.openxmlformats.org/presentationml/2006/main">
+  <p:cSld>
+    <p:spTree>
+      <p:nvGrpSpPr>
+        <p:cNvPr id="1" name=""/>
+        <p:cNvGrpSpPr/>
+        <p:nvPr/>
+      </p:nvGrpSpPr>
+      <p:grpSpPr>
+        <a:xfrm>
+          <a:off x="0" y="0"/>
+          <a:ext cx="0" cy="0"/>
+          <a:chOff x="0" y="0"/>
+          <a:chExt cx="0" cy="0"/>
+        </a:xfrm>
+      </p:grpSpPr>
+      <p:sp>
+        <p:nvSpPr>
+          <p:cNvPr id="2" name="Slide Image Placeholder 1"/>
+          <p:cNvSpPr>
+            <a:spLocks noGrp="1" noRot="1" noChangeAspect="1"/>
+          </p:cNvSpPr>
+          <p:nvPr>
+            <p:ph type="sldImg"/>
+          </p:nvPr>
+        </p:nvSpPr>
+        <p:spPr/>
+      </p:sp>
+      <p:sp>
+        <p:nvSpPr>
+          <p:cNvPr id="3" name="Notes Placeholder 2"/>
+          <p:cNvSpPr>
+            <a:spLocks noGrp="1"/>
+          </p:cNvSpPr>
+          <p:nvPr>
+            <p:ph type="body" idx="1"/>
+          </p:nvPr>
+        </p:nvSpPr>
+        <p:spPr/>
+        <p:txBody>
+          <a:bodyPr/>
+          <a:lstStyle/>
+          <a:p>
+            <a:r>
+              <a:rPr lang="en-US" dirty="0"/>
+              <a:t>echo "</a:t>
+            </a:r>
+            <a:r>
+              <a:rPr lang="en-US" dirty="0" err="1"/>
+              <a:t>obase</a:t>
+            </a:r>
+            <a:r>
+              <a:rPr lang="en-US" dirty="0"/>
+              <a:t>=2;126" | </a:t>
+            </a:r>
+            <a:r>
+              <a:rPr lang="en-US" dirty="0" err="1"/>
+              <a:t>bc</a:t>
+            </a:r>
+            <a:endParaRPr lang="en-US" dirty="0"/>
+          </a:p>
+          <a:p>
+            <a:endParaRPr lang="en-US" dirty="0"/>
+          </a:p>
+        </p:txBody>
+      </p:sp>
+      <p:sp>
+        <p:nvSpPr>
+          <p:cNvPr id="4" name="Slide Number Placeholder 3"/>
+          <p:cNvSpPr>
+            <a:spLocks noGrp="1"/>
+          </p:cNvSpPr>
+          <p:nvPr>
+            <p:ph type="sldNum" sz="quarter" idx="5"/>
+          </p:nvPr>
+        </p:nvSpPr>
+        <p:spPr/>
+        <p:txBody>
+          <a:bodyPr/>
+          <a:lstStyle/>
+          <a:p>
+            <a:fld id="{8349544B-F866-4ED0-8997-24601187AE87}" type="slidenum">
+              <a:rPr lang="en-US" smtClean="0"/>
+              <a:t>8</a:t>
+            </a:fld>
+            <a:endParaRPr lang="en-US"/>
+          </a:p>
+        </p:txBody>
+      </p:sp>
+    </p:spTree>
+    <p:extLst>
+      <p:ext uri="{BB962C8B-B14F-4D97-AF65-F5344CB8AC3E}">
+        <p14:creationId xmlns:p14="http://schemas.microsoft.com/office/powerpoint/2010/main" val="2052793749"/>
+      </p:ext>
+    </p:extLst>
+  </p:cSld>
+  <p:clrMapOvr>
+    <a:masterClrMapping/>
+  </p:clrMapOvr>
+</p:notes>
+</file>
+
+<file path=ppt/notesSlides/notesSlide3.xml><?xml version="1.0" encoding="utf-8"?>
+<p:notes xmlns:a="http://schemas.openxmlformats.org/drawingml/2006/main" xmlns:r="http://schemas.openxmlformats.org/officeDocument/2006/relationships" xmlns:p="http://schemas.openxmlformats.org/presentationml/2006/main">
+  <p:cSld>
+    <p:spTree>
+      <p:nvGrpSpPr>
+        <p:cNvPr id="1" name=""/>
+        <p:cNvGrpSpPr/>
+        <p:nvPr/>
+      </p:nvGrpSpPr>
+      <p:grpSpPr>
+        <a:xfrm>
+          <a:off x="0" y="0"/>
+          <a:ext cx="0" cy="0"/>
+          <a:chOff x="0" y="0"/>
+          <a:chExt cx="0" cy="0"/>
+        </a:xfrm>
+      </p:grpSpPr>
+      <p:sp>
+        <p:nvSpPr>
+          <p:cNvPr id="2" name="Slide Image Placeholder 1"/>
+          <p:cNvSpPr>
+            <a:spLocks noGrp="1" noRot="1" noChangeAspect="1"/>
+          </p:cNvSpPr>
+          <p:nvPr>
+            <p:ph type="sldImg"/>
+          </p:nvPr>
+        </p:nvSpPr>
+        <p:spPr/>
+      </p:sp>
+      <p:sp>
+        <p:nvSpPr>
+          <p:cNvPr id="3" name="Notes Placeholder 2"/>
+          <p:cNvSpPr>
+            <a:spLocks noGrp="1"/>
+          </p:cNvSpPr>
+          <p:nvPr>
+            <p:ph type="body" idx="1"/>
+          </p:nvPr>
+        </p:nvSpPr>
+        <p:spPr/>
+        <p:txBody>
+          <a:bodyPr/>
+          <a:lstStyle/>
+          <a:p>
+            <a:r>
+              <a:rPr lang="en-US" dirty="0"/>
+              <a:t>https://linuxize.com/post/bash-printf-command/</a:t>
+            </a:r>
+          </a:p>
+        </p:txBody>
+      </p:sp>
+      <p:sp>
+        <p:nvSpPr>
+          <p:cNvPr id="4" name="Slide Number Placeholder 3"/>
+          <p:cNvSpPr>
+            <a:spLocks noGrp="1"/>
+          </p:cNvSpPr>
+          <p:nvPr>
+            <p:ph type="sldNum" sz="quarter" idx="5"/>
+          </p:nvPr>
+        </p:nvSpPr>
+        <p:spPr/>
+        <p:txBody>
+          <a:bodyPr/>
+          <a:lstStyle/>
+          <a:p>
+            <a:fld id="{8349544B-F866-4ED0-8997-24601187AE87}" type="slidenum">
+              <a:rPr lang="en-US" smtClean="0"/>
+              <a:t>9</a:t>
+            </a:fld>
+            <a:endParaRPr lang="en-US"/>
+          </a:p>
+        </p:txBody>
+      </p:sp>
+    </p:spTree>
+    <p:extLst>
+      <p:ext uri="{BB962C8B-B14F-4D97-AF65-F5344CB8AC3E}">
+        <p14:creationId xmlns:p14="http://schemas.microsoft.com/office/powerpoint/2010/main" val="3012610226"/>
+      </p:ext>
+    </p:extLst>
+  </p:cSld>
+  <p:clrMapOvr>
+    <a:masterClrMapping/>
+  </p:clrMapOvr>
+</p:notes>
+</file>
+
+<file path=ppt/notesSlides/notesSlide4.xml><?xml version="1.0" encoding="utf-8"?>
+<p:notes xmlns:a="http://schemas.openxmlformats.org/drawingml/2006/main" xmlns:r="http://schemas.openxmlformats.org/officeDocument/2006/relationships" xmlns:p="http://schemas.openxmlformats.org/presentationml/2006/main">
+  <p:cSld>
+    <p:spTree>
+      <p:nvGrpSpPr>
+        <p:cNvPr id="1" name=""/>
+        <p:cNvGrpSpPr/>
+        <p:nvPr/>
+      </p:nvGrpSpPr>
+      <p:grpSpPr>
+        <a:xfrm>
+          <a:off x="0" y="0"/>
+          <a:ext cx="0" cy="0"/>
+          <a:chOff x="0" y="0"/>
+          <a:chExt cx="0" cy="0"/>
+        </a:xfrm>
+      </p:grpSpPr>
+      <p:sp>
+        <p:nvSpPr>
+          <p:cNvPr id="2" name="Slide Image Placeholder 1"/>
+          <p:cNvSpPr>
+            <a:spLocks noGrp="1" noRot="1" noChangeAspect="1"/>
+          </p:cNvSpPr>
+          <p:nvPr>
+            <p:ph type="sldImg"/>
+          </p:nvPr>
+        </p:nvSpPr>
+        <p:spPr/>
+      </p:sp>
+      <p:sp>
+        <p:nvSpPr>
+          <p:cNvPr id="3" name="Notes Placeholder 2"/>
+          <p:cNvSpPr>
+            <a:spLocks noGrp="1"/>
+          </p:cNvSpPr>
+          <p:nvPr>
+            <p:ph type="body" idx="1"/>
+          </p:nvPr>
+        </p:nvSpPr>
+        <p:spPr/>
+        <p:txBody>
+          <a:bodyPr/>
+          <a:lstStyle/>
+          <a:p>
+            <a:r>
+              <a:rPr lang="en-US" dirty="0" err="1"/>
+              <a:t>printf</a:t>
+            </a:r>
+            <a:r>
+              <a:rPr lang="en-US" dirty="0"/>
+              <a:t> "\x48\x65\x6c\x6c\x6f"</a:t>
+            </a:r>
+          </a:p>
+          <a:p>
+            <a:endParaRPr lang="en-US" dirty="0"/>
+          </a:p>
+        </p:txBody>
+      </p:sp>
+      <p:sp>
+        <p:nvSpPr>
+          <p:cNvPr id="4" name="Slide Number Placeholder 3"/>
+          <p:cNvSpPr>
+            <a:spLocks noGrp="1"/>
+          </p:cNvSpPr>
+          <p:nvPr>
+            <p:ph type="sldNum" sz="quarter" idx="5"/>
+          </p:nvPr>
+        </p:nvSpPr>
+        <p:spPr/>
+        <p:txBody>
+          <a:bodyPr/>
+          <a:lstStyle/>
+          <a:p>
+            <a:fld id="{8349544B-F866-4ED0-8997-24601187AE87}" type="slidenum">
+              <a:rPr lang="en-US" smtClean="0"/>
+              <a:t>18</a:t>
+            </a:fld>
+            <a:endParaRPr lang="en-US"/>
+          </a:p>
+        </p:txBody>
+      </p:sp>
+    </p:spTree>
+    <p:extLst>
+      <p:ext uri="{BB962C8B-B14F-4D97-AF65-F5344CB8AC3E}">
+        <p14:creationId xmlns:p14="http://schemas.microsoft.com/office/powerpoint/2010/main" val="572590308"/>
+      </p:ext>
+    </p:extLst>
+  </p:cSld>
+  <p:clrMapOvr>
+    <a:masterClrMapping/>
+  </p:clrMapOvr>
+</p:notes>
+</file>
+
+<file path=ppt/notesSlides/notesSlide5.xml><?xml version="1.0" encoding="utf-8"?>
+<p:notes xmlns:a="http://schemas.openxmlformats.org/drawingml/2006/main" xmlns:r="http://schemas.openxmlformats.org/officeDocument/2006/relationships" xmlns:p="http://schemas.openxmlformats.org/presentationml/2006/main">
+  <p:cSld>
+    <p:spTree>
+      <p:nvGrpSpPr>
+        <p:cNvPr id="1" name=""/>
+        <p:cNvGrpSpPr/>
+        <p:nvPr/>
+      </p:nvGrpSpPr>
+      <p:grpSpPr>
+        <a:xfrm>
+          <a:off x="0" y="0"/>
+          <a:ext cx="0" cy="0"/>
+          <a:chOff x="0" y="0"/>
+          <a:chExt cx="0" cy="0"/>
+        </a:xfrm>
+      </p:grpSpPr>
+      <p:sp>
+        <p:nvSpPr>
+          <p:cNvPr id="2" name="Slide Image Placeholder 1"/>
+          <p:cNvSpPr>
+            <a:spLocks noGrp="1" noRot="1" noChangeAspect="1"/>
+          </p:cNvSpPr>
+          <p:nvPr>
+            <p:ph type="sldImg"/>
+          </p:nvPr>
+        </p:nvSpPr>
+        <p:spPr/>
+      </p:sp>
+      <p:sp>
+        <p:nvSpPr>
+          <p:cNvPr id="3" name="Notes Placeholder 2"/>
+          <p:cNvSpPr>
+            <a:spLocks noGrp="1"/>
+          </p:cNvSpPr>
+          <p:nvPr>
+            <p:ph type="body" idx="1"/>
+          </p:nvPr>
+        </p:nvSpPr>
+        <p:spPr/>
+        <p:txBody>
+          <a:bodyPr/>
+          <a:lstStyle/>
+          <a:p>
+            <a:r>
+              <a:rPr lang="en-US" dirty="0"/>
+              <a:t>1643643491</a:t>
+            </a:r>
+          </a:p>
+        </p:txBody>
+      </p:sp>
+      <p:sp>
+        <p:nvSpPr>
+          <p:cNvPr id="4" name="Slide Number Placeholder 3"/>
+          <p:cNvSpPr>
+            <a:spLocks noGrp="1"/>
+          </p:cNvSpPr>
+          <p:nvPr>
+            <p:ph type="sldNum" sz="quarter" idx="5"/>
+          </p:nvPr>
+        </p:nvSpPr>
+        <p:spPr/>
+        <p:txBody>
+          <a:bodyPr/>
+          <a:lstStyle/>
+          <a:p>
+            <a:fld id="{8349544B-F866-4ED0-8997-24601187AE87}" type="slidenum">
+              <a:rPr lang="en-US" smtClean="0"/>
+              <a:t>20</a:t>
+            </a:fld>
+            <a:endParaRPr lang="en-US"/>
+          </a:p>
+        </p:txBody>
+      </p:sp>
+    </p:spTree>
+    <p:extLst>
+      <p:ext uri="{BB962C8B-B14F-4D97-AF65-F5344CB8AC3E}">
+        <p14:creationId xmlns:p14="http://schemas.microsoft.com/office/powerpoint/2010/main" val="1595841889"/>
+      </p:ext>
+    </p:extLst>
+  </p:cSld>
+  <p:clrMapOvr>
+    <a:masterClrMapping/>
+  </p:clrMapOvr>
+</p:notes>
+</file>
+
 <file path=ppt/slideLayouts/slideLayout1.xml><?xml version="1.0" encoding="utf-8"?>
 <p:sldLayout xmlns:a="http://schemas.openxmlformats.org/drawingml/2006/main" xmlns:r="http://schemas.openxmlformats.org/officeDocument/2006/relationships" xmlns:p="http://schemas.openxmlformats.org/presentationml/2006/main" type="title" preserve="1">
   <p:cSld name="Title Slide">
@@ -7032,7 +8397,7 @@
           <a:p>
             <a:fld id="{4263717A-E3C1-4BED-ABE0-B7069385E023}" type="datetimeFigureOut">
               <a:rPr lang="en-US" smtClean="0"/>
-              <a:t>8/30/2021</a:t>
+              <a:t>1/31/2022</a:t>
             </a:fld>
             <a:endParaRPr lang="en-US"/>
           </a:p>
@@ -7205,7 +8570,7 @@
           <a:p>
             <a:fld id="{4263717A-E3C1-4BED-ABE0-B7069385E023}" type="datetimeFigureOut">
               <a:rPr lang="en-US" smtClean="0"/>
-              <a:t>8/30/2021</a:t>
+              <a:t>1/31/2022</a:t>
             </a:fld>
             <a:endParaRPr lang="en-US"/>
           </a:p>
@@ -7383,7 +8748,7 @@
           <a:p>
             <a:fld id="{4263717A-E3C1-4BED-ABE0-B7069385E023}" type="datetimeFigureOut">
               <a:rPr lang="en-US" smtClean="0"/>
-              <a:t>8/30/2021</a:t>
+              <a:t>1/31/2022</a:t>
             </a:fld>
             <a:endParaRPr lang="en-US"/>
           </a:p>
@@ -7551,7 +8916,7 @@
           <a:p>
             <a:fld id="{4263717A-E3C1-4BED-ABE0-B7069385E023}" type="datetimeFigureOut">
               <a:rPr lang="en-US" smtClean="0"/>
-              <a:t>8/30/2021</a:t>
+              <a:t>1/31/2022</a:t>
             </a:fld>
             <a:endParaRPr lang="en-US"/>
           </a:p>
@@ -7796,7 +9161,7 @@
           <a:p>
             <a:fld id="{4263717A-E3C1-4BED-ABE0-B7069385E023}" type="datetimeFigureOut">
               <a:rPr lang="en-US" smtClean="0"/>
-              <a:t>8/30/2021</a:t>
+              <a:t>1/31/2022</a:t>
             </a:fld>
             <a:endParaRPr lang="en-US"/>
           </a:p>
@@ -8025,7 +9390,7 @@
           <a:p>
             <a:fld id="{4263717A-E3C1-4BED-ABE0-B7069385E023}" type="datetimeFigureOut">
               <a:rPr lang="en-US" smtClean="0"/>
-              <a:t>8/30/2021</a:t>
+              <a:t>1/31/2022</a:t>
             </a:fld>
             <a:endParaRPr lang="en-US"/>
           </a:p>
@@ -8389,7 +9754,7 @@
           <a:p>
             <a:fld id="{4263717A-E3C1-4BED-ABE0-B7069385E023}" type="datetimeFigureOut">
               <a:rPr lang="en-US" smtClean="0"/>
-              <a:t>8/30/2021</a:t>
+              <a:t>1/31/2022</a:t>
             </a:fld>
             <a:endParaRPr lang="en-US"/>
           </a:p>
@@ -8506,7 +9871,7 @@
           <a:p>
             <a:fld id="{4263717A-E3C1-4BED-ABE0-B7069385E023}" type="datetimeFigureOut">
               <a:rPr lang="en-US" smtClean="0"/>
-              <a:t>8/30/2021</a:t>
+              <a:t>1/31/2022</a:t>
             </a:fld>
             <a:endParaRPr lang="en-US"/>
           </a:p>
@@ -8601,7 +9966,7 @@
           <a:p>
             <a:fld id="{4263717A-E3C1-4BED-ABE0-B7069385E023}" type="datetimeFigureOut">
               <a:rPr lang="en-US" smtClean="0"/>
-              <a:t>8/30/2021</a:t>
+              <a:t>1/31/2022</a:t>
             </a:fld>
             <a:endParaRPr lang="en-US"/>
           </a:p>
@@ -8876,7 +10241,7 @@
           <a:p>
             <a:fld id="{4263717A-E3C1-4BED-ABE0-B7069385E023}" type="datetimeFigureOut">
               <a:rPr lang="en-US" smtClean="0"/>
-              <a:t>8/30/2021</a:t>
+              <a:t>1/31/2022</a:t>
             </a:fld>
             <a:endParaRPr lang="en-US"/>
           </a:p>
@@ -9128,7 +10493,7 @@
           <a:p>
             <a:fld id="{4263717A-E3C1-4BED-ABE0-B7069385E023}" type="datetimeFigureOut">
               <a:rPr lang="en-US" smtClean="0"/>
-              <a:t>8/30/2021</a:t>
+              <a:t>1/31/2022</a:t>
             </a:fld>
             <a:endParaRPr lang="en-US"/>
           </a:p>
@@ -9339,7 +10704,7 @@
           <a:p>
             <a:fld id="{4263717A-E3C1-4BED-ABE0-B7069385E023}" type="datetimeFigureOut">
               <a:rPr lang="en-US" smtClean="0"/>
-              <a:t>8/30/2021</a:t>
+              <a:t>1/31/2022</a:t>
             </a:fld>
             <a:endParaRPr lang="en-US"/>
           </a:p>
@@ -15995,7 +17360,15 @@
           <a:p>
             <a:r>
               <a:rPr lang="en-GB" dirty="0"/>
-              <a:t>Endianness is a term that describe the order in which a sequence of bytes is stored in memory. </a:t>
+              <a:t>Endianness is a term that describe the order in which a sequence of bytes (</a:t>
+            </a:r>
+            <a:r>
+              <a:rPr lang="en-GB"/>
+              <a:t>byte order) </a:t>
+            </a:r>
+            <a:r>
+              <a:rPr lang="en-GB" dirty="0"/>
+              <a:t>is stored in memory. </a:t>
             </a:r>
           </a:p>
           <a:p>
@@ -16160,6 +17533,103 @@
           <a:chExt cx="0" cy="0"/>
         </a:xfrm>
       </p:grpSpPr>
+      <p:pic>
+        <p:nvPicPr>
+          <p:cNvPr id="3" name="Picture 2">
+            <a:extLst>
+              <a:ext uri="{FF2B5EF4-FFF2-40B4-BE49-F238E27FC236}">
+                <a16:creationId xmlns:a16="http://schemas.microsoft.com/office/drawing/2014/main" id="{8FD9840B-B109-40DC-9234-D2B228531696}"/>
+              </a:ext>
+            </a:extLst>
+          </p:cNvPr>
+          <p:cNvPicPr>
+            <a:picLocks noChangeAspect="1"/>
+          </p:cNvPicPr>
+          <p:nvPr/>
+        </p:nvPicPr>
+        <p:blipFill>
+          <a:blip r:embed="rId2"/>
+          <a:stretch>
+            <a:fillRect/>
+          </a:stretch>
+        </p:blipFill>
+        <p:spPr>
+          <a:xfrm>
+            <a:off x="2073068" y="1530422"/>
+            <a:ext cx="8045864" cy="3964769"/>
+          </a:xfrm>
+          <a:prstGeom prst="rect">
+            <a:avLst/>
+          </a:prstGeom>
+        </p:spPr>
+      </p:pic>
+      <p:sp>
+        <p:nvSpPr>
+          <p:cNvPr id="4" name="TextBox 3">
+            <a:extLst>
+              <a:ext uri="{FF2B5EF4-FFF2-40B4-BE49-F238E27FC236}">
+                <a16:creationId xmlns:a16="http://schemas.microsoft.com/office/drawing/2014/main" id="{575B0C08-4C42-4366-A7A7-2AE24A9C821E}"/>
+              </a:ext>
+            </a:extLst>
+          </p:cNvPr>
+          <p:cNvSpPr txBox="1"/>
+          <p:nvPr/>
+        </p:nvSpPr>
+        <p:spPr>
+          <a:xfrm>
+            <a:off x="2073068" y="1161090"/>
+            <a:ext cx="1787349" cy="369332"/>
+          </a:xfrm>
+          <a:prstGeom prst="rect">
+            <a:avLst/>
+          </a:prstGeom>
+          <a:solidFill>
+            <a:schemeClr val="accent4"/>
+          </a:solidFill>
+        </p:spPr>
+        <p:txBody>
+          <a:bodyPr wrap="none" rtlCol="0">
+            <a:spAutoFit/>
+          </a:bodyPr>
+          <a:lstStyle/>
+          <a:p>
+            <a:r>
+              <a:rPr lang="en-US" dirty="0"/>
+              <a:t>Check Byte order</a:t>
+            </a:r>
+          </a:p>
+        </p:txBody>
+      </p:sp>
+    </p:spTree>
+    <p:extLst>
+      <p:ext uri="{BB962C8B-B14F-4D97-AF65-F5344CB8AC3E}">
+        <p14:creationId xmlns:p14="http://schemas.microsoft.com/office/powerpoint/2010/main" val="1515556541"/>
+      </p:ext>
+    </p:extLst>
+  </p:cSld>
+  <p:clrMapOvr>
+    <a:masterClrMapping/>
+  </p:clrMapOvr>
+</p:sld>
+</file>
+
+<file path=ppt/slides/slide16.xml><?xml version="1.0" encoding="utf-8"?>
+<p:sld xmlns:a="http://schemas.openxmlformats.org/drawingml/2006/main" xmlns:r="http://schemas.openxmlformats.org/officeDocument/2006/relationships" xmlns:p="http://schemas.openxmlformats.org/presentationml/2006/main">
+  <p:cSld>
+    <p:spTree>
+      <p:nvGrpSpPr>
+        <p:cNvPr id="1" name=""/>
+        <p:cNvGrpSpPr/>
+        <p:nvPr/>
+      </p:nvGrpSpPr>
+      <p:grpSpPr>
+        <a:xfrm>
+          <a:off x="0" y="0"/>
+          <a:ext cx="0" cy="0"/>
+          <a:chOff x="0" y="0"/>
+          <a:chExt cx="0" cy="0"/>
+        </a:xfrm>
+      </p:grpSpPr>
       <p:sp>
         <p:nvSpPr>
           <p:cNvPr id="2" name="Title 1">
@@ -16285,6 +17755,489 @@
     <p:extLst>
       <p:ext uri="{BB962C8B-B14F-4D97-AF65-F5344CB8AC3E}">
         <p14:creationId xmlns:p14="http://schemas.microsoft.com/office/powerpoint/2010/main" val="2607550473"/>
+      </p:ext>
+    </p:extLst>
+  </p:cSld>
+  <p:clrMapOvr>
+    <a:masterClrMapping/>
+  </p:clrMapOvr>
+</p:sld>
+</file>
+
+<file path=ppt/slides/slide17.xml><?xml version="1.0" encoding="utf-8"?>
+<p:sld xmlns:a="http://schemas.openxmlformats.org/drawingml/2006/main" xmlns:r="http://schemas.openxmlformats.org/officeDocument/2006/relationships" xmlns:p="http://schemas.openxmlformats.org/presentationml/2006/main">
+  <p:cSld>
+    <p:spTree>
+      <p:nvGrpSpPr>
+        <p:cNvPr id="1" name=""/>
+        <p:cNvGrpSpPr/>
+        <p:nvPr/>
+      </p:nvGrpSpPr>
+      <p:grpSpPr>
+        <a:xfrm>
+          <a:off x="0" y="0"/>
+          <a:ext cx="0" cy="0"/>
+          <a:chOff x="0" y="0"/>
+          <a:chExt cx="0" cy="0"/>
+        </a:xfrm>
+      </p:grpSpPr>
+      <p:pic>
+        <p:nvPicPr>
+          <p:cNvPr id="5" name="Picture 4">
+            <a:extLst>
+              <a:ext uri="{FF2B5EF4-FFF2-40B4-BE49-F238E27FC236}">
+                <a16:creationId xmlns:a16="http://schemas.microsoft.com/office/drawing/2014/main" id="{DBFCFC3C-50A2-4E27-84D9-502AB698B590}"/>
+              </a:ext>
+            </a:extLst>
+          </p:cNvPr>
+          <p:cNvPicPr>
+            <a:picLocks noChangeAspect="1"/>
+          </p:cNvPicPr>
+          <p:nvPr/>
+        </p:nvPicPr>
+        <p:blipFill>
+          <a:blip r:embed="rId2"/>
+          <a:stretch>
+            <a:fillRect/>
+          </a:stretch>
+        </p:blipFill>
+        <p:spPr>
+          <a:xfrm>
+            <a:off x="3909457" y="0"/>
+            <a:ext cx="6834929" cy="6858000"/>
+          </a:xfrm>
+          <a:prstGeom prst="rect">
+            <a:avLst/>
+          </a:prstGeom>
+        </p:spPr>
+      </p:pic>
+      <p:pic>
+        <p:nvPicPr>
+          <p:cNvPr id="7" name="Picture 6">
+            <a:extLst>
+              <a:ext uri="{FF2B5EF4-FFF2-40B4-BE49-F238E27FC236}">
+                <a16:creationId xmlns:a16="http://schemas.microsoft.com/office/drawing/2014/main" id="{57DB3D4B-A019-46A4-97BC-99E53114A6AE}"/>
+              </a:ext>
+            </a:extLst>
+          </p:cNvPr>
+          <p:cNvPicPr>
+            <a:picLocks noChangeAspect="1"/>
+          </p:cNvPicPr>
+          <p:nvPr/>
+        </p:nvPicPr>
+        <p:blipFill>
+          <a:blip r:embed="rId3"/>
+          <a:stretch>
+            <a:fillRect/>
+          </a:stretch>
+        </p:blipFill>
+        <p:spPr>
+          <a:xfrm>
+            <a:off x="426514" y="1705697"/>
+            <a:ext cx="2446544" cy="553935"/>
+          </a:xfrm>
+          <a:prstGeom prst="rect">
+            <a:avLst/>
+          </a:prstGeom>
+        </p:spPr>
+      </p:pic>
+      <p:sp>
+        <p:nvSpPr>
+          <p:cNvPr id="8" name="Arrow: Right 7">
+            <a:extLst>
+              <a:ext uri="{FF2B5EF4-FFF2-40B4-BE49-F238E27FC236}">
+                <a16:creationId xmlns:a16="http://schemas.microsoft.com/office/drawing/2014/main" id="{6DBDB9C1-0A26-4CF9-B127-A55BEF3A647E}"/>
+              </a:ext>
+            </a:extLst>
+          </p:cNvPr>
+          <p:cNvSpPr/>
+          <p:nvPr/>
+        </p:nvSpPr>
+        <p:spPr>
+          <a:xfrm>
+            <a:off x="3036816" y="1899138"/>
+            <a:ext cx="545124" cy="167054"/>
+          </a:xfrm>
+          <a:prstGeom prst="rightArrow">
+            <a:avLst/>
+          </a:prstGeom>
+        </p:spPr>
+        <p:style>
+          <a:lnRef idx="2">
+            <a:schemeClr val="accent1">
+              <a:shade val="50000"/>
+            </a:schemeClr>
+          </a:lnRef>
+          <a:fillRef idx="1">
+            <a:schemeClr val="accent1"/>
+          </a:fillRef>
+          <a:effectRef idx="0">
+            <a:schemeClr val="accent1"/>
+          </a:effectRef>
+          <a:fontRef idx="minor">
+            <a:schemeClr val="lt1"/>
+          </a:fontRef>
+        </p:style>
+        <p:txBody>
+          <a:bodyPr rtlCol="0" anchor="ctr"/>
+          <a:lstStyle/>
+          <a:p>
+            <a:pPr algn="ctr"/>
+            <a:endParaRPr lang="en-US"/>
+          </a:p>
+        </p:txBody>
+      </p:sp>
+    </p:spTree>
+    <p:extLst>
+      <p:ext uri="{BB962C8B-B14F-4D97-AF65-F5344CB8AC3E}">
+        <p14:creationId xmlns:p14="http://schemas.microsoft.com/office/powerpoint/2010/main" val="4218427973"/>
+      </p:ext>
+    </p:extLst>
+  </p:cSld>
+  <p:clrMapOvr>
+    <a:masterClrMapping/>
+  </p:clrMapOvr>
+</p:sld>
+</file>
+
+<file path=ppt/slides/slide18.xml><?xml version="1.0" encoding="utf-8"?>
+<p:sld xmlns:a="http://schemas.openxmlformats.org/drawingml/2006/main" xmlns:r="http://schemas.openxmlformats.org/officeDocument/2006/relationships" xmlns:p="http://schemas.openxmlformats.org/presentationml/2006/main">
+  <p:cSld>
+    <p:spTree>
+      <p:nvGrpSpPr>
+        <p:cNvPr id="1" name=""/>
+        <p:cNvGrpSpPr/>
+        <p:nvPr/>
+      </p:nvGrpSpPr>
+      <p:grpSpPr>
+        <a:xfrm>
+          <a:off x="0" y="0"/>
+          <a:ext cx="0" cy="0"/>
+          <a:chOff x="0" y="0"/>
+          <a:chExt cx="0" cy="0"/>
+        </a:xfrm>
+      </p:grpSpPr>
+      <p:sp>
+        <p:nvSpPr>
+          <p:cNvPr id="2" name="Title 1">
+            <a:extLst>
+              <a:ext uri="{FF2B5EF4-FFF2-40B4-BE49-F238E27FC236}">
+                <a16:creationId xmlns:a16="http://schemas.microsoft.com/office/drawing/2014/main" id="{AFC1A7BA-7685-444F-857C-61C577903823}"/>
+              </a:ext>
+            </a:extLst>
+          </p:cNvPr>
+          <p:cNvSpPr>
+            <a:spLocks noGrp="1"/>
+          </p:cNvSpPr>
+          <p:nvPr>
+            <p:ph type="title"/>
+          </p:nvPr>
+        </p:nvSpPr>
+        <p:spPr/>
+        <p:txBody>
+          <a:bodyPr/>
+          <a:lstStyle/>
+          <a:p>
+            <a:r>
+              <a:rPr lang="en-US" dirty="0"/>
+              <a:t>Number and ASCII conversion</a:t>
+            </a:r>
+          </a:p>
+        </p:txBody>
+      </p:sp>
+      <p:pic>
+        <p:nvPicPr>
+          <p:cNvPr id="4" name="Picture 3">
+            <a:extLst>
+              <a:ext uri="{FF2B5EF4-FFF2-40B4-BE49-F238E27FC236}">
+                <a16:creationId xmlns:a16="http://schemas.microsoft.com/office/drawing/2014/main" id="{42D45F63-2DF1-4EC4-BADA-005EA22E2150}"/>
+              </a:ext>
+            </a:extLst>
+          </p:cNvPr>
+          <p:cNvPicPr>
+            <a:picLocks noChangeAspect="1"/>
+          </p:cNvPicPr>
+          <p:nvPr/>
+        </p:nvPicPr>
+        <p:blipFill>
+          <a:blip r:embed="rId3"/>
+          <a:stretch>
+            <a:fillRect/>
+          </a:stretch>
+        </p:blipFill>
+        <p:spPr>
+          <a:xfrm>
+            <a:off x="1005169" y="2261943"/>
+            <a:ext cx="4666969" cy="1403885"/>
+          </a:xfrm>
+          <a:prstGeom prst="rect">
+            <a:avLst/>
+          </a:prstGeom>
+        </p:spPr>
+      </p:pic>
+      <p:sp>
+        <p:nvSpPr>
+          <p:cNvPr id="5" name="TextBox 4">
+            <a:extLst>
+              <a:ext uri="{FF2B5EF4-FFF2-40B4-BE49-F238E27FC236}">
+                <a16:creationId xmlns:a16="http://schemas.microsoft.com/office/drawing/2014/main" id="{415B57A5-1BD6-413C-96E9-176F8C2895BE}"/>
+              </a:ext>
+            </a:extLst>
+          </p:cNvPr>
+          <p:cNvSpPr txBox="1"/>
+          <p:nvPr/>
+        </p:nvSpPr>
+        <p:spPr>
+          <a:xfrm>
+            <a:off x="1005169" y="1914525"/>
+            <a:ext cx="1954125" cy="369332"/>
+          </a:xfrm>
+          <a:prstGeom prst="rect">
+            <a:avLst/>
+          </a:prstGeom>
+          <a:solidFill>
+            <a:schemeClr val="accent4"/>
+          </a:solidFill>
+        </p:spPr>
+        <p:txBody>
+          <a:bodyPr wrap="none" rtlCol="0">
+            <a:spAutoFit/>
+          </a:bodyPr>
+          <a:lstStyle/>
+          <a:p>
+            <a:r>
+              <a:rPr lang="en-US" dirty="0"/>
+              <a:t>Hex to ASCII string </a:t>
+            </a:r>
+          </a:p>
+        </p:txBody>
+      </p:sp>
+      <p:pic>
+        <p:nvPicPr>
+          <p:cNvPr id="7" name="Picture 6">
+            <a:extLst>
+              <a:ext uri="{FF2B5EF4-FFF2-40B4-BE49-F238E27FC236}">
+                <a16:creationId xmlns:a16="http://schemas.microsoft.com/office/drawing/2014/main" id="{BDACB289-4944-4585-B8A1-AA600B7BC249}"/>
+              </a:ext>
+            </a:extLst>
+          </p:cNvPr>
+          <p:cNvPicPr>
+            <a:picLocks noChangeAspect="1"/>
+          </p:cNvPicPr>
+          <p:nvPr/>
+        </p:nvPicPr>
+        <p:blipFill>
+          <a:blip r:embed="rId4"/>
+          <a:stretch>
+            <a:fillRect/>
+          </a:stretch>
+        </p:blipFill>
+        <p:spPr>
+          <a:xfrm>
+            <a:off x="6793987" y="2261943"/>
+            <a:ext cx="3528366" cy="754445"/>
+          </a:xfrm>
+          <a:prstGeom prst="rect">
+            <a:avLst/>
+          </a:prstGeom>
+        </p:spPr>
+      </p:pic>
+      <p:sp>
+        <p:nvSpPr>
+          <p:cNvPr id="8" name="TextBox 7">
+            <a:extLst>
+              <a:ext uri="{FF2B5EF4-FFF2-40B4-BE49-F238E27FC236}">
+                <a16:creationId xmlns:a16="http://schemas.microsoft.com/office/drawing/2014/main" id="{EB5CE0EB-8D15-4E49-8E6C-D40A55F67FA1}"/>
+              </a:ext>
+            </a:extLst>
+          </p:cNvPr>
+          <p:cNvSpPr txBox="1"/>
+          <p:nvPr/>
+        </p:nvSpPr>
+        <p:spPr>
+          <a:xfrm>
+            <a:off x="6793987" y="1894992"/>
+            <a:ext cx="2302233" cy="369332"/>
+          </a:xfrm>
+          <a:prstGeom prst="rect">
+            <a:avLst/>
+          </a:prstGeom>
+          <a:solidFill>
+            <a:schemeClr val="accent4"/>
+          </a:solidFill>
+        </p:spPr>
+        <p:txBody>
+          <a:bodyPr wrap="none" rtlCol="0">
+            <a:spAutoFit/>
+          </a:bodyPr>
+          <a:lstStyle/>
+          <a:p>
+            <a:r>
+              <a:rPr lang="en-US" dirty="0"/>
+              <a:t>Decimal to ASCII string</a:t>
+            </a:r>
+          </a:p>
+        </p:txBody>
+      </p:sp>
+      <p:pic>
+        <p:nvPicPr>
+          <p:cNvPr id="10" name="Picture 9">
+            <a:extLst>
+              <a:ext uri="{FF2B5EF4-FFF2-40B4-BE49-F238E27FC236}">
+                <a16:creationId xmlns:a16="http://schemas.microsoft.com/office/drawing/2014/main" id="{514FB793-7020-434C-9CBE-934F371E387F}"/>
+              </a:ext>
+            </a:extLst>
+          </p:cNvPr>
+          <p:cNvPicPr>
+            <a:picLocks noChangeAspect="1"/>
+          </p:cNvPicPr>
+          <p:nvPr/>
+        </p:nvPicPr>
+        <p:blipFill>
+          <a:blip r:embed="rId5"/>
+          <a:stretch>
+            <a:fillRect/>
+          </a:stretch>
+        </p:blipFill>
+        <p:spPr>
+          <a:xfrm>
+            <a:off x="1026969" y="4593677"/>
+            <a:ext cx="6652837" cy="1478408"/>
+          </a:xfrm>
+          <a:prstGeom prst="rect">
+            <a:avLst/>
+          </a:prstGeom>
+        </p:spPr>
+      </p:pic>
+      <p:sp>
+        <p:nvSpPr>
+          <p:cNvPr id="11" name="TextBox 10">
+            <a:extLst>
+              <a:ext uri="{FF2B5EF4-FFF2-40B4-BE49-F238E27FC236}">
+                <a16:creationId xmlns:a16="http://schemas.microsoft.com/office/drawing/2014/main" id="{F1B5F1E5-6327-42E9-9A3A-003CF6C77E29}"/>
+              </a:ext>
+            </a:extLst>
+          </p:cNvPr>
+          <p:cNvSpPr txBox="1"/>
+          <p:nvPr/>
+        </p:nvSpPr>
+        <p:spPr>
+          <a:xfrm>
+            <a:off x="1026969" y="4224345"/>
+            <a:ext cx="1320298" cy="369332"/>
+          </a:xfrm>
+          <a:prstGeom prst="rect">
+            <a:avLst/>
+          </a:prstGeom>
+          <a:solidFill>
+            <a:schemeClr val="accent4"/>
+          </a:solidFill>
+        </p:spPr>
+        <p:txBody>
+          <a:bodyPr wrap="none" rtlCol="0">
+            <a:spAutoFit/>
+          </a:bodyPr>
+          <a:lstStyle/>
+          <a:p>
+            <a:r>
+              <a:rPr lang="en-US" dirty="0"/>
+              <a:t>ASCII </a:t>
+            </a:r>
+            <a:r>
+              <a:rPr lang="en-US"/>
+              <a:t>to Hex</a:t>
+            </a:r>
+            <a:endParaRPr lang="en-US" dirty="0"/>
+          </a:p>
+        </p:txBody>
+      </p:sp>
+    </p:spTree>
+    <p:extLst>
+      <p:ext uri="{BB962C8B-B14F-4D97-AF65-F5344CB8AC3E}">
+        <p14:creationId xmlns:p14="http://schemas.microsoft.com/office/powerpoint/2010/main" val="1324712681"/>
+      </p:ext>
+    </p:extLst>
+  </p:cSld>
+  <p:clrMapOvr>
+    <a:masterClrMapping/>
+  </p:clrMapOvr>
+</p:sld>
+</file>
+
+<file path=ppt/slides/slide19.xml><?xml version="1.0" encoding="utf-8"?>
+<p:sld xmlns:a="http://schemas.openxmlformats.org/drawingml/2006/main" xmlns:r="http://schemas.openxmlformats.org/officeDocument/2006/relationships" xmlns:p="http://schemas.openxmlformats.org/presentationml/2006/main">
+  <p:cSld>
+    <p:spTree>
+      <p:nvGrpSpPr>
+        <p:cNvPr id="1" name=""/>
+        <p:cNvGrpSpPr/>
+        <p:nvPr/>
+      </p:nvGrpSpPr>
+      <p:grpSpPr>
+        <a:xfrm>
+          <a:off x="0" y="0"/>
+          <a:ext cx="0" cy="0"/>
+          <a:chOff x="0" y="0"/>
+          <a:chExt cx="0" cy="0"/>
+        </a:xfrm>
+      </p:grpSpPr>
+      <p:sp>
+        <p:nvSpPr>
+          <p:cNvPr id="3" name="Title 2">
+            <a:extLst>
+              <a:ext uri="{FF2B5EF4-FFF2-40B4-BE49-F238E27FC236}">
+                <a16:creationId xmlns:a16="http://schemas.microsoft.com/office/drawing/2014/main" id="{C8C7F65F-793A-4F87-A760-845F7B6630C1}"/>
+              </a:ext>
+            </a:extLst>
+          </p:cNvPr>
+          <p:cNvSpPr>
+            <a:spLocks noGrp="1"/>
+          </p:cNvSpPr>
+          <p:nvPr>
+            <p:ph type="title"/>
+          </p:nvPr>
+        </p:nvSpPr>
+        <p:spPr/>
+        <p:txBody>
+          <a:bodyPr/>
+          <a:lstStyle/>
+          <a:p>
+            <a:r>
+              <a:rPr lang="en-US" dirty="0"/>
+              <a:t>Date conversion</a:t>
+            </a:r>
+          </a:p>
+        </p:txBody>
+      </p:sp>
+      <p:sp>
+        <p:nvSpPr>
+          <p:cNvPr id="4" name="Text Placeholder 3">
+            <a:extLst>
+              <a:ext uri="{FF2B5EF4-FFF2-40B4-BE49-F238E27FC236}">
+                <a16:creationId xmlns:a16="http://schemas.microsoft.com/office/drawing/2014/main" id="{70C8E395-1569-4B57-B814-E3908C509EA6}"/>
+              </a:ext>
+            </a:extLst>
+          </p:cNvPr>
+          <p:cNvSpPr>
+            <a:spLocks noGrp="1"/>
+          </p:cNvSpPr>
+          <p:nvPr>
+            <p:ph type="body" idx="1"/>
+          </p:nvPr>
+        </p:nvSpPr>
+        <p:spPr/>
+        <p:txBody>
+          <a:bodyPr/>
+          <a:lstStyle/>
+          <a:p>
+            <a:endParaRPr lang="en-US"/>
+          </a:p>
+        </p:txBody>
+      </p:sp>
+    </p:spTree>
+    <p:extLst>
+      <p:ext uri="{BB962C8B-B14F-4D97-AF65-F5344CB8AC3E}">
+        <p14:creationId xmlns:p14="http://schemas.microsoft.com/office/powerpoint/2010/main" val="2476286752"/>
       </p:ext>
     </p:extLst>
   </p:cSld>
@@ -21501,10 +23454,482 @@
           </a:fontRef>
         </p:style>
       </p:cxnSp>
+      <mc:AlternateContent xmlns:mc="http://schemas.openxmlformats.org/markup-compatibility/2006">
+        <mc:Choice xmlns:p14="http://schemas.microsoft.com/office/powerpoint/2010/main" Requires="p14">
+          <p:contentPart p14:bwMode="auto" r:id="rId5">
+            <p14:nvContentPartPr>
+              <p14:cNvPr id="25" name="Ink 24">
+                <a:extLst>
+                  <a:ext uri="{FF2B5EF4-FFF2-40B4-BE49-F238E27FC236}">
+                    <a16:creationId xmlns:a16="http://schemas.microsoft.com/office/drawing/2014/main" id="{69FDBA92-2CD2-480D-A9F0-586873370AA8}"/>
+                  </a:ext>
+                </a:extLst>
+              </p14:cNvPr>
+              <p14:cNvContentPartPr/>
+              <p14:nvPr/>
+            </p14:nvContentPartPr>
+            <p14:xfrm>
+              <a:off x="9032233" y="4988286"/>
+              <a:ext cx="360" cy="360"/>
+            </p14:xfrm>
+          </p:contentPart>
+        </mc:Choice>
+        <mc:Fallback>
+          <p:pic>
+            <p:nvPicPr>
+              <p:cNvPr id="25" name="Ink 24">
+                <a:extLst>
+                  <a:ext uri="{FF2B5EF4-FFF2-40B4-BE49-F238E27FC236}">
+                    <a16:creationId xmlns:a16="http://schemas.microsoft.com/office/drawing/2014/main" id="{69FDBA92-2CD2-480D-A9F0-586873370AA8}"/>
+                  </a:ext>
+                </a:extLst>
+              </p:cNvPr>
+              <p:cNvPicPr/>
+              <p:nvPr/>
+            </p:nvPicPr>
+            <p:blipFill>
+              <a:blip r:embed="rId6"/>
+              <a:stretch>
+                <a:fillRect/>
+              </a:stretch>
+            </p:blipFill>
+            <p:spPr>
+              <a:xfrm>
+                <a:off x="9023233" y="4979286"/>
+                <a:ext cx="18000" cy="18000"/>
+              </a:xfrm>
+              <a:prstGeom prst="rect">
+                <a:avLst/>
+              </a:prstGeom>
+            </p:spPr>
+          </p:pic>
+        </mc:Fallback>
+      </mc:AlternateContent>
+      <mc:AlternateContent xmlns:mc="http://schemas.openxmlformats.org/markup-compatibility/2006">
+        <mc:Choice xmlns:p14="http://schemas.microsoft.com/office/powerpoint/2010/main" Requires="p14">
+          <p:contentPart p14:bwMode="auto" r:id="rId7">
+            <p14:nvContentPartPr>
+              <p14:cNvPr id="26" name="Ink 25">
+                <a:extLst>
+                  <a:ext uri="{FF2B5EF4-FFF2-40B4-BE49-F238E27FC236}">
+                    <a16:creationId xmlns:a16="http://schemas.microsoft.com/office/drawing/2014/main" id="{874106CC-D99A-46BF-A3B5-3B7C9F9091D1}"/>
+                  </a:ext>
+                </a:extLst>
+              </p14:cNvPr>
+              <p14:cNvContentPartPr/>
+              <p14:nvPr/>
+            </p14:nvContentPartPr>
+            <p14:xfrm>
+              <a:off x="11225353" y="5166486"/>
+              <a:ext cx="360" cy="360"/>
+            </p14:xfrm>
+          </p:contentPart>
+        </mc:Choice>
+        <mc:Fallback>
+          <p:pic>
+            <p:nvPicPr>
+              <p:cNvPr id="26" name="Ink 25">
+                <a:extLst>
+                  <a:ext uri="{FF2B5EF4-FFF2-40B4-BE49-F238E27FC236}">
+                    <a16:creationId xmlns:a16="http://schemas.microsoft.com/office/drawing/2014/main" id="{874106CC-D99A-46BF-A3B5-3B7C9F9091D1}"/>
+                  </a:ext>
+                </a:extLst>
+              </p:cNvPr>
+              <p:cNvPicPr/>
+              <p:nvPr/>
+            </p:nvPicPr>
+            <p:blipFill>
+              <a:blip r:embed="rId6"/>
+              <a:stretch>
+                <a:fillRect/>
+              </a:stretch>
+            </p:blipFill>
+            <p:spPr>
+              <a:xfrm>
+                <a:off x="11216353" y="5157846"/>
+                <a:ext cx="18000" cy="18000"/>
+              </a:xfrm>
+              <a:prstGeom prst="rect">
+                <a:avLst/>
+              </a:prstGeom>
+            </p:spPr>
+          </p:pic>
+        </mc:Fallback>
+      </mc:AlternateContent>
     </p:spTree>
     <p:extLst>
       <p:ext uri="{BB962C8B-B14F-4D97-AF65-F5344CB8AC3E}">
         <p14:creationId xmlns:p14="http://schemas.microsoft.com/office/powerpoint/2010/main" val="1421300646"/>
+      </p:ext>
+    </p:extLst>
+  </p:cSld>
+  <p:clrMapOvr>
+    <a:masterClrMapping/>
+  </p:clrMapOvr>
+</p:sld>
+</file>
+
+<file path=ppt/slides/slide20.xml><?xml version="1.0" encoding="utf-8"?>
+<p:sld xmlns:a="http://schemas.openxmlformats.org/drawingml/2006/main" xmlns:r="http://schemas.openxmlformats.org/officeDocument/2006/relationships" xmlns:p="http://schemas.openxmlformats.org/presentationml/2006/main">
+  <p:cSld>
+    <p:spTree>
+      <p:nvGrpSpPr>
+        <p:cNvPr id="1" name=""/>
+        <p:cNvGrpSpPr/>
+        <p:nvPr/>
+      </p:nvGrpSpPr>
+      <p:grpSpPr>
+        <a:xfrm>
+          <a:off x="0" y="0"/>
+          <a:ext cx="0" cy="0"/>
+          <a:chOff x="0" y="0"/>
+          <a:chExt cx="0" cy="0"/>
+        </a:xfrm>
+      </p:grpSpPr>
+      <p:sp>
+        <p:nvSpPr>
+          <p:cNvPr id="5" name="Title 4">
+            <a:extLst>
+              <a:ext uri="{FF2B5EF4-FFF2-40B4-BE49-F238E27FC236}">
+                <a16:creationId xmlns:a16="http://schemas.microsoft.com/office/drawing/2014/main" id="{F7C85A65-85F6-4869-ABF4-66ECE9F4E7F5}"/>
+              </a:ext>
+            </a:extLst>
+          </p:cNvPr>
+          <p:cNvSpPr>
+            <a:spLocks noGrp="1"/>
+          </p:cNvSpPr>
+          <p:nvPr>
+            <p:ph type="title"/>
+          </p:nvPr>
+        </p:nvSpPr>
+        <p:spPr/>
+        <p:txBody>
+          <a:bodyPr/>
+          <a:lstStyle/>
+          <a:p>
+            <a:r>
+              <a:rPr lang="en-GB" dirty="0"/>
+              <a:t>Unix time</a:t>
+            </a:r>
+            <a:endParaRPr lang="en-US" dirty="0"/>
+          </a:p>
+        </p:txBody>
+      </p:sp>
+      <p:sp>
+        <p:nvSpPr>
+          <p:cNvPr id="6" name="Content Placeholder 5">
+            <a:extLst>
+              <a:ext uri="{FF2B5EF4-FFF2-40B4-BE49-F238E27FC236}">
+                <a16:creationId xmlns:a16="http://schemas.microsoft.com/office/drawing/2014/main" id="{23BFB659-95F8-4F0B-8232-6515C6879CE9}"/>
+              </a:ext>
+            </a:extLst>
+          </p:cNvPr>
+          <p:cNvSpPr>
+            <a:spLocks noGrp="1"/>
+          </p:cNvSpPr>
+          <p:nvPr>
+            <p:ph idx="1"/>
+          </p:nvPr>
+        </p:nvSpPr>
+        <p:spPr>
+          <a:xfrm>
+            <a:off x="838200" y="1825625"/>
+            <a:ext cx="10515600" cy="1677142"/>
+          </a:xfrm>
+        </p:spPr>
+        <p:txBody>
+          <a:bodyPr/>
+          <a:lstStyle/>
+          <a:p>
+            <a:r>
+              <a:rPr lang="en-GB" dirty="0"/>
+              <a:t>Unix time, or POSIX time, is a system for describing points in time. </a:t>
+            </a:r>
+          </a:p>
+          <a:p>
+            <a:r>
+              <a:rPr lang="en-GB" dirty="0"/>
+              <a:t>It is the number of seconds that have elapsed since the Unix epoch,</a:t>
+            </a:r>
+          </a:p>
+          <a:p>
+            <a:r>
+              <a:rPr lang="en-GB" dirty="0"/>
+              <a:t>The Unix epoch is 00:00:00 </a:t>
+            </a:r>
+            <a:r>
+              <a:rPr lang="en-GB" dirty="0">
+                <a:hlinkClick r:id="rId3" tooltip="Coordinated Universal Time">
+                  <a:extLst>
+                    <a:ext uri="{A12FA001-AC4F-418D-AE19-62706E023703}">
+                      <ahyp:hlinkClr xmlns:ahyp="http://schemas.microsoft.com/office/drawing/2018/hyperlinkcolor" val="tx"/>
+                    </a:ext>
+                  </a:extLst>
+                </a:hlinkClick>
+              </a:rPr>
+              <a:t>UTC</a:t>
+            </a:r>
+            <a:r>
+              <a:rPr lang="en-GB" dirty="0"/>
+              <a:t> on 1 January 1970 </a:t>
+            </a:r>
+            <a:endParaRPr lang="en-US" dirty="0"/>
+          </a:p>
+        </p:txBody>
+      </p:sp>
+      <p:pic>
+        <p:nvPicPr>
+          <p:cNvPr id="8" name="Picture 7">
+            <a:extLst>
+              <a:ext uri="{FF2B5EF4-FFF2-40B4-BE49-F238E27FC236}">
+                <a16:creationId xmlns:a16="http://schemas.microsoft.com/office/drawing/2014/main" id="{624A0C72-2EC3-4A4F-9E88-34123ABA7E76}"/>
+              </a:ext>
+            </a:extLst>
+          </p:cNvPr>
+          <p:cNvPicPr>
+            <a:picLocks noChangeAspect="1"/>
+          </p:cNvPicPr>
+          <p:nvPr/>
+        </p:nvPicPr>
+        <p:blipFill>
+          <a:blip r:embed="rId4"/>
+          <a:stretch>
+            <a:fillRect/>
+          </a:stretch>
+        </p:blipFill>
+        <p:spPr>
+          <a:xfrm>
+            <a:off x="980658" y="4187949"/>
+            <a:ext cx="3523204" cy="1677142"/>
+          </a:xfrm>
+          <a:prstGeom prst="rect">
+            <a:avLst/>
+          </a:prstGeom>
+        </p:spPr>
+      </p:pic>
+      <p:pic>
+        <p:nvPicPr>
+          <p:cNvPr id="10" name="Picture 9">
+            <a:extLst>
+              <a:ext uri="{FF2B5EF4-FFF2-40B4-BE49-F238E27FC236}">
+                <a16:creationId xmlns:a16="http://schemas.microsoft.com/office/drawing/2014/main" id="{F638BD0D-3CCB-4D36-AD59-F18C1E11EEAB}"/>
+              </a:ext>
+            </a:extLst>
+          </p:cNvPr>
+          <p:cNvPicPr>
+            <a:picLocks noChangeAspect="1"/>
+          </p:cNvPicPr>
+          <p:nvPr/>
+        </p:nvPicPr>
+        <p:blipFill>
+          <a:blip r:embed="rId5"/>
+          <a:stretch>
+            <a:fillRect/>
+          </a:stretch>
+        </p:blipFill>
+        <p:spPr>
+          <a:xfrm>
+            <a:off x="6096000" y="4185960"/>
+            <a:ext cx="3932609" cy="1677142"/>
+          </a:xfrm>
+          <a:prstGeom prst="rect">
+            <a:avLst/>
+          </a:prstGeom>
+        </p:spPr>
+      </p:pic>
+      <p:sp>
+        <p:nvSpPr>
+          <p:cNvPr id="11" name="TextBox 10">
+            <a:extLst>
+              <a:ext uri="{FF2B5EF4-FFF2-40B4-BE49-F238E27FC236}">
+                <a16:creationId xmlns:a16="http://schemas.microsoft.com/office/drawing/2014/main" id="{EAA7B474-0ADF-4310-9AAD-F48A44972498}"/>
+              </a:ext>
+            </a:extLst>
+          </p:cNvPr>
+          <p:cNvSpPr txBox="1"/>
+          <p:nvPr/>
+        </p:nvSpPr>
+        <p:spPr>
+          <a:xfrm>
+            <a:off x="980658" y="3816628"/>
+            <a:ext cx="2588209" cy="369332"/>
+          </a:xfrm>
+          <a:prstGeom prst="rect">
+            <a:avLst/>
+          </a:prstGeom>
+          <a:solidFill>
+            <a:schemeClr val="accent4"/>
+          </a:solidFill>
+        </p:spPr>
+        <p:txBody>
+          <a:bodyPr wrap="none" rtlCol="0">
+            <a:spAutoFit/>
+          </a:bodyPr>
+          <a:lstStyle/>
+          <a:p>
+            <a:r>
+              <a:rPr lang="en-US" dirty="0"/>
+              <a:t>Current time to Unix time</a:t>
+            </a:r>
+          </a:p>
+        </p:txBody>
+      </p:sp>
+      <p:sp>
+        <p:nvSpPr>
+          <p:cNvPr id="12" name="TextBox 11">
+            <a:extLst>
+              <a:ext uri="{FF2B5EF4-FFF2-40B4-BE49-F238E27FC236}">
+                <a16:creationId xmlns:a16="http://schemas.microsoft.com/office/drawing/2014/main" id="{0D8CFFCA-9681-4B33-88B1-0D682032CEA5}"/>
+              </a:ext>
+            </a:extLst>
+          </p:cNvPr>
+          <p:cNvSpPr txBox="1"/>
+          <p:nvPr/>
+        </p:nvSpPr>
+        <p:spPr>
+          <a:xfrm>
+            <a:off x="6096000" y="3816628"/>
+            <a:ext cx="2699329" cy="369332"/>
+          </a:xfrm>
+          <a:prstGeom prst="rect">
+            <a:avLst/>
+          </a:prstGeom>
+          <a:solidFill>
+            <a:schemeClr val="accent4"/>
+          </a:solidFill>
+        </p:spPr>
+        <p:txBody>
+          <a:bodyPr wrap="none" rtlCol="0">
+            <a:spAutoFit/>
+          </a:bodyPr>
+          <a:lstStyle/>
+          <a:p>
+            <a:r>
+              <a:rPr lang="en-US" dirty="0"/>
+              <a:t>Unix time to readable time</a:t>
+            </a:r>
+          </a:p>
+        </p:txBody>
+      </p:sp>
+    </p:spTree>
+    <p:extLst>
+      <p:ext uri="{BB962C8B-B14F-4D97-AF65-F5344CB8AC3E}">
+        <p14:creationId xmlns:p14="http://schemas.microsoft.com/office/powerpoint/2010/main" val="3972243169"/>
+      </p:ext>
+    </p:extLst>
+  </p:cSld>
+  <p:clrMapOvr>
+    <a:masterClrMapping/>
+  </p:clrMapOvr>
+</p:sld>
+</file>
+
+<file path=ppt/slides/slide21.xml><?xml version="1.0" encoding="utf-8"?>
+<p:sld xmlns:a="http://schemas.openxmlformats.org/drawingml/2006/main" xmlns:r="http://schemas.openxmlformats.org/officeDocument/2006/relationships" xmlns:p="http://schemas.openxmlformats.org/presentationml/2006/main">
+  <p:cSld>
+    <p:spTree>
+      <p:nvGrpSpPr>
+        <p:cNvPr id="1" name=""/>
+        <p:cNvGrpSpPr/>
+        <p:nvPr/>
+      </p:nvGrpSpPr>
+      <p:grpSpPr>
+        <a:xfrm>
+          <a:off x="0" y="0"/>
+          <a:ext cx="0" cy="0"/>
+          <a:chOff x="0" y="0"/>
+          <a:chExt cx="0" cy="0"/>
+        </a:xfrm>
+      </p:grpSpPr>
+      <p:sp>
+        <p:nvSpPr>
+          <p:cNvPr id="2" name="Title 1">
+            <a:extLst>
+              <a:ext uri="{FF2B5EF4-FFF2-40B4-BE49-F238E27FC236}">
+                <a16:creationId xmlns:a16="http://schemas.microsoft.com/office/drawing/2014/main" id="{01324B60-4399-4B03-A2B0-1AD626B9B860}"/>
+              </a:ext>
+            </a:extLst>
+          </p:cNvPr>
+          <p:cNvSpPr>
+            <a:spLocks noGrp="1"/>
+          </p:cNvSpPr>
+          <p:nvPr>
+            <p:ph type="title"/>
+          </p:nvPr>
+        </p:nvSpPr>
+        <p:spPr/>
+        <p:txBody>
+          <a:bodyPr/>
+          <a:lstStyle/>
+          <a:p>
+            <a:r>
+              <a:rPr lang="en-GB" dirty="0"/>
+              <a:t>Mac "epoch time"</a:t>
+            </a:r>
+            <a:endParaRPr lang="en-US" dirty="0"/>
+          </a:p>
+        </p:txBody>
+      </p:sp>
+      <p:sp>
+        <p:nvSpPr>
+          <p:cNvPr id="3" name="Content Placeholder 2">
+            <a:extLst>
+              <a:ext uri="{FF2B5EF4-FFF2-40B4-BE49-F238E27FC236}">
+                <a16:creationId xmlns:a16="http://schemas.microsoft.com/office/drawing/2014/main" id="{2500F15C-7111-422D-9384-11B217932593}"/>
+              </a:ext>
+            </a:extLst>
+          </p:cNvPr>
+          <p:cNvSpPr>
+            <a:spLocks noGrp="1"/>
+          </p:cNvSpPr>
+          <p:nvPr>
+            <p:ph idx="1"/>
+          </p:nvPr>
+        </p:nvSpPr>
+        <p:spPr/>
+        <p:txBody>
+          <a:bodyPr/>
+          <a:lstStyle/>
+          <a:p>
+            <a:r>
+              <a:rPr lang="en-GB" dirty="0"/>
+              <a:t>Mac uses a different "epoch time" than the UNIX epoch time.</a:t>
+            </a:r>
+          </a:p>
+          <a:p>
+            <a:r>
+              <a:rPr lang="en-GB" dirty="0"/>
+              <a:t>Mac OS epoch date is Midnight January 1, 2001 UTC</a:t>
+            </a:r>
+          </a:p>
+          <a:p>
+            <a:r>
+              <a:rPr lang="en-US">
+                <a:solidFill>
+                  <a:srgbClr val="232629"/>
+                </a:solidFill>
+                <a:latin typeface="-apple-system"/>
+              </a:rPr>
+              <a:t>Different is </a:t>
+            </a:r>
+            <a:r>
+              <a:rPr lang="en-US" b="0" i="0">
+                <a:solidFill>
+                  <a:srgbClr val="232629"/>
+                </a:solidFill>
+                <a:effectLst/>
+                <a:latin typeface="-apple-system"/>
+              </a:rPr>
+              <a:t>31 years (978264705 second) </a:t>
+            </a:r>
+            <a:endParaRPr lang="en-US" dirty="0"/>
+          </a:p>
+        </p:txBody>
+      </p:sp>
+    </p:spTree>
+    <p:extLst>
+      <p:ext uri="{BB962C8B-B14F-4D97-AF65-F5344CB8AC3E}">
+        <p14:creationId xmlns:p14="http://schemas.microsoft.com/office/powerpoint/2010/main" val="930520840"/>
       </p:ext>
     </p:extLst>
   </p:cSld>
@@ -32855,6 +35280,57 @@
           </a:graphicData>
         </a:graphic>
       </p:graphicFrame>
+      <mc:AlternateContent xmlns:mc="http://schemas.openxmlformats.org/markup-compatibility/2006">
+        <mc:Choice xmlns:p14="http://schemas.microsoft.com/office/powerpoint/2010/main" Requires="p14">
+          <p:contentPart p14:bwMode="auto" r:id="rId2">
+            <p14:nvContentPartPr>
+              <p14:cNvPr id="5" name="Ink 4">
+                <a:extLst>
+                  <a:ext uri="{FF2B5EF4-FFF2-40B4-BE49-F238E27FC236}">
+                    <a16:creationId xmlns:a16="http://schemas.microsoft.com/office/drawing/2014/main" id="{BDB25615-A17A-4913-B636-42B32AD24BB6}"/>
+                  </a:ext>
+                </a:extLst>
+              </p14:cNvPr>
+              <p14:cNvContentPartPr/>
+              <p14:nvPr/>
+            </p14:nvContentPartPr>
+            <p14:xfrm>
+              <a:off x="10348033" y="3434526"/>
+              <a:ext cx="360" cy="360"/>
+            </p14:xfrm>
+          </p:contentPart>
+        </mc:Choice>
+        <mc:Fallback>
+          <p:pic>
+            <p:nvPicPr>
+              <p:cNvPr id="5" name="Ink 4">
+                <a:extLst>
+                  <a:ext uri="{FF2B5EF4-FFF2-40B4-BE49-F238E27FC236}">
+                    <a16:creationId xmlns:a16="http://schemas.microsoft.com/office/drawing/2014/main" id="{BDB25615-A17A-4913-B636-42B32AD24BB6}"/>
+                  </a:ext>
+                </a:extLst>
+              </p:cNvPr>
+              <p:cNvPicPr/>
+              <p:nvPr/>
+            </p:nvPicPr>
+            <p:blipFill>
+              <a:blip r:embed="rId3"/>
+              <a:stretch>
+                <a:fillRect/>
+              </a:stretch>
+            </p:blipFill>
+            <p:spPr>
+              <a:xfrm>
+                <a:off x="10339033" y="3425526"/>
+                <a:ext cx="18000" cy="18000"/>
+              </a:xfrm>
+              <a:prstGeom prst="rect">
+                <a:avLst/>
+              </a:prstGeom>
+            </p:spPr>
+          </p:pic>
+        </mc:Fallback>
+      </mc:AlternateContent>
     </p:spTree>
     <p:extLst>
       <p:ext uri="{BB962C8B-B14F-4D97-AF65-F5344CB8AC3E}">
@@ -33546,6 +36022,57 @@
           </a:p>
         </p:txBody>
       </p:sp>
+      <mc:AlternateContent xmlns:mc="http://schemas.openxmlformats.org/markup-compatibility/2006">
+        <mc:Choice xmlns:p14="http://schemas.microsoft.com/office/powerpoint/2010/main" Requires="p14">
+          <p:contentPart p14:bwMode="auto" r:id="rId2">
+            <p14:nvContentPartPr>
+              <p14:cNvPr id="3" name="Ink 2">
+                <a:extLst>
+                  <a:ext uri="{FF2B5EF4-FFF2-40B4-BE49-F238E27FC236}">
+                    <a16:creationId xmlns:a16="http://schemas.microsoft.com/office/drawing/2014/main" id="{7D314D81-37EB-4649-98B4-3BA004A9B9CE}"/>
+                  </a:ext>
+                </a:extLst>
+              </p14:cNvPr>
+              <p14:cNvContentPartPr/>
+              <p14:nvPr/>
+            </p14:nvContentPartPr>
+            <p14:xfrm>
+              <a:off x="10838678" y="3070206"/>
+              <a:ext cx="360" cy="360"/>
+            </p14:xfrm>
+          </p:contentPart>
+        </mc:Choice>
+        <mc:Fallback>
+          <p:pic>
+            <p:nvPicPr>
+              <p:cNvPr id="3" name="Ink 2">
+                <a:extLst>
+                  <a:ext uri="{FF2B5EF4-FFF2-40B4-BE49-F238E27FC236}">
+                    <a16:creationId xmlns:a16="http://schemas.microsoft.com/office/drawing/2014/main" id="{7D314D81-37EB-4649-98B4-3BA004A9B9CE}"/>
+                  </a:ext>
+                </a:extLst>
+              </p:cNvPr>
+              <p:cNvPicPr/>
+              <p:nvPr/>
+            </p:nvPicPr>
+            <p:blipFill>
+              <a:blip r:embed="rId3"/>
+              <a:stretch>
+                <a:fillRect/>
+              </a:stretch>
+            </p:blipFill>
+            <p:spPr>
+              <a:xfrm>
+                <a:off x="10829678" y="3061206"/>
+                <a:ext cx="18000" cy="18000"/>
+              </a:xfrm>
+              <a:prstGeom prst="rect">
+                <a:avLst/>
+              </a:prstGeom>
+            </p:spPr>
+          </p:pic>
+        </mc:Fallback>
+      </mc:AlternateContent>
     </p:spTree>
     <p:extLst>
       <p:ext uri="{BB962C8B-B14F-4D97-AF65-F5344CB8AC3E}">
@@ -33592,7 +36119,12 @@
             <p:ph type="title"/>
           </p:nvPr>
         </p:nvSpPr>
-        <p:spPr/>
+        <p:spPr>
+          <a:xfrm>
+            <a:off x="798847" y="357485"/>
+            <a:ext cx="10515600" cy="1325563"/>
+          </a:xfrm>
+        </p:spPr>
         <p:txBody>
           <a:bodyPr/>
           <a:lstStyle/>
@@ -33622,7 +36154,7 @@
         </p:nvSpPr>
         <p:spPr>
           <a:xfrm>
-            <a:off x="838200" y="1825625"/>
+            <a:off x="712841" y="1674216"/>
             <a:ext cx="4338234" cy="4351338"/>
           </a:xfrm>
         </p:spPr>
@@ -33696,7 +36228,7 @@
         </p:nvSpPr>
         <p:spPr bwMode="auto">
           <a:xfrm>
-            <a:off x="5562600" y="2577886"/>
+            <a:off x="5548312" y="1767006"/>
             <a:ext cx="5580681" cy="3323987"/>
           </a:xfrm>
           <a:prstGeom prst="rect">
@@ -34201,7 +36733,7 @@
         </p:nvSpPr>
         <p:spPr bwMode="auto">
           <a:xfrm>
-            <a:off x="10036444" y="5181600"/>
+            <a:off x="10022156" y="4370720"/>
             <a:ext cx="609600" cy="0"/>
           </a:xfrm>
           <a:prstGeom prst="line">
@@ -34260,7 +36792,7 @@
         </p:nvSpPr>
         <p:spPr bwMode="auto">
           <a:xfrm>
-            <a:off x="5915725" y="1415257"/>
+            <a:off x="7052659" y="612983"/>
             <a:ext cx="1371600" cy="685800"/>
           </a:xfrm>
           <a:prstGeom prst="wedgeRoundRectCallout">
@@ -34289,8 +36821,8 @@
           <a:p>
             <a:pPr algn="ctr"/>
             <a:r>
-              <a:rPr lang="en-US" altLang="en-US"/>
-              <a:t>Bit “0”</a:t>
+              <a:rPr lang="en-US" altLang="en-US" dirty="0"/>
+              <a:t>placeholder</a:t>
             </a:r>
           </a:p>
         </p:txBody>
@@ -34311,7 +36843,7 @@
         </p:nvSpPr>
         <p:spPr bwMode="auto">
           <a:xfrm>
-            <a:off x="8028768" y="5414963"/>
+            <a:off x="8014480" y="4604083"/>
             <a:ext cx="990600" cy="762000"/>
           </a:xfrm>
           <a:prstGeom prst="wedgeRoundRectCallout">
@@ -34365,7 +36897,7 @@
         </p:nvSpPr>
         <p:spPr bwMode="auto">
           <a:xfrm>
-            <a:off x="9019368" y="1450147"/>
+            <a:off x="9005080" y="639267"/>
             <a:ext cx="1295400" cy="762000"/>
           </a:xfrm>
           <a:prstGeom prst="wedgeRoundRectCallout">
@@ -34400,6 +36932,210 @@
           </a:p>
         </p:txBody>
       </p:sp>
+      <p:pic>
+        <p:nvPicPr>
+          <p:cNvPr id="10" name="Picture 9">
+            <a:extLst>
+              <a:ext uri="{FF2B5EF4-FFF2-40B4-BE49-F238E27FC236}">
+                <a16:creationId xmlns:a16="http://schemas.microsoft.com/office/drawing/2014/main" id="{715D01BF-50B3-4C1F-A943-AB2FB8F91FFF}"/>
+              </a:ext>
+            </a:extLst>
+          </p:cNvPr>
+          <p:cNvPicPr>
+            <a:picLocks noChangeAspect="1"/>
+          </p:cNvPicPr>
+          <p:nvPr/>
+        </p:nvPicPr>
+        <p:blipFill>
+          <a:blip r:embed="rId2"/>
+          <a:stretch>
+            <a:fillRect/>
+          </a:stretch>
+        </p:blipFill>
+        <p:spPr>
+          <a:xfrm>
+            <a:off x="5589968" y="5778779"/>
+            <a:ext cx="2925383" cy="762000"/>
+          </a:xfrm>
+          <a:prstGeom prst="rect">
+            <a:avLst/>
+          </a:prstGeom>
+        </p:spPr>
+      </p:pic>
+      <p:sp>
+        <p:nvSpPr>
+          <p:cNvPr id="11" name="TextBox 10">
+            <a:extLst>
+              <a:ext uri="{FF2B5EF4-FFF2-40B4-BE49-F238E27FC236}">
+                <a16:creationId xmlns:a16="http://schemas.microsoft.com/office/drawing/2014/main" id="{C934F1A0-1DFB-4533-B0D2-370D2DCC082D}"/>
+              </a:ext>
+            </a:extLst>
+          </p:cNvPr>
+          <p:cNvSpPr txBox="1"/>
+          <p:nvPr/>
+        </p:nvSpPr>
+        <p:spPr>
+          <a:xfrm>
+            <a:off x="8741739" y="5855999"/>
+            <a:ext cx="2078831" cy="584775"/>
+          </a:xfrm>
+          <a:prstGeom prst="rect">
+            <a:avLst/>
+          </a:prstGeom>
+          <a:solidFill>
+            <a:schemeClr val="accent4">
+              <a:lumMod val="20000"/>
+              <a:lumOff val="80000"/>
+            </a:schemeClr>
+          </a:solidFill>
+        </p:spPr>
+        <p:txBody>
+          <a:bodyPr wrap="square">
+            <a:spAutoFit/>
+          </a:bodyPr>
+          <a:lstStyle/>
+          <a:p>
+            <a:pPr algn="l"/>
+            <a:r>
+              <a:rPr lang="en-US" sz="1600" dirty="0">
+                <a:solidFill>
+                  <a:srgbClr val="FF0000"/>
+                </a:solidFill>
+              </a:rPr>
+              <a:t>$(())</a:t>
+            </a:r>
+            <a:r>
+              <a:rPr lang="en-US" sz="1600" dirty="0"/>
+              <a:t>: Shell</a:t>
+            </a:r>
+            <a:r>
+              <a:rPr lang="en-US" sz="1600" b="1" i="0" dirty="0">
+                <a:solidFill>
+                  <a:srgbClr val="333333"/>
+                </a:solidFill>
+                <a:effectLst/>
+                <a:latin typeface="Fira Sans" panose="020B0503050000020004" pitchFamily="34" charset="0"/>
+              </a:rPr>
+              <a:t> </a:t>
+            </a:r>
+            <a:r>
+              <a:rPr lang="en-US" sz="1600" dirty="0"/>
+              <a:t>Arithmetic</a:t>
+            </a:r>
+          </a:p>
+          <a:p>
+            <a:pPr algn="l"/>
+            <a:r>
+              <a:rPr lang="en-US" sz="1600" dirty="0">
+                <a:solidFill>
+                  <a:srgbClr val="FF0000"/>
+                </a:solidFill>
+              </a:rPr>
+              <a:t>2# </a:t>
+            </a:r>
+            <a:r>
+              <a:rPr lang="en-US" sz="1600" dirty="0"/>
+              <a:t>base 2</a:t>
+            </a:r>
+          </a:p>
+        </p:txBody>
+      </p:sp>
+      <p:cxnSp>
+        <p:nvCxnSpPr>
+          <p:cNvPr id="13" name="Straight Arrow Connector 12">
+            <a:extLst>
+              <a:ext uri="{FF2B5EF4-FFF2-40B4-BE49-F238E27FC236}">
+                <a16:creationId xmlns:a16="http://schemas.microsoft.com/office/drawing/2014/main" id="{6B4F433A-FCF6-4195-8AB6-ADC64B0901D8}"/>
+              </a:ext>
+            </a:extLst>
+          </p:cNvPr>
+          <p:cNvCxnSpPr>
+            <a:cxnSpLocks/>
+            <a:endCxn id="11" idx="1"/>
+          </p:cNvCxnSpPr>
+          <p:nvPr/>
+        </p:nvCxnSpPr>
+        <p:spPr>
+          <a:xfrm>
+            <a:off x="8201025" y="6131089"/>
+            <a:ext cx="540714" cy="17298"/>
+          </a:xfrm>
+          <a:prstGeom prst="straightConnector1">
+            <a:avLst/>
+          </a:prstGeom>
+          <a:ln>
+            <a:solidFill>
+              <a:srgbClr val="FFC000"/>
+            </a:solidFill>
+            <a:tailEnd type="triangle"/>
+          </a:ln>
+        </p:spPr>
+        <p:style>
+          <a:lnRef idx="1">
+            <a:schemeClr val="accent1"/>
+          </a:lnRef>
+          <a:fillRef idx="0">
+            <a:schemeClr val="accent1"/>
+          </a:fillRef>
+          <a:effectRef idx="0">
+            <a:schemeClr val="accent1"/>
+          </a:effectRef>
+          <a:fontRef idx="minor">
+            <a:schemeClr val="tx1"/>
+          </a:fontRef>
+        </p:style>
+      </p:cxnSp>
+      <mc:AlternateContent xmlns:mc="http://schemas.openxmlformats.org/markup-compatibility/2006">
+        <mc:Choice xmlns:p14="http://schemas.microsoft.com/office/powerpoint/2010/main" Requires="p14">
+          <p:contentPart p14:bwMode="auto" r:id="rId3">
+            <p14:nvContentPartPr>
+              <p14:cNvPr id="26" name="Ink 25">
+                <a:extLst>
+                  <a:ext uri="{FF2B5EF4-FFF2-40B4-BE49-F238E27FC236}">
+                    <a16:creationId xmlns:a16="http://schemas.microsoft.com/office/drawing/2014/main" id="{9CC61299-270D-4B70-BFF6-F8C97F3328D5}"/>
+                  </a:ext>
+                </a:extLst>
+              </p14:cNvPr>
+              <p14:cNvContentPartPr/>
+              <p14:nvPr/>
+            </p14:nvContentPartPr>
+            <p14:xfrm>
+              <a:off x="1761638" y="832446"/>
+              <a:ext cx="360" cy="360"/>
+            </p14:xfrm>
+          </p:contentPart>
+        </mc:Choice>
+        <mc:Fallback>
+          <p:pic>
+            <p:nvPicPr>
+              <p:cNvPr id="26" name="Ink 25">
+                <a:extLst>
+                  <a:ext uri="{FF2B5EF4-FFF2-40B4-BE49-F238E27FC236}">
+                    <a16:creationId xmlns:a16="http://schemas.microsoft.com/office/drawing/2014/main" id="{9CC61299-270D-4B70-BFF6-F8C97F3328D5}"/>
+                  </a:ext>
+                </a:extLst>
+              </p:cNvPr>
+              <p:cNvPicPr/>
+              <p:nvPr/>
+            </p:nvPicPr>
+            <p:blipFill>
+              <a:blip r:embed="rId4"/>
+              <a:stretch>
+                <a:fillRect/>
+              </a:stretch>
+            </p:blipFill>
+            <p:spPr>
+              <a:xfrm>
+                <a:off x="1752638" y="823806"/>
+                <a:ext cx="18000" cy="18000"/>
+              </a:xfrm>
+              <a:prstGeom prst="rect">
+                <a:avLst/>
+              </a:prstGeom>
+            </p:spPr>
+          </p:pic>
+        </mc:Fallback>
+      </mc:AlternateContent>
     </p:spTree>
     <p:extLst>
       <p:ext uri="{BB962C8B-B14F-4D97-AF65-F5344CB8AC3E}">
@@ -34477,7 +37213,7 @@
         <p:spPr>
           <a:xfrm>
             <a:off x="838200" y="1825625"/>
-            <a:ext cx="4330485" cy="4351338"/>
+            <a:ext cx="4330485" cy="3160713"/>
           </a:xfrm>
         </p:spPr>
         <p:txBody>
@@ -34550,8 +37286,8 @@
         </p:nvSpPr>
         <p:spPr bwMode="auto">
           <a:xfrm>
-            <a:off x="5318501" y="2061019"/>
-            <a:ext cx="5786035" cy="3139321"/>
+            <a:off x="5361364" y="1825625"/>
+            <a:ext cx="5786035" cy="2585323"/>
           </a:xfrm>
           <a:prstGeom prst="rect">
             <a:avLst/>
@@ -34625,16 +37361,6 @@
               </a:rPr>
               <a:t> =&gt;</a:t>
             </a:r>
-          </a:p>
-          <a:p>
-            <a:pPr>
-              <a:spcBef>
-                <a:spcPct val="50000"/>
-              </a:spcBef>
-            </a:pPr>
-            <a:endParaRPr lang="en-US" altLang="en-US" sz="2400" dirty="0">
-              <a:latin typeface="Courier New" panose="02070309020205020404" pitchFamily="49" charset="0"/>
-            </a:endParaRPr>
           </a:p>
           <a:p>
             <a:pPr>
@@ -34852,7 +37578,7 @@
         </p:nvSpPr>
         <p:spPr bwMode="auto">
           <a:xfrm>
-            <a:off x="9137541" y="4559918"/>
+            <a:off x="9155126" y="3954043"/>
             <a:ext cx="1143000" cy="0"/>
           </a:xfrm>
           <a:prstGeom prst="line">
@@ -34891,6 +37617,253 @@
           </a:bodyPr>
           <a:lstStyle/>
           <a:p>
+            <a:endParaRPr lang="en-US"/>
+          </a:p>
+        </p:txBody>
+      </p:sp>
+      <p:pic>
+        <p:nvPicPr>
+          <p:cNvPr id="7" name="Picture 6">
+            <a:extLst>
+              <a:ext uri="{FF2B5EF4-FFF2-40B4-BE49-F238E27FC236}">
+                <a16:creationId xmlns:a16="http://schemas.microsoft.com/office/drawing/2014/main" id="{194E9B75-5BB8-4A05-B9B4-8A1F9F25DF90}"/>
+              </a:ext>
+            </a:extLst>
+          </p:cNvPr>
+          <p:cNvPicPr>
+            <a:picLocks noChangeAspect="1"/>
+          </p:cNvPicPr>
+          <p:nvPr/>
+        </p:nvPicPr>
+        <p:blipFill>
+          <a:blip r:embed="rId3"/>
+          <a:stretch>
+            <a:fillRect/>
+          </a:stretch>
+        </p:blipFill>
+        <p:spPr>
+          <a:xfrm>
+            <a:off x="7536484" y="4986338"/>
+            <a:ext cx="3962743" cy="1432684"/>
+          </a:xfrm>
+          <a:prstGeom prst="rect">
+            <a:avLst/>
+          </a:prstGeom>
+        </p:spPr>
+      </p:pic>
+      <p:sp>
+        <p:nvSpPr>
+          <p:cNvPr id="9" name="TextBox 8">
+            <a:extLst>
+              <a:ext uri="{FF2B5EF4-FFF2-40B4-BE49-F238E27FC236}">
+                <a16:creationId xmlns:a16="http://schemas.microsoft.com/office/drawing/2014/main" id="{68071F5E-E1F3-4080-9432-87DFE966BCBA}"/>
+              </a:ext>
+            </a:extLst>
+          </p:cNvPr>
+          <p:cNvSpPr txBox="1"/>
+          <p:nvPr/>
+        </p:nvSpPr>
+        <p:spPr>
+          <a:xfrm>
+            <a:off x="9420396" y="5533403"/>
+            <a:ext cx="2078831" cy="338554"/>
+          </a:xfrm>
+          <a:prstGeom prst="rect">
+            <a:avLst/>
+          </a:prstGeom>
+          <a:solidFill>
+            <a:schemeClr val="accent4">
+              <a:lumMod val="20000"/>
+              <a:lumOff val="80000"/>
+            </a:schemeClr>
+          </a:solidFill>
+        </p:spPr>
+        <p:txBody>
+          <a:bodyPr wrap="square">
+            <a:spAutoFit/>
+          </a:bodyPr>
+          <a:lstStyle/>
+          <a:p>
+            <a:pPr algn="l"/>
+            <a:r>
+              <a:rPr lang="en-US" sz="1600" dirty="0">
+                <a:solidFill>
+                  <a:srgbClr val="FF0000"/>
+                </a:solidFill>
+              </a:rPr>
+              <a:t>$(())</a:t>
+            </a:r>
+            <a:r>
+              <a:rPr lang="en-US" sz="1600" dirty="0"/>
+              <a:t>: Shell</a:t>
+            </a:r>
+            <a:r>
+              <a:rPr lang="en-US" sz="1600" b="1" i="0" dirty="0">
+                <a:solidFill>
+                  <a:srgbClr val="333333"/>
+                </a:solidFill>
+                <a:effectLst/>
+                <a:latin typeface="Fira Sans" panose="020B0503050000020004" pitchFamily="34" charset="0"/>
+              </a:rPr>
+              <a:t> </a:t>
+            </a:r>
+            <a:r>
+              <a:rPr lang="en-US" sz="1600" dirty="0"/>
+              <a:t>Arithmetic</a:t>
+            </a:r>
+          </a:p>
+        </p:txBody>
+      </p:sp>
+      <p:cxnSp>
+        <p:nvCxnSpPr>
+          <p:cNvPr id="13" name="Straight Arrow Connector 12">
+            <a:extLst>
+              <a:ext uri="{FF2B5EF4-FFF2-40B4-BE49-F238E27FC236}">
+                <a16:creationId xmlns:a16="http://schemas.microsoft.com/office/drawing/2014/main" id="{28A1D5AE-6B30-4F17-830F-EC5EBF833DB5}"/>
+              </a:ext>
+            </a:extLst>
+          </p:cNvPr>
+          <p:cNvCxnSpPr/>
+          <p:nvPr/>
+        </p:nvCxnSpPr>
+        <p:spPr>
+          <a:xfrm>
+            <a:off x="9236869" y="5410544"/>
+            <a:ext cx="183527" cy="292136"/>
+          </a:xfrm>
+          <a:prstGeom prst="straightConnector1">
+            <a:avLst/>
+          </a:prstGeom>
+          <a:ln>
+            <a:tailEnd type="triangle"/>
+          </a:ln>
+        </p:spPr>
+        <p:style>
+          <a:lnRef idx="1">
+            <a:schemeClr val="accent1"/>
+          </a:lnRef>
+          <a:fillRef idx="0">
+            <a:schemeClr val="accent1"/>
+          </a:fillRef>
+          <a:effectRef idx="0">
+            <a:schemeClr val="accent1"/>
+          </a:effectRef>
+          <a:fontRef idx="minor">
+            <a:schemeClr val="tx1"/>
+          </a:fontRef>
+        </p:style>
+      </p:cxnSp>
+      <p:cxnSp>
+        <p:nvCxnSpPr>
+          <p:cNvPr id="15" name="Straight Arrow Connector 14">
+            <a:extLst>
+              <a:ext uri="{FF2B5EF4-FFF2-40B4-BE49-F238E27FC236}">
+                <a16:creationId xmlns:a16="http://schemas.microsoft.com/office/drawing/2014/main" id="{9C633FCA-C20D-4F68-80E8-16106B0803FA}"/>
+              </a:ext>
+            </a:extLst>
+          </p:cNvPr>
+          <p:cNvCxnSpPr/>
+          <p:nvPr/>
+        </p:nvCxnSpPr>
+        <p:spPr>
+          <a:xfrm flipV="1">
+            <a:off x="9093994" y="5702680"/>
+            <a:ext cx="326402" cy="457958"/>
+          </a:xfrm>
+          <a:prstGeom prst="straightConnector1">
+            <a:avLst/>
+          </a:prstGeom>
+          <a:ln>
+            <a:tailEnd type="triangle"/>
+          </a:ln>
+        </p:spPr>
+        <p:style>
+          <a:lnRef idx="1">
+            <a:schemeClr val="accent1"/>
+          </a:lnRef>
+          <a:fillRef idx="0">
+            <a:schemeClr val="accent1"/>
+          </a:fillRef>
+          <a:effectRef idx="0">
+            <a:schemeClr val="accent1"/>
+          </a:effectRef>
+          <a:fontRef idx="minor">
+            <a:schemeClr val="tx1"/>
+          </a:fontRef>
+        </p:style>
+      </p:cxnSp>
+      <p:pic>
+        <p:nvPicPr>
+          <p:cNvPr id="17" name="Picture 16">
+            <a:extLst>
+              <a:ext uri="{FF2B5EF4-FFF2-40B4-BE49-F238E27FC236}">
+                <a16:creationId xmlns:a16="http://schemas.microsoft.com/office/drawing/2014/main" id="{706E799A-9C7C-450B-80CA-9F31CB6E836D}"/>
+              </a:ext>
+            </a:extLst>
+          </p:cNvPr>
+          <p:cNvPicPr>
+            <a:picLocks noChangeAspect="1"/>
+          </p:cNvPicPr>
+          <p:nvPr/>
+        </p:nvPicPr>
+        <p:blipFill>
+          <a:blip r:embed="rId4"/>
+          <a:stretch>
+            <a:fillRect/>
+          </a:stretch>
+        </p:blipFill>
+        <p:spPr>
+          <a:xfrm>
+            <a:off x="4968811" y="4986338"/>
+            <a:ext cx="2278577" cy="685859"/>
+          </a:xfrm>
+          <a:prstGeom prst="rect">
+            <a:avLst/>
+          </a:prstGeom>
+        </p:spPr>
+      </p:pic>
+      <p:sp>
+        <p:nvSpPr>
+          <p:cNvPr id="18" name="Arrow: Left-Right 17">
+            <a:extLst>
+              <a:ext uri="{FF2B5EF4-FFF2-40B4-BE49-F238E27FC236}">
+                <a16:creationId xmlns:a16="http://schemas.microsoft.com/office/drawing/2014/main" id="{3C80ED41-0993-44D7-A825-6581EE4636F4}"/>
+              </a:ext>
+            </a:extLst>
+          </p:cNvPr>
+          <p:cNvSpPr/>
+          <p:nvPr/>
+        </p:nvSpPr>
+        <p:spPr>
+          <a:xfrm>
+            <a:off x="7247388" y="5286375"/>
+            <a:ext cx="289096" cy="124169"/>
+          </a:xfrm>
+          <a:prstGeom prst="leftRightArrow">
+            <a:avLst/>
+          </a:prstGeom>
+        </p:spPr>
+        <p:style>
+          <a:lnRef idx="2">
+            <a:schemeClr val="accent1">
+              <a:shade val="50000"/>
+            </a:schemeClr>
+          </a:lnRef>
+          <a:fillRef idx="1">
+            <a:schemeClr val="accent1"/>
+          </a:fillRef>
+          <a:effectRef idx="0">
+            <a:schemeClr val="accent1"/>
+          </a:effectRef>
+          <a:fontRef idx="minor">
+            <a:schemeClr val="lt1"/>
+          </a:fontRef>
+        </p:style>
+        <p:txBody>
+          <a:bodyPr rtlCol="0" anchor="ctr"/>
+          <a:lstStyle/>
+          <a:p>
+            <a:pPr algn="ctr"/>
             <a:endParaRPr lang="en-US"/>
           </a:p>
         </p:txBody>
@@ -34972,7 +37945,7 @@
         <p:spPr>
           <a:xfrm>
             <a:off x="838200" y="1825625"/>
-            <a:ext cx="4469969" cy="4351338"/>
+            <a:ext cx="4469969" cy="3010694"/>
           </a:xfrm>
         </p:spPr>
         <p:txBody>
@@ -35035,7 +38008,7 @@
         </p:nvGrpSpPr>
         <p:grpSpPr bwMode="auto">
           <a:xfrm>
-            <a:off x="7356908" y="1825625"/>
+            <a:off x="7356908" y="1389856"/>
             <a:ext cx="2057400" cy="830263"/>
             <a:chOff x="2232" y="816"/>
             <a:chExt cx="1296" cy="523"/>
@@ -35275,7 +38248,7 @@
         </p:nvGrpSpPr>
         <p:grpSpPr bwMode="auto">
           <a:xfrm>
-            <a:off x="7356908" y="2206625"/>
+            <a:off x="7356908" y="1770856"/>
             <a:ext cx="2057400" cy="830263"/>
             <a:chOff x="2232" y="1056"/>
             <a:chExt cx="1296" cy="523"/>
@@ -35515,7 +38488,7 @@
         </p:nvGrpSpPr>
         <p:grpSpPr bwMode="auto">
           <a:xfrm>
-            <a:off x="7356908" y="2587625"/>
+            <a:off x="7356908" y="2151856"/>
             <a:ext cx="2057400" cy="830263"/>
             <a:chOff x="2232" y="1296"/>
             <a:chExt cx="1296" cy="523"/>
@@ -35755,7 +38728,7 @@
         </p:nvGrpSpPr>
         <p:grpSpPr bwMode="auto">
           <a:xfrm>
-            <a:off x="7341033" y="2981326"/>
+            <a:off x="7341033" y="2545557"/>
             <a:ext cx="2057400" cy="830263"/>
             <a:chOff x="624" y="2112"/>
             <a:chExt cx="1296" cy="523"/>
@@ -35995,7 +38968,7 @@
         </p:nvGrpSpPr>
         <p:grpSpPr bwMode="auto">
           <a:xfrm>
-            <a:off x="7372783" y="3376614"/>
+            <a:off x="7372783" y="2940845"/>
             <a:ext cx="2057400" cy="830263"/>
             <a:chOff x="2232" y="1783"/>
             <a:chExt cx="1296" cy="523"/>
@@ -36235,7 +39208,7 @@
         </p:nvGrpSpPr>
         <p:grpSpPr bwMode="auto">
           <a:xfrm>
-            <a:off x="7372783" y="3759202"/>
+            <a:off x="7372783" y="3323433"/>
             <a:ext cx="2057400" cy="830263"/>
             <a:chOff x="2232" y="2976"/>
             <a:chExt cx="1296" cy="523"/>
@@ -36475,7 +39448,7 @@
         </p:nvGrpSpPr>
         <p:grpSpPr bwMode="auto">
           <a:xfrm>
-            <a:off x="7356908" y="4140201"/>
+            <a:off x="7356908" y="3704432"/>
             <a:ext cx="2057400" cy="830263"/>
             <a:chOff x="2232" y="2284"/>
             <a:chExt cx="1296" cy="523"/>
@@ -36715,7 +39688,7 @@
         </p:nvSpPr>
         <p:spPr bwMode="auto">
           <a:xfrm>
-            <a:off x="6607446" y="5387308"/>
+            <a:off x="6550270" y="4705511"/>
             <a:ext cx="4334357" cy="523220"/>
           </a:xfrm>
           <a:prstGeom prst="rect">
@@ -36807,7 +39780,7 @@
         </p:nvSpPr>
         <p:spPr>
           <a:xfrm rot="10800000">
-            <a:off x="9577953" y="2282825"/>
+            <a:off x="9577953" y="1847056"/>
             <a:ext cx="163380" cy="2591392"/>
           </a:xfrm>
           <a:prstGeom prst="downArrow">
@@ -36861,7 +39834,7 @@
         </p:nvCxnSpPr>
         <p:spPr>
           <a:xfrm>
-            <a:off x="7183464" y="4719234"/>
+            <a:off x="7183464" y="4283465"/>
             <a:ext cx="883404" cy="0"/>
           </a:xfrm>
           <a:prstGeom prst="straightConnector1">
@@ -36903,7 +39876,7 @@
         </p:nvSpPr>
         <p:spPr>
           <a:xfrm>
-            <a:off x="6550270" y="4521201"/>
+            <a:off x="6550270" y="4085432"/>
             <a:ext cx="643125" cy="369332"/>
           </a:xfrm>
           <a:prstGeom prst="rect">
@@ -37018,6 +39991,152 @@
           </a:p>
         </p:txBody>
       </p:sp>
+      <p:pic>
+        <p:nvPicPr>
+          <p:cNvPr id="34" name="Picture 33">
+            <a:extLst>
+              <a:ext uri="{FF2B5EF4-FFF2-40B4-BE49-F238E27FC236}">
+                <a16:creationId xmlns:a16="http://schemas.microsoft.com/office/drawing/2014/main" id="{16B41702-FF15-4F4F-BA1E-390256313C1C}"/>
+              </a:ext>
+            </a:extLst>
+          </p:cNvPr>
+          <p:cNvPicPr>
+            <a:picLocks noChangeAspect="1"/>
+          </p:cNvPicPr>
+          <p:nvPr/>
+        </p:nvPicPr>
+        <p:blipFill>
+          <a:blip r:embed="rId3"/>
+          <a:stretch>
+            <a:fillRect/>
+          </a:stretch>
+        </p:blipFill>
+        <p:spPr>
+          <a:xfrm>
+            <a:off x="1203863" y="5314950"/>
+            <a:ext cx="2660428" cy="542945"/>
+          </a:xfrm>
+          <a:prstGeom prst="rect">
+            <a:avLst/>
+          </a:prstGeom>
+        </p:spPr>
+      </p:pic>
+      <p:sp>
+        <p:nvSpPr>
+          <p:cNvPr id="41" name="TextBox 40">
+            <a:extLst>
+              <a:ext uri="{FF2B5EF4-FFF2-40B4-BE49-F238E27FC236}">
+                <a16:creationId xmlns:a16="http://schemas.microsoft.com/office/drawing/2014/main" id="{CAD544CE-399D-47CE-A3BB-2D2B7B27A656}"/>
+              </a:ext>
+            </a:extLst>
+          </p:cNvPr>
+          <p:cNvSpPr txBox="1"/>
+          <p:nvPr/>
+        </p:nvSpPr>
+        <p:spPr>
+          <a:xfrm>
+            <a:off x="2138715" y="6073420"/>
+            <a:ext cx="1725576" cy="369332"/>
+          </a:xfrm>
+          <a:prstGeom prst="rect">
+            <a:avLst/>
+          </a:prstGeom>
+          <a:solidFill>
+            <a:schemeClr val="accent4">
+              <a:lumMod val="20000"/>
+              <a:lumOff val="80000"/>
+            </a:schemeClr>
+          </a:solidFill>
+        </p:spPr>
+        <p:txBody>
+          <a:bodyPr wrap="square">
+            <a:spAutoFit/>
+          </a:bodyPr>
+          <a:lstStyle/>
+          <a:p>
+            <a:r>
+              <a:rPr lang="en-US" b="0" i="0" dirty="0">
+                <a:solidFill>
+                  <a:srgbClr val="273239"/>
+                </a:solidFill>
+                <a:effectLst/>
+                <a:latin typeface="urw-din"/>
+              </a:rPr>
+              <a:t>basic calculator </a:t>
+            </a:r>
+            <a:endParaRPr lang="en-US" dirty="0"/>
+          </a:p>
+        </p:txBody>
+      </p:sp>
+      <p:cxnSp>
+        <p:nvCxnSpPr>
+          <p:cNvPr id="42" name="Straight Arrow Connector 41">
+            <a:extLst>
+              <a:ext uri="{FF2B5EF4-FFF2-40B4-BE49-F238E27FC236}">
+                <a16:creationId xmlns:a16="http://schemas.microsoft.com/office/drawing/2014/main" id="{EB3D095B-1D75-4C11-BA8F-7E0FD9F64767}"/>
+              </a:ext>
+            </a:extLst>
+          </p:cNvPr>
+          <p:cNvCxnSpPr/>
+          <p:nvPr/>
+        </p:nvCxnSpPr>
+        <p:spPr>
+          <a:xfrm>
+            <a:off x="3443288" y="5857895"/>
+            <a:ext cx="0" cy="314305"/>
+          </a:xfrm>
+          <a:prstGeom prst="straightConnector1">
+            <a:avLst/>
+          </a:prstGeom>
+          <a:ln>
+            <a:tailEnd type="triangle"/>
+          </a:ln>
+        </p:spPr>
+        <p:style>
+          <a:lnRef idx="1">
+            <a:schemeClr val="accent1"/>
+          </a:lnRef>
+          <a:fillRef idx="0">
+            <a:schemeClr val="accent1"/>
+          </a:fillRef>
+          <a:effectRef idx="0">
+            <a:schemeClr val="accent1"/>
+          </a:effectRef>
+          <a:fontRef idx="minor">
+            <a:schemeClr val="tx1"/>
+          </a:fontRef>
+        </p:style>
+      </p:cxnSp>
+      <p:pic>
+        <p:nvPicPr>
+          <p:cNvPr id="44" name="Picture 43">
+            <a:extLst>
+              <a:ext uri="{FF2B5EF4-FFF2-40B4-BE49-F238E27FC236}">
+                <a16:creationId xmlns:a16="http://schemas.microsoft.com/office/drawing/2014/main" id="{5EB7E3CA-C154-44B1-90F7-E2EA341D477F}"/>
+              </a:ext>
+            </a:extLst>
+          </p:cNvPr>
+          <p:cNvPicPr>
+            <a:picLocks noChangeAspect="1"/>
+          </p:cNvPicPr>
+          <p:nvPr/>
+        </p:nvPicPr>
+        <p:blipFill>
+          <a:blip r:embed="rId4"/>
+          <a:stretch>
+            <a:fillRect/>
+          </a:stretch>
+        </p:blipFill>
+        <p:spPr>
+          <a:xfrm>
+            <a:off x="6671622" y="5364699"/>
+            <a:ext cx="3069709" cy="784293"/>
+          </a:xfrm>
+          <a:prstGeom prst="rect">
+            <a:avLst/>
+          </a:prstGeom>
+        </p:spPr>
+      </p:pic>
     </p:spTree>
     <p:extLst>
       <p:ext uri="{BB962C8B-B14F-4D97-AF65-F5344CB8AC3E}">
@@ -37447,7 +40566,7 @@
         <p:spPr>
           <a:xfrm>
             <a:off x="838200" y="1825625"/>
-            <a:ext cx="4609454" cy="4351338"/>
+            <a:ext cx="4609454" cy="1702824"/>
           </a:xfrm>
         </p:spPr>
         <p:txBody>
@@ -38460,7 +41579,7 @@
         </p:nvSpPr>
         <p:spPr bwMode="auto">
           <a:xfrm>
-            <a:off x="6306519" y="4850969"/>
+            <a:off x="6318711" y="4106987"/>
             <a:ext cx="2895600" cy="461665"/>
           </a:xfrm>
           <a:prstGeom prst="rect">
@@ -38632,6 +41751,219 @@
           </a:p>
         </p:txBody>
       </p:sp>
+      <p:pic>
+        <p:nvPicPr>
+          <p:cNvPr id="19" name="Picture 18">
+            <a:extLst>
+              <a:ext uri="{FF2B5EF4-FFF2-40B4-BE49-F238E27FC236}">
+                <a16:creationId xmlns:a16="http://schemas.microsoft.com/office/drawing/2014/main" id="{FDD98927-560D-4667-AE41-98F920887A4E}"/>
+              </a:ext>
+            </a:extLst>
+          </p:cNvPr>
+          <p:cNvPicPr>
+            <a:picLocks noChangeAspect="1"/>
+          </p:cNvPicPr>
+          <p:nvPr/>
+        </p:nvPicPr>
+        <p:blipFill rotWithShape="1">
+          <a:blip r:embed="rId3"/>
+          <a:srcRect r="23019"/>
+          <a:stretch/>
+        </p:blipFill>
+        <p:spPr>
+          <a:xfrm>
+            <a:off x="838200" y="5450681"/>
+            <a:ext cx="2990850" cy="883509"/>
+          </a:xfrm>
+          <a:prstGeom prst="rect">
+            <a:avLst/>
+          </a:prstGeom>
+        </p:spPr>
+      </p:pic>
+      <p:sp>
+        <p:nvSpPr>
+          <p:cNvPr id="23" name="TextBox 22">
+            <a:extLst>
+              <a:ext uri="{FF2B5EF4-FFF2-40B4-BE49-F238E27FC236}">
+                <a16:creationId xmlns:a16="http://schemas.microsoft.com/office/drawing/2014/main" id="{B1D51253-22FB-4DF1-91DF-9BE3FBAA196A}"/>
+              </a:ext>
+            </a:extLst>
+          </p:cNvPr>
+          <p:cNvSpPr txBox="1"/>
+          <p:nvPr/>
+        </p:nvSpPr>
+        <p:spPr>
+          <a:xfrm>
+            <a:off x="5346729" y="5068967"/>
+            <a:ext cx="5304795" cy="1107996"/>
+          </a:xfrm>
+          <a:prstGeom prst="rect">
+            <a:avLst/>
+          </a:prstGeom>
+          <a:solidFill>
+            <a:schemeClr val="accent4">
+              <a:lumMod val="20000"/>
+              <a:lumOff val="80000"/>
+            </a:schemeClr>
+          </a:solidFill>
+        </p:spPr>
+        <p:txBody>
+          <a:bodyPr wrap="square">
+            <a:spAutoFit/>
+          </a:bodyPr>
+          <a:lstStyle/>
+          <a:p>
+            <a:r>
+              <a:rPr lang="en-US" dirty="0"/>
+              <a:t>controls the output as in C </a:t>
+            </a:r>
+            <a:r>
+              <a:rPr lang="en-US" dirty="0" err="1"/>
+              <a:t>printf</a:t>
+            </a:r>
+            <a:br>
+              <a:rPr lang="en-US" dirty="0"/>
+            </a:br>
+            <a:r>
+              <a:rPr lang="en-GB" sz="1600" dirty="0">
+                <a:solidFill>
+                  <a:srgbClr val="7030A0"/>
+                </a:solidFill>
+              </a:rPr>
+              <a:t>%</a:t>
+            </a:r>
+            <a:r>
+              <a:rPr lang="en-GB" sz="1600" dirty="0">
+                <a:solidFill>
+                  <a:srgbClr val="FF0000"/>
+                </a:solidFill>
+              </a:rPr>
+              <a:t>d</a:t>
+            </a:r>
+            <a:r>
+              <a:rPr lang="en-GB" sz="1600" dirty="0"/>
+              <a:t> - Print the argument as a signed decimal integer.</a:t>
+            </a:r>
+          </a:p>
+          <a:p>
+            <a:r>
+              <a:rPr lang="en-GB" sz="1600" dirty="0">
+                <a:solidFill>
+                  <a:srgbClr val="7030A0"/>
+                </a:solidFill>
+              </a:rPr>
+              <a:t>%</a:t>
+            </a:r>
+            <a:r>
+              <a:rPr lang="en-GB" sz="1600" dirty="0">
+                <a:solidFill>
+                  <a:srgbClr val="FF0000"/>
+                </a:solidFill>
+              </a:rPr>
+              <a:t>x</a:t>
+            </a:r>
+            <a:r>
+              <a:rPr lang="en-GB" sz="1600" dirty="0"/>
+              <a:t> - Print the argument as an unsigned hexadecimal integer.</a:t>
+            </a:r>
+          </a:p>
+          <a:p>
+            <a:r>
+              <a:rPr lang="en-GB" sz="1600" dirty="0">
+                <a:solidFill>
+                  <a:srgbClr val="7030A0"/>
+                </a:solidFill>
+              </a:rPr>
+              <a:t>%</a:t>
+            </a:r>
+            <a:r>
+              <a:rPr lang="en-GB" sz="1600" dirty="0">
+                <a:solidFill>
+                  <a:srgbClr val="FF0000"/>
+                </a:solidFill>
+              </a:rPr>
+              <a:t>s </a:t>
+            </a:r>
+            <a:r>
+              <a:rPr lang="en-GB" sz="1600" dirty="0"/>
+              <a:t>- Print the argument as a string.</a:t>
+            </a:r>
+            <a:endParaRPr lang="en-US" sz="1600" dirty="0"/>
+          </a:p>
+        </p:txBody>
+      </p:sp>
+      <p:cxnSp>
+        <p:nvCxnSpPr>
+          <p:cNvPr id="25" name="Straight Arrow Connector 24">
+            <a:extLst>
+              <a:ext uri="{FF2B5EF4-FFF2-40B4-BE49-F238E27FC236}">
+                <a16:creationId xmlns:a16="http://schemas.microsoft.com/office/drawing/2014/main" id="{99A9F88D-4755-468F-A2AF-E445878C7079}"/>
+              </a:ext>
+            </a:extLst>
+          </p:cNvPr>
+          <p:cNvCxnSpPr>
+            <a:cxnSpLocks/>
+            <a:stCxn id="19" idx="3"/>
+          </p:cNvCxnSpPr>
+          <p:nvPr/>
+        </p:nvCxnSpPr>
+        <p:spPr>
+          <a:xfrm flipV="1">
+            <a:off x="3829050" y="5783126"/>
+            <a:ext cx="1482602" cy="109310"/>
+          </a:xfrm>
+          <a:prstGeom prst="straightConnector1">
+            <a:avLst/>
+          </a:prstGeom>
+          <a:ln>
+            <a:tailEnd type="triangle"/>
+          </a:ln>
+        </p:spPr>
+        <p:style>
+          <a:lnRef idx="1">
+            <a:schemeClr val="accent1"/>
+          </a:lnRef>
+          <a:fillRef idx="0">
+            <a:schemeClr val="accent1"/>
+          </a:fillRef>
+          <a:effectRef idx="0">
+            <a:schemeClr val="accent1"/>
+          </a:effectRef>
+          <a:fontRef idx="minor">
+            <a:schemeClr val="tx1"/>
+          </a:fontRef>
+        </p:style>
+      </p:cxnSp>
+      <p:pic>
+        <p:nvPicPr>
+          <p:cNvPr id="27" name="Picture 26">
+            <a:extLst>
+              <a:ext uri="{FF2B5EF4-FFF2-40B4-BE49-F238E27FC236}">
+                <a16:creationId xmlns:a16="http://schemas.microsoft.com/office/drawing/2014/main" id="{68FF8FB9-13A9-481E-8EEF-22645987AEF8}"/>
+              </a:ext>
+            </a:extLst>
+          </p:cNvPr>
+          <p:cNvPicPr>
+            <a:picLocks noChangeAspect="1"/>
+          </p:cNvPicPr>
+          <p:nvPr/>
+        </p:nvPicPr>
+        <p:blipFill>
+          <a:blip r:embed="rId4"/>
+          <a:stretch>
+            <a:fillRect/>
+          </a:stretch>
+        </p:blipFill>
+        <p:spPr>
+          <a:xfrm>
+            <a:off x="838200" y="4497720"/>
+            <a:ext cx="2990850" cy="684747"/>
+          </a:xfrm>
+          <a:prstGeom prst="rect">
+            <a:avLst/>
+          </a:prstGeom>
+        </p:spPr>
+      </p:pic>
     </p:spTree>
     <p:extLst>
       <p:ext uri="{BB962C8B-B14F-4D97-AF65-F5344CB8AC3E}">

</xml_diff>

<commit_message>
update basic computer skills for forensics 0 and 1
</commit_message>
<xml_diff>
--- a/Basic_Computer_Skills_for_Forensics/0_Number_Systems.pptx
+++ b/Basic_Computer_Skills_for_Forensics/0_Number_Systems.pptx
@@ -157,7 +157,7 @@
 <file path=ppt/revisionInfo.xml><?xml version="1.0" encoding="utf-8"?>
 <p1510:revInfo xmlns:a="http://schemas.openxmlformats.org/drawingml/2006/main" xmlns:r="http://schemas.openxmlformats.org/officeDocument/2006/relationships" xmlns:p1510="http://schemas.microsoft.com/office/powerpoint/2015/10/main">
   <p1510:revLst>
-    <p1510:client id="{BC6292C7-23F4-4ED4-A77E-013F6C63BF9B}" v="358" dt="2025-01-22T16:15:59.140"/>
+    <p1510:client id="{BC6292C7-23F4-4ED4-A77E-013F6C63BF9B}" v="4" dt="2025-09-11T13:07:41.270"/>
   </p1510:revLst>
 </p1510:revInfo>
 </file>
@@ -580,6 +580,121 @@
     </pc:docChg>
   </pc:docChgLst>
   <pc:docChgLst>
+    <pc:chgData name="Weifeng Xu" userId="e7aed605-a3dd-4d5a-a692-a87037af107b" providerId="ADAL" clId="{F99F8FFF-BA20-43EA-924B-4DF5D2A785F3}"/>
+    <pc:docChg chg="undo custSel modSld">
+      <pc:chgData name="Weifeng Xu" userId="e7aed605-a3dd-4d5a-a692-a87037af107b" providerId="ADAL" clId="{F99F8FFF-BA20-43EA-924B-4DF5D2A785F3}" dt="2025-09-11T13:11:47.727" v="187" actId="207"/>
+      <pc:docMkLst>
+        <pc:docMk/>
+      </pc:docMkLst>
+      <pc:sldChg chg="modSp mod">
+        <pc:chgData name="Weifeng Xu" userId="e7aed605-a3dd-4d5a-a692-a87037af107b" providerId="ADAL" clId="{F99F8FFF-BA20-43EA-924B-4DF5D2A785F3}" dt="2025-09-11T12:54:41.561" v="71" actId="207"/>
+        <pc:sldMkLst>
+          <pc:docMk/>
+          <pc:sldMk cId="3972243169" sldId="275"/>
+        </pc:sldMkLst>
+        <pc:spChg chg="mod">
+          <ac:chgData name="Weifeng Xu" userId="e7aed605-a3dd-4d5a-a692-a87037af107b" providerId="ADAL" clId="{F99F8FFF-BA20-43EA-924B-4DF5D2A785F3}" dt="2025-09-11T12:54:41.561" v="71" actId="207"/>
+          <ac:spMkLst>
+            <pc:docMk/>
+            <pc:sldMk cId="3972243169" sldId="275"/>
+            <ac:spMk id="6" creationId="{23BFB659-95F8-4F0B-8232-6515C6879CE9}"/>
+          </ac:spMkLst>
+        </pc:spChg>
+      </pc:sldChg>
+      <pc:sldChg chg="modSp mod">
+        <pc:chgData name="Weifeng Xu" userId="e7aed605-a3dd-4d5a-a692-a87037af107b" providerId="ADAL" clId="{F99F8FFF-BA20-43EA-924B-4DF5D2A785F3}" dt="2025-09-11T13:11:47.727" v="187" actId="207"/>
+        <pc:sldMkLst>
+          <pc:docMk/>
+          <pc:sldMk cId="930520840" sldId="276"/>
+        </pc:sldMkLst>
+        <pc:spChg chg="mod">
+          <ac:chgData name="Weifeng Xu" userId="e7aed605-a3dd-4d5a-a692-a87037af107b" providerId="ADAL" clId="{F99F8FFF-BA20-43EA-924B-4DF5D2A785F3}" dt="2025-09-11T13:11:47.727" v="187" actId="207"/>
+          <ac:spMkLst>
+            <pc:docMk/>
+            <pc:sldMk cId="930520840" sldId="276"/>
+            <ac:spMk id="3" creationId="{2500F15C-7111-422D-9384-11B217932593}"/>
+          </ac:spMkLst>
+        </pc:spChg>
+      </pc:sldChg>
+      <pc:sldChg chg="addSp modSp mod">
+        <pc:chgData name="Weifeng Xu" userId="e7aed605-a3dd-4d5a-a692-a87037af107b" providerId="ADAL" clId="{F99F8FFF-BA20-43EA-924B-4DF5D2A785F3}" dt="2025-09-11T12:52:13.980" v="68" actId="20577"/>
+        <pc:sldMkLst>
+          <pc:docMk/>
+          <pc:sldMk cId="4101372602" sldId="283"/>
+        </pc:sldMkLst>
+        <pc:spChg chg="add mod">
+          <ac:chgData name="Weifeng Xu" userId="e7aed605-a3dd-4d5a-a692-a87037af107b" providerId="ADAL" clId="{F99F8FFF-BA20-43EA-924B-4DF5D2A785F3}" dt="2025-09-11T12:52:13.980" v="68" actId="20577"/>
+          <ac:spMkLst>
+            <pc:docMk/>
+            <pc:sldMk cId="4101372602" sldId="283"/>
+            <ac:spMk id="3" creationId="{75BFF07C-81C0-9DB6-8CEC-EE0DC73496B7}"/>
+          </ac:spMkLst>
+        </pc:spChg>
+      </pc:sldChg>
+      <pc:sldChg chg="modSp mod">
+        <pc:chgData name="Weifeng Xu" userId="e7aed605-a3dd-4d5a-a692-a87037af107b" providerId="ADAL" clId="{F99F8FFF-BA20-43EA-924B-4DF5D2A785F3}" dt="2025-09-11T12:28:18.412" v="8" actId="6549"/>
+        <pc:sldMkLst>
+          <pc:docMk/>
+          <pc:sldMk cId="15140870" sldId="290"/>
+        </pc:sldMkLst>
+        <pc:spChg chg="mod">
+          <ac:chgData name="Weifeng Xu" userId="e7aed605-a3dd-4d5a-a692-a87037af107b" providerId="ADAL" clId="{F99F8FFF-BA20-43EA-924B-4DF5D2A785F3}" dt="2025-09-11T12:28:18.412" v="8" actId="6549"/>
+          <ac:spMkLst>
+            <pc:docMk/>
+            <pc:sldMk cId="15140870" sldId="290"/>
+            <ac:spMk id="2" creationId="{AFC1A7BA-7685-444F-857C-61C577903823}"/>
+          </ac:spMkLst>
+        </pc:spChg>
+      </pc:sldChg>
+      <pc:sldChg chg="modSp mod">
+        <pc:chgData name="Weifeng Xu" userId="e7aed605-a3dd-4d5a-a692-a87037af107b" providerId="ADAL" clId="{F99F8FFF-BA20-43EA-924B-4DF5D2A785F3}" dt="2025-09-11T12:58:02.407" v="108" actId="20577"/>
+        <pc:sldMkLst>
+          <pc:docMk/>
+          <pc:sldMk cId="3881227093" sldId="295"/>
+        </pc:sldMkLst>
+        <pc:spChg chg="mod">
+          <ac:chgData name="Weifeng Xu" userId="e7aed605-a3dd-4d5a-a692-a87037af107b" providerId="ADAL" clId="{F99F8FFF-BA20-43EA-924B-4DF5D2A785F3}" dt="2025-09-11T12:58:02.407" v="108" actId="20577"/>
+          <ac:spMkLst>
+            <pc:docMk/>
+            <pc:sldMk cId="3881227093" sldId="295"/>
+            <ac:spMk id="3" creationId="{8B5D58A0-6807-57BF-5D0C-8257C2AC5541}"/>
+          </ac:spMkLst>
+        </pc:spChg>
+      </pc:sldChg>
+      <pc:sldChg chg="modSp mod">
+        <pc:chgData name="Weifeng Xu" userId="e7aed605-a3dd-4d5a-a692-a87037af107b" providerId="ADAL" clId="{F99F8FFF-BA20-43EA-924B-4DF5D2A785F3}" dt="2025-09-11T13:09:36.031" v="145" actId="6549"/>
+        <pc:sldMkLst>
+          <pc:docMk/>
+          <pc:sldMk cId="2995281700" sldId="296"/>
+        </pc:sldMkLst>
+        <pc:spChg chg="mod">
+          <ac:chgData name="Weifeng Xu" userId="e7aed605-a3dd-4d5a-a692-a87037af107b" providerId="ADAL" clId="{F99F8FFF-BA20-43EA-924B-4DF5D2A785F3}" dt="2025-09-11T13:09:36.031" v="145" actId="6549"/>
+          <ac:spMkLst>
+            <pc:docMk/>
+            <pc:sldMk cId="2995281700" sldId="296"/>
+            <ac:spMk id="5" creationId="{0DB2AA35-282A-A3F8-3BCB-F97C196BF3E7}"/>
+          </ac:spMkLst>
+        </pc:spChg>
+      </pc:sldChg>
+    </pc:docChg>
+  </pc:docChgLst>
+  <pc:docChgLst>
+    <pc:chgData name="Weifeng Xu" userId="S::id31ga53@ubalt.edu::e7aed605-a3dd-4d5a-a692-a87037af107b" providerId="AD" clId="Web-{8CC6238D-296C-FCBB-A5FB-AB720724D325}"/>
+    <pc:docChg chg="modSld">
+      <pc:chgData name="Weifeng Xu" userId="S::id31ga53@ubalt.edu::e7aed605-a3dd-4d5a-a692-a87037af107b" providerId="AD" clId="Web-{8CC6238D-296C-FCBB-A5FB-AB720724D325}" dt="2025-02-03T14:33:12.927" v="3"/>
+      <pc:docMkLst>
+        <pc:docMk/>
+      </pc:docMkLst>
+      <pc:sldChg chg="addSp delSp">
+        <pc:chgData name="Weifeng Xu" userId="S::id31ga53@ubalt.edu::e7aed605-a3dd-4d5a-a692-a87037af107b" providerId="AD" clId="Web-{8CC6238D-296C-FCBB-A5FB-AB720724D325}" dt="2025-02-03T14:33:12.927" v="3"/>
+        <pc:sldMkLst>
+          <pc:docMk/>
+          <pc:sldMk cId="1421300646" sldId="257"/>
+        </pc:sldMkLst>
+      </pc:sldChg>
+    </pc:docChg>
+  </pc:docChgLst>
+  <pc:docChgLst>
     <pc:chgData name="Weifeng Xu" userId="e7aed605-a3dd-4d5a-a692-a87037af107b" providerId="ADAL" clId="{A4CA56D5-47CB-484F-8DE2-B0FAB0B6CF57}"/>
     <pc:docChg chg="undo custSel addSld delSld modSld sldOrd">
       <pc:chgData name="Weifeng Xu" userId="e7aed605-a3dd-4d5a-a692-a87037af107b" providerId="ADAL" clId="{A4CA56D5-47CB-484F-8DE2-B0FAB0B6CF57}" dt="2021-08-22T19:34:40.420" v="2300" actId="20577"/>
@@ -972,14 +1087,6 @@
           <pc:docMk/>
           <pc:sldMk cId="555243388" sldId="269"/>
         </pc:sldMkLst>
-        <pc:spChg chg="mod">
-          <ac:chgData name="Weifeng Xu" userId="e7aed605-a3dd-4d5a-a692-a87037af107b" providerId="ADAL" clId="{BC6292C7-23F4-4ED4-A77E-013F6C63BF9B}" dt="2025-01-22T20:23:04.756" v="4464" actId="207"/>
-          <ac:spMkLst>
-            <pc:docMk/>
-            <pc:sldMk cId="555243388" sldId="269"/>
-            <ac:spMk id="3" creationId="{A294E17E-2E7C-45A6-80F4-39AF1EAFB6C1}"/>
-          </ac:spMkLst>
-        </pc:spChg>
       </pc:sldChg>
       <pc:sldChg chg="addSp delSp modSp new mod ord setBg modClrScheme chgLayout modNotesTx">
         <pc:chgData name="Weifeng Xu" userId="e7aed605-a3dd-4d5a-a692-a87037af107b" providerId="ADAL" clId="{BC6292C7-23F4-4ED4-A77E-013F6C63BF9B}" dt="2025-01-22T19:46:39.119" v="4463" actId="478"/>
@@ -987,54 +1094,6 @@
           <pc:docMk/>
           <pc:sldMk cId="1734535167" sldId="270"/>
         </pc:sldMkLst>
-        <pc:grpChg chg="del">
-          <ac:chgData name="Weifeng Xu" userId="e7aed605-a3dd-4d5a-a692-a87037af107b" providerId="ADAL" clId="{BC6292C7-23F4-4ED4-A77E-013F6C63BF9B}" dt="2025-01-22T19:46:35.664" v="4462" actId="478"/>
-          <ac:grpSpMkLst>
-            <pc:docMk/>
-            <pc:sldMk cId="1734535167" sldId="270"/>
-            <ac:grpSpMk id="32" creationId="{B9287788-B33D-3EEE-463E-72CBA729DA5A}"/>
-          </ac:grpSpMkLst>
-        </pc:grpChg>
-        <pc:grpChg chg="del">
-          <ac:chgData name="Weifeng Xu" userId="e7aed605-a3dd-4d5a-a692-a87037af107b" providerId="ADAL" clId="{BC6292C7-23F4-4ED4-A77E-013F6C63BF9B}" dt="2025-01-22T19:46:35.664" v="4462" actId="478"/>
-          <ac:grpSpMkLst>
-            <pc:docMk/>
-            <pc:sldMk cId="1734535167" sldId="270"/>
-            <ac:grpSpMk id="37" creationId="{07342B8D-1711-75EB-B0DD-A079536594CC}"/>
-          </ac:grpSpMkLst>
-        </pc:grpChg>
-        <pc:grpChg chg="del">
-          <ac:chgData name="Weifeng Xu" userId="e7aed605-a3dd-4d5a-a692-a87037af107b" providerId="ADAL" clId="{BC6292C7-23F4-4ED4-A77E-013F6C63BF9B}" dt="2025-01-22T19:46:35.664" v="4462" actId="478"/>
-          <ac:grpSpMkLst>
-            <pc:docMk/>
-            <pc:sldMk cId="1734535167" sldId="270"/>
-            <ac:grpSpMk id="44" creationId="{E66A5B11-F20B-11A4-DC9B-875AF99F6D40}"/>
-          </ac:grpSpMkLst>
-        </pc:grpChg>
-        <pc:inkChg chg="del">
-          <ac:chgData name="Weifeng Xu" userId="e7aed605-a3dd-4d5a-a692-a87037af107b" providerId="ADAL" clId="{BC6292C7-23F4-4ED4-A77E-013F6C63BF9B}" dt="2025-01-22T19:46:39.119" v="4463" actId="478"/>
-          <ac:inkMkLst>
-            <pc:docMk/>
-            <pc:sldMk cId="1734535167" sldId="270"/>
-            <ac:inkMk id="21" creationId="{A2C4DFEC-9AC9-8E01-6953-80669545C8E6}"/>
-          </ac:inkMkLst>
-        </pc:inkChg>
-        <pc:inkChg chg="del">
-          <ac:chgData name="Weifeng Xu" userId="e7aed605-a3dd-4d5a-a692-a87037af107b" providerId="ADAL" clId="{BC6292C7-23F4-4ED4-A77E-013F6C63BF9B}" dt="2025-01-22T19:46:35.664" v="4462" actId="478"/>
-          <ac:inkMkLst>
-            <pc:docMk/>
-            <pc:sldMk cId="1734535167" sldId="270"/>
-            <ac:inkMk id="45" creationId="{E964F263-1E4B-FF1A-6656-0A396F41A0FD}"/>
-          </ac:inkMkLst>
-        </pc:inkChg>
-        <pc:inkChg chg="del">
-          <ac:chgData name="Weifeng Xu" userId="e7aed605-a3dd-4d5a-a692-a87037af107b" providerId="ADAL" clId="{BC6292C7-23F4-4ED4-A77E-013F6C63BF9B}" dt="2025-01-22T19:46:35.664" v="4462" actId="478"/>
-          <ac:inkMkLst>
-            <pc:docMk/>
-            <pc:sldMk cId="1734535167" sldId="270"/>
-            <ac:inkMk id="46" creationId="{772F9124-90C1-D2EC-B3A7-1946BCD06080}"/>
-          </ac:inkMkLst>
-        </pc:inkChg>
       </pc:sldChg>
       <pc:sldChg chg="addSp delSp modSp new mod modClrScheme chgLayout">
         <pc:chgData name="Weifeng Xu" userId="e7aed605-a3dd-4d5a-a692-a87037af107b" providerId="ADAL" clId="{BC6292C7-23F4-4ED4-A77E-013F6C63BF9B}" dt="2021-12-21T00:26:53.513" v="1054" actId="1076"/>
@@ -1049,22 +1108,6 @@
           <pc:docMk/>
           <pc:sldMk cId="1324712681" sldId="272"/>
         </pc:sldMkLst>
-        <pc:spChg chg="add mod">
-          <ac:chgData name="Weifeng Xu" userId="e7aed605-a3dd-4d5a-a692-a87037af107b" providerId="ADAL" clId="{BC6292C7-23F4-4ED4-A77E-013F6C63BF9B}" dt="2025-01-22T15:32:14.607" v="4444" actId="113"/>
-          <ac:spMkLst>
-            <pc:docMk/>
-            <pc:sldMk cId="1324712681" sldId="272"/>
-            <ac:spMk id="3" creationId="{B14571F0-929B-1E35-AB2C-5C39BA9CD6C2}"/>
-          </ac:spMkLst>
-        </pc:spChg>
-        <pc:spChg chg="add del">
-          <ac:chgData name="Weifeng Xu" userId="e7aed605-a3dd-4d5a-a692-a87037af107b" providerId="ADAL" clId="{BC6292C7-23F4-4ED4-A77E-013F6C63BF9B}" dt="2025-01-22T15:32:28.165" v="4445" actId="478"/>
-          <ac:spMkLst>
-            <pc:docMk/>
-            <pc:sldMk cId="1324712681" sldId="272"/>
-            <ac:spMk id="6" creationId="{836AAC61-349B-DF32-4544-C9534DA06FC1}"/>
-          </ac:spMkLst>
-        </pc:spChg>
       </pc:sldChg>
       <pc:sldChg chg="addSp modSp new mod ord">
         <pc:chgData name="Weifeng Xu" userId="e7aed605-a3dd-4d5a-a692-a87037af107b" providerId="ADAL" clId="{BC6292C7-23F4-4ED4-A77E-013F6C63BF9B}" dt="2022-08-29T12:17:57.976" v="1763"/>
@@ -1086,14 +1129,6 @@
           <pc:docMk/>
           <pc:sldMk cId="3972243169" sldId="275"/>
         </pc:sldMkLst>
-        <pc:spChg chg="add mod">
-          <ac:chgData name="Weifeng Xu" userId="e7aed605-a3dd-4d5a-a692-a87037af107b" providerId="ADAL" clId="{BC6292C7-23F4-4ED4-A77E-013F6C63BF9B}" dt="2025-01-22T19:42:10.882" v="4461" actId="1076"/>
-          <ac:spMkLst>
-            <pc:docMk/>
-            <pc:sldMk cId="3972243169" sldId="275"/>
-            <ac:spMk id="3" creationId="{D0956C43-FE03-D320-7E12-D2334AD8A82A}"/>
-          </ac:spMkLst>
-        </pc:spChg>
       </pc:sldChg>
       <pc:sldChg chg="modSp new mod modNotesTx">
         <pc:chgData name="Weifeng Xu" userId="e7aed605-a3dd-4d5a-a692-a87037af107b" providerId="ADAL" clId="{BC6292C7-23F4-4ED4-A77E-013F6C63BF9B}" dt="2023-02-06T23:21:33.253" v="3883" actId="20577"/>
@@ -1248,14 +1283,6 @@
           <pc:docMk/>
           <pc:sldMk cId="2995281700" sldId="296"/>
         </pc:sldMkLst>
-        <pc:spChg chg="mod">
-          <ac:chgData name="Weifeng Xu" userId="e7aed605-a3dd-4d5a-a692-a87037af107b" providerId="ADAL" clId="{BC6292C7-23F4-4ED4-A77E-013F6C63BF9B}" dt="2025-01-22T16:32:30.881" v="4453" actId="27636"/>
-          <ac:spMkLst>
-            <pc:docMk/>
-            <pc:sldMk cId="2995281700" sldId="296"/>
-            <ac:spMk id="5" creationId="{0DB2AA35-282A-A3F8-3BCB-F97C196BF3E7}"/>
-          </ac:spMkLst>
-        </pc:spChg>
       </pc:sldChg>
       <pc:sldChg chg="del">
         <pc:chgData name="Weifeng Xu" userId="e7aed605-a3dd-4d5a-a692-a87037af107b" providerId="ADAL" clId="{BC6292C7-23F4-4ED4-A77E-013F6C63BF9B}" dt="2021-08-26T13:19:54.875" v="24" actId="47"/>
@@ -1932,6 +1959,62 @@
           <inkml:channelProperty channel="F" name="resolution" value="0" units="1/dev"/>
         </inkml:channelProperties>
       </inkml:inkSource>
+      <inkml:timestamp xml:id="ts0" timeString="2022-08-22T14:48:39.339"/>
+    </inkml:context>
+    <inkml:brush xml:id="br0">
+      <inkml:brushProperty name="width" value="0.1" units="cm"/>
+      <inkml:brushProperty name="height" value="0.1" units="cm"/>
+      <inkml:brushProperty name="color" value="#FF0066"/>
+    </inkml:brush>
+  </inkml:definitions>
+  <inkml:trace contextRef="#ctx0" brushRef="#br0">279 1 24575,'1'6'0,"0"1"0,0 0 0,1-1 0,0 1 0,0-1 0,0 0 0,1 1 0,0-1 0,0 0 0,1-1 0,5 8 0,15 31 0,-20-36 0,1 1 0,0-1 0,0 0 0,1 0 0,0-1 0,0 0 0,10 9 0,20 25 0,-35-39 0,0 0 0,1 0 0,-1 0 0,-1 0 0,1 0 0,0 0 0,0 0 0,-1 0 0,1 0 0,-1 0 0,0 0 0,1 1 0,-1-1 0,0 0 0,0 0 0,-1 0 0,1 0 0,0 1 0,-1-1 0,1 0 0,-1 0 0,0 0 0,0 0 0,1 0 0,-1 0 0,-1 0 0,1 0 0,0-1 0,-3 4 0,-5 5 0,0-1 0,0 1 0,-1-2 0,-12 9 0,-6 6 0,15-13 0,-1 1 0,0-2 0,0 0 0,-1-1 0,-30 13 0,-24 12 0,35-15-19,-41 15 0,35-16-1308</inkml:trace>
+</inkml:ink>
+</file>
+
+<file path=ppt/ink/ink11.xml><?xml version="1.0" encoding="utf-8"?>
+<inkml:ink xmlns:inkml="http://www.w3.org/2003/InkML">
+  <inkml:definitions>
+    <inkml:context xml:id="ctx0">
+      <inkml:inkSource xml:id="inkSrc0">
+        <inkml:traceFormat>
+          <inkml:channel name="X" type="integer" min="-2.14748E9" max="2.14748E9" units="cm"/>
+          <inkml:channel name="Y" type="integer" min="-2.14748E9" max="2.14748E9" units="cm"/>
+          <inkml:channel name="F" type="integer" max="32767" units="dev"/>
+        </inkml:traceFormat>
+        <inkml:channelProperties>
+          <inkml:channelProperty channel="X" name="resolution" value="1000" units="1/cm"/>
+          <inkml:channelProperty channel="Y" name="resolution" value="1000" units="1/cm"/>
+          <inkml:channelProperty channel="F" name="resolution" value="0" units="1/dev"/>
+        </inkml:channelProperties>
+      </inkml:inkSource>
+      <inkml:timestamp xml:id="ts0" timeString="2022-08-22T14:48:40.587"/>
+    </inkml:context>
+    <inkml:brush xml:id="br0">
+      <inkml:brushProperty name="width" value="0.1" units="cm"/>
+      <inkml:brushProperty name="height" value="0.1" units="cm"/>
+      <inkml:brushProperty name="color" value="#FF0066"/>
+    </inkml:brush>
+  </inkml:definitions>
+  <inkml:trace contextRef="#ctx0" brushRef="#br0">0 43 24575,'31'0'0,"-5"1"0,0-1 0,-1-1 0,1-1 0,0-1 0,-1-1 0,46-15 0,-56 15-49,1 1 0,-1 0 0,1 0 0,0 2 0,0 0 0,30 3 0,-18-2-973,-11 0-5804</inkml:trace>
+</inkml:ink>
+</file>
+
+<file path=ppt/ink/ink12.xml><?xml version="1.0" encoding="utf-8"?>
+<inkml:ink xmlns:inkml="http://www.w3.org/2003/InkML">
+  <inkml:definitions>
+    <inkml:context xml:id="ctx0">
+      <inkml:inkSource xml:id="inkSrc0">
+        <inkml:traceFormat>
+          <inkml:channel name="X" type="integer" min="-2.14748E9" max="2.14748E9" units="cm"/>
+          <inkml:channel name="Y" type="integer" min="-2.14748E9" max="2.14748E9" units="cm"/>
+          <inkml:channel name="F" type="integer" max="32767" units="dev"/>
+        </inkml:traceFormat>
+        <inkml:channelProperties>
+          <inkml:channelProperty channel="X" name="resolution" value="1000" units="1/cm"/>
+          <inkml:channelProperty channel="Y" name="resolution" value="1000" units="1/cm"/>
+          <inkml:channelProperty channel="F" name="resolution" value="0" units="1/dev"/>
+        </inkml:channelProperties>
+      </inkml:inkSource>
       <inkml:timestamp xml:id="ts0" timeString="2022-08-22T14:48:41.792"/>
     </inkml:context>
     <inkml:brush xml:id="br0">
@@ -1944,7 +2027,7 @@
 </inkml:ink>
 </file>
 
-<file path=ppt/ink/ink11.xml><?xml version="1.0" encoding="utf-8"?>
+<file path=ppt/ink/ink13.xml><?xml version="1.0" encoding="utf-8"?>
 <inkml:ink xmlns:inkml="http://www.w3.org/2003/InkML">
   <inkml:definitions>
     <inkml:context xml:id="ctx0">
@@ -1972,7 +2055,7 @@
 </inkml:ink>
 </file>
 
-<file path=ppt/ink/ink12.xml><?xml version="1.0" encoding="utf-8"?>
+<file path=ppt/ink/ink14.xml><?xml version="1.0" encoding="utf-8"?>
 <inkml:ink xmlns:inkml="http://www.w3.org/2003/InkML">
   <inkml:definitions>
     <inkml:context xml:id="ctx0">
@@ -2000,7 +2083,7 @@
 </inkml:ink>
 </file>
 
-<file path=ppt/ink/ink13.xml><?xml version="1.0" encoding="utf-8"?>
+<file path=ppt/ink/ink15.xml><?xml version="1.0" encoding="utf-8"?>
 <inkml:ink xmlns:inkml="http://www.w3.org/2003/InkML">
   <inkml:definitions>
     <inkml:context xml:id="ctx0">
@@ -2028,7 +2111,7 @@
 </inkml:ink>
 </file>
 
-<file path=ppt/ink/ink14.xml><?xml version="1.0" encoding="utf-8"?>
+<file path=ppt/ink/ink16.xml><?xml version="1.0" encoding="utf-8"?>
 <inkml:ink xmlns:inkml="http://www.w3.org/2003/InkML">
   <inkml:definitions>
     <inkml:context xml:id="ctx0">
@@ -2056,7 +2139,7 @@
 </inkml:ink>
 </file>
 
-<file path=ppt/ink/ink15.xml><?xml version="1.0" encoding="utf-8"?>
+<file path=ppt/ink/ink17.xml><?xml version="1.0" encoding="utf-8"?>
 <inkml:ink xmlns:inkml="http://www.w3.org/2003/InkML">
   <inkml:definitions>
     <inkml:context xml:id="ctx0">
@@ -2084,7 +2167,7 @@
 </inkml:ink>
 </file>
 
-<file path=ppt/ink/ink16.xml><?xml version="1.0" encoding="utf-8"?>
+<file path=ppt/ink/ink18.xml><?xml version="1.0" encoding="utf-8"?>
 <inkml:ink xmlns:inkml="http://www.w3.org/2003/InkML">
   <inkml:definitions>
     <inkml:context xml:id="ctx0">
@@ -2112,7 +2195,7 @@
 </inkml:ink>
 </file>
 
-<file path=ppt/ink/ink17.xml><?xml version="1.0" encoding="utf-8"?>
+<file path=ppt/ink/ink19.xml><?xml version="1.0" encoding="utf-8"?>
 <inkml:ink xmlns:inkml="http://www.w3.org/2003/InkML">
   <inkml:definitions>
     <inkml:context xml:id="ctx0">
@@ -2137,62 +2220,6 @@
     </inkml:brush>
   </inkml:definitions>
   <inkml:trace contextRef="#ctx0" brushRef="#br0">126 1 24575,'-1'10'0,"-1"0"0,0-1 0,0 1 0,-1-1 0,0 1 0,-1-1 0,0 0 0,0 0 0,-12 16 0,-13 32 0,12-17 0,9-25 0,1 1 0,1 0 0,0 0 0,-4 23 0,9-35 0,1-1 0,-1 1 0,1 0 0,0 0 0,0-1 0,0 1 0,1 0 0,-1 0 0,1-1 0,0 1 0,0 0 0,0-1 0,1 1 0,-1-1 0,1 1 0,-1-1 0,1 0 0,1 0 0,-1 1 0,0-2 0,1 1 0,-1 0 0,1 0 0,5 4 0,-1-4 0,0 1 0,-1-1 0,1 0 0,0-1 0,1 0 0,-1 0 0,0 0 0,12 0 0,33 10 0,-43-8 0,17 6 0,0 1 0,42 25 0,-36-18 0,0-1 0,51 18 0,-42-19 0,40 23 0,-41-19-1365,-30-12-5461</inkml:trace>
-</inkml:ink>
-</file>
-
-<file path=ppt/ink/ink18.xml><?xml version="1.0" encoding="utf-8"?>
-<inkml:ink xmlns:inkml="http://www.w3.org/2003/InkML">
-  <inkml:definitions>
-    <inkml:context xml:id="ctx0">
-      <inkml:inkSource xml:id="inkSrc0">
-        <inkml:traceFormat>
-          <inkml:channel name="X" type="integer" min="-2.14748E9" max="2.14748E9" units="cm"/>
-          <inkml:channel name="Y" type="integer" min="-2.14748E9" max="2.14748E9" units="cm"/>
-          <inkml:channel name="F" type="integer" max="32767" units="dev"/>
-        </inkml:traceFormat>
-        <inkml:channelProperties>
-          <inkml:channelProperty channel="X" name="resolution" value="1000" units="1/cm"/>
-          <inkml:channelProperty channel="Y" name="resolution" value="1000" units="1/cm"/>
-          <inkml:channelProperty channel="F" name="resolution" value="0" units="1/dev"/>
-        </inkml:channelProperties>
-      </inkml:inkSource>
-      <inkml:timestamp xml:id="ts0" timeString="2023-01-30T14:00:40.317"/>
-    </inkml:context>
-    <inkml:brush xml:id="br0">
-      <inkml:brushProperty name="width" value="0.05" units="cm"/>
-      <inkml:brushProperty name="height" value="0.05" units="cm"/>
-      <inkml:brushProperty name="color" value="#E71224"/>
-    </inkml:brush>
-  </inkml:definitions>
-  <inkml:trace contextRef="#ctx0" brushRef="#br0">293 1 24575,'7'0'0,"-1"1"0,0 0 0,0 0 0,0 0 0,0 1 0,0 0 0,0 0 0,-1 1 0,1-1 0,0 1 0,-1 0 0,0 1 0,6 4 0,7 7 0,-2 1 0,20 22 0,-12-12 0,39 59 0,-17-24 0,-27-32 0,16 17 0,-12-17 0,29 51 0,-33-45 0,-3-9 0,-2 1 0,0 1 0,-2 1 0,8 29 0,-13-33 0,-1 0 0,-2 0 0,-1 1 0,1 38 0,-4-62 0,0 19 0,-1 1 0,-6 37 0,5-51 0,0-1 0,0 0 0,-1 0 0,0 0 0,0 0 0,-1 0 0,0-1 0,0 0 0,0 0 0,-1 0 0,-8 9 0,8-10 0,-7 6 0,0 0 0,1 2 0,0-1 0,1 1 0,-14 23 0,19-27 0,0-2 0,-1 1 0,0 0 0,-1-1 0,0-1 0,0 1 0,0-1 0,-1 0 0,0 0 0,-15 7 0,9-4 0,1 0 0,-20 17 0,24-17 0,0-1 0,0 0 0,-1 0 0,0-1 0,-1-1 0,1 0 0,-1 0 0,0-1 0,-23 7 0,6-5 0,0 0 0,1 2 0,1 1 0,-47 23 0,52-22 0,-2-1 0,1-1 0,-34 8 0,-4 2 0,59-18 3,0 0 1,0-1-1,-1 1 0,1-1 0,0 1 1,0-1-1,-1 0 0,1 1 0,0-1 1,-1 0-1,1 0 0,0 0 0,-1 0 1,1 0-1,0 0 0,-1 0 0,1-1 1,0 1-1,0 0 0,-1-1 0,1 1 0,0-1 1,0 0-1,-1 1 0,1-1 0,0 0 1,0 1-1,0-1 0,0 0 0,0 0 1,0 0-1,0 0 0,1 0 0,-1 0 1,0 0-1,-1-3 0,0-1-189,1-1 1,-1 0-1,1 0 0,0 1 1,1-1-1,-1 0 1,2-7-1,-1-5-6640</inkml:trace>
-</inkml:ink>
-</file>
-
-<file path=ppt/ink/ink19.xml><?xml version="1.0" encoding="utf-8"?>
-<inkml:ink xmlns:inkml="http://www.w3.org/2003/InkML">
-  <inkml:definitions>
-    <inkml:context xml:id="ctx0">
-      <inkml:inkSource xml:id="inkSrc0">
-        <inkml:traceFormat>
-          <inkml:channel name="X" type="integer" min="-2.14748E9" max="2.14748E9" units="cm"/>
-          <inkml:channel name="Y" type="integer" min="-2.14748E9" max="2.14748E9" units="cm"/>
-          <inkml:channel name="F" type="integer" max="32767" units="dev"/>
-        </inkml:traceFormat>
-        <inkml:channelProperties>
-          <inkml:channelProperty channel="X" name="resolution" value="1000" units="1/cm"/>
-          <inkml:channelProperty channel="Y" name="resolution" value="1000" units="1/cm"/>
-          <inkml:channelProperty channel="F" name="resolution" value="0" units="1/dev"/>
-        </inkml:channelProperties>
-      </inkml:inkSource>
-      <inkml:timestamp xml:id="ts0" timeString="2023-01-30T14:00:41.623"/>
-    </inkml:context>
-    <inkml:brush xml:id="br0">
-      <inkml:brushProperty name="width" value="0.05" units="cm"/>
-      <inkml:brushProperty name="height" value="0.05" units="cm"/>
-      <inkml:brushProperty name="color" value="#E71224"/>
-    </inkml:brush>
-  </inkml:definitions>
-  <inkml:trace contextRef="#ctx0" brushRef="#br0">78 1 24575,'0'13'0,"-1"1"0,-1-1 0,0 0 0,0 0 0,-2 1 0,1-2 0,-2 1 0,0 0 0,0-1 0,-12 20 0,12-24 0,0 0 0,1 0 0,0 1 0,1 0 0,0-1 0,-3 12 0,6-17 0,-1 0 0,1 0 0,0 0 0,0 0 0,0 0 0,0 0 0,1 0 0,-1 0 0,1-1 0,0 1 0,-1 0 0,1 0 0,0 0 0,1-1 0,-1 1 0,0-1 0,1 1 0,0-1 0,-1 1 0,1-1 0,0 0 0,0 0 0,3 2 0,7 5 0,1 0 0,0-1 0,1 0 0,27 10 0,8 5 0,-15-7 0,-23-11 0,0 0 0,-1 0 0,0 1 0,0 1 0,0 0 0,12 11 0,-14-11 0,0-1 0,0 0 0,0 0 0,1-1 0,0 0 0,0 0 0,1-1 0,-1 0 0,1-1 0,18 4 0,7 4 0,-10-2 0,-1 1 0,24 15 0,15 7 0,-33-16 22,-23-12-254,1 1 1,-1-2 0,1 1 0,-1-1 0,10 2 0,-7-4-6595</inkml:trace>
 </inkml:ink>
 </file>
 
@@ -2240,6 +2267,62 @@
           <inkml:channelProperty channel="F" name="resolution" value="0" units="1/dev"/>
         </inkml:channelProperties>
       </inkml:inkSource>
+      <inkml:timestamp xml:id="ts0" timeString="2023-01-30T14:00:40.317"/>
+    </inkml:context>
+    <inkml:brush xml:id="br0">
+      <inkml:brushProperty name="width" value="0.05" units="cm"/>
+      <inkml:brushProperty name="height" value="0.05" units="cm"/>
+      <inkml:brushProperty name="color" value="#E71224"/>
+    </inkml:brush>
+  </inkml:definitions>
+  <inkml:trace contextRef="#ctx0" brushRef="#br0">293 1 24575,'7'0'0,"-1"1"0,0 0 0,0 0 0,0 0 0,0 1 0,0 0 0,0 0 0,-1 1 0,1-1 0,0 1 0,-1 0 0,0 1 0,6 4 0,7 7 0,-2 1 0,20 22 0,-12-12 0,39 59 0,-17-24 0,-27-32 0,16 17 0,-12-17 0,29 51 0,-33-45 0,-3-9 0,-2 1 0,0 1 0,-2 1 0,8 29 0,-13-33 0,-1 0 0,-2 0 0,-1 1 0,1 38 0,-4-62 0,0 19 0,-1 1 0,-6 37 0,5-51 0,0-1 0,0 0 0,-1 0 0,0 0 0,0 0 0,-1 0 0,0-1 0,0 0 0,0 0 0,-1 0 0,-8 9 0,8-10 0,-7 6 0,0 0 0,1 2 0,0-1 0,1 1 0,-14 23 0,19-27 0,0-2 0,-1 1 0,0 0 0,-1-1 0,0-1 0,0 1 0,0-1 0,-1 0 0,0 0 0,-15 7 0,9-4 0,1 0 0,-20 17 0,24-17 0,0-1 0,0 0 0,-1 0 0,0-1 0,-1-1 0,1 0 0,-1 0 0,0-1 0,-23 7 0,6-5 0,0 0 0,1 2 0,1 1 0,-47 23 0,52-22 0,-2-1 0,1-1 0,-34 8 0,-4 2 0,59-18 3,0 0 1,0-1-1,-1 1 0,1-1 0,0 1 1,0-1-1,-1 0 0,1 1 0,0-1 1,-1 0-1,1 0 0,0 0 0,-1 0 1,1 0-1,0 0 0,-1 0 0,1-1 1,0 1-1,0 0 0,-1-1 0,1 1 0,0-1 1,0 0-1,-1 1 0,1-1 0,0 0 1,0 1-1,0-1 0,0 0 0,0 0 1,0 0-1,0 0 0,1 0 0,-1 0 1,0 0-1,-1-3 0,0-1-189,1-1 1,-1 0-1,1 0 0,0 1 1,1-1-1,-1 0 1,2-7-1,-1-5-6640</inkml:trace>
+</inkml:ink>
+</file>
+
+<file path=ppt/ink/ink21.xml><?xml version="1.0" encoding="utf-8"?>
+<inkml:ink xmlns:inkml="http://www.w3.org/2003/InkML">
+  <inkml:definitions>
+    <inkml:context xml:id="ctx0">
+      <inkml:inkSource xml:id="inkSrc0">
+        <inkml:traceFormat>
+          <inkml:channel name="X" type="integer" min="-2.14748E9" max="2.14748E9" units="cm"/>
+          <inkml:channel name="Y" type="integer" min="-2.14748E9" max="2.14748E9" units="cm"/>
+          <inkml:channel name="F" type="integer" max="32767" units="dev"/>
+        </inkml:traceFormat>
+        <inkml:channelProperties>
+          <inkml:channelProperty channel="X" name="resolution" value="1000" units="1/cm"/>
+          <inkml:channelProperty channel="Y" name="resolution" value="1000" units="1/cm"/>
+          <inkml:channelProperty channel="F" name="resolution" value="0" units="1/dev"/>
+        </inkml:channelProperties>
+      </inkml:inkSource>
+      <inkml:timestamp xml:id="ts0" timeString="2023-01-30T14:00:41.623"/>
+    </inkml:context>
+    <inkml:brush xml:id="br0">
+      <inkml:brushProperty name="width" value="0.05" units="cm"/>
+      <inkml:brushProperty name="height" value="0.05" units="cm"/>
+      <inkml:brushProperty name="color" value="#E71224"/>
+    </inkml:brush>
+  </inkml:definitions>
+  <inkml:trace contextRef="#ctx0" brushRef="#br0">78 1 24575,'0'13'0,"-1"1"0,-1-1 0,0 0 0,0 0 0,-2 1 0,1-2 0,-2 1 0,0 0 0,0-1 0,-12 20 0,12-24 0,0 0 0,1 0 0,0 1 0,1 0 0,0-1 0,-3 12 0,6-17 0,-1 0 0,1 0 0,0 0 0,0 0 0,0 0 0,0 0 0,1 0 0,-1 0 0,1-1 0,0 1 0,-1 0 0,1 0 0,0 0 0,1-1 0,-1 1 0,0-1 0,1 1 0,0-1 0,-1 1 0,1-1 0,0 0 0,0 0 0,3 2 0,7 5 0,1 0 0,0-1 0,1 0 0,27 10 0,8 5 0,-15-7 0,-23-11 0,0 0 0,-1 0 0,0 1 0,0 1 0,0 0 0,12 11 0,-14-11 0,0-1 0,0 0 0,0 0 0,1-1 0,0 0 0,0 0 0,1-1 0,-1 0 0,1-1 0,18 4 0,7 4 0,-10-2 0,-1 1 0,24 15 0,15 7 0,-33-16 22,-23-12-254,1 1 1,-1-2 0,1 1 0,-1-1 0,10 2 0,-7-4-6595</inkml:trace>
+</inkml:ink>
+</file>
+
+<file path=ppt/ink/ink22.xml><?xml version="1.0" encoding="utf-8"?>
+<inkml:ink xmlns:inkml="http://www.w3.org/2003/InkML">
+  <inkml:definitions>
+    <inkml:context xml:id="ctx0">
+      <inkml:inkSource xml:id="inkSrc0">
+        <inkml:traceFormat>
+          <inkml:channel name="X" type="integer" min="-2.14748E9" max="2.14748E9" units="cm"/>
+          <inkml:channel name="Y" type="integer" min="-2.14748E9" max="2.14748E9" units="cm"/>
+          <inkml:channel name="F" type="integer" max="32767" units="dev"/>
+        </inkml:traceFormat>
+        <inkml:channelProperties>
+          <inkml:channelProperty channel="X" name="resolution" value="1000" units="1/cm"/>
+          <inkml:channelProperty channel="Y" name="resolution" value="1000" units="1/cm"/>
+          <inkml:channelProperty channel="F" name="resolution" value="0" units="1/dev"/>
+        </inkml:channelProperties>
+      </inkml:inkSource>
       <inkml:timestamp xml:id="ts0" timeString="2023-01-30T14:00:58.023"/>
     </inkml:context>
     <inkml:brush xml:id="br0">
@@ -2252,7 +2335,7 @@
 </inkml:ink>
 </file>
 
-<file path=ppt/ink/ink21.xml><?xml version="1.0" encoding="utf-8"?>
+<file path=ppt/ink/ink23.xml><?xml version="1.0" encoding="utf-8"?>
 <inkml:ink xmlns:inkml="http://www.w3.org/2003/InkML">
   <inkml:definitions>
     <inkml:context xml:id="ctx0">
@@ -2280,7 +2363,7 @@
 </inkml:ink>
 </file>
 
-<file path=ppt/ink/ink22.xml><?xml version="1.0" encoding="utf-8"?>
+<file path=ppt/ink/ink24.xml><?xml version="1.0" encoding="utf-8"?>
 <inkml:ink xmlns:inkml="http://www.w3.org/2003/InkML">
   <inkml:definitions>
     <inkml:context xml:id="ctx0">
@@ -2308,7 +2391,7 @@
 </inkml:ink>
 </file>
 
-<file path=ppt/ink/ink23.xml><?xml version="1.0" encoding="utf-8"?>
+<file path=ppt/ink/ink25.xml><?xml version="1.0" encoding="utf-8"?>
 <inkml:ink xmlns:inkml="http://www.w3.org/2003/InkML">
   <inkml:definitions>
     <inkml:context xml:id="ctx0">
@@ -2336,7 +2419,7 @@
 </inkml:ink>
 </file>
 
-<file path=ppt/ink/ink24.xml><?xml version="1.0" encoding="utf-8"?>
+<file path=ppt/ink/ink26.xml><?xml version="1.0" encoding="utf-8"?>
 <inkml:ink xmlns:inkml="http://www.w3.org/2003/InkML">
   <inkml:definitions>
     <inkml:context xml:id="ctx0">
@@ -2364,7 +2447,7 @@
 </inkml:ink>
 </file>
 
-<file path=ppt/ink/ink25.xml><?xml version="1.0" encoding="utf-8"?>
+<file path=ppt/ink/ink27.xml><?xml version="1.0" encoding="utf-8"?>
 <inkml:ink xmlns:inkml="http://www.w3.org/2003/InkML">
   <inkml:definitions>
     <inkml:context xml:id="ctx0">
@@ -2392,7 +2475,7 @@
 </inkml:ink>
 </file>
 
-<file path=ppt/ink/ink26.xml><?xml version="1.0" encoding="utf-8"?>
+<file path=ppt/ink/ink28.xml><?xml version="1.0" encoding="utf-8"?>
 <inkml:ink xmlns:inkml="http://www.w3.org/2003/InkML">
   <inkml:definitions>
     <inkml:context xml:id="ctx0">
@@ -2420,7 +2503,7 @@
 </inkml:ink>
 </file>
 
-<file path=ppt/ink/ink27.xml><?xml version="1.0" encoding="utf-8"?>
+<file path=ppt/ink/ink29.xml><?xml version="1.0" encoding="utf-8"?>
 <inkml:ink xmlns:inkml="http://www.w3.org/2003/InkML">
   <inkml:definitions>
     <inkml:context xml:id="ctx0">
@@ -2448,7 +2531,39 @@
 </inkml:ink>
 </file>
 
-<file path=ppt/ink/ink28.xml><?xml version="1.0" encoding="utf-8"?>
+<file path=ppt/ink/ink3.xml><?xml version="1.0" encoding="utf-8"?>
+<inkml:ink xmlns:inkml="http://www.w3.org/2003/InkML">
+  <inkml:definitions>
+    <inkml:context xml:id="ctx0">
+      <inkml:inkSource xml:id="inkSrc0">
+        <inkml:traceFormat>
+          <inkml:channel name="X" type="integer" min="-2.14748E9" max="2.14748E9" units="cm"/>
+          <inkml:channel name="Y" type="integer" min="-2.14748E9" max="2.14748E9" units="cm"/>
+          <inkml:channel name="F" type="integer" max="32767" units="dev"/>
+          <inkml:channel name="OA" type="integer" max="360" units="deg"/>
+          <inkml:channel name="OE" type="integer" max="90" units="deg"/>
+        </inkml:traceFormat>
+        <inkml:channelProperties>
+          <inkml:channelProperty channel="X" name="resolution" value="1000" units="1/cm"/>
+          <inkml:channelProperty channel="Y" name="resolution" value="1000" units="1/cm"/>
+          <inkml:channelProperty channel="F" name="resolution" value="0" units="1/dev"/>
+          <inkml:channelProperty channel="OA" name="resolution" value="1000" units="1/deg"/>
+          <inkml:channelProperty channel="OE" name="resolution" value="1000" units="1/deg"/>
+        </inkml:channelProperties>
+      </inkml:inkSource>
+      <inkml:timestamp xml:id="ts0" timeString="2025-09-10T16:36:39.392"/>
+    </inkml:context>
+    <inkml:brush xml:id="br0">
+      <inkml:brushProperty name="width" value="0.1" units="cm"/>
+      <inkml:brushProperty name="height" value="0.1" units="cm"/>
+      <inkml:brushProperty name="color" value="#E71224"/>
+    </inkml:brush>
+  </inkml:definitions>
+  <inkml:trace contextRef="#ctx0" brushRef="#br0">12468 3953 16383 0 0,'0'0'0'0'0</inkml:trace>
+</inkml:ink>
+</file>
+
+<file path=ppt/ink/ink30.xml><?xml version="1.0" encoding="utf-8"?>
 <inkml:ink xmlns:inkml="http://www.w3.org/2003/InkML">
   <inkml:definitions>
     <inkml:context xml:id="ctx0">
@@ -2476,7 +2591,7 @@
 </inkml:ink>
 </file>
 
-<file path=ppt/ink/ink29.xml><?xml version="1.0" encoding="utf-8"?>
+<file path=ppt/ink/ink31.xml><?xml version="1.0" encoding="utf-8"?>
 <inkml:ink xmlns:inkml="http://www.w3.org/2003/InkML">
   <inkml:definitions>
     <inkml:context xml:id="ctx0">
@@ -2504,35 +2619,7 @@
 </inkml:ink>
 </file>
 
-<file path=ppt/ink/ink3.xml><?xml version="1.0" encoding="utf-8"?>
-<inkml:ink xmlns:inkml="http://www.w3.org/2003/InkML">
-  <inkml:definitions>
-    <inkml:context xml:id="ctx0">
-      <inkml:inkSource xml:id="inkSrc0">
-        <inkml:traceFormat>
-          <inkml:channel name="X" type="integer" min="-2.14748E9" max="2.14748E9" units="cm"/>
-          <inkml:channel name="Y" type="integer" min="-2.14748E9" max="2.14748E9" units="cm"/>
-          <inkml:channel name="F" type="integer" max="32767" units="dev"/>
-        </inkml:traceFormat>
-        <inkml:channelProperties>
-          <inkml:channelProperty channel="X" name="resolution" value="1000" units="1/cm"/>
-          <inkml:channelProperty channel="Y" name="resolution" value="1000" units="1/cm"/>
-          <inkml:channelProperty channel="F" name="resolution" value="0" units="1/dev"/>
-        </inkml:channelProperties>
-      </inkml:inkSource>
-      <inkml:timestamp xml:id="ts0" timeString="2022-01-31T13:22:06.270"/>
-    </inkml:context>
-    <inkml:brush xml:id="br0">
-      <inkml:brushProperty name="width" value="0.05" units="cm"/>
-      <inkml:brushProperty name="height" value="0.05" units="cm"/>
-      <inkml:brushProperty name="color" value="#E71224"/>
-    </inkml:brush>
-  </inkml:definitions>
-  <inkml:trace contextRef="#ctx0" brushRef="#br0">0 0 24575,'0'0'-8191</inkml:trace>
-</inkml:ink>
-</file>
-
-<file path=ppt/ink/ink30.xml><?xml version="1.0" encoding="utf-8"?>
+<file path=ppt/ink/ink32.xml><?xml version="1.0" encoding="utf-8"?>
 <inkml:ink xmlns:inkml="http://www.w3.org/2003/InkML">
   <inkml:definitions>
     <inkml:context xml:id="ctx0">
@@ -2560,7 +2647,7 @@
 </inkml:ink>
 </file>
 
-<file path=ppt/ink/ink31.xml><?xml version="1.0" encoding="utf-8"?>
+<file path=ppt/ink/ink33.xml><?xml version="1.0" encoding="utf-8"?>
 <inkml:ink xmlns:inkml="http://www.w3.org/2003/InkML">
   <inkml:definitions>
     <inkml:context xml:id="ctx0">
@@ -2588,7 +2675,7 @@
 </inkml:ink>
 </file>
 
-<file path=ppt/ink/ink32.xml><?xml version="1.0" encoding="utf-8"?>
+<file path=ppt/ink/ink34.xml><?xml version="1.0" encoding="utf-8"?>
 <inkml:ink xmlns:inkml="http://www.w3.org/2003/InkML">
   <inkml:definitions>
     <inkml:context xml:id="ctx0">
@@ -2616,7 +2703,7 @@
 </inkml:ink>
 </file>
 
-<file path=ppt/ink/ink33.xml><?xml version="1.0" encoding="utf-8"?>
+<file path=ppt/ink/ink35.xml><?xml version="1.0" encoding="utf-8"?>
 <inkml:ink xmlns:inkml="http://www.w3.org/2003/InkML">
   <inkml:definitions>
     <inkml:context xml:id="ctx0">
@@ -2644,7 +2731,7 @@
 </inkml:ink>
 </file>
 
-<file path=ppt/ink/ink34.xml><?xml version="1.0" encoding="utf-8"?>
+<file path=ppt/ink/ink36.xml><?xml version="1.0" encoding="utf-8"?>
 <inkml:ink xmlns:inkml="http://www.w3.org/2003/InkML">
   <inkml:definitions>
     <inkml:context xml:id="ctx0">
@@ -2672,7 +2759,7 @@
 </inkml:ink>
 </file>
 
-<file path=ppt/ink/ink35.xml><?xml version="1.0" encoding="utf-8"?>
+<file path=ppt/ink/ink37.xml><?xml version="1.0" encoding="utf-8"?>
 <inkml:ink xmlns:inkml="http://www.w3.org/2003/InkML">
   <inkml:definitions>
     <inkml:context xml:id="ctx0">
@@ -2700,7 +2787,7 @@
 </inkml:ink>
 </file>
 
-<file path=ppt/ink/ink36.xml><?xml version="1.0" encoding="utf-8"?>
+<file path=ppt/ink/ink38.xml><?xml version="1.0" encoding="utf-8"?>
 <inkml:ink xmlns:inkml="http://www.w3.org/2003/InkML">
   <inkml:definitions>
     <inkml:context xml:id="ctx0">
@@ -2728,7 +2815,7 @@
 </inkml:ink>
 </file>
 
-<file path=ppt/ink/ink37.xml><?xml version="1.0" encoding="utf-8"?>
+<file path=ppt/ink/ink39.xml><?xml version="1.0" encoding="utf-8"?>
 <inkml:ink xmlns:inkml="http://www.w3.org/2003/InkML">
   <inkml:definitions>
     <inkml:context xml:id="ctx0">
@@ -2765,6 +2852,66 @@
           <inkml:channel name="X" type="integer" min="-2.14748E9" max="2.14748E9" units="cm"/>
           <inkml:channel name="Y" type="integer" min="-2.14748E9" max="2.14748E9" units="cm"/>
           <inkml:channel name="F" type="integer" max="32767" units="dev"/>
+          <inkml:channel name="OA" type="integer" max="360" units="deg"/>
+          <inkml:channel name="OE" type="integer" max="90" units="deg"/>
+        </inkml:traceFormat>
+        <inkml:channelProperties>
+          <inkml:channelProperty channel="X" name="resolution" value="1000" units="1/cm"/>
+          <inkml:channelProperty channel="Y" name="resolution" value="1000" units="1/cm"/>
+          <inkml:channelProperty channel="F" name="resolution" value="0" units="1/dev"/>
+          <inkml:channelProperty channel="OA" name="resolution" value="1000" units="1/deg"/>
+          <inkml:channelProperty channel="OE" name="resolution" value="1000" units="1/deg"/>
+        </inkml:channelProperties>
+      </inkml:inkSource>
+      <inkml:timestamp xml:id="ts0" timeString="2025-09-10T16:36:39.393"/>
+    </inkml:context>
+    <inkml:brush xml:id="br0">
+      <inkml:brushProperty name="width" value="0.1" units="cm"/>
+      <inkml:brushProperty name="height" value="0.1" units="cm"/>
+      <inkml:brushProperty name="color" value="#E71224"/>
+    </inkml:brush>
+  </inkml:definitions>
+  <inkml:trace contextRef="#ctx0" brushRef="#br0">11872 1521 16383 0 0,'0'0'0'0'0,"0"0"0"0"0</inkml:trace>
+</inkml:ink>
+</file>
+
+<file path=ppt/ink/ink5.xml><?xml version="1.0" encoding="utf-8"?>
+<inkml:ink xmlns:inkml="http://www.w3.org/2003/InkML">
+  <inkml:definitions>
+    <inkml:context xml:id="ctx0">
+      <inkml:inkSource xml:id="inkSrc0">
+        <inkml:traceFormat>
+          <inkml:channel name="X" type="integer" min="-2.14748E9" max="2.14748E9" units="cm"/>
+          <inkml:channel name="Y" type="integer" min="-2.14748E9" max="2.14748E9" units="cm"/>
+          <inkml:channel name="F" type="integer" max="32767" units="dev"/>
+        </inkml:traceFormat>
+        <inkml:channelProperties>
+          <inkml:channelProperty channel="X" name="resolution" value="1000" units="1/cm"/>
+          <inkml:channelProperty channel="Y" name="resolution" value="1000" units="1/cm"/>
+          <inkml:channelProperty channel="F" name="resolution" value="0" units="1/dev"/>
+        </inkml:channelProperties>
+      </inkml:inkSource>
+      <inkml:timestamp xml:id="ts0" timeString="2022-01-31T13:22:06.270"/>
+    </inkml:context>
+    <inkml:brush xml:id="br0">
+      <inkml:brushProperty name="width" value="0.05" units="cm"/>
+      <inkml:brushProperty name="height" value="0.05" units="cm"/>
+      <inkml:brushProperty name="color" value="#E71224"/>
+    </inkml:brush>
+  </inkml:definitions>
+  <inkml:trace contextRef="#ctx0" brushRef="#br0">0 0 24575,'0'0'-8191</inkml:trace>
+</inkml:ink>
+</file>
+
+<file path=ppt/ink/ink6.xml><?xml version="1.0" encoding="utf-8"?>
+<inkml:ink xmlns:inkml="http://www.w3.org/2003/InkML">
+  <inkml:definitions>
+    <inkml:context xml:id="ctx0">
+      <inkml:inkSource xml:id="inkSrc0">
+        <inkml:traceFormat>
+          <inkml:channel name="X" type="integer" min="-2.14748E9" max="2.14748E9" units="cm"/>
+          <inkml:channel name="Y" type="integer" min="-2.14748E9" max="2.14748E9" units="cm"/>
+          <inkml:channel name="F" type="integer" max="32767" units="dev"/>
         </inkml:traceFormat>
         <inkml:channelProperties>
           <inkml:channelProperty channel="X" name="resolution" value="1000" units="1/cm"/>
@@ -2784,7 +2931,7 @@
 </inkml:ink>
 </file>
 
-<file path=ppt/ink/ink5.xml><?xml version="1.0" encoding="utf-8"?>
+<file path=ppt/ink/ink7.xml><?xml version="1.0" encoding="utf-8"?>
 <inkml:ink xmlns:inkml="http://www.w3.org/2003/InkML">
   <inkml:definitions>
     <inkml:context xml:id="ctx0">
@@ -2812,7 +2959,7 @@
 </inkml:ink>
 </file>
 
-<file path=ppt/ink/ink6.xml><?xml version="1.0" encoding="utf-8"?>
+<file path=ppt/ink/ink8.xml><?xml version="1.0" encoding="utf-8"?>
 <inkml:ink xmlns:inkml="http://www.w3.org/2003/InkML">
   <inkml:definitions>
     <inkml:context xml:id="ctx0">
@@ -2840,7 +2987,7 @@
 </inkml:ink>
 </file>
 
-<file path=ppt/ink/ink7.xml><?xml version="1.0" encoding="utf-8"?>
+<file path=ppt/ink/ink9.xml><?xml version="1.0" encoding="utf-8"?>
 <inkml:ink xmlns:inkml="http://www.w3.org/2003/InkML">
   <inkml:definitions>
     <inkml:context xml:id="ctx0">
@@ -2865,62 +3012,6 @@
     </inkml:brush>
   </inkml:definitions>
   <inkml:trace contextRef="#ctx0" brushRef="#br0">284 0 24575,'-3'0'0,"-1"1"0,0-1 0,0 1 0,1 0 0,-1 0 0,0 0 0,1 1 0,-1-1 0,1 1 0,0 0 0,-1 0 0,1 0 0,0 0 0,0 1 0,0-1 0,0 1 0,-4 5 0,-3 6 0,-1 0 0,-14 27 0,-2 3 0,23-38 0,1 0 0,-1 1 0,1 0 0,1 0 0,-1 0 0,1 0 0,0 0 0,1 0 0,-1 8 0,0-5 0,1-1 0,-2 1 0,1 0 0,-7 12 0,-2 5 0,1 1 0,2 1 0,-7 34 0,5-22 0,-29 145 0,35-153 0,0 0 0,3 0 0,3 58 0,0-84 0,-1 0 0,2 1 0,-1-1 0,1 0 0,0 0 0,0-1 0,1 1 0,0 0 0,9 10 0,-6-8 0,-1 1 0,0 0 0,6 13 0,-10-17-57,0-1 0,0-1 1,1 1-1,-1 0 0,1-1 0,0 1 0,0-1 0,1 0 0,-1 0 0,1 0 0,0 0 1,0-1-1,1 1 0,-1-1 0,0 0 0,1-1 0,0 1 0,0-1 0,0 0 1,0 0-1,0 0 0,0-1 0,6 1 0</inkml:trace>
-</inkml:ink>
-</file>
-
-<file path=ppt/ink/ink8.xml><?xml version="1.0" encoding="utf-8"?>
-<inkml:ink xmlns:inkml="http://www.w3.org/2003/InkML">
-  <inkml:definitions>
-    <inkml:context xml:id="ctx0">
-      <inkml:inkSource xml:id="inkSrc0">
-        <inkml:traceFormat>
-          <inkml:channel name="X" type="integer" min="-2.14748E9" max="2.14748E9" units="cm"/>
-          <inkml:channel name="Y" type="integer" min="-2.14748E9" max="2.14748E9" units="cm"/>
-          <inkml:channel name="F" type="integer" max="32767" units="dev"/>
-        </inkml:traceFormat>
-        <inkml:channelProperties>
-          <inkml:channelProperty channel="X" name="resolution" value="1000" units="1/cm"/>
-          <inkml:channelProperty channel="Y" name="resolution" value="1000" units="1/cm"/>
-          <inkml:channelProperty channel="F" name="resolution" value="0" units="1/dev"/>
-        </inkml:channelProperties>
-      </inkml:inkSource>
-      <inkml:timestamp xml:id="ts0" timeString="2022-08-22T14:48:39.339"/>
-    </inkml:context>
-    <inkml:brush xml:id="br0">
-      <inkml:brushProperty name="width" value="0.1" units="cm"/>
-      <inkml:brushProperty name="height" value="0.1" units="cm"/>
-      <inkml:brushProperty name="color" value="#FF0066"/>
-    </inkml:brush>
-  </inkml:definitions>
-  <inkml:trace contextRef="#ctx0" brushRef="#br0">279 1 24575,'1'6'0,"0"1"0,0 0 0,1-1 0,0 1 0,0-1 0,0 0 0,1 1 0,0-1 0,0 0 0,1-1 0,5 8 0,15 31 0,-20-36 0,1 1 0,0-1 0,0 0 0,1 0 0,0-1 0,0 0 0,10 9 0,20 25 0,-35-39 0,0 0 0,1 0 0,-1 0 0,-1 0 0,1 0 0,0 0 0,0 0 0,-1 0 0,1 0 0,-1 0 0,0 0 0,1 1 0,-1-1 0,0 0 0,0 0 0,-1 0 0,1 0 0,0 1 0,-1-1 0,1 0 0,-1 0 0,0 0 0,0 0 0,1 0 0,-1 0 0,-1 0 0,1 0 0,0-1 0,-3 4 0,-5 5 0,0-1 0,0 1 0,-1-2 0,-12 9 0,-6 6 0,15-13 0,-1 1 0,0-2 0,0 0 0,-1-1 0,-30 13 0,-24 12 0,35-15-19,-41 15 0,35-16-1308</inkml:trace>
-</inkml:ink>
-</file>
-
-<file path=ppt/ink/ink9.xml><?xml version="1.0" encoding="utf-8"?>
-<inkml:ink xmlns:inkml="http://www.w3.org/2003/InkML">
-  <inkml:definitions>
-    <inkml:context xml:id="ctx0">
-      <inkml:inkSource xml:id="inkSrc0">
-        <inkml:traceFormat>
-          <inkml:channel name="X" type="integer" min="-2.14748E9" max="2.14748E9" units="cm"/>
-          <inkml:channel name="Y" type="integer" min="-2.14748E9" max="2.14748E9" units="cm"/>
-          <inkml:channel name="F" type="integer" max="32767" units="dev"/>
-        </inkml:traceFormat>
-        <inkml:channelProperties>
-          <inkml:channelProperty channel="X" name="resolution" value="1000" units="1/cm"/>
-          <inkml:channelProperty channel="Y" name="resolution" value="1000" units="1/cm"/>
-          <inkml:channelProperty channel="F" name="resolution" value="0" units="1/dev"/>
-        </inkml:channelProperties>
-      </inkml:inkSource>
-      <inkml:timestamp xml:id="ts0" timeString="2022-08-22T14:48:40.587"/>
-    </inkml:context>
-    <inkml:brush xml:id="br0">
-      <inkml:brushProperty name="width" value="0.1" units="cm"/>
-      <inkml:brushProperty name="height" value="0.1" units="cm"/>
-      <inkml:brushProperty name="color" value="#FF0066"/>
-    </inkml:brush>
-  </inkml:definitions>
-  <inkml:trace contextRef="#ctx0" brushRef="#br0">0 43 24575,'31'0'0,"-5"1"0,0-1 0,-1-1 0,1-1 0,0-1 0,-1-1 0,46-15 0,-56 15-49,1 1 0,-1 0 0,1 0 0,0 2 0,0 0 0,30 3 0,-18-2-973,-11 0-5804</inkml:trace>
 </inkml:ink>
 </file>
 
@@ -3006,7 +3097,7 @@
           <a:p>
             <a:fld id="{B9658D5F-65FB-4E17-9D5B-8CF1DE5A98DF}" type="datetimeFigureOut">
               <a:rPr lang="en-US" smtClean="0"/>
-              <a:t>1/22/2025</a:t>
+              <a:t>9/10/2025</a:t>
             </a:fld>
             <a:endParaRPr lang="en-US"/>
           </a:p>
@@ -5989,7 +6080,7 @@
           <a:p>
             <a:fld id="{4263717A-E3C1-4BED-ABE0-B7069385E023}" type="datetimeFigureOut">
               <a:rPr lang="en-US" smtClean="0"/>
-              <a:t>1/22/2025</a:t>
+              <a:t>9/10/2025</a:t>
             </a:fld>
             <a:endParaRPr lang="en-US"/>
           </a:p>
@@ -6162,7 +6253,7 @@
           <a:p>
             <a:fld id="{4263717A-E3C1-4BED-ABE0-B7069385E023}" type="datetimeFigureOut">
               <a:rPr lang="en-US" smtClean="0"/>
-              <a:t>1/22/2025</a:t>
+              <a:t>9/10/2025</a:t>
             </a:fld>
             <a:endParaRPr lang="en-US"/>
           </a:p>
@@ -6340,7 +6431,7 @@
           <a:p>
             <a:fld id="{4263717A-E3C1-4BED-ABE0-B7069385E023}" type="datetimeFigureOut">
               <a:rPr lang="en-US" smtClean="0"/>
-              <a:t>1/22/2025</a:t>
+              <a:t>9/10/2025</a:t>
             </a:fld>
             <a:endParaRPr lang="en-US"/>
           </a:p>
@@ -6508,7 +6599,7 @@
           <a:p>
             <a:fld id="{4263717A-E3C1-4BED-ABE0-B7069385E023}" type="datetimeFigureOut">
               <a:rPr lang="en-US" smtClean="0"/>
-              <a:t>1/22/2025</a:t>
+              <a:t>9/10/2025</a:t>
             </a:fld>
             <a:endParaRPr lang="en-US"/>
           </a:p>
@@ -6753,7 +6844,7 @@
           <a:p>
             <a:fld id="{4263717A-E3C1-4BED-ABE0-B7069385E023}" type="datetimeFigureOut">
               <a:rPr lang="en-US" smtClean="0"/>
-              <a:t>1/22/2025</a:t>
+              <a:t>9/10/2025</a:t>
             </a:fld>
             <a:endParaRPr lang="en-US"/>
           </a:p>
@@ -6982,7 +7073,7 @@
           <a:p>
             <a:fld id="{4263717A-E3C1-4BED-ABE0-B7069385E023}" type="datetimeFigureOut">
               <a:rPr lang="en-US" smtClean="0"/>
-              <a:t>1/22/2025</a:t>
+              <a:t>9/10/2025</a:t>
             </a:fld>
             <a:endParaRPr lang="en-US"/>
           </a:p>
@@ -7346,7 +7437,7 @@
           <a:p>
             <a:fld id="{4263717A-E3C1-4BED-ABE0-B7069385E023}" type="datetimeFigureOut">
               <a:rPr lang="en-US" smtClean="0"/>
-              <a:t>1/22/2025</a:t>
+              <a:t>9/10/2025</a:t>
             </a:fld>
             <a:endParaRPr lang="en-US"/>
           </a:p>
@@ -7463,7 +7554,7 @@
           <a:p>
             <a:fld id="{4263717A-E3C1-4BED-ABE0-B7069385E023}" type="datetimeFigureOut">
               <a:rPr lang="en-US" smtClean="0"/>
-              <a:t>1/22/2025</a:t>
+              <a:t>9/10/2025</a:t>
             </a:fld>
             <a:endParaRPr lang="en-US"/>
           </a:p>
@@ -7558,7 +7649,7 @@
           <a:p>
             <a:fld id="{4263717A-E3C1-4BED-ABE0-B7069385E023}" type="datetimeFigureOut">
               <a:rPr lang="en-US" smtClean="0"/>
-              <a:t>1/22/2025</a:t>
+              <a:t>9/10/2025</a:t>
             </a:fld>
             <a:endParaRPr lang="en-US"/>
           </a:p>
@@ -7833,7 +7924,7 @@
           <a:p>
             <a:fld id="{4263717A-E3C1-4BED-ABE0-B7069385E023}" type="datetimeFigureOut">
               <a:rPr lang="en-US" smtClean="0"/>
-              <a:t>1/22/2025</a:t>
+              <a:t>9/10/2025</a:t>
             </a:fld>
             <a:endParaRPr lang="en-US"/>
           </a:p>
@@ -8085,7 +8176,7 @@
           <a:p>
             <a:fld id="{4263717A-E3C1-4BED-ABE0-B7069385E023}" type="datetimeFigureOut">
               <a:rPr lang="en-US" smtClean="0"/>
-              <a:t>1/22/2025</a:t>
+              <a:t>9/10/2025</a:t>
             </a:fld>
             <a:endParaRPr lang="en-US"/>
           </a:p>
@@ -8296,7 +8387,7 @@
           <a:p>
             <a:fld id="{4263717A-E3C1-4BED-ABE0-B7069385E023}" type="datetimeFigureOut">
               <a:rPr lang="en-US" smtClean="0"/>
-              <a:t>1/22/2025</a:t>
+              <a:t>9/10/2025</a:t>
             </a:fld>
             <a:endParaRPr lang="en-US"/>
           </a:p>
@@ -19623,7 +19714,7 @@
           <a:p>
             <a:r>
               <a:rPr lang="en-US" dirty="0"/>
-              <a:t>Number and ASCII conversion (Python version)</a:t>
+              <a:t>Hex and ASCII conversion (Python version)</a:t>
             </a:r>
           </a:p>
         </p:txBody>
@@ -21399,18 +21490,18 @@
             <a:pPr lvl="1"/>
             <a:r>
               <a:rPr lang="en-GB" dirty="0"/>
-              <a:t>Mac Absolute Time (Mac OS X Time/ Cocoa Core Date) - 2001 </a:t>
+              <a:t>Mac Time: Mac OS X Time/ Cocoa Core Date – 2001; </a:t>
+            </a:r>
+            <a:r>
+              <a:rPr lang="en-US" dirty="0"/>
+              <a:t>HFS+/APFS - 1904</a:t>
             </a:r>
           </a:p>
           <a:p>
             <a:pPr lvl="1"/>
             <a:r>
-              <a:rPr lang="en-GB" dirty="0" err="1"/>
-              <a:t>WebKit</a:t>
-            </a:r>
-            <a:r>
               <a:rPr lang="en-GB" dirty="0"/>
-              <a:t> time - 1601</a:t>
+              <a:t>WebKit time - 1601</a:t>
             </a:r>
           </a:p>
           <a:p>
@@ -21530,7 +21621,19 @@
           <a:p>
             <a:r>
               <a:rPr lang="en-GB" dirty="0"/>
-              <a:t>It is the number of seconds that have elapsed since the Unix epoch,</a:t>
+              <a:t>It is the number of </a:t>
+            </a:r>
+            <a:r>
+              <a:rPr lang="en-GB" dirty="0">
+                <a:solidFill>
+                  <a:srgbClr val="FF0000"/>
+                </a:solidFill>
+              </a:rPr>
+              <a:t>seconds</a:t>
+            </a:r>
+            <a:r>
+              <a:rPr lang="en-GB" dirty="0"/>
+              <a:t> that have elapsed since the Unix epoch,</a:t>
             </a:r>
           </a:p>
           <a:p>
@@ -23492,6 +23595,49 @@
           </a:p>
         </p:txBody>
       </p:sp>
+      <p:sp>
+        <p:nvSpPr>
+          <p:cNvPr id="3" name="TextBox 2">
+            <a:extLst>
+              <a:ext uri="{FF2B5EF4-FFF2-40B4-BE49-F238E27FC236}">
+                <a16:creationId xmlns:a16="http://schemas.microsoft.com/office/drawing/2014/main" id="{75BFF07C-81C0-9DB6-8CEC-EE0DC73496B7}"/>
+              </a:ext>
+            </a:extLst>
+          </p:cNvPr>
+          <p:cNvSpPr txBox="1"/>
+          <p:nvPr/>
+        </p:nvSpPr>
+        <p:spPr>
+          <a:xfrm>
+            <a:off x="7513795" y="1574453"/>
+            <a:ext cx="3421219" cy="369332"/>
+          </a:xfrm>
+          <a:prstGeom prst="rect">
+            <a:avLst/>
+          </a:prstGeom>
+          <a:noFill/>
+        </p:spPr>
+        <p:txBody>
+          <a:bodyPr wrap="square">
+            <a:spAutoFit/>
+          </a:bodyPr>
+          <a:lstStyle/>
+          <a:p>
+            <a:r>
+              <a:rPr lang="en-US" dirty="0">
+                <a:solidFill>
+                  <a:srgbClr val="FF0000"/>
+                </a:solidFill>
+              </a:rPr>
+              <a:t>1.7</a:t>
+            </a:r>
+            <a:r>
+              <a:rPr lang="en-US" dirty="0"/>
+              <a:t> trillion = 1,600,000,000,000,</a:t>
+            </a:r>
+          </a:p>
+        </p:txBody>
+      </p:sp>
     </p:spTree>
     <p:extLst>
       <p:ext uri="{BB962C8B-B14F-4D97-AF65-F5344CB8AC3E}">
@@ -23581,13 +23727,8 @@
             <a:pPr lvl="1"/>
             <a:r>
               <a:rPr lang="en-GB" dirty="0"/>
-              <a:t>Cocoa </a:t>
-            </a:r>
-            <a:r>
-              <a:rPr lang="en-GB"/>
-              <a:t>Core Date </a:t>
-            </a:r>
-            <a:endParaRPr lang="en-GB" dirty="0"/>
+              <a:t>Cocoa Core Date </a:t>
+            </a:r>
           </a:p>
           <a:p>
             <a:r>
@@ -23599,7 +23740,19 @@
             <a:pPr lvl="1"/>
             <a:r>
               <a:rPr lang="en-GB" dirty="0"/>
-              <a:t>Cocoa Core Data time is the number of seconds elapsed since January 1, 2001, 00:00:00 UTC,</a:t>
+              <a:t>Cocoa Core Data time is the number of </a:t>
+            </a:r>
+            <a:r>
+              <a:rPr lang="en-GB" dirty="0">
+                <a:solidFill>
+                  <a:srgbClr val="FF0000"/>
+                </a:solidFill>
+              </a:rPr>
+              <a:t>seconds</a:t>
+            </a:r>
+            <a:r>
+              <a:rPr lang="en-GB" dirty="0"/>
+              <a:t> elapsed since January 1, 2001, 00:00:00 UTC,</a:t>
             </a:r>
           </a:p>
           <a:p>
@@ -23620,9 +23773,26 @@
                 <a:effectLst/>
                 <a:latin typeface="-apple-system"/>
               </a:rPr>
-              <a:t>31 years (978307200 seconds) </a:t>
-            </a:r>
-            <a:endParaRPr lang="en-US" dirty="0"/>
+              <a:t>31 years (978,307,200 seconds) </a:t>
+            </a:r>
+          </a:p>
+          <a:p>
+            <a:r>
+              <a:rPr lang="en-US" dirty="0"/>
+              <a:t>Example: </a:t>
+            </a:r>
+            <a:r>
+              <a:rPr lang="en-US" dirty="0">
+                <a:solidFill>
+                  <a:srgbClr val="FF0000"/>
+                </a:solidFill>
+              </a:rPr>
+              <a:t>0,7</a:t>
+            </a:r>
+            <a:r>
+              <a:rPr lang="en-US" dirty="0"/>
+              <a:t>00,000,000 (0.7 trillion)</a:t>
+            </a:r>
           </a:p>
         </p:txBody>
       </p:sp>
@@ -23872,12 +24042,8 @@
           <a:lstStyle/>
           <a:p>
             <a:r>
-              <a:rPr lang="en-GB" dirty="0" err="1"/>
-              <a:t>WebKit</a:t>
-            </a:r>
-            <a:r>
               <a:rPr lang="en-GB" dirty="0"/>
-              <a:t> is a popular open-source rendering engine used by many web browsers</a:t>
+              <a:t>WebKit (Chrome) is a popular open-source rendering engine used by many web browsers</a:t>
             </a:r>
           </a:p>
           <a:p>
@@ -23909,7 +24075,47 @@
             </a:r>
             <a:r>
               <a:rPr lang="en-GB" dirty="0"/>
-              <a:t> microsecond since 01/01/1601</a:t>
+              <a:t> </a:t>
+            </a:r>
+            <a:r>
+              <a:rPr lang="en-GB" dirty="0">
+                <a:solidFill>
+                  <a:srgbClr val="FF0000"/>
+                </a:solidFill>
+              </a:rPr>
+              <a:t>microsecond</a:t>
+            </a:r>
+            <a:r>
+              <a:rPr lang="en-GB" dirty="0"/>
+              <a:t> since 01/01/1601</a:t>
+            </a:r>
+          </a:p>
+          <a:p>
+            <a:r>
+              <a:rPr lang="en-GB" dirty="0"/>
+              <a:t>Example: </a:t>
+            </a:r>
+            <a:r>
+              <a:rPr lang="en-GB" dirty="0">
+                <a:solidFill>
+                  <a:srgbClr val="FF0000"/>
+                </a:solidFill>
+              </a:rPr>
+              <a:t>13</a:t>
+            </a:r>
+            <a:r>
+              <a:rPr lang="en-GB" dirty="0"/>
+              <a:t>,402,068,765, </a:t>
+            </a:r>
+            <a:r>
+              <a:rPr lang="en-GB" dirty="0">
+                <a:solidFill>
+                  <a:schemeClr val="bg2">
+                    <a:lumMod val="90000"/>
+                  </a:schemeClr>
+                </a:solidFill>
+              </a:rPr>
+              <a:t>000,000</a:t>
             </a:r>
           </a:p>
         </p:txBody>
@@ -30345,6 +30551,108 @@
               <a:xfrm>
                 <a:off x="11201485" y="4800647"/>
                 <a:ext cx="18000" cy="18000"/>
+              </a:xfrm>
+              <a:prstGeom prst="rect">
+                <a:avLst/>
+              </a:prstGeom>
+            </p:spPr>
+          </p:pic>
+        </mc:Fallback>
+      </mc:AlternateContent>
+      <mc:AlternateContent xmlns:mc="http://schemas.openxmlformats.org/markup-compatibility/2006" xmlns:p14="http://schemas.microsoft.com/office/powerpoint/2010/main">
+        <mc:Choice Requires="p14">
+          <p:contentPart p14:bwMode="auto" r:id="rId8">
+            <p14:nvContentPartPr>
+              <p14:cNvPr id="3" name="Ink 2">
+                <a:extLst>
+                  <a:ext uri="{FF2B5EF4-FFF2-40B4-BE49-F238E27FC236}">
+                    <a16:creationId xmlns:a16="http://schemas.microsoft.com/office/drawing/2014/main" id="{B3F33769-706E-3124-DA80-31BFC0B6FD52}"/>
+                  </a:ext>
+                </a:extLst>
+              </p14:cNvPr>
+              <p14:cNvContentPartPr/>
+              <p14:nvPr/>
+            </p14:nvContentPartPr>
+            <p14:xfrm>
+              <a:off x="3985649" y="-469269"/>
+              <a:ext cx="9094" cy="9094"/>
+            </p14:xfrm>
+          </p:contentPart>
+        </mc:Choice>
+        <mc:Fallback xmlns="">
+          <p:pic>
+            <p:nvPicPr>
+              <p:cNvPr id="3" name="Ink 2">
+                <a:extLst>
+                  <a:ext uri="{FF2B5EF4-FFF2-40B4-BE49-F238E27FC236}">
+                    <a16:creationId xmlns:a16="http://schemas.microsoft.com/office/drawing/2014/main" id="{B3F33769-706E-3124-DA80-31BFC0B6FD52}"/>
+                  </a:ext>
+                </a:extLst>
+              </p:cNvPr>
+              <p:cNvPicPr/>
+              <p:nvPr/>
+            </p:nvPicPr>
+            <p:blipFill>
+              <a:blip r:embed="rId9"/>
+              <a:stretch>
+                <a:fillRect/>
+              </a:stretch>
+            </p:blipFill>
+            <p:spPr>
+              <a:xfrm>
+                <a:off x="3540043" y="-914875"/>
+                <a:ext cx="909400" cy="909400"/>
+              </a:xfrm>
+              <a:prstGeom prst="rect">
+                <a:avLst/>
+              </a:prstGeom>
+            </p:spPr>
+          </p:pic>
+        </mc:Fallback>
+      </mc:AlternateContent>
+      <mc:AlternateContent xmlns:mc="http://schemas.openxmlformats.org/markup-compatibility/2006" xmlns:p14="http://schemas.microsoft.com/office/powerpoint/2010/main">
+        <mc:Choice Requires="p14">
+          <p:contentPart p14:bwMode="auto" r:id="rId10">
+            <p14:nvContentPartPr>
+              <p14:cNvPr id="6" name="Ink 5">
+                <a:extLst>
+                  <a:ext uri="{FF2B5EF4-FFF2-40B4-BE49-F238E27FC236}">
+                    <a16:creationId xmlns:a16="http://schemas.microsoft.com/office/drawing/2014/main" id="{E0501239-EC97-6BD2-A7C2-0BFD7C370D20}"/>
+                  </a:ext>
+                </a:extLst>
+              </p14:cNvPr>
+              <p14:cNvContentPartPr/>
+              <p14:nvPr/>
+            </p14:nvContentPartPr>
+            <p14:xfrm>
+              <a:off x="3780810" y="-1305011"/>
+              <a:ext cx="9094" cy="9094"/>
+            </p14:xfrm>
+          </p:contentPart>
+        </mc:Choice>
+        <mc:Fallback xmlns="">
+          <p:pic>
+            <p:nvPicPr>
+              <p:cNvPr id="6" name="Ink 5">
+                <a:extLst>
+                  <a:ext uri="{FF2B5EF4-FFF2-40B4-BE49-F238E27FC236}">
+                    <a16:creationId xmlns:a16="http://schemas.microsoft.com/office/drawing/2014/main" id="{E0501239-EC97-6BD2-A7C2-0BFD7C370D20}"/>
+                  </a:ext>
+                </a:extLst>
+              </p:cNvPr>
+              <p:cNvPicPr/>
+              <p:nvPr/>
+            </p:nvPicPr>
+            <p:blipFill>
+              <a:blip r:embed="rId9"/>
+              <a:stretch>
+                <a:fillRect/>
+              </a:stretch>
+            </p:blipFill>
+            <p:spPr>
+              <a:xfrm>
+                <a:off x="3335204" y="-1759711"/>
+                <a:ext cx="909400" cy="909400"/>
               </a:xfrm>
               <a:prstGeom prst="rect">
                 <a:avLst/>

</xml_diff>

<commit_message>
minor changes to 0_number_system
</commit_message>
<xml_diff>
--- a/Basic_Computer_Skills_for_Forensics/0_Number_Systems.pptx
+++ b/Basic_Computer_Skills_for_Forensics/0_Number_Systems.pptx
@@ -157,7 +157,7 @@
 <file path=ppt/revisionInfo.xml><?xml version="1.0" encoding="utf-8"?>
 <p1510:revInfo xmlns:a="http://schemas.openxmlformats.org/drawingml/2006/main" xmlns:r="http://schemas.openxmlformats.org/officeDocument/2006/relationships" xmlns:p1510="http://schemas.microsoft.com/office/powerpoint/2015/10/main">
   <p1510:revLst>
-    <p1510:client id="{BC6292C7-23F4-4ED4-A77E-013F6C63BF9B}" v="12" dt="2025-09-16T12:54:10.956"/>
+    <p1510:client id="{7BEF0D23-9094-4A96-AFA4-D25CADF5FD19}" v="2" dt="2026-01-28T14:30:28.847"/>
   </p1510:revLst>
 </p1510:revInfo>
 </file>
@@ -165,1767 +165,65 @@
 <file path=ppt/changesInfos/changesInfo1.xml><?xml version="1.0" encoding="utf-8"?>
 <pc:chgInfo xmlns:a="http://schemas.openxmlformats.org/drawingml/2006/main" xmlns:r="http://schemas.openxmlformats.org/officeDocument/2006/relationships" xmlns:ac="http://schemas.microsoft.com/office/drawing/2013/main/command" xmlns:pc="http://schemas.microsoft.com/office/powerpoint/2013/main/command">
   <pc:docChgLst>
-    <pc:chgData name="Weifeng Xu" userId="e7aed605-a3dd-4d5a-a692-a87037af107b" providerId="ADAL" clId="{2DF50834-70B7-4792-8287-7E44FACC55EB}"/>
-    <pc:docChg chg="undo redo custSel addSld delSld modSld sldOrd">
-      <pc:chgData name="Weifeng Xu" userId="e7aed605-a3dd-4d5a-a692-a87037af107b" providerId="ADAL" clId="{2DF50834-70B7-4792-8287-7E44FACC55EB}" dt="2021-07-02T18:46:17.506" v="2421" actId="1076"/>
+    <pc:chgData name="Weifeng Xu" userId="e7aed605-a3dd-4d5a-a692-a87037af107b" providerId="ADAL" clId="{F99F8FFF-BA20-43EA-924B-4DF5D2A785F3}"/>
+    <pc:docChg chg="undo custSel modSld">
+      <pc:chgData name="Weifeng Xu" userId="e7aed605-a3dd-4d5a-a692-a87037af107b" providerId="ADAL" clId="{F99F8FFF-BA20-43EA-924B-4DF5D2A785F3}" dt="2026-01-28T16:14:27.061" v="286" actId="113"/>
       <pc:docMkLst>
         <pc:docMk/>
       </pc:docMkLst>
-      <pc:sldChg chg="addSp delSp modSp mod chgLayout">
-        <pc:chgData name="Weifeng Xu" userId="e7aed605-a3dd-4d5a-a692-a87037af107b" providerId="ADAL" clId="{2DF50834-70B7-4792-8287-7E44FACC55EB}" dt="2021-06-27T00:54:00.122" v="1673" actId="6264"/>
-        <pc:sldMkLst>
-          <pc:docMk/>
-          <pc:sldMk cId="1325061211" sldId="256"/>
-        </pc:sldMkLst>
-      </pc:sldChg>
-      <pc:sldChg chg="del">
-        <pc:chgData name="Weifeng Xu" userId="e7aed605-a3dd-4d5a-a692-a87037af107b" providerId="ADAL" clId="{2DF50834-70B7-4792-8287-7E44FACC55EB}" dt="2021-06-25T22:29:38.709" v="54" actId="47"/>
-        <pc:sldMkLst>
-          <pc:docMk/>
-          <pc:sldMk cId="2201572609" sldId="257"/>
-        </pc:sldMkLst>
-      </pc:sldChg>
-      <pc:sldChg chg="del">
-        <pc:chgData name="Weifeng Xu" userId="e7aed605-a3dd-4d5a-a692-a87037af107b" providerId="ADAL" clId="{2DF50834-70B7-4792-8287-7E44FACC55EB}" dt="2021-06-26T00:55:36.178" v="1173" actId="47"/>
-        <pc:sldMkLst>
-          <pc:docMk/>
-          <pc:sldMk cId="450669007" sldId="258"/>
-        </pc:sldMkLst>
-      </pc:sldChg>
-      <pc:sldChg chg="add mod chgLayout">
-        <pc:chgData name="Weifeng Xu" userId="e7aed605-a3dd-4d5a-a692-a87037af107b" providerId="ADAL" clId="{2DF50834-70B7-4792-8287-7E44FACC55EB}" dt="2021-06-27T00:53:30.358" v="1663" actId="6264"/>
-        <pc:sldMkLst>
-          <pc:docMk/>
-          <pc:sldMk cId="2789471632" sldId="392"/>
-        </pc:sldMkLst>
-      </pc:sldChg>
-      <pc:sldChg chg="addSp delSp modSp add mod modClrScheme chgLayout">
-        <pc:chgData name="Weifeng Xu" userId="e7aed605-a3dd-4d5a-a692-a87037af107b" providerId="ADAL" clId="{2DF50834-70B7-4792-8287-7E44FACC55EB}" dt="2021-06-27T00:54:00.122" v="1673" actId="6264"/>
-        <pc:sldMkLst>
-          <pc:docMk/>
-          <pc:sldMk cId="3672303902" sldId="393"/>
-        </pc:sldMkLst>
-      </pc:sldChg>
-      <pc:sldChg chg="addSp delSp modSp add mod modClrScheme chgLayout">
-        <pc:chgData name="Weifeng Xu" userId="e7aed605-a3dd-4d5a-a692-a87037af107b" providerId="ADAL" clId="{2DF50834-70B7-4792-8287-7E44FACC55EB}" dt="2021-06-27T00:54:00.122" v="1673" actId="6264"/>
-        <pc:sldMkLst>
-          <pc:docMk/>
-          <pc:sldMk cId="2467691949" sldId="394"/>
-        </pc:sldMkLst>
-      </pc:sldChg>
-      <pc:sldChg chg="addSp delSp modSp add mod chgLayout">
-        <pc:chgData name="Weifeng Xu" userId="e7aed605-a3dd-4d5a-a692-a87037af107b" providerId="ADAL" clId="{2DF50834-70B7-4792-8287-7E44FACC55EB}" dt="2021-06-27T00:54:00.122" v="1673" actId="6264"/>
-        <pc:sldMkLst>
-          <pc:docMk/>
-          <pc:sldMk cId="1030962794" sldId="395"/>
-        </pc:sldMkLst>
-      </pc:sldChg>
-      <pc:sldChg chg="addSp delSp modSp add mod chgLayout">
-        <pc:chgData name="Weifeng Xu" userId="e7aed605-a3dd-4d5a-a692-a87037af107b" providerId="ADAL" clId="{2DF50834-70B7-4792-8287-7E44FACC55EB}" dt="2021-06-27T00:54:00.122" v="1673" actId="6264"/>
-        <pc:sldMkLst>
-          <pc:docMk/>
-          <pc:sldMk cId="1635951812" sldId="396"/>
-        </pc:sldMkLst>
-      </pc:sldChg>
-      <pc:sldChg chg="delSp add mod chgLayout">
-        <pc:chgData name="Weifeng Xu" userId="e7aed605-a3dd-4d5a-a692-a87037af107b" providerId="ADAL" clId="{2DF50834-70B7-4792-8287-7E44FACC55EB}" dt="2021-06-27T00:53:30.358" v="1663" actId="6264"/>
-        <pc:sldMkLst>
-          <pc:docMk/>
-          <pc:sldMk cId="3476957671" sldId="397"/>
-        </pc:sldMkLst>
-      </pc:sldChg>
-      <pc:sldChg chg="addSp delSp modSp add mod chgLayout">
-        <pc:chgData name="Weifeng Xu" userId="e7aed605-a3dd-4d5a-a692-a87037af107b" providerId="ADAL" clId="{2DF50834-70B7-4792-8287-7E44FACC55EB}" dt="2021-07-02T18:35:17.348" v="2403" actId="114"/>
-        <pc:sldMkLst>
-          <pc:docMk/>
-          <pc:sldMk cId="837580508" sldId="398"/>
-        </pc:sldMkLst>
-      </pc:sldChg>
-      <pc:sldChg chg="addSp delSp modSp add mod chgLayout">
-        <pc:chgData name="Weifeng Xu" userId="e7aed605-a3dd-4d5a-a692-a87037af107b" providerId="ADAL" clId="{2DF50834-70B7-4792-8287-7E44FACC55EB}" dt="2021-07-02T18:36:24.185" v="2405" actId="114"/>
-        <pc:sldMkLst>
-          <pc:docMk/>
-          <pc:sldMk cId="775249280" sldId="399"/>
-        </pc:sldMkLst>
-      </pc:sldChg>
-      <pc:sldChg chg="addSp delSp modSp add mod chgLayout">
-        <pc:chgData name="Weifeng Xu" userId="e7aed605-a3dd-4d5a-a692-a87037af107b" providerId="ADAL" clId="{2DF50834-70B7-4792-8287-7E44FACC55EB}" dt="2021-07-02T18:36:39.379" v="2407" actId="114"/>
-        <pc:sldMkLst>
-          <pc:docMk/>
-          <pc:sldMk cId="614667185" sldId="400"/>
-        </pc:sldMkLst>
-      </pc:sldChg>
-      <pc:sldChg chg="addSp delSp modSp add mod chgLayout">
-        <pc:chgData name="Weifeng Xu" userId="e7aed605-a3dd-4d5a-a692-a87037af107b" providerId="ADAL" clId="{2DF50834-70B7-4792-8287-7E44FACC55EB}" dt="2021-06-27T00:54:00.122" v="1673" actId="6264"/>
-        <pc:sldMkLst>
-          <pc:docMk/>
-          <pc:sldMk cId="3582893092" sldId="401"/>
-        </pc:sldMkLst>
-      </pc:sldChg>
-      <pc:sldChg chg="addSp delSp modSp add mod chgLayout">
-        <pc:chgData name="Weifeng Xu" userId="e7aed605-a3dd-4d5a-a692-a87037af107b" providerId="ADAL" clId="{2DF50834-70B7-4792-8287-7E44FACC55EB}" dt="2021-06-27T00:54:00.122" v="1673" actId="6264"/>
-        <pc:sldMkLst>
-          <pc:docMk/>
-          <pc:sldMk cId="819433619" sldId="402"/>
-        </pc:sldMkLst>
-      </pc:sldChg>
-      <pc:sldChg chg="addSp delSp modSp add mod chgLayout">
-        <pc:chgData name="Weifeng Xu" userId="e7aed605-a3dd-4d5a-a692-a87037af107b" providerId="ADAL" clId="{2DF50834-70B7-4792-8287-7E44FACC55EB}" dt="2021-06-27T00:54:00.122" v="1673" actId="6264"/>
-        <pc:sldMkLst>
-          <pc:docMk/>
-          <pc:sldMk cId="39788097" sldId="403"/>
-        </pc:sldMkLst>
-      </pc:sldChg>
-      <pc:sldChg chg="addSp delSp modSp add mod chgLayout">
-        <pc:chgData name="Weifeng Xu" userId="e7aed605-a3dd-4d5a-a692-a87037af107b" providerId="ADAL" clId="{2DF50834-70B7-4792-8287-7E44FACC55EB}" dt="2021-06-27T00:54:00.122" v="1673" actId="6264"/>
-        <pc:sldMkLst>
-          <pc:docMk/>
-          <pc:sldMk cId="3665038014" sldId="404"/>
-        </pc:sldMkLst>
-      </pc:sldChg>
-      <pc:sldChg chg="addSp delSp modSp add mod chgLayout">
-        <pc:chgData name="Weifeng Xu" userId="e7aed605-a3dd-4d5a-a692-a87037af107b" providerId="ADAL" clId="{2DF50834-70B7-4792-8287-7E44FACC55EB}" dt="2021-06-27T00:54:00.122" v="1673" actId="6264"/>
-        <pc:sldMkLst>
-          <pc:docMk/>
-          <pc:sldMk cId="464350271" sldId="405"/>
-        </pc:sldMkLst>
-      </pc:sldChg>
-      <pc:sldChg chg="addSp delSp modSp add mod chgLayout">
-        <pc:chgData name="Weifeng Xu" userId="e7aed605-a3dd-4d5a-a692-a87037af107b" providerId="ADAL" clId="{2DF50834-70B7-4792-8287-7E44FACC55EB}" dt="2021-06-27T00:54:00.122" v="1673" actId="6264"/>
-        <pc:sldMkLst>
-          <pc:docMk/>
-          <pc:sldMk cId="2093752077" sldId="406"/>
-        </pc:sldMkLst>
-      </pc:sldChg>
-      <pc:sldChg chg="addSp delSp modSp add mod chgLayout">
-        <pc:chgData name="Weifeng Xu" userId="e7aed605-a3dd-4d5a-a692-a87037af107b" providerId="ADAL" clId="{2DF50834-70B7-4792-8287-7E44FACC55EB}" dt="2021-06-27T00:54:00.122" v="1673" actId="6264"/>
-        <pc:sldMkLst>
-          <pc:docMk/>
-          <pc:sldMk cId="1972666229" sldId="407"/>
-        </pc:sldMkLst>
-      </pc:sldChg>
-      <pc:sldChg chg="addSp delSp modSp add mod chgLayout">
-        <pc:chgData name="Weifeng Xu" userId="e7aed605-a3dd-4d5a-a692-a87037af107b" providerId="ADAL" clId="{2DF50834-70B7-4792-8287-7E44FACC55EB}" dt="2021-06-27T00:54:00.122" v="1673" actId="6264"/>
-        <pc:sldMkLst>
-          <pc:docMk/>
-          <pc:sldMk cId="2980641166" sldId="408"/>
-        </pc:sldMkLst>
-      </pc:sldChg>
-      <pc:sldChg chg="addSp delSp modSp add mod chgLayout">
-        <pc:chgData name="Weifeng Xu" userId="e7aed605-a3dd-4d5a-a692-a87037af107b" providerId="ADAL" clId="{2DF50834-70B7-4792-8287-7E44FACC55EB}" dt="2021-07-02T18:46:17.506" v="2421" actId="1076"/>
-        <pc:sldMkLst>
-          <pc:docMk/>
-          <pc:sldMk cId="3277870470" sldId="409"/>
-        </pc:sldMkLst>
-      </pc:sldChg>
-      <pc:sldChg chg="addSp delSp modSp add del mod chgLayout">
-        <pc:chgData name="Weifeng Xu" userId="e7aed605-a3dd-4d5a-a692-a87037af107b" providerId="ADAL" clId="{2DF50834-70B7-4792-8287-7E44FACC55EB}" dt="2021-06-27T00:54:00.122" v="1673" actId="6264"/>
-        <pc:sldMkLst>
-          <pc:docMk/>
-          <pc:sldMk cId="2489270501" sldId="411"/>
-        </pc:sldMkLst>
-      </pc:sldChg>
-      <pc:sldChg chg="addSp delSp modSp add mod chgLayout">
-        <pc:chgData name="Weifeng Xu" userId="e7aed605-a3dd-4d5a-a692-a87037af107b" providerId="ADAL" clId="{2DF50834-70B7-4792-8287-7E44FACC55EB}" dt="2021-06-27T00:54:00.122" v="1673" actId="6264"/>
-        <pc:sldMkLst>
-          <pc:docMk/>
-          <pc:sldMk cId="3881480386" sldId="413"/>
-        </pc:sldMkLst>
-      </pc:sldChg>
-      <pc:sldChg chg="addSp delSp modSp add mod chgLayout">
-        <pc:chgData name="Weifeng Xu" userId="e7aed605-a3dd-4d5a-a692-a87037af107b" providerId="ADAL" clId="{2DF50834-70B7-4792-8287-7E44FACC55EB}" dt="2021-06-27T00:54:00.122" v="1673" actId="6264"/>
-        <pc:sldMkLst>
-          <pc:docMk/>
-          <pc:sldMk cId="3118374455" sldId="414"/>
-        </pc:sldMkLst>
-      </pc:sldChg>
-      <pc:sldChg chg="addSp delSp modSp add mod chgLayout">
-        <pc:chgData name="Weifeng Xu" userId="e7aed605-a3dd-4d5a-a692-a87037af107b" providerId="ADAL" clId="{2DF50834-70B7-4792-8287-7E44FACC55EB}" dt="2021-06-27T00:54:00.122" v="1673" actId="6264"/>
-        <pc:sldMkLst>
-          <pc:docMk/>
-          <pc:sldMk cId="214186708" sldId="415"/>
-        </pc:sldMkLst>
-      </pc:sldChg>
-      <pc:sldChg chg="addSp delSp modSp add mod chgLayout">
-        <pc:chgData name="Weifeng Xu" userId="e7aed605-a3dd-4d5a-a692-a87037af107b" providerId="ADAL" clId="{2DF50834-70B7-4792-8287-7E44FACC55EB}" dt="2021-06-27T00:54:00.122" v="1673" actId="6264"/>
-        <pc:sldMkLst>
-          <pc:docMk/>
-          <pc:sldMk cId="4266318337" sldId="416"/>
-        </pc:sldMkLst>
-      </pc:sldChg>
-      <pc:sldChg chg="addSp delSp modSp add mod chgLayout">
-        <pc:chgData name="Weifeng Xu" userId="e7aed605-a3dd-4d5a-a692-a87037af107b" providerId="ADAL" clId="{2DF50834-70B7-4792-8287-7E44FACC55EB}" dt="2021-06-27T00:54:00.122" v="1673" actId="6264"/>
-        <pc:sldMkLst>
-          <pc:docMk/>
-          <pc:sldMk cId="1453023660" sldId="417"/>
-        </pc:sldMkLst>
-      </pc:sldChg>
-      <pc:sldChg chg="addSp delSp modSp add mod chgLayout">
-        <pc:chgData name="Weifeng Xu" userId="e7aed605-a3dd-4d5a-a692-a87037af107b" providerId="ADAL" clId="{2DF50834-70B7-4792-8287-7E44FACC55EB}" dt="2021-06-27T00:54:00.122" v="1673" actId="6264"/>
-        <pc:sldMkLst>
-          <pc:docMk/>
-          <pc:sldMk cId="4247754591" sldId="418"/>
-        </pc:sldMkLst>
-      </pc:sldChg>
-      <pc:sldChg chg="addSp delSp modSp new mod chgLayout">
-        <pc:chgData name="Weifeng Xu" userId="e7aed605-a3dd-4d5a-a692-a87037af107b" providerId="ADAL" clId="{2DF50834-70B7-4792-8287-7E44FACC55EB}" dt="2021-07-02T18:41:14.260" v="2412" actId="14100"/>
-        <pc:sldMkLst>
-          <pc:docMk/>
-          <pc:sldMk cId="1871513867" sldId="419"/>
-        </pc:sldMkLst>
-      </pc:sldChg>
-      <pc:sldChg chg="new del">
-        <pc:chgData name="Weifeng Xu" userId="e7aed605-a3dd-4d5a-a692-a87037af107b" providerId="ADAL" clId="{2DF50834-70B7-4792-8287-7E44FACC55EB}" dt="2021-06-25T22:38:18.838" v="191" actId="680"/>
-        <pc:sldMkLst>
-          <pc:docMk/>
-          <pc:sldMk cId="4105834762" sldId="419"/>
-        </pc:sldMkLst>
-      </pc:sldChg>
-      <pc:sldChg chg="addSp delSp modSp new mod modClrScheme chgLayout">
-        <pc:chgData name="Weifeng Xu" userId="e7aed605-a3dd-4d5a-a692-a87037af107b" providerId="ADAL" clId="{2DF50834-70B7-4792-8287-7E44FACC55EB}" dt="2021-07-02T18:13:32.683" v="2385" actId="14100"/>
-        <pc:sldMkLst>
-          <pc:docMk/>
-          <pc:sldMk cId="4160866766" sldId="420"/>
-        </pc:sldMkLst>
-      </pc:sldChg>
-      <pc:sldChg chg="addSp delSp modSp new mod modClrScheme chgLayout">
-        <pc:chgData name="Weifeng Xu" userId="e7aed605-a3dd-4d5a-a692-a87037af107b" providerId="ADAL" clId="{2DF50834-70B7-4792-8287-7E44FACC55EB}" dt="2021-06-27T00:54:00.122" v="1673" actId="6264"/>
-        <pc:sldMkLst>
-          <pc:docMk/>
-          <pc:sldMk cId="1090587346" sldId="421"/>
-        </pc:sldMkLst>
-      </pc:sldChg>
-      <pc:sldChg chg="addSp delSp modSp new mod modClrScheme chgLayout">
-        <pc:chgData name="Weifeng Xu" userId="e7aed605-a3dd-4d5a-a692-a87037af107b" providerId="ADAL" clId="{2DF50834-70B7-4792-8287-7E44FACC55EB}" dt="2021-07-02T18:30:38.342" v="2401" actId="11529"/>
-        <pc:sldMkLst>
-          <pc:docMk/>
-          <pc:sldMk cId="2079099636" sldId="422"/>
-        </pc:sldMkLst>
-      </pc:sldChg>
-      <pc:sldChg chg="addSp delSp modSp add mod chgLayout">
-        <pc:chgData name="Weifeng Xu" userId="e7aed605-a3dd-4d5a-a692-a87037af107b" providerId="ADAL" clId="{2DF50834-70B7-4792-8287-7E44FACC55EB}" dt="2021-06-27T00:54:00.122" v="1673" actId="6264"/>
-        <pc:sldMkLst>
-          <pc:docMk/>
-          <pc:sldMk cId="1881823739" sldId="423"/>
-        </pc:sldMkLst>
-      </pc:sldChg>
-      <pc:sldChg chg="modSp new del mod">
-        <pc:chgData name="Weifeng Xu" userId="e7aed605-a3dd-4d5a-a692-a87037af107b" providerId="ADAL" clId="{2DF50834-70B7-4792-8287-7E44FACC55EB}" dt="2021-06-26T00:55:30.187" v="1172" actId="47"/>
-        <pc:sldMkLst>
-          <pc:docMk/>
-          <pc:sldMk cId="1470109627" sldId="424"/>
-        </pc:sldMkLst>
-      </pc:sldChg>
-      <pc:sldChg chg="addSp delSp modSp new mod chgLayout">
-        <pc:chgData name="Weifeng Xu" userId="e7aed605-a3dd-4d5a-a692-a87037af107b" providerId="ADAL" clId="{2DF50834-70B7-4792-8287-7E44FACC55EB}" dt="2021-06-27T00:54:00.122" v="1673" actId="6264"/>
-        <pc:sldMkLst>
-          <pc:docMk/>
-          <pc:sldMk cId="3519466523" sldId="424"/>
-        </pc:sldMkLst>
-      </pc:sldChg>
-      <pc:sldChg chg="addSp delSp modSp new mod chgLayout">
-        <pc:chgData name="Weifeng Xu" userId="e7aed605-a3dd-4d5a-a692-a87037af107b" providerId="ADAL" clId="{2DF50834-70B7-4792-8287-7E44FACC55EB}" dt="2021-06-27T00:54:00.122" v="1673" actId="6264"/>
-        <pc:sldMkLst>
-          <pc:docMk/>
-          <pc:sldMk cId="2940456927" sldId="425"/>
-        </pc:sldMkLst>
-      </pc:sldChg>
-      <pc:sldChg chg="addSp delSp modSp new mod chgLayout">
-        <pc:chgData name="Weifeng Xu" userId="e7aed605-a3dd-4d5a-a692-a87037af107b" providerId="ADAL" clId="{2DF50834-70B7-4792-8287-7E44FACC55EB}" dt="2021-06-27T00:54:00.122" v="1673" actId="6264"/>
-        <pc:sldMkLst>
-          <pc:docMk/>
-          <pc:sldMk cId="3876190788" sldId="426"/>
-        </pc:sldMkLst>
-      </pc:sldChg>
-      <pc:sldChg chg="addSp delSp modSp new mod ord chgLayout">
-        <pc:chgData name="Weifeng Xu" userId="e7aed605-a3dd-4d5a-a692-a87037af107b" providerId="ADAL" clId="{2DF50834-70B7-4792-8287-7E44FACC55EB}" dt="2021-06-27T01:12:15.231" v="1756"/>
-        <pc:sldMkLst>
-          <pc:docMk/>
-          <pc:sldMk cId="2709397411" sldId="427"/>
-        </pc:sldMkLst>
-      </pc:sldChg>
-      <pc:sldChg chg="addSp delSp modSp new mod chgLayout">
-        <pc:chgData name="Weifeng Xu" userId="e7aed605-a3dd-4d5a-a692-a87037af107b" providerId="ADAL" clId="{2DF50834-70B7-4792-8287-7E44FACC55EB}" dt="2021-06-27T00:54:00.122" v="1673" actId="6264"/>
-        <pc:sldMkLst>
-          <pc:docMk/>
-          <pc:sldMk cId="647302650" sldId="428"/>
-        </pc:sldMkLst>
-      </pc:sldChg>
-      <pc:sldChg chg="addSp delSp modSp new mod modClrScheme chgLayout">
-        <pc:chgData name="Weifeng Xu" userId="e7aed605-a3dd-4d5a-a692-a87037af107b" providerId="ADAL" clId="{2DF50834-70B7-4792-8287-7E44FACC55EB}" dt="2021-06-27T00:54:00.122" v="1673" actId="6264"/>
-        <pc:sldMkLst>
-          <pc:docMk/>
-          <pc:sldMk cId="878272104" sldId="429"/>
-        </pc:sldMkLst>
-      </pc:sldChg>
-      <pc:sldChg chg="addSp delSp modSp new mod modClrScheme chgLayout">
-        <pc:chgData name="Weifeng Xu" userId="e7aed605-a3dd-4d5a-a692-a87037af107b" providerId="ADAL" clId="{2DF50834-70B7-4792-8287-7E44FACC55EB}" dt="2021-06-27T00:54:00.122" v="1673" actId="6264"/>
-        <pc:sldMkLst>
-          <pc:docMk/>
-          <pc:sldMk cId="4091828154" sldId="430"/>
-        </pc:sldMkLst>
-      </pc:sldChg>
-      <pc:sldChg chg="addSp delSp modSp new mod chgLayout">
-        <pc:chgData name="Weifeng Xu" userId="e7aed605-a3dd-4d5a-a692-a87037af107b" providerId="ADAL" clId="{2DF50834-70B7-4792-8287-7E44FACC55EB}" dt="2021-06-27T12:23:44.642" v="2091" actId="20577"/>
-        <pc:sldMkLst>
-          <pc:docMk/>
-          <pc:sldMk cId="593614233" sldId="431"/>
-        </pc:sldMkLst>
-      </pc:sldChg>
-      <pc:sldChg chg="addSp delSp modSp new mod chgLayout">
-        <pc:chgData name="Weifeng Xu" userId="e7aed605-a3dd-4d5a-a692-a87037af107b" providerId="ADAL" clId="{2DF50834-70B7-4792-8287-7E44FACC55EB}" dt="2021-07-02T18:42:31.597" v="2418" actId="114"/>
-        <pc:sldMkLst>
-          <pc:docMk/>
-          <pc:sldMk cId="996485528" sldId="432"/>
-        </pc:sldMkLst>
-      </pc:sldChg>
-      <pc:sldChg chg="addSp delSp modSp new mod modClrScheme chgLayout">
-        <pc:chgData name="Weifeng Xu" userId="e7aed605-a3dd-4d5a-a692-a87037af107b" providerId="ADAL" clId="{2DF50834-70B7-4792-8287-7E44FACC55EB}" dt="2021-06-27T00:53:59.629" v="1671" actId="1076"/>
-        <pc:sldMkLst>
-          <pc:docMk/>
-          <pc:sldMk cId="848404907" sldId="433"/>
-        </pc:sldMkLst>
-      </pc:sldChg>
-      <pc:sldChg chg="addSp delSp modSp new mod ord modClrScheme chgLayout">
-        <pc:chgData name="Weifeng Xu" userId="e7aed605-a3dd-4d5a-a692-a87037af107b" providerId="ADAL" clId="{2DF50834-70B7-4792-8287-7E44FACC55EB}" dt="2021-06-27T01:12:15.231" v="1756"/>
-        <pc:sldMkLst>
-          <pc:docMk/>
-          <pc:sldMk cId="2829655940" sldId="434"/>
-        </pc:sldMkLst>
-      </pc:sldChg>
-      <pc:sldChg chg="addSp delSp modSp new mod ord modClrScheme chgLayout">
-        <pc:chgData name="Weifeng Xu" userId="e7aed605-a3dd-4d5a-a692-a87037af107b" providerId="ADAL" clId="{2DF50834-70B7-4792-8287-7E44FACC55EB}" dt="2021-06-27T01:40:40.036" v="1917" actId="20577"/>
-        <pc:sldMkLst>
-          <pc:docMk/>
-          <pc:sldMk cId="3752964083" sldId="435"/>
-        </pc:sldMkLst>
-      </pc:sldChg>
-      <pc:sldChg chg="addSp modSp new mod">
-        <pc:chgData name="Weifeng Xu" userId="e7aed605-a3dd-4d5a-a692-a87037af107b" providerId="ADAL" clId="{2DF50834-70B7-4792-8287-7E44FACC55EB}" dt="2021-06-27T01:41:00.419" v="1944" actId="20577"/>
-        <pc:sldMkLst>
-          <pc:docMk/>
-          <pc:sldMk cId="3503932430" sldId="436"/>
-        </pc:sldMkLst>
-      </pc:sldChg>
-      <pc:sldChg chg="addSp delSp modSp new mod">
-        <pc:chgData name="Weifeng Xu" userId="e7aed605-a3dd-4d5a-a692-a87037af107b" providerId="ADAL" clId="{2DF50834-70B7-4792-8287-7E44FACC55EB}" dt="2021-06-27T01:41:16.603" v="1962" actId="20577"/>
-        <pc:sldMkLst>
-          <pc:docMk/>
-          <pc:sldMk cId="1984469485" sldId="437"/>
-        </pc:sldMkLst>
-      </pc:sldChg>
-      <pc:sldChg chg="addSp modSp new mod modNotesTx">
-        <pc:chgData name="Weifeng Xu" userId="e7aed605-a3dd-4d5a-a692-a87037af107b" providerId="ADAL" clId="{2DF50834-70B7-4792-8287-7E44FACC55EB}" dt="2021-06-27T01:42:20.128" v="1966" actId="14100"/>
-        <pc:sldMkLst>
-          <pc:docMk/>
-          <pc:sldMk cId="4198334412" sldId="438"/>
-        </pc:sldMkLst>
-      </pc:sldChg>
-      <pc:sldChg chg="addSp modSp new mod modNotesTx">
-        <pc:chgData name="Weifeng Xu" userId="e7aed605-a3dd-4d5a-a692-a87037af107b" providerId="ADAL" clId="{2DF50834-70B7-4792-8287-7E44FACC55EB}" dt="2021-06-27T01:45:55.971" v="1971" actId="1076"/>
-        <pc:sldMkLst>
-          <pc:docMk/>
-          <pc:sldMk cId="4192281943" sldId="439"/>
-        </pc:sldMkLst>
-      </pc:sldChg>
-      <pc:sldChg chg="addSp modSp new mod">
-        <pc:chgData name="Weifeng Xu" userId="e7aed605-a3dd-4d5a-a692-a87037af107b" providerId="ADAL" clId="{2DF50834-70B7-4792-8287-7E44FACC55EB}" dt="2021-06-27T01:47:33.949" v="2031" actId="1076"/>
-        <pc:sldMkLst>
-          <pc:docMk/>
-          <pc:sldMk cId="3098642995" sldId="440"/>
-        </pc:sldMkLst>
-      </pc:sldChg>
-      <pc:sldChg chg="addSp modSp new mod">
-        <pc:chgData name="Weifeng Xu" userId="e7aed605-a3dd-4d5a-a692-a87037af107b" providerId="ADAL" clId="{2DF50834-70B7-4792-8287-7E44FACC55EB}" dt="2021-06-27T01:55:21.260" v="2063" actId="14100"/>
-        <pc:sldMkLst>
-          <pc:docMk/>
-          <pc:sldMk cId="3265397422" sldId="441"/>
-        </pc:sldMkLst>
-      </pc:sldChg>
-      <pc:sldChg chg="addSp delSp modSp new mod modClrScheme chgLayout">
-        <pc:chgData name="Weifeng Xu" userId="e7aed605-a3dd-4d5a-a692-a87037af107b" providerId="ADAL" clId="{2DF50834-70B7-4792-8287-7E44FACC55EB}" dt="2021-06-27T12:24:10.779" v="2095" actId="20577"/>
-        <pc:sldMkLst>
-          <pc:docMk/>
-          <pc:sldMk cId="4060643725" sldId="442"/>
-        </pc:sldMkLst>
-      </pc:sldChg>
-      <pc:sldChg chg="addSp delSp modSp new mod modClrScheme chgLayout modNotesTx">
-        <pc:chgData name="Weifeng Xu" userId="e7aed605-a3dd-4d5a-a692-a87037af107b" providerId="ADAL" clId="{2DF50834-70B7-4792-8287-7E44FACC55EB}" dt="2021-06-27T14:07:48.913" v="2177" actId="20577"/>
-        <pc:sldMkLst>
-          <pc:docMk/>
-          <pc:sldMk cId="3308258886" sldId="443"/>
-        </pc:sldMkLst>
-      </pc:sldChg>
-      <pc:sldChg chg="addSp modSp new mod">
-        <pc:chgData name="Weifeng Xu" userId="e7aed605-a3dd-4d5a-a692-a87037af107b" providerId="ADAL" clId="{2DF50834-70B7-4792-8287-7E44FACC55EB}" dt="2021-06-27T14:09:05.312" v="2218" actId="1076"/>
-        <pc:sldMkLst>
-          <pc:docMk/>
-          <pc:sldMk cId="2290480652" sldId="444"/>
-        </pc:sldMkLst>
-      </pc:sldChg>
-      <pc:sldChg chg="addSp modSp new mod modNotesTx">
-        <pc:chgData name="Weifeng Xu" userId="e7aed605-a3dd-4d5a-a692-a87037af107b" providerId="ADAL" clId="{2DF50834-70B7-4792-8287-7E44FACC55EB}" dt="2021-06-27T14:29:01.031" v="2277" actId="1076"/>
-        <pc:sldMkLst>
-          <pc:docMk/>
-          <pc:sldMk cId="1737777844" sldId="445"/>
-        </pc:sldMkLst>
-      </pc:sldChg>
-      <pc:sldChg chg="addSp modSp new mod">
-        <pc:chgData name="Weifeng Xu" userId="e7aed605-a3dd-4d5a-a692-a87037af107b" providerId="ADAL" clId="{2DF50834-70B7-4792-8287-7E44FACC55EB}" dt="2021-06-27T14:32:54.680" v="2383" actId="114"/>
-        <pc:sldMkLst>
-          <pc:docMk/>
-          <pc:sldMk cId="2625291343" sldId="446"/>
-        </pc:sldMkLst>
-      </pc:sldChg>
-    </pc:docChg>
-  </pc:docChgLst>
-  <pc:docChgLst>
-    <pc:chgData name="Weifeng Xu" userId="e7aed605-a3dd-4d5a-a692-a87037af107b" providerId="ADAL" clId="{F99F8FFF-BA20-43EA-924B-4DF5D2A785F3}"/>
-    <pc:docChg chg="undo custSel modSld">
-      <pc:chgData name="Weifeng Xu" userId="e7aed605-a3dd-4d5a-a692-a87037af107b" providerId="ADAL" clId="{F99F8FFF-BA20-43EA-924B-4DF5D2A785F3}" dt="2025-09-16T12:54:36.189" v="235" actId="1076"/>
-      <pc:docMkLst>
-        <pc:docMk/>
-      </pc:docMkLst>
-      <pc:sldChg chg="modSp mod">
-        <pc:chgData name="Weifeng Xu" userId="e7aed605-a3dd-4d5a-a692-a87037af107b" providerId="ADAL" clId="{F99F8FFF-BA20-43EA-924B-4DF5D2A785F3}" dt="2025-09-11T12:54:41.561" v="71" actId="207"/>
-        <pc:sldMkLst>
-          <pc:docMk/>
-          <pc:sldMk cId="3972243169" sldId="275"/>
-        </pc:sldMkLst>
-        <pc:spChg chg="mod">
-          <ac:chgData name="Weifeng Xu" userId="e7aed605-a3dd-4d5a-a692-a87037af107b" providerId="ADAL" clId="{F99F8FFF-BA20-43EA-924B-4DF5D2A785F3}" dt="2025-09-11T12:54:41.561" v="71" actId="207"/>
-          <ac:spMkLst>
-            <pc:docMk/>
-            <pc:sldMk cId="3972243169" sldId="275"/>
-            <ac:spMk id="6" creationId="{23BFB659-95F8-4F0B-8232-6515C6879CE9}"/>
-          </ac:spMkLst>
-        </pc:spChg>
-      </pc:sldChg>
-      <pc:sldChg chg="modSp mod">
-        <pc:chgData name="Weifeng Xu" userId="e7aed605-a3dd-4d5a-a692-a87037af107b" providerId="ADAL" clId="{F99F8FFF-BA20-43EA-924B-4DF5D2A785F3}" dt="2025-09-16T12:51:26.174" v="222" actId="20577"/>
-        <pc:sldMkLst>
-          <pc:docMk/>
-          <pc:sldMk cId="930520840" sldId="276"/>
-        </pc:sldMkLst>
-        <pc:spChg chg="mod">
-          <ac:chgData name="Weifeng Xu" userId="e7aed605-a3dd-4d5a-a692-a87037af107b" providerId="ADAL" clId="{F99F8FFF-BA20-43EA-924B-4DF5D2A785F3}" dt="2025-09-16T12:51:26.174" v="222" actId="20577"/>
-          <ac:spMkLst>
-            <pc:docMk/>
-            <pc:sldMk cId="930520840" sldId="276"/>
-            <ac:spMk id="3" creationId="{2500F15C-7111-422D-9384-11B217932593}"/>
-          </ac:spMkLst>
-        </pc:spChg>
-      </pc:sldChg>
-      <pc:sldChg chg="addSp delSp modSp mod">
-        <pc:chgData name="Weifeng Xu" userId="e7aed605-a3dd-4d5a-a692-a87037af107b" providerId="ADAL" clId="{F99F8FFF-BA20-43EA-924B-4DF5D2A785F3}" dt="2025-09-16T12:54:36.189" v="235" actId="1076"/>
-        <pc:sldMkLst>
-          <pc:docMk/>
-          <pc:sldMk cId="4101372602" sldId="283"/>
-        </pc:sldMkLst>
-        <pc:spChg chg="add mod">
-          <ac:chgData name="Weifeng Xu" userId="e7aed605-a3dd-4d5a-a692-a87037af107b" providerId="ADAL" clId="{F99F8FFF-BA20-43EA-924B-4DF5D2A785F3}" dt="2025-09-16T12:54:36.189" v="235" actId="1076"/>
-          <ac:spMkLst>
-            <pc:docMk/>
-            <pc:sldMk cId="4101372602" sldId="283"/>
-            <ac:spMk id="3" creationId="{75BFF07C-81C0-9DB6-8CEC-EE0DC73496B7}"/>
-          </ac:spMkLst>
-        </pc:spChg>
-        <pc:picChg chg="add del mod">
-          <ac:chgData name="Weifeng Xu" userId="e7aed605-a3dd-4d5a-a692-a87037af107b" providerId="ADAL" clId="{F99F8FFF-BA20-43EA-924B-4DF5D2A785F3}" dt="2025-09-16T12:53:29.518" v="225" actId="478"/>
-          <ac:picMkLst>
-            <pc:docMk/>
-            <pc:sldMk cId="4101372602" sldId="283"/>
-            <ac:picMk id="1026" creationId="{36F41E31-A342-BE57-3A51-91BB7B893C69}"/>
-          </ac:picMkLst>
-        </pc:picChg>
-        <pc:picChg chg="add mod">
-          <ac:chgData name="Weifeng Xu" userId="e7aed605-a3dd-4d5a-a692-a87037af107b" providerId="ADAL" clId="{F99F8FFF-BA20-43EA-924B-4DF5D2A785F3}" dt="2025-09-16T12:54:10.955" v="230" actId="1076"/>
-          <ac:picMkLst>
-            <pc:docMk/>
-            <pc:sldMk cId="4101372602" sldId="283"/>
-            <ac:picMk id="1028" creationId="{977334E4-B9B3-4B33-4869-C0046387D5F7}"/>
-          </ac:picMkLst>
-        </pc:picChg>
-      </pc:sldChg>
-      <pc:sldChg chg="modSp mod">
-        <pc:chgData name="Weifeng Xu" userId="e7aed605-a3dd-4d5a-a692-a87037af107b" providerId="ADAL" clId="{F99F8FFF-BA20-43EA-924B-4DF5D2A785F3}" dt="2025-09-11T12:28:18.412" v="8" actId="6549"/>
-        <pc:sldMkLst>
-          <pc:docMk/>
-          <pc:sldMk cId="15140870" sldId="290"/>
-        </pc:sldMkLst>
-        <pc:spChg chg="mod">
-          <ac:chgData name="Weifeng Xu" userId="e7aed605-a3dd-4d5a-a692-a87037af107b" providerId="ADAL" clId="{F99F8FFF-BA20-43EA-924B-4DF5D2A785F3}" dt="2025-09-11T12:28:18.412" v="8" actId="6549"/>
-          <ac:spMkLst>
-            <pc:docMk/>
-            <pc:sldMk cId="15140870" sldId="290"/>
-            <ac:spMk id="2" creationId="{AFC1A7BA-7685-444F-857C-61C577903823}"/>
-          </ac:spMkLst>
-        </pc:spChg>
-      </pc:sldChg>
-      <pc:sldChg chg="modSp mod">
-        <pc:chgData name="Weifeng Xu" userId="e7aed605-a3dd-4d5a-a692-a87037af107b" providerId="ADAL" clId="{F99F8FFF-BA20-43EA-924B-4DF5D2A785F3}" dt="2025-09-11T12:58:02.407" v="108" actId="20577"/>
-        <pc:sldMkLst>
-          <pc:docMk/>
-          <pc:sldMk cId="3881227093" sldId="295"/>
-        </pc:sldMkLst>
-        <pc:spChg chg="mod">
-          <ac:chgData name="Weifeng Xu" userId="e7aed605-a3dd-4d5a-a692-a87037af107b" providerId="ADAL" clId="{F99F8FFF-BA20-43EA-924B-4DF5D2A785F3}" dt="2025-09-11T12:58:02.407" v="108" actId="20577"/>
-          <ac:spMkLst>
-            <pc:docMk/>
-            <pc:sldMk cId="3881227093" sldId="295"/>
-            <ac:spMk id="3" creationId="{8B5D58A0-6807-57BF-5D0C-8257C2AC5541}"/>
-          </ac:spMkLst>
-        </pc:spChg>
-      </pc:sldChg>
-      <pc:sldChg chg="modSp mod">
-        <pc:chgData name="Weifeng Xu" userId="e7aed605-a3dd-4d5a-a692-a87037af107b" providerId="ADAL" clId="{F99F8FFF-BA20-43EA-924B-4DF5D2A785F3}" dt="2025-09-11T13:09:36.031" v="145" actId="6549"/>
-        <pc:sldMkLst>
-          <pc:docMk/>
-          <pc:sldMk cId="2995281700" sldId="296"/>
-        </pc:sldMkLst>
-        <pc:spChg chg="mod">
-          <ac:chgData name="Weifeng Xu" userId="e7aed605-a3dd-4d5a-a692-a87037af107b" providerId="ADAL" clId="{F99F8FFF-BA20-43EA-924B-4DF5D2A785F3}" dt="2025-09-11T13:09:36.031" v="145" actId="6549"/>
-          <ac:spMkLst>
-            <pc:docMk/>
-            <pc:sldMk cId="2995281700" sldId="296"/>
-            <ac:spMk id="5" creationId="{0DB2AA35-282A-A3F8-3BCB-F97C196BF3E7}"/>
-          </ac:spMkLst>
-        </pc:spChg>
-      </pc:sldChg>
-    </pc:docChg>
-  </pc:docChgLst>
-  <pc:docChgLst>
-    <pc:chgData name="Weifeng Xu" userId="S::id31ga53@ubalt.edu::e7aed605-a3dd-4d5a-a692-a87037af107b" providerId="AD" clId="Web-{8CC6238D-296C-FCBB-A5FB-AB720724D325}"/>
-    <pc:docChg chg="modSld">
-      <pc:chgData name="Weifeng Xu" userId="S::id31ga53@ubalt.edu::e7aed605-a3dd-4d5a-a692-a87037af107b" providerId="AD" clId="Web-{8CC6238D-296C-FCBB-A5FB-AB720724D325}" dt="2025-02-03T14:33:12.927" v="3"/>
-      <pc:docMkLst>
-        <pc:docMk/>
-      </pc:docMkLst>
-      <pc:sldChg chg="addSp delSp">
-        <pc:chgData name="Weifeng Xu" userId="S::id31ga53@ubalt.edu::e7aed605-a3dd-4d5a-a692-a87037af107b" providerId="AD" clId="Web-{8CC6238D-296C-FCBB-A5FB-AB720724D325}" dt="2025-02-03T14:33:12.927" v="3"/>
+      <pc:sldChg chg="delSp mod">
+        <pc:chgData name="Weifeng Xu" userId="e7aed605-a3dd-4d5a-a692-a87037af107b" providerId="ADAL" clId="{F99F8FFF-BA20-43EA-924B-4DF5D2A785F3}" dt="2026-01-28T14:12:51.297" v="237" actId="478"/>
         <pc:sldMkLst>
           <pc:docMk/>
           <pc:sldMk cId="1421300646" sldId="257"/>
         </pc:sldMkLst>
+        <pc:inkChg chg="del">
+          <ac:chgData name="Weifeng Xu" userId="e7aed605-a3dd-4d5a-a692-a87037af107b" providerId="ADAL" clId="{F99F8FFF-BA20-43EA-924B-4DF5D2A785F3}" dt="2026-01-28T14:12:48.998" v="236" actId="478"/>
+          <ac:inkMkLst>
+            <pc:docMk/>
+            <pc:sldMk cId="1421300646" sldId="257"/>
+            <ac:inkMk id="3" creationId="{B3F33769-706E-3124-DA80-31BFC0B6FD52}"/>
+          </ac:inkMkLst>
+        </pc:inkChg>
+        <pc:inkChg chg="del">
+          <ac:chgData name="Weifeng Xu" userId="e7aed605-a3dd-4d5a-a692-a87037af107b" providerId="ADAL" clId="{F99F8FFF-BA20-43EA-924B-4DF5D2A785F3}" dt="2026-01-28T14:12:51.297" v="237" actId="478"/>
+          <ac:inkMkLst>
+            <pc:docMk/>
+            <pc:sldMk cId="1421300646" sldId="257"/>
+            <ac:inkMk id="6" creationId="{E0501239-EC97-6BD2-A7C2-0BFD7C370D20}"/>
+          </ac:inkMkLst>
+        </pc:inkChg>
       </pc:sldChg>
-    </pc:docChg>
-  </pc:docChgLst>
-  <pc:docChgLst>
-    <pc:chgData name="Weifeng Xu" userId="e7aed605-a3dd-4d5a-a692-a87037af107b" providerId="ADAL" clId="{A4CA56D5-47CB-484F-8DE2-B0FAB0B6CF57}"/>
-    <pc:docChg chg="undo custSel addSld delSld modSld sldOrd">
-      <pc:chgData name="Weifeng Xu" userId="e7aed605-a3dd-4d5a-a692-a87037af107b" providerId="ADAL" clId="{A4CA56D5-47CB-484F-8DE2-B0FAB0B6CF57}" dt="2021-08-22T19:34:40.420" v="2300" actId="20577"/>
-      <pc:docMkLst>
-        <pc:docMk/>
-      </pc:docMkLst>
       <pc:sldChg chg="modSp mod">
-        <pc:chgData name="Weifeng Xu" userId="e7aed605-a3dd-4d5a-a692-a87037af107b" providerId="ADAL" clId="{A4CA56D5-47CB-484F-8DE2-B0FAB0B6CF57}" dt="2021-08-10T21:20:32.860" v="73" actId="20577"/>
-        <pc:sldMkLst>
-          <pc:docMk/>
-          <pc:sldMk cId="1325061211" sldId="256"/>
-        </pc:sldMkLst>
-      </pc:sldChg>
-      <pc:sldChg chg="modSp mod ord">
-        <pc:chgData name="Weifeng Xu" userId="e7aed605-a3dd-4d5a-a692-a87037af107b" providerId="ADAL" clId="{A4CA56D5-47CB-484F-8DE2-B0FAB0B6CF57}" dt="2021-08-22T19:22:01.493" v="2293"/>
-        <pc:sldMkLst>
-          <pc:docMk/>
-          <pc:sldMk cId="3464803328" sldId="257"/>
-        </pc:sldMkLst>
-      </pc:sldChg>
-      <pc:sldChg chg="addSp delSp modSp new mod setBg modClrScheme chgLayout">
-        <pc:chgData name="Weifeng Xu" userId="e7aed605-a3dd-4d5a-a692-a87037af107b" providerId="ADAL" clId="{A4CA56D5-47CB-484F-8DE2-B0FAB0B6CF57}" dt="2021-08-22T19:23:04.768" v="2294" actId="1076"/>
-        <pc:sldMkLst>
-          <pc:docMk/>
-          <pc:sldMk cId="4010385979" sldId="259"/>
-        </pc:sldMkLst>
-      </pc:sldChg>
-      <pc:sldChg chg="new del">
-        <pc:chgData name="Weifeng Xu" userId="e7aed605-a3dd-4d5a-a692-a87037af107b" providerId="ADAL" clId="{A4CA56D5-47CB-484F-8DE2-B0FAB0B6CF57}" dt="2021-08-10T21:42:26.415" v="182" actId="47"/>
-        <pc:sldMkLst>
-          <pc:docMk/>
-          <pc:sldMk cId="1129541375" sldId="260"/>
-        </pc:sldMkLst>
-      </pc:sldChg>
-      <pc:sldChg chg="addSp delSp modSp add mod ord modClrScheme chgLayout">
-        <pc:chgData name="Weifeng Xu" userId="e7aed605-a3dd-4d5a-a692-a87037af107b" providerId="ADAL" clId="{A4CA56D5-47CB-484F-8DE2-B0FAB0B6CF57}" dt="2021-08-21T15:07:08.260" v="1781" actId="1076"/>
-        <pc:sldMkLst>
-          <pc:docMk/>
-          <pc:sldMk cId="1663533553" sldId="418"/>
-        </pc:sldMkLst>
-      </pc:sldChg>
-      <pc:sldChg chg="delSp modSp add mod">
-        <pc:chgData name="Weifeng Xu" userId="e7aed605-a3dd-4d5a-a692-a87037af107b" providerId="ADAL" clId="{A4CA56D5-47CB-484F-8DE2-B0FAB0B6CF57}" dt="2021-08-10T21:48:43.040" v="253" actId="6549"/>
-        <pc:sldMkLst>
-          <pc:docMk/>
-          <pc:sldMk cId="1167073923" sldId="419"/>
-        </pc:sldMkLst>
-      </pc:sldChg>
-      <pc:sldChg chg="modSp add mod">
-        <pc:chgData name="Weifeng Xu" userId="e7aed605-a3dd-4d5a-a692-a87037af107b" providerId="ADAL" clId="{A4CA56D5-47CB-484F-8DE2-B0FAB0B6CF57}" dt="2021-08-11T00:21:46.582" v="265" actId="12"/>
-        <pc:sldMkLst>
-          <pc:docMk/>
-          <pc:sldMk cId="964867491" sldId="420"/>
-        </pc:sldMkLst>
-      </pc:sldChg>
-      <pc:sldChg chg="add">
-        <pc:chgData name="Weifeng Xu" userId="e7aed605-a3dd-4d5a-a692-a87037af107b" providerId="ADAL" clId="{A4CA56D5-47CB-484F-8DE2-B0FAB0B6CF57}" dt="2021-08-10T21:42:24.194" v="181"/>
-        <pc:sldMkLst>
-          <pc:docMk/>
-          <pc:sldMk cId="1428006167" sldId="421"/>
-        </pc:sldMkLst>
-      </pc:sldChg>
-      <pc:sldChg chg="delSp modSp add mod">
-        <pc:chgData name="Weifeng Xu" userId="e7aed605-a3dd-4d5a-a692-a87037af107b" providerId="ADAL" clId="{A4CA56D5-47CB-484F-8DE2-B0FAB0B6CF57}" dt="2021-08-11T01:22:29.006" v="673" actId="1076"/>
-        <pc:sldMkLst>
-          <pc:docMk/>
-          <pc:sldMk cId="593528442" sldId="423"/>
-        </pc:sldMkLst>
-      </pc:sldChg>
-      <pc:sldChg chg="delSp modSp add mod ord">
-        <pc:chgData name="Weifeng Xu" userId="e7aed605-a3dd-4d5a-a692-a87037af107b" providerId="ADAL" clId="{A4CA56D5-47CB-484F-8DE2-B0FAB0B6CF57}" dt="2021-08-11T00:23:57.337" v="275" actId="20577"/>
-        <pc:sldMkLst>
-          <pc:docMk/>
-          <pc:sldMk cId="1429759575" sldId="427"/>
-        </pc:sldMkLst>
-      </pc:sldChg>
-      <pc:sldChg chg="addSp delSp modSp new mod modClrScheme chgLayout">
-        <pc:chgData name="Weifeng Xu" userId="e7aed605-a3dd-4d5a-a692-a87037af107b" providerId="ADAL" clId="{A4CA56D5-47CB-484F-8DE2-B0FAB0B6CF57}" dt="2021-08-22T14:22:59.325" v="1822" actId="700"/>
-        <pc:sldMkLst>
-          <pc:docMk/>
-          <pc:sldMk cId="1159618598" sldId="428"/>
-        </pc:sldMkLst>
-      </pc:sldChg>
-      <pc:sldChg chg="addSp delSp modSp new mod modClrScheme chgLayout">
-        <pc:chgData name="Weifeng Xu" userId="e7aed605-a3dd-4d5a-a692-a87037af107b" providerId="ADAL" clId="{A4CA56D5-47CB-484F-8DE2-B0FAB0B6CF57}" dt="2021-08-21T15:12:29.378" v="1783" actId="208"/>
-        <pc:sldMkLst>
-          <pc:docMk/>
-          <pc:sldMk cId="1861126999" sldId="429"/>
-        </pc:sldMkLst>
-      </pc:sldChg>
-      <pc:sldChg chg="addSp modSp new mod ord">
-        <pc:chgData name="Weifeng Xu" userId="e7aed605-a3dd-4d5a-a692-a87037af107b" providerId="ADAL" clId="{A4CA56D5-47CB-484F-8DE2-B0FAB0B6CF57}" dt="2021-08-21T18:49:24.978" v="1785"/>
-        <pc:sldMkLst>
-          <pc:docMk/>
-          <pc:sldMk cId="2182210702" sldId="430"/>
-        </pc:sldMkLst>
-      </pc:sldChg>
-      <pc:sldChg chg="addSp modSp new mod modNotesTx">
-        <pc:chgData name="Weifeng Xu" userId="e7aed605-a3dd-4d5a-a692-a87037af107b" providerId="ADAL" clId="{A4CA56D5-47CB-484F-8DE2-B0FAB0B6CF57}" dt="2021-08-22T14:59:15.006" v="1939" actId="20577"/>
-        <pc:sldMkLst>
-          <pc:docMk/>
-          <pc:sldMk cId="3967940993" sldId="431"/>
-        </pc:sldMkLst>
-      </pc:sldChg>
-      <pc:sldChg chg="addSp modSp new mod">
-        <pc:chgData name="Weifeng Xu" userId="e7aed605-a3dd-4d5a-a692-a87037af107b" providerId="ADAL" clId="{A4CA56D5-47CB-484F-8DE2-B0FAB0B6CF57}" dt="2021-08-11T01:10:59.711" v="617" actId="20577"/>
-        <pc:sldMkLst>
-          <pc:docMk/>
-          <pc:sldMk cId="730846325" sldId="432"/>
-        </pc:sldMkLst>
-      </pc:sldChg>
-      <pc:sldChg chg="addSp modSp add mod">
-        <pc:chgData name="Weifeng Xu" userId="e7aed605-a3dd-4d5a-a692-a87037af107b" providerId="ADAL" clId="{A4CA56D5-47CB-484F-8DE2-B0FAB0B6CF57}" dt="2021-08-22T15:36:38.957" v="2063" actId="1076"/>
-        <pc:sldMkLst>
-          <pc:docMk/>
-          <pc:sldMk cId="1187390596" sldId="433"/>
-        </pc:sldMkLst>
-      </pc:sldChg>
-      <pc:sldChg chg="addSp modSp add mod">
-        <pc:chgData name="Weifeng Xu" userId="e7aed605-a3dd-4d5a-a692-a87037af107b" providerId="ADAL" clId="{A4CA56D5-47CB-484F-8DE2-B0FAB0B6CF57}" dt="2021-08-22T15:36:58.416" v="2075" actId="14100"/>
-        <pc:sldMkLst>
-          <pc:docMk/>
-          <pc:sldMk cId="189084197" sldId="438"/>
-        </pc:sldMkLst>
-      </pc:sldChg>
-      <pc:sldChg chg="add del">
-        <pc:chgData name="Weifeng Xu" userId="e7aed605-a3dd-4d5a-a692-a87037af107b" providerId="ADAL" clId="{A4CA56D5-47CB-484F-8DE2-B0FAB0B6CF57}" dt="2021-08-11T01:12:25.052" v="619" actId="47"/>
-        <pc:sldMkLst>
-          <pc:docMk/>
-          <pc:sldMk cId="2339261532" sldId="440"/>
-        </pc:sldMkLst>
-      </pc:sldChg>
-      <pc:sldChg chg="add del">
-        <pc:chgData name="Weifeng Xu" userId="e7aed605-a3dd-4d5a-a692-a87037af107b" providerId="ADAL" clId="{A4CA56D5-47CB-484F-8DE2-B0FAB0B6CF57}" dt="2021-08-11T01:10:45.404" v="616"/>
-        <pc:sldMkLst>
-          <pc:docMk/>
-          <pc:sldMk cId="2445928380" sldId="441"/>
-        </pc:sldMkLst>
-      </pc:sldChg>
-      <pc:sldChg chg="modSp add mod">
-        <pc:chgData name="Weifeng Xu" userId="e7aed605-a3dd-4d5a-a692-a87037af107b" providerId="ADAL" clId="{A4CA56D5-47CB-484F-8DE2-B0FAB0B6CF57}" dt="2021-08-11T01:12:03.020" v="618" actId="6549"/>
-        <pc:sldMkLst>
-          <pc:docMk/>
-          <pc:sldMk cId="3293749384" sldId="444"/>
-        </pc:sldMkLst>
-      </pc:sldChg>
-      <pc:sldChg chg="delSp modSp add mod">
-        <pc:chgData name="Weifeng Xu" userId="e7aed605-a3dd-4d5a-a692-a87037af107b" providerId="ADAL" clId="{A4CA56D5-47CB-484F-8DE2-B0FAB0B6CF57}" dt="2021-08-21T18:54:21.820" v="1786" actId="14100"/>
-        <pc:sldMkLst>
-          <pc:docMk/>
-          <pc:sldMk cId="3984724258" sldId="447"/>
-        </pc:sldMkLst>
-      </pc:sldChg>
-      <pc:sldChg chg="addSp delSp modSp new mod modClrScheme chgLayout">
-        <pc:chgData name="Weifeng Xu" userId="e7aed605-a3dd-4d5a-a692-a87037af107b" providerId="ADAL" clId="{A4CA56D5-47CB-484F-8DE2-B0FAB0B6CF57}" dt="2021-08-11T01:16:55.569" v="644" actId="20577"/>
-        <pc:sldMkLst>
-          <pc:docMk/>
-          <pc:sldMk cId="3457596351" sldId="448"/>
-        </pc:sldMkLst>
-      </pc:sldChg>
-      <pc:sldChg chg="addSp delSp modSp new mod modClrScheme chgLayout">
-        <pc:chgData name="Weifeng Xu" userId="e7aed605-a3dd-4d5a-a692-a87037af107b" providerId="ADAL" clId="{A4CA56D5-47CB-484F-8DE2-B0FAB0B6CF57}" dt="2021-08-11T01:18:12.542" v="665" actId="20577"/>
-        <pc:sldMkLst>
-          <pc:docMk/>
-          <pc:sldMk cId="1351668847" sldId="449"/>
-        </pc:sldMkLst>
-      </pc:sldChg>
-      <pc:sldChg chg="addSp modSp new mod modClrScheme chgLayout">
-        <pc:chgData name="Weifeng Xu" userId="e7aed605-a3dd-4d5a-a692-a87037af107b" providerId="ADAL" clId="{A4CA56D5-47CB-484F-8DE2-B0FAB0B6CF57}" dt="2021-08-11T01:20:53.011" v="669" actId="20577"/>
-        <pc:sldMkLst>
-          <pc:docMk/>
-          <pc:sldMk cId="56855467" sldId="450"/>
-        </pc:sldMkLst>
-      </pc:sldChg>
-      <pc:sldChg chg="delSp add mod">
-        <pc:chgData name="Weifeng Xu" userId="e7aed605-a3dd-4d5a-a692-a87037af107b" providerId="ADAL" clId="{A4CA56D5-47CB-484F-8DE2-B0FAB0B6CF57}" dt="2021-08-11T01:22:12.457" v="672" actId="478"/>
-        <pc:sldMkLst>
-          <pc:docMk/>
-          <pc:sldMk cId="1939852994" sldId="451"/>
-        </pc:sldMkLst>
-      </pc:sldChg>
-      <pc:sldChg chg="addSp delSp modSp new mod ord modClrScheme chgLayout">
-        <pc:chgData name="Weifeng Xu" userId="e7aed605-a3dd-4d5a-a692-a87037af107b" providerId="ADAL" clId="{A4CA56D5-47CB-484F-8DE2-B0FAB0B6CF57}" dt="2021-08-21T14:10:25.437" v="741"/>
-        <pc:sldMkLst>
-          <pc:docMk/>
-          <pc:sldMk cId="1947422297" sldId="452"/>
-        </pc:sldMkLst>
-      </pc:sldChg>
-      <pc:sldChg chg="addSp delSp modSp new mod ord modClrScheme chgLayout">
-        <pc:chgData name="Weifeng Xu" userId="e7aed605-a3dd-4d5a-a692-a87037af107b" providerId="ADAL" clId="{A4CA56D5-47CB-484F-8DE2-B0FAB0B6CF57}" dt="2021-08-21T14:36:11.881" v="1086"/>
-        <pc:sldMkLst>
-          <pc:docMk/>
-          <pc:sldMk cId="3041551094" sldId="453"/>
-        </pc:sldMkLst>
-      </pc:sldChg>
-      <pc:sldChg chg="addSp delSp modSp new mod modClrScheme chgLayout">
-        <pc:chgData name="Weifeng Xu" userId="e7aed605-a3dd-4d5a-a692-a87037af107b" providerId="ADAL" clId="{A4CA56D5-47CB-484F-8DE2-B0FAB0B6CF57}" dt="2021-08-21T14:35:03.490" v="1082" actId="20577"/>
-        <pc:sldMkLst>
-          <pc:docMk/>
-          <pc:sldMk cId="3669683899" sldId="454"/>
-        </pc:sldMkLst>
-      </pc:sldChg>
-      <pc:sldChg chg="addSp modSp new mod ord modClrScheme chgLayout">
-        <pc:chgData name="Weifeng Xu" userId="e7aed605-a3dd-4d5a-a692-a87037af107b" providerId="ADAL" clId="{A4CA56D5-47CB-484F-8DE2-B0FAB0B6CF57}" dt="2021-08-22T19:34:40.420" v="2300" actId="20577"/>
-        <pc:sldMkLst>
-          <pc:docMk/>
-          <pc:sldMk cId="524028341" sldId="455"/>
-        </pc:sldMkLst>
-      </pc:sldChg>
-      <pc:sldChg chg="addSp modSp new mod ord">
-        <pc:chgData name="Weifeng Xu" userId="e7aed605-a3dd-4d5a-a692-a87037af107b" providerId="ADAL" clId="{A4CA56D5-47CB-484F-8DE2-B0FAB0B6CF57}" dt="2021-08-22T14:22:32.895" v="1820" actId="1440"/>
-        <pc:sldMkLst>
-          <pc:docMk/>
-          <pc:sldMk cId="1611306107" sldId="456"/>
-        </pc:sldMkLst>
-      </pc:sldChg>
-      <pc:sldChg chg="new del">
-        <pc:chgData name="Weifeng Xu" userId="e7aed605-a3dd-4d5a-a692-a87037af107b" providerId="ADAL" clId="{A4CA56D5-47CB-484F-8DE2-B0FAB0B6CF57}" dt="2021-08-22T14:26:31.667" v="1871" actId="47"/>
-        <pc:sldMkLst>
-          <pc:docMk/>
-          <pc:sldMk cId="3407403307" sldId="457"/>
-        </pc:sldMkLst>
-      </pc:sldChg>
-      <pc:sldChg chg="addSp delSp modSp new mod modClrScheme chgLayout">
-        <pc:chgData name="Weifeng Xu" userId="e7aed605-a3dd-4d5a-a692-a87037af107b" providerId="ADAL" clId="{A4CA56D5-47CB-484F-8DE2-B0FAB0B6CF57}" dt="2021-08-22T14:26:16.760" v="1870" actId="1440"/>
-        <pc:sldMkLst>
-          <pc:docMk/>
-          <pc:sldMk cId="588258724" sldId="458"/>
-        </pc:sldMkLst>
-      </pc:sldChg>
-      <pc:sldChg chg="addSp modSp new mod">
-        <pc:chgData name="Weifeng Xu" userId="e7aed605-a3dd-4d5a-a692-a87037af107b" providerId="ADAL" clId="{A4CA56D5-47CB-484F-8DE2-B0FAB0B6CF57}" dt="2021-08-22T14:53:21.752" v="1914" actId="6549"/>
-        <pc:sldMkLst>
-          <pc:docMk/>
-          <pc:sldMk cId="2564593808" sldId="459"/>
-        </pc:sldMkLst>
-      </pc:sldChg>
-      <pc:sldChg chg="addSp modSp new mod modClrScheme chgLayout modNotesTx">
-        <pc:chgData name="Weifeng Xu" userId="e7aed605-a3dd-4d5a-a692-a87037af107b" providerId="ADAL" clId="{A4CA56D5-47CB-484F-8DE2-B0FAB0B6CF57}" dt="2021-08-22T15:44:37.431" v="2291" actId="20577"/>
-        <pc:sldMkLst>
-          <pc:docMk/>
-          <pc:sldMk cId="4044252772" sldId="460"/>
-        </pc:sldMkLst>
-      </pc:sldChg>
-      <pc:sldChg chg="addSp modSp new del mod modClrScheme chgLayout">
-        <pc:chgData name="Weifeng Xu" userId="e7aed605-a3dd-4d5a-a692-a87037af107b" providerId="ADAL" clId="{A4CA56D5-47CB-484F-8DE2-B0FAB0B6CF57}" dt="2021-08-22T15:31:52.499" v="2027" actId="47"/>
-        <pc:sldMkLst>
-          <pc:docMk/>
-          <pc:sldMk cId="3221681910" sldId="461"/>
-        </pc:sldMkLst>
-      </pc:sldChg>
-      <pc:sldChg chg="addSp modSp new mod">
-        <pc:chgData name="Weifeng Xu" userId="e7aed605-a3dd-4d5a-a692-a87037af107b" providerId="ADAL" clId="{A4CA56D5-47CB-484F-8DE2-B0FAB0B6CF57}" dt="2021-08-22T15:37:21.286" v="2123" actId="20577"/>
-        <pc:sldMkLst>
-          <pc:docMk/>
-          <pc:sldMk cId="3630229365" sldId="461"/>
-        </pc:sldMkLst>
-      </pc:sldChg>
-      <pc:sldChg chg="addSp delSp modSp new mod">
-        <pc:chgData name="Weifeng Xu" userId="e7aed605-a3dd-4d5a-a692-a87037af107b" providerId="ADAL" clId="{A4CA56D5-47CB-484F-8DE2-B0FAB0B6CF57}" dt="2021-08-22T15:42:40.956" v="2210" actId="1076"/>
-        <pc:sldMkLst>
-          <pc:docMk/>
-          <pc:sldMk cId="2559588248" sldId="462"/>
-        </pc:sldMkLst>
-      </pc:sldChg>
-    </pc:docChg>
-  </pc:docChgLst>
-  <pc:docChgLst>
-    <pc:chgData name="Weifeng Xu" userId="e7aed605-a3dd-4d5a-a692-a87037af107b" providerId="ADAL" clId="{BC6292C7-23F4-4ED4-A77E-013F6C63BF9B}"/>
-    <pc:docChg chg="undo custSel addSld delSld modSld sldOrd">
-      <pc:chgData name="Weifeng Xu" userId="e7aed605-a3dd-4d5a-a692-a87037af107b" providerId="ADAL" clId="{BC6292C7-23F4-4ED4-A77E-013F6C63BF9B}" dt="2025-01-22T20:23:04.756" v="4464" actId="207"/>
-      <pc:docMkLst>
-        <pc:docMk/>
-      </pc:docMkLst>
-      <pc:sldChg chg="modSp mod">
-        <pc:chgData name="Weifeng Xu" userId="e7aed605-a3dd-4d5a-a692-a87037af107b" providerId="ADAL" clId="{BC6292C7-23F4-4ED4-A77E-013F6C63BF9B}" dt="2024-01-25T21:46:15.056" v="4353" actId="20577"/>
-        <pc:sldMkLst>
-          <pc:docMk/>
-          <pc:sldMk cId="1325061211" sldId="256"/>
-        </pc:sldMkLst>
-      </pc:sldChg>
-      <pc:sldChg chg="addSp delSp modSp new mod setBg modClrScheme delDesignElem chgLayout">
-        <pc:chgData name="Weifeng Xu" userId="e7aed605-a3dd-4d5a-a692-a87037af107b" providerId="ADAL" clId="{BC6292C7-23F4-4ED4-A77E-013F6C63BF9B}" dt="2023-01-29T20:05:35.290" v="2986" actId="1076"/>
-        <pc:sldMkLst>
-          <pc:docMk/>
-          <pc:sldMk cId="1421300646" sldId="257"/>
-        </pc:sldMkLst>
-      </pc:sldChg>
-      <pc:sldChg chg="del">
-        <pc:chgData name="Weifeng Xu" userId="e7aed605-a3dd-4d5a-a692-a87037af107b" providerId="ADAL" clId="{BC6292C7-23F4-4ED4-A77E-013F6C63BF9B}" dt="2021-08-26T13:19:53.377" v="15" actId="47"/>
-        <pc:sldMkLst>
-          <pc:docMk/>
-          <pc:sldMk cId="3464803328" sldId="257"/>
-        </pc:sldMkLst>
-      </pc:sldChg>
-      <pc:sldChg chg="del">
-        <pc:chgData name="Weifeng Xu" userId="e7aed605-a3dd-4d5a-a692-a87037af107b" providerId="ADAL" clId="{BC6292C7-23F4-4ED4-A77E-013F6C63BF9B}" dt="2021-08-26T13:19:53.866" v="18" actId="47"/>
-        <pc:sldMkLst>
-          <pc:docMk/>
-          <pc:sldMk cId="1820053488" sldId="258"/>
-        </pc:sldMkLst>
-      </pc:sldChg>
-      <pc:sldChg chg="addSp delSp modSp new mod">
-        <pc:chgData name="Weifeng Xu" userId="e7aed605-a3dd-4d5a-a692-a87037af107b" providerId="ADAL" clId="{BC6292C7-23F4-4ED4-A77E-013F6C63BF9B}" dt="2024-01-25T23:40:54.505" v="4370" actId="14100"/>
-        <pc:sldMkLst>
-          <pc:docMk/>
-          <pc:sldMk cId="2870090564" sldId="258"/>
-        </pc:sldMkLst>
-      </pc:sldChg>
-      <pc:sldChg chg="addSp delSp modSp new mod ord">
-        <pc:chgData name="Weifeng Xu" userId="e7aed605-a3dd-4d5a-a692-a87037af107b" providerId="ADAL" clId="{BC6292C7-23F4-4ED4-A77E-013F6C63BF9B}" dt="2023-01-30T13:51:01.549" v="3605" actId="20577"/>
-        <pc:sldMkLst>
-          <pc:docMk/>
-          <pc:sldMk cId="3593987998" sldId="259"/>
-        </pc:sldMkLst>
-      </pc:sldChg>
-      <pc:sldChg chg="del">
-        <pc:chgData name="Weifeng Xu" userId="e7aed605-a3dd-4d5a-a692-a87037af107b" providerId="ADAL" clId="{BC6292C7-23F4-4ED4-A77E-013F6C63BF9B}" dt="2021-08-26T13:19:53.698" v="17" actId="47"/>
-        <pc:sldMkLst>
-          <pc:docMk/>
-          <pc:sldMk cId="4010385979" sldId="259"/>
-        </pc:sldMkLst>
-      </pc:sldChg>
-      <pc:sldChg chg="addSp delSp modSp new mod">
-        <pc:chgData name="Weifeng Xu" userId="e7aed605-a3dd-4d5a-a692-a87037af107b" providerId="ADAL" clId="{BC6292C7-23F4-4ED4-A77E-013F6C63BF9B}" dt="2022-01-31T13:26:16.723" v="1303" actId="9405"/>
-        <pc:sldMkLst>
-          <pc:docMk/>
-          <pc:sldMk cId="3796464813" sldId="260"/>
-        </pc:sldMkLst>
-      </pc:sldChg>
-      <pc:sldChg chg="addSp delSp modSp new mod modClrScheme chgLayout modNotesTx">
-        <pc:chgData name="Weifeng Xu" userId="e7aed605-a3dd-4d5a-a692-a87037af107b" providerId="ADAL" clId="{BC6292C7-23F4-4ED4-A77E-013F6C63BF9B}" dt="2023-01-29T13:57:59.028" v="2135" actId="14100"/>
-        <pc:sldMkLst>
-          <pc:docMk/>
-          <pc:sldMk cId="40448527" sldId="261"/>
-        </pc:sldMkLst>
-      </pc:sldChg>
-      <pc:sldChg chg="addSp delSp modSp new mod ord modClrScheme chgLayout modNotesTx">
-        <pc:chgData name="Weifeng Xu" userId="e7aed605-a3dd-4d5a-a692-a87037af107b" providerId="ADAL" clId="{BC6292C7-23F4-4ED4-A77E-013F6C63BF9B}" dt="2024-05-12T14:08:45.991" v="4382" actId="1076"/>
-        <pc:sldMkLst>
-          <pc:docMk/>
-          <pc:sldMk cId="1777162073" sldId="262"/>
-        </pc:sldMkLst>
-      </pc:sldChg>
-      <pc:sldChg chg="addSp delSp modSp new mod modAnim modNotesTx">
-        <pc:chgData name="Weifeng Xu" userId="e7aed605-a3dd-4d5a-a692-a87037af107b" providerId="ADAL" clId="{BC6292C7-23F4-4ED4-A77E-013F6C63BF9B}" dt="2023-01-29T15:36:23.476" v="2603" actId="478"/>
-        <pc:sldMkLst>
-          <pc:docMk/>
-          <pc:sldMk cId="1561560363" sldId="263"/>
-        </pc:sldMkLst>
-      </pc:sldChg>
-      <pc:sldChg chg="addSp delSp modSp new mod modAnim modNotesTx">
-        <pc:chgData name="Weifeng Xu" userId="e7aed605-a3dd-4d5a-a692-a87037af107b" providerId="ADAL" clId="{BC6292C7-23F4-4ED4-A77E-013F6C63BF9B}" dt="2023-01-29T15:37:38.579" v="2614" actId="478"/>
+        <pc:chgData name="Weifeng Xu" userId="e7aed605-a3dd-4d5a-a692-a87037af107b" providerId="ADAL" clId="{F99F8FFF-BA20-43EA-924B-4DF5D2A785F3}" dt="2026-01-28T14:30:44.260" v="274" actId="20577"/>
         <pc:sldMkLst>
           <pc:docMk/>
           <pc:sldMk cId="177740071" sldId="264"/>
         </pc:sldMkLst>
+        <pc:spChg chg="mod">
+          <ac:chgData name="Weifeng Xu" userId="e7aed605-a3dd-4d5a-a692-a87037af107b" providerId="ADAL" clId="{F99F8FFF-BA20-43EA-924B-4DF5D2A785F3}" dt="2026-01-28T14:30:44.260" v="274" actId="20577"/>
+          <ac:spMkLst>
+            <pc:docMk/>
+            <pc:sldMk cId="177740071" sldId="264"/>
+            <ac:spMk id="23" creationId="{B1D51253-22FB-4DF1-91DF-9BE3FBAA196A}"/>
+          </ac:spMkLst>
+        </pc:spChg>
       </pc:sldChg>
-      <pc:sldChg chg="addSp delSp modSp new mod">
-        <pc:chgData name="Weifeng Xu" userId="e7aed605-a3dd-4d5a-a692-a87037af107b" providerId="ADAL" clId="{BC6292C7-23F4-4ED4-A77E-013F6C63BF9B}" dt="2022-08-29T12:18:57.575" v="1773" actId="20577"/>
-        <pc:sldMkLst>
-          <pc:docMk/>
-          <pc:sldMk cId="3062979800" sldId="265"/>
-        </pc:sldMkLst>
-      </pc:sldChg>
-      <pc:sldChg chg="addSp delSp modSp new mod ord">
-        <pc:chgData name="Weifeng Xu" userId="e7aed605-a3dd-4d5a-a692-a87037af107b" providerId="ADAL" clId="{BC6292C7-23F4-4ED4-A77E-013F6C63BF9B}" dt="2023-01-30T14:01:07.815" v="3651"/>
-        <pc:sldMkLst>
-          <pc:docMk/>
-          <pc:sldMk cId="3778345459" sldId="266"/>
-        </pc:sldMkLst>
-      </pc:sldChg>
-      <pc:sldChg chg="addSp delSp modSp new mod ord modClrScheme modAnim chgLayout">
-        <pc:chgData name="Weifeng Xu" userId="e7aed605-a3dd-4d5a-a692-a87037af107b" providerId="ADAL" clId="{BC6292C7-23F4-4ED4-A77E-013F6C63BF9B}" dt="2023-01-29T20:02:23.969" v="2950"/>
-        <pc:sldMkLst>
-          <pc:docMk/>
-          <pc:sldMk cId="2982506860" sldId="267"/>
-        </pc:sldMkLst>
-      </pc:sldChg>
-      <pc:sldChg chg="addSp modSp new mod">
-        <pc:chgData name="Weifeng Xu" userId="e7aed605-a3dd-4d5a-a692-a87037af107b" providerId="ADAL" clId="{BC6292C7-23F4-4ED4-A77E-013F6C63BF9B}" dt="2023-01-30T14:09:56.497" v="3673" actId="6549"/>
-        <pc:sldMkLst>
-          <pc:docMk/>
-          <pc:sldMk cId="2607550473" sldId="268"/>
-        </pc:sldMkLst>
-      </pc:sldChg>
-      <pc:sldChg chg="modSp new mod ord">
-        <pc:chgData name="Weifeng Xu" userId="e7aed605-a3dd-4d5a-a692-a87037af107b" providerId="ADAL" clId="{BC6292C7-23F4-4ED4-A77E-013F6C63BF9B}" dt="2025-01-22T20:23:04.756" v="4464" actId="207"/>
-        <pc:sldMkLst>
-          <pc:docMk/>
-          <pc:sldMk cId="555243388" sldId="269"/>
-        </pc:sldMkLst>
-      </pc:sldChg>
-      <pc:sldChg chg="addSp delSp modSp new mod ord setBg modClrScheme chgLayout modNotesTx">
-        <pc:chgData name="Weifeng Xu" userId="e7aed605-a3dd-4d5a-a692-a87037af107b" providerId="ADAL" clId="{BC6292C7-23F4-4ED4-A77E-013F6C63BF9B}" dt="2025-01-22T19:46:39.119" v="4463" actId="478"/>
-        <pc:sldMkLst>
-          <pc:docMk/>
-          <pc:sldMk cId="1734535167" sldId="270"/>
-        </pc:sldMkLst>
-      </pc:sldChg>
-      <pc:sldChg chg="addSp delSp modSp new mod modClrScheme chgLayout">
-        <pc:chgData name="Weifeng Xu" userId="e7aed605-a3dd-4d5a-a692-a87037af107b" providerId="ADAL" clId="{BC6292C7-23F4-4ED4-A77E-013F6C63BF9B}" dt="2021-12-21T00:26:53.513" v="1054" actId="1076"/>
-        <pc:sldMkLst>
-          <pc:docMk/>
-          <pc:sldMk cId="4218427973" sldId="271"/>
-        </pc:sldMkLst>
-      </pc:sldChg>
-      <pc:sldChg chg="addSp delSp modSp new mod modClrScheme chgLayout modNotesTx">
-        <pc:chgData name="Weifeng Xu" userId="e7aed605-a3dd-4d5a-a692-a87037af107b" providerId="ADAL" clId="{BC6292C7-23F4-4ED4-A77E-013F6C63BF9B}" dt="2025-01-22T15:32:28.165" v="4445" actId="478"/>
+      <pc:sldChg chg="addSp modSp mod">
+        <pc:chgData name="Weifeng Xu" userId="e7aed605-a3dd-4d5a-a692-a87037af107b" providerId="ADAL" clId="{F99F8FFF-BA20-43EA-924B-4DF5D2A785F3}" dt="2026-01-28T16:14:27.061" v="286" actId="113"/>
         <pc:sldMkLst>
           <pc:docMk/>
           <pc:sldMk cId="1324712681" sldId="272"/>
         </pc:sldMkLst>
+        <pc:spChg chg="add mod">
+          <ac:chgData name="Weifeng Xu" userId="e7aed605-a3dd-4d5a-a692-a87037af107b" providerId="ADAL" clId="{F99F8FFF-BA20-43EA-924B-4DF5D2A785F3}" dt="2026-01-28T16:14:27.061" v="286" actId="113"/>
+          <ac:spMkLst>
+            <pc:docMk/>
+            <pc:sldMk cId="1324712681" sldId="272"/>
+            <ac:spMk id="9" creationId="{85923769-CCA6-6567-6A63-C40FCB5E3E31}"/>
+          </ac:spMkLst>
+        </pc:spChg>
       </pc:sldChg>
-      <pc:sldChg chg="addSp modSp new mod ord">
-        <pc:chgData name="Weifeng Xu" userId="e7aed605-a3dd-4d5a-a692-a87037af107b" providerId="ADAL" clId="{BC6292C7-23F4-4ED4-A77E-013F6C63BF9B}" dt="2022-08-29T12:17:57.976" v="1763"/>
-        <pc:sldMkLst>
-          <pc:docMk/>
-          <pc:sldMk cId="1515556541" sldId="273"/>
-        </pc:sldMkLst>
-      </pc:sldChg>
-      <pc:sldChg chg="addSp delSp modSp new mod modClrScheme chgLayout">
-        <pc:chgData name="Weifeng Xu" userId="e7aed605-a3dd-4d5a-a692-a87037af107b" providerId="ADAL" clId="{BC6292C7-23F4-4ED4-A77E-013F6C63BF9B}" dt="2024-01-25T23:39:16.669" v="4368" actId="20577"/>
-        <pc:sldMkLst>
-          <pc:docMk/>
-          <pc:sldMk cId="2476286752" sldId="274"/>
-        </pc:sldMkLst>
-      </pc:sldChg>
-      <pc:sldChg chg="addSp delSp modSp new mod modClrScheme chgLayout modNotesTx">
-        <pc:chgData name="Weifeng Xu" userId="e7aed605-a3dd-4d5a-a692-a87037af107b" providerId="ADAL" clId="{BC6292C7-23F4-4ED4-A77E-013F6C63BF9B}" dt="2025-01-22T19:42:10.882" v="4461" actId="1076"/>
-        <pc:sldMkLst>
-          <pc:docMk/>
-          <pc:sldMk cId="3972243169" sldId="275"/>
-        </pc:sldMkLst>
-      </pc:sldChg>
-      <pc:sldChg chg="modSp new mod modNotesTx">
-        <pc:chgData name="Weifeng Xu" userId="e7aed605-a3dd-4d5a-a692-a87037af107b" providerId="ADAL" clId="{BC6292C7-23F4-4ED4-A77E-013F6C63BF9B}" dt="2023-02-06T23:21:33.253" v="3883" actId="20577"/>
-        <pc:sldMkLst>
-          <pc:docMk/>
-          <pc:sldMk cId="930520840" sldId="276"/>
-        </pc:sldMkLst>
-      </pc:sldChg>
-      <pc:sldChg chg="modSp new del mod">
-        <pc:chgData name="Weifeng Xu" userId="e7aed605-a3dd-4d5a-a692-a87037af107b" providerId="ADAL" clId="{BC6292C7-23F4-4ED4-A77E-013F6C63BF9B}" dt="2022-01-31T16:27:37.460" v="1475" actId="47"/>
-        <pc:sldMkLst>
-          <pc:docMk/>
-          <pc:sldMk cId="3290993918" sldId="276"/>
-        </pc:sldMkLst>
-      </pc:sldChg>
-      <pc:sldChg chg="addSp delSp modSp new mod ord setBg">
-        <pc:chgData name="Weifeng Xu" userId="e7aed605-a3dd-4d5a-a692-a87037af107b" providerId="ADAL" clId="{BC6292C7-23F4-4ED4-A77E-013F6C63BF9B}" dt="2025-01-22T16:15:59.145" v="4447"/>
-        <pc:sldMkLst>
-          <pc:docMk/>
-          <pc:sldMk cId="1320463007" sldId="277"/>
-        </pc:sldMkLst>
-      </pc:sldChg>
-      <pc:sldChg chg="addSp delSp modSp add mod modNotesTx">
-        <pc:chgData name="Weifeng Xu" userId="e7aed605-a3dd-4d5a-a692-a87037af107b" providerId="ADAL" clId="{BC6292C7-23F4-4ED4-A77E-013F6C63BF9B}" dt="2024-01-29T13:39:56.678" v="4373" actId="113"/>
-        <pc:sldMkLst>
-          <pc:docMk/>
-          <pc:sldMk cId="1561772277" sldId="278"/>
-        </pc:sldMkLst>
-      </pc:sldChg>
-      <pc:sldChg chg="addSp delSp modSp new mod modClrScheme chgLayout">
-        <pc:chgData name="Weifeng Xu" userId="e7aed605-a3dd-4d5a-a692-a87037af107b" providerId="ADAL" clId="{BC6292C7-23F4-4ED4-A77E-013F6C63BF9B}" dt="2023-01-30T14:27:03.084" v="3709" actId="20577"/>
-        <pc:sldMkLst>
-          <pc:docMk/>
-          <pc:sldMk cId="578291410" sldId="279"/>
-        </pc:sldMkLst>
-      </pc:sldChg>
-      <pc:sldChg chg="addSp delSp modSp new mod modClrScheme chgLayout modNotesTx">
-        <pc:chgData name="Weifeng Xu" userId="e7aed605-a3dd-4d5a-a692-a87037af107b" providerId="ADAL" clId="{BC6292C7-23F4-4ED4-A77E-013F6C63BF9B}" dt="2024-05-12T12:36:29.890" v="4378" actId="6549"/>
-        <pc:sldMkLst>
-          <pc:docMk/>
-          <pc:sldMk cId="1046599537" sldId="280"/>
-        </pc:sldMkLst>
-      </pc:sldChg>
-      <pc:sldChg chg="addSp delSp modSp new mod modClrScheme chgLayout modNotesTx">
-        <pc:chgData name="Weifeng Xu" userId="e7aed605-a3dd-4d5a-a692-a87037af107b" providerId="ADAL" clId="{BC6292C7-23F4-4ED4-A77E-013F6C63BF9B}" dt="2023-02-05T01:32:31.479" v="3879" actId="20577"/>
-        <pc:sldMkLst>
-          <pc:docMk/>
-          <pc:sldMk cId="3587021781" sldId="281"/>
-        </pc:sldMkLst>
-      </pc:sldChg>
-      <pc:sldChg chg="addSp delSp modSp new mod ord modClrScheme chgLayout">
-        <pc:chgData name="Weifeng Xu" userId="e7aed605-a3dd-4d5a-a692-a87037af107b" providerId="ADAL" clId="{BC6292C7-23F4-4ED4-A77E-013F6C63BF9B}" dt="2023-01-29T15:38:45.600" v="2631" actId="20577"/>
-        <pc:sldMkLst>
-          <pc:docMk/>
-          <pc:sldMk cId="2782818314" sldId="282"/>
-        </pc:sldMkLst>
-      </pc:sldChg>
-      <pc:sldChg chg="addSp delSp modSp new mod modClrScheme chgLayout modNotesTx">
-        <pc:chgData name="Weifeng Xu" userId="e7aed605-a3dd-4d5a-a692-a87037af107b" providerId="ADAL" clId="{BC6292C7-23F4-4ED4-A77E-013F6C63BF9B}" dt="2024-01-25T21:02:34.489" v="4094" actId="1038"/>
-        <pc:sldMkLst>
-          <pc:docMk/>
-          <pc:sldMk cId="4101372602" sldId="283"/>
-        </pc:sldMkLst>
-      </pc:sldChg>
-      <pc:sldChg chg="modSp new mod">
-        <pc:chgData name="Weifeng Xu" userId="e7aed605-a3dd-4d5a-a692-a87037af107b" providerId="ADAL" clId="{BC6292C7-23F4-4ED4-A77E-013F6C63BF9B}" dt="2024-01-25T23:38:51.221" v="4361" actId="20577"/>
-        <pc:sldMkLst>
-          <pc:docMk/>
-          <pc:sldMk cId="2937806077" sldId="284"/>
-        </pc:sldMkLst>
-      </pc:sldChg>
-      <pc:sldChg chg="addSp delSp modSp new mod modClrScheme chgLayout">
-        <pc:chgData name="Weifeng Xu" userId="e7aed605-a3dd-4d5a-a692-a87037af107b" providerId="ADAL" clId="{BC6292C7-23F4-4ED4-A77E-013F6C63BF9B}" dt="2023-01-30T14:08:21.219" v="3670" actId="6549"/>
-        <pc:sldMkLst>
-          <pc:docMk/>
-          <pc:sldMk cId="4010551952" sldId="285"/>
-        </pc:sldMkLst>
-      </pc:sldChg>
-      <pc:sldChg chg="addSp delSp modSp new mod ord modClrScheme chgLayout">
-        <pc:chgData name="Weifeng Xu" userId="e7aed605-a3dd-4d5a-a692-a87037af107b" providerId="ADAL" clId="{BC6292C7-23F4-4ED4-A77E-013F6C63BF9B}" dt="2023-02-12T17:09:55.804" v="3965"/>
-        <pc:sldMkLst>
-          <pc:docMk/>
-          <pc:sldMk cId="3744169585" sldId="286"/>
-        </pc:sldMkLst>
-      </pc:sldChg>
-      <pc:sldChg chg="addSp delSp modSp new mod modClrScheme chgLayout">
-        <pc:chgData name="Weifeng Xu" userId="e7aed605-a3dd-4d5a-a692-a87037af107b" providerId="ADAL" clId="{BC6292C7-23F4-4ED4-A77E-013F6C63BF9B}" dt="2023-01-29T20:05:11.044" v="2983" actId="20577"/>
-        <pc:sldMkLst>
-          <pc:docMk/>
-          <pc:sldMk cId="1199689971" sldId="287"/>
-        </pc:sldMkLst>
-      </pc:sldChg>
-      <pc:sldChg chg="addSp delSp modSp new mod modClrScheme chgLayout modNotesTx">
-        <pc:chgData name="Weifeng Xu" userId="e7aed605-a3dd-4d5a-a692-a87037af107b" providerId="ADAL" clId="{BC6292C7-23F4-4ED4-A77E-013F6C63BF9B}" dt="2024-05-12T12:37:36.067" v="4381" actId="20577"/>
-        <pc:sldMkLst>
-          <pc:docMk/>
-          <pc:sldMk cId="1687911296" sldId="288"/>
-        </pc:sldMkLst>
-      </pc:sldChg>
-      <pc:sldChg chg="addSp delSp modSp new mod modClrScheme chgLayout modNotesTx">
-        <pc:chgData name="Weifeng Xu" userId="e7aed605-a3dd-4d5a-a692-a87037af107b" providerId="ADAL" clId="{BC6292C7-23F4-4ED4-A77E-013F6C63BF9B}" dt="2024-02-05T23:47:58.115" v="4375"/>
-        <pc:sldMkLst>
-          <pc:docMk/>
-          <pc:sldMk cId="1469864866" sldId="289"/>
-        </pc:sldMkLst>
-      </pc:sldChg>
-      <pc:sldChg chg="addSp delSp modSp add mod modNotesTx">
-        <pc:chgData name="Weifeng Xu" userId="e7aed605-a3dd-4d5a-a692-a87037af107b" providerId="ADAL" clId="{BC6292C7-23F4-4ED4-A77E-013F6C63BF9B}" dt="2023-01-31T14:54:20.536" v="3857" actId="20577"/>
-        <pc:sldMkLst>
-          <pc:docMk/>
-          <pc:sldMk cId="15140870" sldId="290"/>
-        </pc:sldMkLst>
-      </pc:sldChg>
-      <pc:sldChg chg="modSp new mod">
-        <pc:chgData name="Weifeng Xu" userId="e7aed605-a3dd-4d5a-a692-a87037af107b" providerId="ADAL" clId="{BC6292C7-23F4-4ED4-A77E-013F6C63BF9B}" dt="2023-02-12T17:11:39.902" v="3967" actId="20577"/>
-        <pc:sldMkLst>
-          <pc:docMk/>
-          <pc:sldMk cId="1435299230" sldId="291"/>
-        </pc:sldMkLst>
-      </pc:sldChg>
-      <pc:sldChg chg="addSp delSp modSp new del mod modClrScheme chgLayout">
-        <pc:chgData name="Weifeng Xu" userId="e7aed605-a3dd-4d5a-a692-a87037af107b" providerId="ADAL" clId="{BC6292C7-23F4-4ED4-A77E-013F6C63BF9B}" dt="2023-02-12T17:09:42.772" v="3963" actId="47"/>
-        <pc:sldMkLst>
-          <pc:docMk/>
-          <pc:sldMk cId="1542450704" sldId="292"/>
-        </pc:sldMkLst>
-      </pc:sldChg>
-      <pc:sldChg chg="addSp delSp modSp new mod modClrScheme chgLayout modNotesTx">
-        <pc:chgData name="Weifeng Xu" userId="e7aed605-a3dd-4d5a-a692-a87037af107b" providerId="ADAL" clId="{BC6292C7-23F4-4ED4-A77E-013F6C63BF9B}" dt="2023-02-12T17:09:13.467" v="3962"/>
-        <pc:sldMkLst>
-          <pc:docMk/>
-          <pc:sldMk cId="184682048" sldId="293"/>
-        </pc:sldMkLst>
-      </pc:sldChg>
-      <pc:sldChg chg="addSp modSp new mod">
-        <pc:chgData name="Weifeng Xu" userId="e7aed605-a3dd-4d5a-a692-a87037af107b" providerId="ADAL" clId="{BC6292C7-23F4-4ED4-A77E-013F6C63BF9B}" dt="2023-02-12T16:54:57.318" v="3930" actId="14100"/>
-        <pc:sldMkLst>
-          <pc:docMk/>
-          <pc:sldMk cId="3491661479" sldId="294"/>
-        </pc:sldMkLst>
-      </pc:sldChg>
-      <pc:sldChg chg="addSp modSp new mod modClrScheme chgLayout">
-        <pc:chgData name="Weifeng Xu" userId="e7aed605-a3dd-4d5a-a692-a87037af107b" providerId="ADAL" clId="{BC6292C7-23F4-4ED4-A77E-013F6C63BF9B}" dt="2023-02-28T15:09:04.206" v="3998" actId="20577"/>
-        <pc:sldMkLst>
-          <pc:docMk/>
-          <pc:sldMk cId="3881227093" sldId="295"/>
-        </pc:sldMkLst>
-      </pc:sldChg>
-      <pc:sldChg chg="addSp delSp modSp new mod modClrScheme chgLayout">
-        <pc:chgData name="Weifeng Xu" userId="e7aed605-a3dd-4d5a-a692-a87037af107b" providerId="ADAL" clId="{BC6292C7-23F4-4ED4-A77E-013F6C63BF9B}" dt="2025-01-22T16:32:30.881" v="4453" actId="27636"/>
-        <pc:sldMkLst>
-          <pc:docMk/>
-          <pc:sldMk cId="2995281700" sldId="296"/>
-        </pc:sldMkLst>
-      </pc:sldChg>
-      <pc:sldChg chg="del">
-        <pc:chgData name="Weifeng Xu" userId="e7aed605-a3dd-4d5a-a692-a87037af107b" providerId="ADAL" clId="{BC6292C7-23F4-4ED4-A77E-013F6C63BF9B}" dt="2021-08-26T13:19:54.875" v="24" actId="47"/>
-        <pc:sldMkLst>
-          <pc:docMk/>
-          <pc:sldMk cId="1663533553" sldId="418"/>
-        </pc:sldMkLst>
-      </pc:sldChg>
-      <pc:sldChg chg="del">
-        <pc:chgData name="Weifeng Xu" userId="e7aed605-a3dd-4d5a-a692-a87037af107b" providerId="ADAL" clId="{BC6292C7-23F4-4ED4-A77E-013F6C63BF9B}" dt="2021-08-26T13:19:55.267" v="26" actId="47"/>
-        <pc:sldMkLst>
-          <pc:docMk/>
-          <pc:sldMk cId="1167073923" sldId="419"/>
-        </pc:sldMkLst>
-      </pc:sldChg>
-      <pc:sldChg chg="del">
-        <pc:chgData name="Weifeng Xu" userId="e7aed605-a3dd-4d5a-a692-a87037af107b" providerId="ADAL" clId="{BC6292C7-23F4-4ED4-A77E-013F6C63BF9B}" dt="2021-08-26T13:19:55.449" v="27" actId="47"/>
-        <pc:sldMkLst>
-          <pc:docMk/>
-          <pc:sldMk cId="964867491" sldId="420"/>
-        </pc:sldMkLst>
-      </pc:sldChg>
-      <pc:sldChg chg="del">
-        <pc:chgData name="Weifeng Xu" userId="e7aed605-a3dd-4d5a-a692-a87037af107b" providerId="ADAL" clId="{BC6292C7-23F4-4ED4-A77E-013F6C63BF9B}" dt="2021-08-26T13:19:55.633" v="28" actId="47"/>
-        <pc:sldMkLst>
-          <pc:docMk/>
-          <pc:sldMk cId="1428006167" sldId="421"/>
-        </pc:sldMkLst>
-      </pc:sldChg>
-      <pc:sldChg chg="del">
-        <pc:chgData name="Weifeng Xu" userId="e7aed605-a3dd-4d5a-a692-a87037af107b" providerId="ADAL" clId="{BC6292C7-23F4-4ED4-A77E-013F6C63BF9B}" dt="2021-08-26T13:19:58.110" v="41" actId="47"/>
-        <pc:sldMkLst>
-          <pc:docMk/>
-          <pc:sldMk cId="593528442" sldId="423"/>
-        </pc:sldMkLst>
-      </pc:sldChg>
-      <pc:sldChg chg="del">
-        <pc:chgData name="Weifeng Xu" userId="e7aed605-a3dd-4d5a-a692-a87037af107b" providerId="ADAL" clId="{BC6292C7-23F4-4ED4-A77E-013F6C63BF9B}" dt="2021-08-26T13:19:55.087" v="25" actId="47"/>
-        <pc:sldMkLst>
-          <pc:docMk/>
-          <pc:sldMk cId="1429759575" sldId="427"/>
-        </pc:sldMkLst>
-      </pc:sldChg>
-      <pc:sldChg chg="del">
-        <pc:chgData name="Weifeng Xu" userId="e7aed605-a3dd-4d5a-a692-a87037af107b" providerId="ADAL" clId="{BC6292C7-23F4-4ED4-A77E-013F6C63BF9B}" dt="2021-08-26T13:19:56.144" v="31" actId="47"/>
-        <pc:sldMkLst>
-          <pc:docMk/>
-          <pc:sldMk cId="1159618598" sldId="428"/>
-        </pc:sldMkLst>
-      </pc:sldChg>
-      <pc:sldChg chg="del">
-        <pc:chgData name="Weifeng Xu" userId="e7aed605-a3dd-4d5a-a692-a87037af107b" providerId="ADAL" clId="{BC6292C7-23F4-4ED4-A77E-013F6C63BF9B}" dt="2021-08-26T13:19:56.512" v="33" actId="47"/>
-        <pc:sldMkLst>
-          <pc:docMk/>
-          <pc:sldMk cId="1861126999" sldId="429"/>
-        </pc:sldMkLst>
-      </pc:sldChg>
-      <pc:sldChg chg="del">
-        <pc:chgData name="Weifeng Xu" userId="e7aed605-a3dd-4d5a-a692-a87037af107b" providerId="ADAL" clId="{BC6292C7-23F4-4ED4-A77E-013F6C63BF9B}" dt="2021-08-26T13:19:56.737" v="34" actId="47"/>
-        <pc:sldMkLst>
-          <pc:docMk/>
-          <pc:sldMk cId="2182210702" sldId="430"/>
-        </pc:sldMkLst>
-      </pc:sldChg>
-      <pc:sldChg chg="del">
-        <pc:chgData name="Weifeng Xu" userId="e7aed605-a3dd-4d5a-a692-a87037af107b" providerId="ADAL" clId="{BC6292C7-23F4-4ED4-A77E-013F6C63BF9B}" dt="2021-08-26T13:19:56.928" v="35" actId="47"/>
-        <pc:sldMkLst>
-          <pc:docMk/>
-          <pc:sldMk cId="3967940993" sldId="431"/>
-        </pc:sldMkLst>
-      </pc:sldChg>
-      <pc:sldChg chg="del">
-        <pc:chgData name="Weifeng Xu" userId="e7aed605-a3dd-4d5a-a692-a87037af107b" providerId="ADAL" clId="{BC6292C7-23F4-4ED4-A77E-013F6C63BF9B}" dt="2021-08-26T13:19:57.084" v="36" actId="47"/>
-        <pc:sldMkLst>
-          <pc:docMk/>
-          <pc:sldMk cId="730846325" sldId="432"/>
-        </pc:sldMkLst>
-      </pc:sldChg>
-      <pc:sldChg chg="del">
-        <pc:chgData name="Weifeng Xu" userId="e7aed605-a3dd-4d5a-a692-a87037af107b" providerId="ADAL" clId="{BC6292C7-23F4-4ED4-A77E-013F6C63BF9B}" dt="2021-08-26T13:19:58.319" v="42" actId="47"/>
-        <pc:sldMkLst>
-          <pc:docMk/>
-          <pc:sldMk cId="1187390596" sldId="433"/>
-        </pc:sldMkLst>
-      </pc:sldChg>
-      <pc:sldChg chg="del">
-        <pc:chgData name="Weifeng Xu" userId="e7aed605-a3dd-4d5a-a692-a87037af107b" providerId="ADAL" clId="{BC6292C7-23F4-4ED4-A77E-013F6C63BF9B}" dt="2021-08-26T13:19:58.528" v="43" actId="47"/>
-        <pc:sldMkLst>
-          <pc:docMk/>
-          <pc:sldMk cId="189084197" sldId="438"/>
-        </pc:sldMkLst>
-      </pc:sldChg>
-      <pc:sldChg chg="del">
-        <pc:chgData name="Weifeng Xu" userId="e7aed605-a3dd-4d5a-a692-a87037af107b" providerId="ADAL" clId="{BC6292C7-23F4-4ED4-A77E-013F6C63BF9B}" dt="2021-08-26T13:19:57.656" v="39" actId="47"/>
-        <pc:sldMkLst>
-          <pc:docMk/>
-          <pc:sldMk cId="2445928380" sldId="441"/>
-        </pc:sldMkLst>
-      </pc:sldChg>
-      <pc:sldChg chg="del">
-        <pc:chgData name="Weifeng Xu" userId="e7aed605-a3dd-4d5a-a692-a87037af107b" providerId="ADAL" clId="{BC6292C7-23F4-4ED4-A77E-013F6C63BF9B}" dt="2021-08-26T13:19:57.280" v="37" actId="47"/>
-        <pc:sldMkLst>
-          <pc:docMk/>
-          <pc:sldMk cId="3293749384" sldId="444"/>
-        </pc:sldMkLst>
-      </pc:sldChg>
-      <pc:sldChg chg="del">
-        <pc:chgData name="Weifeng Xu" userId="e7aed605-a3dd-4d5a-a692-a87037af107b" providerId="ADAL" clId="{BC6292C7-23F4-4ED4-A77E-013F6C63BF9B}" dt="2021-08-26T13:19:57.465" v="38" actId="47"/>
-        <pc:sldMkLst>
-          <pc:docMk/>
-          <pc:sldMk cId="3984724258" sldId="447"/>
-        </pc:sldMkLst>
-      </pc:sldChg>
-      <pc:sldChg chg="del">
-        <pc:chgData name="Weifeng Xu" userId="e7aed605-a3dd-4d5a-a692-a87037af107b" providerId="ADAL" clId="{BC6292C7-23F4-4ED4-A77E-013F6C63BF9B}" dt="2021-08-26T13:19:53.547" v="16" actId="47"/>
-        <pc:sldMkLst>
-          <pc:docMk/>
-          <pc:sldMk cId="3457596351" sldId="448"/>
-        </pc:sldMkLst>
-      </pc:sldChg>
-      <pc:sldChg chg="del">
-        <pc:chgData name="Weifeng Xu" userId="e7aed605-a3dd-4d5a-a692-a87037af107b" providerId="ADAL" clId="{BC6292C7-23F4-4ED4-A77E-013F6C63BF9B}" dt="2021-08-26T13:19:54.706" v="23" actId="47"/>
-        <pc:sldMkLst>
-          <pc:docMk/>
-          <pc:sldMk cId="1351668847" sldId="449"/>
-        </pc:sldMkLst>
-      </pc:sldChg>
-      <pc:sldChg chg="del">
-        <pc:chgData name="Weifeng Xu" userId="e7aed605-a3dd-4d5a-a692-a87037af107b" providerId="ADAL" clId="{BC6292C7-23F4-4ED4-A77E-013F6C63BF9B}" dt="2021-08-26T13:19:57.838" v="40" actId="47"/>
-        <pc:sldMkLst>
-          <pc:docMk/>
-          <pc:sldMk cId="56855467" sldId="450"/>
-        </pc:sldMkLst>
-      </pc:sldChg>
-      <pc:sldChg chg="del">
-        <pc:chgData name="Weifeng Xu" userId="e7aed605-a3dd-4d5a-a692-a87037af107b" providerId="ADAL" clId="{BC6292C7-23F4-4ED4-A77E-013F6C63BF9B}" dt="2021-08-26T13:19:59.138" v="46" actId="47"/>
-        <pc:sldMkLst>
-          <pc:docMk/>
-          <pc:sldMk cId="1939852994" sldId="451"/>
-        </pc:sldMkLst>
-      </pc:sldChg>
-      <pc:sldChg chg="del">
-        <pc:chgData name="Weifeng Xu" userId="e7aed605-a3dd-4d5a-a692-a87037af107b" providerId="ADAL" clId="{BC6292C7-23F4-4ED4-A77E-013F6C63BF9B}" dt="2021-08-26T13:19:54.039" v="19" actId="47"/>
-        <pc:sldMkLst>
-          <pc:docMk/>
-          <pc:sldMk cId="1947422297" sldId="452"/>
-        </pc:sldMkLst>
-      </pc:sldChg>
-      <pc:sldChg chg="del">
-        <pc:chgData name="Weifeng Xu" userId="e7aed605-a3dd-4d5a-a692-a87037af107b" providerId="ADAL" clId="{BC6292C7-23F4-4ED4-A77E-013F6C63BF9B}" dt="2021-08-26T13:19:54.196" v="20" actId="47"/>
-        <pc:sldMkLst>
-          <pc:docMk/>
-          <pc:sldMk cId="3041551094" sldId="453"/>
-        </pc:sldMkLst>
-      </pc:sldChg>
-      <pc:sldChg chg="del">
-        <pc:chgData name="Weifeng Xu" userId="e7aed605-a3dd-4d5a-a692-a87037af107b" providerId="ADAL" clId="{BC6292C7-23F4-4ED4-A77E-013F6C63BF9B}" dt="2021-08-26T13:19:54.529" v="22" actId="47"/>
-        <pc:sldMkLst>
-          <pc:docMk/>
-          <pc:sldMk cId="3669683899" sldId="454"/>
-        </pc:sldMkLst>
-      </pc:sldChg>
-      <pc:sldChg chg="del">
-        <pc:chgData name="Weifeng Xu" userId="e7aed605-a3dd-4d5a-a692-a87037af107b" providerId="ADAL" clId="{BC6292C7-23F4-4ED4-A77E-013F6C63BF9B}" dt="2021-08-26T13:19:54.370" v="21" actId="47"/>
-        <pc:sldMkLst>
-          <pc:docMk/>
-          <pc:sldMk cId="524028341" sldId="455"/>
-        </pc:sldMkLst>
-      </pc:sldChg>
-      <pc:sldChg chg="del">
-        <pc:chgData name="Weifeng Xu" userId="e7aed605-a3dd-4d5a-a692-a87037af107b" providerId="ADAL" clId="{BC6292C7-23F4-4ED4-A77E-013F6C63BF9B}" dt="2021-08-26T13:19:55.816" v="29" actId="47"/>
-        <pc:sldMkLst>
-          <pc:docMk/>
-          <pc:sldMk cId="1611306107" sldId="456"/>
-        </pc:sldMkLst>
-      </pc:sldChg>
-      <pc:sldChg chg="del">
-        <pc:chgData name="Weifeng Xu" userId="e7aed605-a3dd-4d5a-a692-a87037af107b" providerId="ADAL" clId="{BC6292C7-23F4-4ED4-A77E-013F6C63BF9B}" dt="2021-08-26T13:19:55.976" v="30" actId="47"/>
-        <pc:sldMkLst>
-          <pc:docMk/>
-          <pc:sldMk cId="588258724" sldId="458"/>
-        </pc:sldMkLst>
-      </pc:sldChg>
-      <pc:sldChg chg="del">
-        <pc:chgData name="Weifeng Xu" userId="e7aed605-a3dd-4d5a-a692-a87037af107b" providerId="ADAL" clId="{BC6292C7-23F4-4ED4-A77E-013F6C63BF9B}" dt="2021-08-26T13:19:56.354" v="32" actId="47"/>
-        <pc:sldMkLst>
-          <pc:docMk/>
-          <pc:sldMk cId="2564593808" sldId="459"/>
-        </pc:sldMkLst>
-      </pc:sldChg>
-      <pc:sldChg chg="del">
-        <pc:chgData name="Weifeng Xu" userId="e7aed605-a3dd-4d5a-a692-a87037af107b" providerId="ADAL" clId="{BC6292C7-23F4-4ED4-A77E-013F6C63BF9B}" dt="2021-08-26T13:19:59.472" v="47" actId="47"/>
-        <pc:sldMkLst>
-          <pc:docMk/>
-          <pc:sldMk cId="4044252772" sldId="460"/>
-        </pc:sldMkLst>
-      </pc:sldChg>
-      <pc:sldChg chg="del">
-        <pc:chgData name="Weifeng Xu" userId="e7aed605-a3dd-4d5a-a692-a87037af107b" providerId="ADAL" clId="{BC6292C7-23F4-4ED4-A77E-013F6C63BF9B}" dt="2021-08-26T13:19:58.735" v="44" actId="47"/>
-        <pc:sldMkLst>
-          <pc:docMk/>
-          <pc:sldMk cId="3630229365" sldId="461"/>
-        </pc:sldMkLst>
-      </pc:sldChg>
-      <pc:sldChg chg="del">
-        <pc:chgData name="Weifeng Xu" userId="e7aed605-a3dd-4d5a-a692-a87037af107b" providerId="ADAL" clId="{BC6292C7-23F4-4ED4-A77E-013F6C63BF9B}" dt="2021-08-26T13:19:58.951" v="45" actId="47"/>
-        <pc:sldMkLst>
-          <pc:docMk/>
-          <pc:sldMk cId="2559588248" sldId="462"/>
-        </pc:sldMkLst>
-      </pc:sldChg>
-    </pc:docChg>
-  </pc:docChgLst>
-  <pc:docChgLst>
-    <pc:chgData name="Weifeng Xu" userId="e7aed605-a3dd-4d5a-a692-a87037af107b" providerId="ADAL" clId="{3A194C69-541F-4DAC-9FC0-76AC812597F4}"/>
-    <pc:docChg chg="undo custSel addSld delSld modSld">
-      <pc:chgData name="Weifeng Xu" userId="e7aed605-a3dd-4d5a-a692-a87037af107b" providerId="ADAL" clId="{3A194C69-541F-4DAC-9FC0-76AC812597F4}" dt="2021-08-10T21:17:23.928" v="162" actId="20577"/>
-      <pc:docMkLst>
-        <pc:docMk/>
-      </pc:docMkLst>
-      <pc:sldChg chg="modSp mod">
-        <pc:chgData name="Weifeng Xu" userId="e7aed605-a3dd-4d5a-a692-a87037af107b" providerId="ADAL" clId="{3A194C69-541F-4DAC-9FC0-76AC812597F4}" dt="2021-08-10T20:51:26.847" v="66" actId="20577"/>
-        <pc:sldMkLst>
-          <pc:docMk/>
-          <pc:sldMk cId="1325061211" sldId="256"/>
-        </pc:sldMkLst>
-      </pc:sldChg>
-      <pc:sldChg chg="modSp new mod">
-        <pc:chgData name="Weifeng Xu" userId="e7aed605-a3dd-4d5a-a692-a87037af107b" providerId="ADAL" clId="{3A194C69-541F-4DAC-9FC0-76AC812597F4}" dt="2021-08-10T21:17:23.928" v="162" actId="20577"/>
-        <pc:sldMkLst>
-          <pc:docMk/>
-          <pc:sldMk cId="3464803328" sldId="257"/>
-        </pc:sldMkLst>
-      </pc:sldChg>
-      <pc:sldChg chg="addSp delSp modSp new mod modClrScheme chgLayout">
-        <pc:chgData name="Weifeng Xu" userId="e7aed605-a3dd-4d5a-a692-a87037af107b" providerId="ADAL" clId="{3A194C69-541F-4DAC-9FC0-76AC812597F4}" dt="2021-08-10T21:15:16.623" v="148" actId="1076"/>
-        <pc:sldMkLst>
-          <pc:docMk/>
-          <pc:sldMk cId="1820053488" sldId="258"/>
-        </pc:sldMkLst>
-      </pc:sldChg>
-      <pc:sldChg chg="del">
-        <pc:chgData name="Weifeng Xu" userId="e7aed605-a3dd-4d5a-a692-a87037af107b" providerId="ADAL" clId="{3A194C69-541F-4DAC-9FC0-76AC812597F4}" dt="2021-08-10T20:50:26.162" v="2" actId="47"/>
-        <pc:sldMkLst>
-          <pc:docMk/>
-          <pc:sldMk cId="2789471632" sldId="392"/>
-        </pc:sldMkLst>
-      </pc:sldChg>
-      <pc:sldChg chg="del">
-        <pc:chgData name="Weifeng Xu" userId="e7aed605-a3dd-4d5a-a692-a87037af107b" providerId="ADAL" clId="{3A194C69-541F-4DAC-9FC0-76AC812597F4}" dt="2021-08-10T20:50:26.992" v="6" actId="47"/>
-        <pc:sldMkLst>
-          <pc:docMk/>
-          <pc:sldMk cId="3672303902" sldId="393"/>
-        </pc:sldMkLst>
-      </pc:sldChg>
-      <pc:sldChg chg="del">
-        <pc:chgData name="Weifeng Xu" userId="e7aed605-a3dd-4d5a-a692-a87037af107b" providerId="ADAL" clId="{3A194C69-541F-4DAC-9FC0-76AC812597F4}" dt="2021-08-10T20:50:27.360" v="8" actId="47"/>
-        <pc:sldMkLst>
-          <pc:docMk/>
-          <pc:sldMk cId="2467691949" sldId="394"/>
-        </pc:sldMkLst>
-      </pc:sldChg>
-      <pc:sldChg chg="del">
-        <pc:chgData name="Weifeng Xu" userId="e7aed605-a3dd-4d5a-a692-a87037af107b" providerId="ADAL" clId="{3A194C69-541F-4DAC-9FC0-76AC812597F4}" dt="2021-08-10T20:50:27.968" v="11" actId="47"/>
-        <pc:sldMkLst>
-          <pc:docMk/>
-          <pc:sldMk cId="1030962794" sldId="395"/>
-        </pc:sldMkLst>
-      </pc:sldChg>
-      <pc:sldChg chg="del">
-        <pc:chgData name="Weifeng Xu" userId="e7aed605-a3dd-4d5a-a692-a87037af107b" providerId="ADAL" clId="{3A194C69-541F-4DAC-9FC0-76AC812597F4}" dt="2021-08-10T20:50:29.651" v="19" actId="47"/>
-        <pc:sldMkLst>
-          <pc:docMk/>
-          <pc:sldMk cId="1635951812" sldId="396"/>
-        </pc:sldMkLst>
-      </pc:sldChg>
-      <pc:sldChg chg="del">
-        <pc:chgData name="Weifeng Xu" userId="e7aed605-a3dd-4d5a-a692-a87037af107b" providerId="ADAL" clId="{3A194C69-541F-4DAC-9FC0-76AC812597F4}" dt="2021-08-10T20:50:27.543" v="9" actId="47"/>
-        <pc:sldMkLst>
-          <pc:docMk/>
-          <pc:sldMk cId="3476957671" sldId="397"/>
-        </pc:sldMkLst>
-      </pc:sldChg>
-      <pc:sldChg chg="del">
-        <pc:chgData name="Weifeng Xu" userId="e7aed605-a3dd-4d5a-a692-a87037af107b" providerId="ADAL" clId="{3A194C69-541F-4DAC-9FC0-76AC812597F4}" dt="2021-08-10T20:50:28.334" v="13" actId="47"/>
-        <pc:sldMkLst>
-          <pc:docMk/>
-          <pc:sldMk cId="837580508" sldId="398"/>
-        </pc:sldMkLst>
-      </pc:sldChg>
-      <pc:sldChg chg="del">
-        <pc:chgData name="Weifeng Xu" userId="e7aed605-a3dd-4d5a-a692-a87037af107b" providerId="ADAL" clId="{3A194C69-541F-4DAC-9FC0-76AC812597F4}" dt="2021-08-10T20:50:28.535" v="14" actId="47"/>
-        <pc:sldMkLst>
-          <pc:docMk/>
-          <pc:sldMk cId="775249280" sldId="399"/>
-        </pc:sldMkLst>
-      </pc:sldChg>
-      <pc:sldChg chg="del">
-        <pc:chgData name="Weifeng Xu" userId="e7aed605-a3dd-4d5a-a692-a87037af107b" providerId="ADAL" clId="{3A194C69-541F-4DAC-9FC0-76AC812597F4}" dt="2021-08-10T20:50:28.768" v="15" actId="47"/>
-        <pc:sldMkLst>
-          <pc:docMk/>
-          <pc:sldMk cId="614667185" sldId="400"/>
-        </pc:sldMkLst>
-      </pc:sldChg>
-      <pc:sldChg chg="del">
-        <pc:chgData name="Weifeng Xu" userId="e7aed605-a3dd-4d5a-a692-a87037af107b" providerId="ADAL" clId="{3A194C69-541F-4DAC-9FC0-76AC812597F4}" dt="2021-08-10T20:50:30.071" v="21" actId="47"/>
-        <pc:sldMkLst>
-          <pc:docMk/>
-          <pc:sldMk cId="3582893092" sldId="401"/>
-        </pc:sldMkLst>
-      </pc:sldChg>
-      <pc:sldChg chg="del">
-        <pc:chgData name="Weifeng Xu" userId="e7aed605-a3dd-4d5a-a692-a87037af107b" providerId="ADAL" clId="{3A194C69-541F-4DAC-9FC0-76AC812597F4}" dt="2021-08-10T20:50:31.039" v="26" actId="47"/>
-        <pc:sldMkLst>
-          <pc:docMk/>
-          <pc:sldMk cId="819433619" sldId="402"/>
-        </pc:sldMkLst>
-      </pc:sldChg>
-      <pc:sldChg chg="del">
-        <pc:chgData name="Weifeng Xu" userId="e7aed605-a3dd-4d5a-a692-a87037af107b" providerId="ADAL" clId="{3A194C69-541F-4DAC-9FC0-76AC812597F4}" dt="2021-08-10T20:50:29.867" v="20" actId="47"/>
-        <pc:sldMkLst>
-          <pc:docMk/>
-          <pc:sldMk cId="39788097" sldId="403"/>
-        </pc:sldMkLst>
-      </pc:sldChg>
-      <pc:sldChg chg="del">
-        <pc:chgData name="Weifeng Xu" userId="e7aed605-a3dd-4d5a-a692-a87037af107b" providerId="ADAL" clId="{3A194C69-541F-4DAC-9FC0-76AC812597F4}" dt="2021-08-10T20:50:30.839" v="25" actId="47"/>
-        <pc:sldMkLst>
-          <pc:docMk/>
-          <pc:sldMk cId="3665038014" sldId="404"/>
-        </pc:sldMkLst>
-      </pc:sldChg>
-      <pc:sldChg chg="del">
-        <pc:chgData name="Weifeng Xu" userId="e7aed605-a3dd-4d5a-a692-a87037af107b" providerId="ADAL" clId="{3A194C69-541F-4DAC-9FC0-76AC812597F4}" dt="2021-08-10T20:50:30.285" v="22" actId="47"/>
-        <pc:sldMkLst>
-          <pc:docMk/>
-          <pc:sldMk cId="464350271" sldId="405"/>
-        </pc:sldMkLst>
-      </pc:sldChg>
-      <pc:sldChg chg="del">
-        <pc:chgData name="Weifeng Xu" userId="e7aed605-a3dd-4d5a-a692-a87037af107b" providerId="ADAL" clId="{3A194C69-541F-4DAC-9FC0-76AC812597F4}" dt="2021-08-10T20:50:31.220" v="27" actId="47"/>
-        <pc:sldMkLst>
-          <pc:docMk/>
-          <pc:sldMk cId="2093752077" sldId="406"/>
-        </pc:sldMkLst>
-      </pc:sldChg>
-      <pc:sldChg chg="del">
-        <pc:chgData name="Weifeng Xu" userId="e7aed605-a3dd-4d5a-a692-a87037af107b" providerId="ADAL" clId="{3A194C69-541F-4DAC-9FC0-76AC812597F4}" dt="2021-08-10T20:50:31.936" v="31" actId="47"/>
-        <pc:sldMkLst>
-          <pc:docMk/>
-          <pc:sldMk cId="1972666229" sldId="407"/>
-        </pc:sldMkLst>
-      </pc:sldChg>
-      <pc:sldChg chg="del">
-        <pc:chgData name="Weifeng Xu" userId="e7aed605-a3dd-4d5a-a692-a87037af107b" providerId="ADAL" clId="{3A194C69-541F-4DAC-9FC0-76AC812597F4}" dt="2021-08-10T20:50:32.126" v="32" actId="47"/>
-        <pc:sldMkLst>
-          <pc:docMk/>
-          <pc:sldMk cId="2980641166" sldId="408"/>
-        </pc:sldMkLst>
-      </pc:sldChg>
-      <pc:sldChg chg="del">
-        <pc:chgData name="Weifeng Xu" userId="e7aed605-a3dd-4d5a-a692-a87037af107b" providerId="ADAL" clId="{3A194C69-541F-4DAC-9FC0-76AC812597F4}" dt="2021-08-10T20:50:32.374" v="33" actId="47"/>
-        <pc:sldMkLst>
-          <pc:docMk/>
-          <pc:sldMk cId="3277870470" sldId="409"/>
-        </pc:sldMkLst>
-      </pc:sldChg>
-      <pc:sldChg chg="del">
-        <pc:chgData name="Weifeng Xu" userId="e7aed605-a3dd-4d5a-a692-a87037af107b" providerId="ADAL" clId="{3A194C69-541F-4DAC-9FC0-76AC812597F4}" dt="2021-08-10T20:50:32.789" v="35" actId="47"/>
-        <pc:sldMkLst>
-          <pc:docMk/>
-          <pc:sldMk cId="2489270501" sldId="411"/>
-        </pc:sldMkLst>
-      </pc:sldChg>
-      <pc:sldChg chg="del">
-        <pc:chgData name="Weifeng Xu" userId="e7aed605-a3dd-4d5a-a692-a87037af107b" providerId="ADAL" clId="{3A194C69-541F-4DAC-9FC0-76AC812597F4}" dt="2021-08-10T20:50:32.969" v="36" actId="47"/>
-        <pc:sldMkLst>
-          <pc:docMk/>
-          <pc:sldMk cId="3881480386" sldId="413"/>
-        </pc:sldMkLst>
-      </pc:sldChg>
-      <pc:sldChg chg="del">
-        <pc:chgData name="Weifeng Xu" userId="e7aed605-a3dd-4d5a-a692-a87037af107b" providerId="ADAL" clId="{3A194C69-541F-4DAC-9FC0-76AC812597F4}" dt="2021-08-10T20:50:33.166" v="37" actId="47"/>
-        <pc:sldMkLst>
-          <pc:docMk/>
-          <pc:sldMk cId="3118374455" sldId="414"/>
-        </pc:sldMkLst>
-      </pc:sldChg>
-      <pc:sldChg chg="del">
-        <pc:chgData name="Weifeng Xu" userId="e7aed605-a3dd-4d5a-a692-a87037af107b" providerId="ADAL" clId="{3A194C69-541F-4DAC-9FC0-76AC812597F4}" dt="2021-08-10T20:50:32.570" v="34" actId="47"/>
-        <pc:sldMkLst>
-          <pc:docMk/>
-          <pc:sldMk cId="214186708" sldId="415"/>
-        </pc:sldMkLst>
-      </pc:sldChg>
-      <pc:sldChg chg="del">
-        <pc:chgData name="Weifeng Xu" userId="e7aed605-a3dd-4d5a-a692-a87037af107b" providerId="ADAL" clId="{3A194C69-541F-4DAC-9FC0-76AC812597F4}" dt="2021-08-10T20:50:30.690" v="24" actId="47"/>
-        <pc:sldMkLst>
-          <pc:docMk/>
-          <pc:sldMk cId="4266318337" sldId="416"/>
-        </pc:sldMkLst>
-      </pc:sldChg>
-      <pc:sldChg chg="del">
-        <pc:chgData name="Weifeng Xu" userId="e7aed605-a3dd-4d5a-a692-a87037af107b" providerId="ADAL" clId="{3A194C69-541F-4DAC-9FC0-76AC812597F4}" dt="2021-08-10T20:50:30.485" v="23" actId="47"/>
-        <pc:sldMkLst>
-          <pc:docMk/>
-          <pc:sldMk cId="1453023660" sldId="417"/>
-        </pc:sldMkLst>
-      </pc:sldChg>
-      <pc:sldChg chg="del">
-        <pc:chgData name="Weifeng Xu" userId="e7aed605-a3dd-4d5a-a692-a87037af107b" providerId="ADAL" clId="{3A194C69-541F-4DAC-9FC0-76AC812597F4}" dt="2021-08-10T20:50:33.382" v="38" actId="47"/>
-        <pc:sldMkLst>
-          <pc:docMk/>
-          <pc:sldMk cId="4247754591" sldId="418"/>
-        </pc:sldMkLst>
-      </pc:sldChg>
-      <pc:sldChg chg="del">
-        <pc:chgData name="Weifeng Xu" userId="e7aed605-a3dd-4d5a-a692-a87037af107b" providerId="ADAL" clId="{3A194C69-541F-4DAC-9FC0-76AC812597F4}" dt="2021-08-10T20:50:31.370" v="28" actId="47"/>
-        <pc:sldMkLst>
-          <pc:docMk/>
-          <pc:sldMk cId="1871513867" sldId="419"/>
-        </pc:sldMkLst>
-      </pc:sldChg>
-      <pc:sldChg chg="del">
-        <pc:chgData name="Weifeng Xu" userId="e7aed605-a3dd-4d5a-a692-a87037af107b" providerId="ADAL" clId="{3A194C69-541F-4DAC-9FC0-76AC812597F4}" dt="2021-08-10T20:50:26.336" v="3" actId="47"/>
-        <pc:sldMkLst>
-          <pc:docMk/>
-          <pc:sldMk cId="4160866766" sldId="420"/>
-        </pc:sldMkLst>
-      </pc:sldChg>
-      <pc:sldChg chg="del">
-        <pc:chgData name="Weifeng Xu" userId="e7aed605-a3dd-4d5a-a692-a87037af107b" providerId="ADAL" clId="{3A194C69-541F-4DAC-9FC0-76AC812597F4}" dt="2021-08-10T20:50:26.566" v="4" actId="47"/>
-        <pc:sldMkLst>
-          <pc:docMk/>
-          <pc:sldMk cId="1090587346" sldId="421"/>
-        </pc:sldMkLst>
-      </pc:sldChg>
-      <pc:sldChg chg="del">
-        <pc:chgData name="Weifeng Xu" userId="e7aed605-a3dd-4d5a-a692-a87037af107b" providerId="ADAL" clId="{3A194C69-541F-4DAC-9FC0-76AC812597F4}" dt="2021-08-10T20:50:26.783" v="5" actId="47"/>
-        <pc:sldMkLst>
-          <pc:docMk/>
-          <pc:sldMk cId="2079099636" sldId="422"/>
-        </pc:sldMkLst>
-      </pc:sldChg>
-      <pc:sldChg chg="del">
-        <pc:chgData name="Weifeng Xu" userId="e7aed605-a3dd-4d5a-a692-a87037af107b" providerId="ADAL" clId="{3A194C69-541F-4DAC-9FC0-76AC812597F4}" dt="2021-08-10T20:50:27.177" v="7" actId="47"/>
-        <pc:sldMkLst>
-          <pc:docMk/>
-          <pc:sldMk cId="1881823739" sldId="423"/>
-        </pc:sldMkLst>
-      </pc:sldChg>
-      <pc:sldChg chg="del">
-        <pc:chgData name="Weifeng Xu" userId="e7aed605-a3dd-4d5a-a692-a87037af107b" providerId="ADAL" clId="{3A194C69-541F-4DAC-9FC0-76AC812597F4}" dt="2021-08-10T20:50:28.982" v="16" actId="47"/>
-        <pc:sldMkLst>
-          <pc:docMk/>
-          <pc:sldMk cId="3519466523" sldId="424"/>
-        </pc:sldMkLst>
-      </pc:sldChg>
-      <pc:sldChg chg="del">
-        <pc:chgData name="Weifeng Xu" userId="e7aed605-a3dd-4d5a-a692-a87037af107b" providerId="ADAL" clId="{3A194C69-541F-4DAC-9FC0-76AC812597F4}" dt="2021-08-10T20:50:29.207" v="17" actId="47"/>
-        <pc:sldMkLst>
-          <pc:docMk/>
-          <pc:sldMk cId="2940456927" sldId="425"/>
-        </pc:sldMkLst>
-      </pc:sldChg>
-      <pc:sldChg chg="del">
-        <pc:chgData name="Weifeng Xu" userId="e7aed605-a3dd-4d5a-a692-a87037af107b" providerId="ADAL" clId="{3A194C69-541F-4DAC-9FC0-76AC812597F4}" dt="2021-08-10T20:50:29.434" v="18" actId="47"/>
-        <pc:sldMkLst>
-          <pc:docMk/>
-          <pc:sldMk cId="3876190788" sldId="426"/>
-        </pc:sldMkLst>
-      </pc:sldChg>
-      <pc:sldChg chg="del">
-        <pc:chgData name="Weifeng Xu" userId="e7aed605-a3dd-4d5a-a692-a87037af107b" providerId="ADAL" clId="{3A194C69-541F-4DAC-9FC0-76AC812597F4}" dt="2021-08-10T20:50:33.832" v="40" actId="47"/>
-        <pc:sldMkLst>
-          <pc:docMk/>
-          <pc:sldMk cId="2709397411" sldId="427"/>
-        </pc:sldMkLst>
-      </pc:sldChg>
-      <pc:sldChg chg="del">
-        <pc:chgData name="Weifeng Xu" userId="e7aed605-a3dd-4d5a-a692-a87037af107b" providerId="ADAL" clId="{3A194C69-541F-4DAC-9FC0-76AC812597F4}" dt="2021-08-10T20:50:28.143" v="12" actId="47"/>
-        <pc:sldMkLst>
-          <pc:docMk/>
-          <pc:sldMk cId="647302650" sldId="428"/>
-        </pc:sldMkLst>
-      </pc:sldChg>
-      <pc:sldChg chg="del">
-        <pc:chgData name="Weifeng Xu" userId="e7aed605-a3dd-4d5a-a692-a87037af107b" providerId="ADAL" clId="{3A194C69-541F-4DAC-9FC0-76AC812597F4}" dt="2021-08-10T20:50:27.751" v="10" actId="47"/>
-        <pc:sldMkLst>
-          <pc:docMk/>
-          <pc:sldMk cId="878272104" sldId="429"/>
-        </pc:sldMkLst>
-      </pc:sldChg>
-      <pc:sldChg chg="del">
-        <pc:chgData name="Weifeng Xu" userId="e7aed605-a3dd-4d5a-a692-a87037af107b" providerId="ADAL" clId="{3A194C69-541F-4DAC-9FC0-76AC812597F4}" dt="2021-08-10T20:50:25.967" v="1" actId="47"/>
-        <pc:sldMkLst>
-          <pc:docMk/>
-          <pc:sldMk cId="4091828154" sldId="430"/>
-        </pc:sldMkLst>
-      </pc:sldChg>
-      <pc:sldChg chg="del">
-        <pc:chgData name="Weifeng Xu" userId="e7aed605-a3dd-4d5a-a692-a87037af107b" providerId="ADAL" clId="{3A194C69-541F-4DAC-9FC0-76AC812597F4}" dt="2021-08-10T20:50:25.540" v="0" actId="47"/>
-        <pc:sldMkLst>
-          <pc:docMk/>
-          <pc:sldMk cId="593614233" sldId="431"/>
-        </pc:sldMkLst>
-      </pc:sldChg>
-      <pc:sldChg chg="del">
-        <pc:chgData name="Weifeng Xu" userId="e7aed605-a3dd-4d5a-a692-a87037af107b" providerId="ADAL" clId="{3A194C69-541F-4DAC-9FC0-76AC812597F4}" dt="2021-08-10T20:50:31.559" v="29" actId="47"/>
-        <pc:sldMkLst>
-          <pc:docMk/>
-          <pc:sldMk cId="996485528" sldId="432"/>
-        </pc:sldMkLst>
-      </pc:sldChg>
-      <pc:sldChg chg="del">
-        <pc:chgData name="Weifeng Xu" userId="e7aed605-a3dd-4d5a-a692-a87037af107b" providerId="ADAL" clId="{3A194C69-541F-4DAC-9FC0-76AC812597F4}" dt="2021-08-10T20:50:31.702" v="30" actId="47"/>
-        <pc:sldMkLst>
-          <pc:docMk/>
-          <pc:sldMk cId="848404907" sldId="433"/>
-        </pc:sldMkLst>
-      </pc:sldChg>
-      <pc:sldChg chg="del">
-        <pc:chgData name="Weifeng Xu" userId="e7aed605-a3dd-4d5a-a692-a87037af107b" providerId="ADAL" clId="{3A194C69-541F-4DAC-9FC0-76AC812597F4}" dt="2021-08-10T20:50:33.605" v="39" actId="47"/>
-        <pc:sldMkLst>
-          <pc:docMk/>
-          <pc:sldMk cId="2829655940" sldId="434"/>
-        </pc:sldMkLst>
-      </pc:sldChg>
-      <pc:sldChg chg="del">
-        <pc:chgData name="Weifeng Xu" userId="e7aed605-a3dd-4d5a-a692-a87037af107b" providerId="ADAL" clId="{3A194C69-541F-4DAC-9FC0-76AC812597F4}" dt="2021-08-10T20:50:34.052" v="41" actId="47"/>
-        <pc:sldMkLst>
-          <pc:docMk/>
-          <pc:sldMk cId="3752964083" sldId="435"/>
-        </pc:sldMkLst>
-      </pc:sldChg>
-      <pc:sldChg chg="del">
-        <pc:chgData name="Weifeng Xu" userId="e7aed605-a3dd-4d5a-a692-a87037af107b" providerId="ADAL" clId="{3A194C69-541F-4DAC-9FC0-76AC812597F4}" dt="2021-08-10T20:50:34.239" v="42" actId="47"/>
-        <pc:sldMkLst>
-          <pc:docMk/>
-          <pc:sldMk cId="3503932430" sldId="436"/>
-        </pc:sldMkLst>
-      </pc:sldChg>
-      <pc:sldChg chg="del">
-        <pc:chgData name="Weifeng Xu" userId="e7aed605-a3dd-4d5a-a692-a87037af107b" providerId="ADAL" clId="{3A194C69-541F-4DAC-9FC0-76AC812597F4}" dt="2021-08-10T20:50:34.431" v="43" actId="47"/>
-        <pc:sldMkLst>
-          <pc:docMk/>
-          <pc:sldMk cId="1984469485" sldId="437"/>
-        </pc:sldMkLst>
-      </pc:sldChg>
-      <pc:sldChg chg="del">
-        <pc:chgData name="Weifeng Xu" userId="e7aed605-a3dd-4d5a-a692-a87037af107b" providerId="ADAL" clId="{3A194C69-541F-4DAC-9FC0-76AC812597F4}" dt="2021-08-10T20:50:34.813" v="45" actId="47"/>
-        <pc:sldMkLst>
-          <pc:docMk/>
-          <pc:sldMk cId="4198334412" sldId="438"/>
-        </pc:sldMkLst>
-      </pc:sldChg>
-      <pc:sldChg chg="del">
-        <pc:chgData name="Weifeng Xu" userId="e7aed605-a3dd-4d5a-a692-a87037af107b" providerId="ADAL" clId="{3A194C69-541F-4DAC-9FC0-76AC812597F4}" dt="2021-08-10T20:50:34.990" v="46" actId="47"/>
-        <pc:sldMkLst>
-          <pc:docMk/>
-          <pc:sldMk cId="4192281943" sldId="439"/>
-        </pc:sldMkLst>
-      </pc:sldChg>
-      <pc:sldChg chg="del">
-        <pc:chgData name="Weifeng Xu" userId="e7aed605-a3dd-4d5a-a692-a87037af107b" providerId="ADAL" clId="{3A194C69-541F-4DAC-9FC0-76AC812597F4}" dt="2021-08-10T20:50:35.479" v="47" actId="47"/>
-        <pc:sldMkLst>
-          <pc:docMk/>
-          <pc:sldMk cId="3098642995" sldId="440"/>
-        </pc:sldMkLst>
-      </pc:sldChg>
-      <pc:sldChg chg="del">
-        <pc:chgData name="Weifeng Xu" userId="e7aed605-a3dd-4d5a-a692-a87037af107b" providerId="ADAL" clId="{3A194C69-541F-4DAC-9FC0-76AC812597F4}" dt="2021-08-10T20:50:34.643" v="44" actId="47"/>
-        <pc:sldMkLst>
-          <pc:docMk/>
-          <pc:sldMk cId="3265397422" sldId="441"/>
-        </pc:sldMkLst>
-      </pc:sldChg>
-      <pc:sldChg chg="del">
-        <pc:chgData name="Weifeng Xu" userId="e7aed605-a3dd-4d5a-a692-a87037af107b" providerId="ADAL" clId="{3A194C69-541F-4DAC-9FC0-76AC812597F4}" dt="2021-08-10T20:50:36.046" v="48" actId="47"/>
-        <pc:sldMkLst>
-          <pc:docMk/>
-          <pc:sldMk cId="4060643725" sldId="442"/>
-        </pc:sldMkLst>
-      </pc:sldChg>
-      <pc:sldChg chg="del">
-        <pc:chgData name="Weifeng Xu" userId="e7aed605-a3dd-4d5a-a692-a87037af107b" providerId="ADAL" clId="{3A194C69-541F-4DAC-9FC0-76AC812597F4}" dt="2021-08-10T20:50:36.326" v="49" actId="47"/>
-        <pc:sldMkLst>
-          <pc:docMk/>
-          <pc:sldMk cId="3308258886" sldId="443"/>
-        </pc:sldMkLst>
-      </pc:sldChg>
-      <pc:sldChg chg="del">
-        <pc:chgData name="Weifeng Xu" userId="e7aed605-a3dd-4d5a-a692-a87037af107b" providerId="ADAL" clId="{3A194C69-541F-4DAC-9FC0-76AC812597F4}" dt="2021-08-10T20:50:36.588" v="50" actId="47"/>
-        <pc:sldMkLst>
-          <pc:docMk/>
-          <pc:sldMk cId="2290480652" sldId="444"/>
-        </pc:sldMkLst>
-      </pc:sldChg>
-      <pc:sldChg chg="del">
-        <pc:chgData name="Weifeng Xu" userId="e7aed605-a3dd-4d5a-a692-a87037af107b" providerId="ADAL" clId="{3A194C69-541F-4DAC-9FC0-76AC812597F4}" dt="2021-08-10T20:50:37.496" v="51" actId="47"/>
-        <pc:sldMkLst>
-          <pc:docMk/>
-          <pc:sldMk cId="1737777844" sldId="445"/>
-        </pc:sldMkLst>
-      </pc:sldChg>
-      <pc:sldChg chg="del">
-        <pc:chgData name="Weifeng Xu" userId="e7aed605-a3dd-4d5a-a692-a87037af107b" providerId="ADAL" clId="{3A194C69-541F-4DAC-9FC0-76AC812597F4}" dt="2021-08-10T20:50:38.567" v="52" actId="47"/>
-        <pc:sldMkLst>
-          <pc:docMk/>
-          <pc:sldMk cId="2625291343" sldId="446"/>
-        </pc:sldMkLst>
-      </pc:sldChg>
-      <pc:sldMasterChg chg="delSldLayout">
-        <pc:chgData name="Weifeng Xu" userId="e7aed605-a3dd-4d5a-a692-a87037af107b" providerId="ADAL" clId="{3A194C69-541F-4DAC-9FC0-76AC812597F4}" dt="2021-08-10T20:50:32.789" v="35" actId="47"/>
-        <pc:sldMasterMkLst>
-          <pc:docMk/>
-          <pc:sldMasterMk cId="813574162" sldId="2147483648"/>
-        </pc:sldMasterMkLst>
-        <pc:sldLayoutChg chg="del">
-          <pc:chgData name="Weifeng Xu" userId="e7aed605-a3dd-4d5a-a692-a87037af107b" providerId="ADAL" clId="{3A194C69-541F-4DAC-9FC0-76AC812597F4}" dt="2021-08-10T20:50:32.789" v="35" actId="47"/>
-          <pc:sldLayoutMkLst>
-            <pc:docMk/>
-            <pc:sldMasterMk cId="813574162" sldId="2147483648"/>
-            <pc:sldLayoutMk cId="2252348551" sldId="2147483660"/>
-          </pc:sldLayoutMkLst>
-        </pc:sldLayoutChg>
-      </pc:sldMasterChg>
     </pc:docChg>
   </pc:docChgLst>
 </pc:chgInfo>
@@ -1975,62 +273,6 @@
           <inkml:channelProperty channel="F" name="resolution" value="0" units="1/dev"/>
         </inkml:channelProperties>
       </inkml:inkSource>
-      <inkml:timestamp xml:id="ts0" timeString="2022-08-22T14:48:39.339"/>
-    </inkml:context>
-    <inkml:brush xml:id="br0">
-      <inkml:brushProperty name="width" value="0.1" units="cm"/>
-      <inkml:brushProperty name="height" value="0.1" units="cm"/>
-      <inkml:brushProperty name="color" value="#FF0066"/>
-    </inkml:brush>
-  </inkml:definitions>
-  <inkml:trace contextRef="#ctx0" brushRef="#br0">279 1 24575,'1'6'0,"0"1"0,0 0 0,1-1 0,0 1 0,0-1 0,0 0 0,1 1 0,0-1 0,0 0 0,1-1 0,5 8 0,15 31 0,-20-36 0,1 1 0,0-1 0,0 0 0,1 0 0,0-1 0,0 0 0,10 9 0,20 25 0,-35-39 0,0 0 0,1 0 0,-1 0 0,-1 0 0,1 0 0,0 0 0,0 0 0,-1 0 0,1 0 0,-1 0 0,0 0 0,1 1 0,-1-1 0,0 0 0,0 0 0,-1 0 0,1 0 0,0 1 0,-1-1 0,1 0 0,-1 0 0,0 0 0,0 0 0,1 0 0,-1 0 0,-1 0 0,1 0 0,0-1 0,-3 4 0,-5 5 0,0-1 0,0 1 0,-1-2 0,-12 9 0,-6 6 0,15-13 0,-1 1 0,0-2 0,0 0 0,-1-1 0,-30 13 0,-24 12 0,35-15-19,-41 15 0,35-16-1308</inkml:trace>
-</inkml:ink>
-</file>
-
-<file path=ppt/ink/ink11.xml><?xml version="1.0" encoding="utf-8"?>
-<inkml:ink xmlns:inkml="http://www.w3.org/2003/InkML">
-  <inkml:definitions>
-    <inkml:context xml:id="ctx0">
-      <inkml:inkSource xml:id="inkSrc0">
-        <inkml:traceFormat>
-          <inkml:channel name="X" type="integer" min="-2.14748E9" max="2.14748E9" units="cm"/>
-          <inkml:channel name="Y" type="integer" min="-2.14748E9" max="2.14748E9" units="cm"/>
-          <inkml:channel name="F" type="integer" max="32767" units="dev"/>
-        </inkml:traceFormat>
-        <inkml:channelProperties>
-          <inkml:channelProperty channel="X" name="resolution" value="1000" units="1/cm"/>
-          <inkml:channelProperty channel="Y" name="resolution" value="1000" units="1/cm"/>
-          <inkml:channelProperty channel="F" name="resolution" value="0" units="1/dev"/>
-        </inkml:channelProperties>
-      </inkml:inkSource>
-      <inkml:timestamp xml:id="ts0" timeString="2022-08-22T14:48:40.587"/>
-    </inkml:context>
-    <inkml:brush xml:id="br0">
-      <inkml:brushProperty name="width" value="0.1" units="cm"/>
-      <inkml:brushProperty name="height" value="0.1" units="cm"/>
-      <inkml:brushProperty name="color" value="#FF0066"/>
-    </inkml:brush>
-  </inkml:definitions>
-  <inkml:trace contextRef="#ctx0" brushRef="#br0">0 43 24575,'31'0'0,"-5"1"0,0-1 0,-1-1 0,1-1 0,0-1 0,-1-1 0,46-15 0,-56 15-49,1 1 0,-1 0 0,1 0 0,0 2 0,0 0 0,30 3 0,-18-2-973,-11 0-5804</inkml:trace>
-</inkml:ink>
-</file>
-
-<file path=ppt/ink/ink12.xml><?xml version="1.0" encoding="utf-8"?>
-<inkml:ink xmlns:inkml="http://www.w3.org/2003/InkML">
-  <inkml:definitions>
-    <inkml:context xml:id="ctx0">
-      <inkml:inkSource xml:id="inkSrc0">
-        <inkml:traceFormat>
-          <inkml:channel name="X" type="integer" min="-2.14748E9" max="2.14748E9" units="cm"/>
-          <inkml:channel name="Y" type="integer" min="-2.14748E9" max="2.14748E9" units="cm"/>
-          <inkml:channel name="F" type="integer" max="32767" units="dev"/>
-        </inkml:traceFormat>
-        <inkml:channelProperties>
-          <inkml:channelProperty channel="X" name="resolution" value="1000" units="1/cm"/>
-          <inkml:channelProperty channel="Y" name="resolution" value="1000" units="1/cm"/>
-          <inkml:channelProperty channel="F" name="resolution" value="0" units="1/dev"/>
-        </inkml:channelProperties>
-      </inkml:inkSource>
       <inkml:timestamp xml:id="ts0" timeString="2022-08-22T14:48:41.792"/>
     </inkml:context>
     <inkml:brush xml:id="br0">
@@ -2043,7 +285,7 @@
 </inkml:ink>
 </file>
 
-<file path=ppt/ink/ink13.xml><?xml version="1.0" encoding="utf-8"?>
+<file path=ppt/ink/ink11.xml><?xml version="1.0" encoding="utf-8"?>
 <inkml:ink xmlns:inkml="http://www.w3.org/2003/InkML">
   <inkml:definitions>
     <inkml:context xml:id="ctx0">
@@ -2071,7 +313,7 @@
 </inkml:ink>
 </file>
 
-<file path=ppt/ink/ink14.xml><?xml version="1.0" encoding="utf-8"?>
+<file path=ppt/ink/ink12.xml><?xml version="1.0" encoding="utf-8"?>
 <inkml:ink xmlns:inkml="http://www.w3.org/2003/InkML">
   <inkml:definitions>
     <inkml:context xml:id="ctx0">
@@ -2099,7 +341,7 @@
 </inkml:ink>
 </file>
 
-<file path=ppt/ink/ink15.xml><?xml version="1.0" encoding="utf-8"?>
+<file path=ppt/ink/ink13.xml><?xml version="1.0" encoding="utf-8"?>
 <inkml:ink xmlns:inkml="http://www.w3.org/2003/InkML">
   <inkml:definitions>
     <inkml:context xml:id="ctx0">
@@ -2127,7 +369,7 @@
 </inkml:ink>
 </file>
 
-<file path=ppt/ink/ink16.xml><?xml version="1.0" encoding="utf-8"?>
+<file path=ppt/ink/ink14.xml><?xml version="1.0" encoding="utf-8"?>
 <inkml:ink xmlns:inkml="http://www.w3.org/2003/InkML">
   <inkml:definitions>
     <inkml:context xml:id="ctx0">
@@ -2155,7 +397,7 @@
 </inkml:ink>
 </file>
 
-<file path=ppt/ink/ink17.xml><?xml version="1.0" encoding="utf-8"?>
+<file path=ppt/ink/ink15.xml><?xml version="1.0" encoding="utf-8"?>
 <inkml:ink xmlns:inkml="http://www.w3.org/2003/InkML">
   <inkml:definitions>
     <inkml:context xml:id="ctx0">
@@ -2183,7 +425,7 @@
 </inkml:ink>
 </file>
 
-<file path=ppt/ink/ink18.xml><?xml version="1.0" encoding="utf-8"?>
+<file path=ppt/ink/ink16.xml><?xml version="1.0" encoding="utf-8"?>
 <inkml:ink xmlns:inkml="http://www.w3.org/2003/InkML">
   <inkml:definitions>
     <inkml:context xml:id="ctx0">
@@ -2211,7 +453,7 @@
 </inkml:ink>
 </file>
 
-<file path=ppt/ink/ink19.xml><?xml version="1.0" encoding="utf-8"?>
+<file path=ppt/ink/ink17.xml><?xml version="1.0" encoding="utf-8"?>
 <inkml:ink xmlns:inkml="http://www.w3.org/2003/InkML">
   <inkml:definitions>
     <inkml:context xml:id="ctx0">
@@ -2236,6 +478,62 @@
     </inkml:brush>
   </inkml:definitions>
   <inkml:trace contextRef="#ctx0" brushRef="#br0">126 1 24575,'-1'10'0,"-1"0"0,0-1 0,0 1 0,-1-1 0,0 1 0,-1-1 0,0 0 0,0 0 0,-12 16 0,-13 32 0,12-17 0,9-25 0,1 1 0,1 0 0,0 0 0,-4 23 0,9-35 0,1-1 0,-1 1 0,1 0 0,0 0 0,0-1 0,0 1 0,1 0 0,-1 0 0,1-1 0,0 1 0,0 0 0,0-1 0,1 1 0,-1-1 0,1 1 0,-1-1 0,1 0 0,1 0 0,-1 1 0,0-2 0,1 1 0,-1 0 0,1 0 0,5 4 0,-1-4 0,0 1 0,-1-1 0,1 0 0,0-1 0,1 0 0,-1 0 0,0 0 0,12 0 0,33 10 0,-43-8 0,17 6 0,0 1 0,42 25 0,-36-18 0,0-1 0,51 18 0,-42-19 0,40 23 0,-41-19-1365,-30-12-5461</inkml:trace>
+</inkml:ink>
+</file>
+
+<file path=ppt/ink/ink18.xml><?xml version="1.0" encoding="utf-8"?>
+<inkml:ink xmlns:inkml="http://www.w3.org/2003/InkML">
+  <inkml:definitions>
+    <inkml:context xml:id="ctx0">
+      <inkml:inkSource xml:id="inkSrc0">
+        <inkml:traceFormat>
+          <inkml:channel name="X" type="integer" min="-2.14748E9" max="2.14748E9" units="cm"/>
+          <inkml:channel name="Y" type="integer" min="-2.14748E9" max="2.14748E9" units="cm"/>
+          <inkml:channel name="F" type="integer" max="32767" units="dev"/>
+        </inkml:traceFormat>
+        <inkml:channelProperties>
+          <inkml:channelProperty channel="X" name="resolution" value="1000" units="1/cm"/>
+          <inkml:channelProperty channel="Y" name="resolution" value="1000" units="1/cm"/>
+          <inkml:channelProperty channel="F" name="resolution" value="0" units="1/dev"/>
+        </inkml:channelProperties>
+      </inkml:inkSource>
+      <inkml:timestamp xml:id="ts0" timeString="2023-01-30T14:00:40.317"/>
+    </inkml:context>
+    <inkml:brush xml:id="br0">
+      <inkml:brushProperty name="width" value="0.05" units="cm"/>
+      <inkml:brushProperty name="height" value="0.05" units="cm"/>
+      <inkml:brushProperty name="color" value="#E71224"/>
+    </inkml:brush>
+  </inkml:definitions>
+  <inkml:trace contextRef="#ctx0" brushRef="#br0">293 1 24575,'7'0'0,"-1"1"0,0 0 0,0 0 0,0 0 0,0 1 0,0 0 0,0 0 0,-1 1 0,1-1 0,0 1 0,-1 0 0,0 1 0,6 4 0,7 7 0,-2 1 0,20 22 0,-12-12 0,39 59 0,-17-24 0,-27-32 0,16 17 0,-12-17 0,29 51 0,-33-45 0,-3-9 0,-2 1 0,0 1 0,-2 1 0,8 29 0,-13-33 0,-1 0 0,-2 0 0,-1 1 0,1 38 0,-4-62 0,0 19 0,-1 1 0,-6 37 0,5-51 0,0-1 0,0 0 0,-1 0 0,0 0 0,0 0 0,-1 0 0,0-1 0,0 0 0,0 0 0,-1 0 0,-8 9 0,8-10 0,-7 6 0,0 0 0,1 2 0,0-1 0,1 1 0,-14 23 0,19-27 0,0-2 0,-1 1 0,0 0 0,-1-1 0,0-1 0,0 1 0,0-1 0,-1 0 0,0 0 0,-15 7 0,9-4 0,1 0 0,-20 17 0,24-17 0,0-1 0,0 0 0,-1 0 0,0-1 0,-1-1 0,1 0 0,-1 0 0,0-1 0,-23 7 0,6-5 0,0 0 0,1 2 0,1 1 0,-47 23 0,52-22 0,-2-1 0,1-1 0,-34 8 0,-4 2 0,59-18 3,0 0 1,0-1-1,-1 1 0,1-1 0,0 1 1,0-1-1,-1 0 0,1 1 0,0-1 1,-1 0-1,1 0 0,0 0 0,-1 0 1,1 0-1,0 0 0,-1 0 0,1-1 1,0 1-1,0 0 0,-1-1 0,1 1 0,0-1 1,0 0-1,-1 1 0,1-1 0,0 0 1,0 1-1,0-1 0,0 0 0,0 0 1,0 0-1,0 0 0,1 0 0,-1 0 1,0 0-1,-1-3 0,0-1-189,1-1 1,-1 0-1,1 0 0,0 1 1,1-1-1,-1 0 1,2-7-1,-1-5-6640</inkml:trace>
+</inkml:ink>
+</file>
+
+<file path=ppt/ink/ink19.xml><?xml version="1.0" encoding="utf-8"?>
+<inkml:ink xmlns:inkml="http://www.w3.org/2003/InkML">
+  <inkml:definitions>
+    <inkml:context xml:id="ctx0">
+      <inkml:inkSource xml:id="inkSrc0">
+        <inkml:traceFormat>
+          <inkml:channel name="X" type="integer" min="-2.14748E9" max="2.14748E9" units="cm"/>
+          <inkml:channel name="Y" type="integer" min="-2.14748E9" max="2.14748E9" units="cm"/>
+          <inkml:channel name="F" type="integer" max="32767" units="dev"/>
+        </inkml:traceFormat>
+        <inkml:channelProperties>
+          <inkml:channelProperty channel="X" name="resolution" value="1000" units="1/cm"/>
+          <inkml:channelProperty channel="Y" name="resolution" value="1000" units="1/cm"/>
+          <inkml:channelProperty channel="F" name="resolution" value="0" units="1/dev"/>
+        </inkml:channelProperties>
+      </inkml:inkSource>
+      <inkml:timestamp xml:id="ts0" timeString="2023-01-30T14:00:41.623"/>
+    </inkml:context>
+    <inkml:brush xml:id="br0">
+      <inkml:brushProperty name="width" value="0.05" units="cm"/>
+      <inkml:brushProperty name="height" value="0.05" units="cm"/>
+      <inkml:brushProperty name="color" value="#E71224"/>
+    </inkml:brush>
+  </inkml:definitions>
+  <inkml:trace contextRef="#ctx0" brushRef="#br0">78 1 24575,'0'13'0,"-1"1"0,-1-1 0,0 0 0,0 0 0,-2 1 0,1-2 0,-2 1 0,0 0 0,0-1 0,-12 20 0,12-24 0,0 0 0,1 0 0,0 1 0,1 0 0,0-1 0,-3 12 0,6-17 0,-1 0 0,1 0 0,0 0 0,0 0 0,0 0 0,0 0 0,1 0 0,-1 0 0,1-1 0,0 1 0,-1 0 0,1 0 0,0 0 0,1-1 0,-1 1 0,0-1 0,1 1 0,0-1 0,-1 1 0,1-1 0,0 0 0,0 0 0,3 2 0,7 5 0,1 0 0,0-1 0,1 0 0,27 10 0,8 5 0,-15-7 0,-23-11 0,0 0 0,-1 0 0,0 1 0,0 1 0,0 0 0,12 11 0,-14-11 0,0-1 0,0 0 0,0 0 0,1-1 0,0 0 0,0 0 0,1-1 0,-1 0 0,1-1 0,18 4 0,7 4 0,-10-2 0,-1 1 0,24 15 0,15 7 0,-33-16 22,-23-12-254,1 1 1,-1-2 0,1 1 0,-1-1 0,10 2 0,-7-4-6595</inkml:trace>
 </inkml:ink>
 </file>
 
@@ -2283,62 +581,6 @@
           <inkml:channelProperty channel="F" name="resolution" value="0" units="1/dev"/>
         </inkml:channelProperties>
       </inkml:inkSource>
-      <inkml:timestamp xml:id="ts0" timeString="2023-01-30T14:00:40.317"/>
-    </inkml:context>
-    <inkml:brush xml:id="br0">
-      <inkml:brushProperty name="width" value="0.05" units="cm"/>
-      <inkml:brushProperty name="height" value="0.05" units="cm"/>
-      <inkml:brushProperty name="color" value="#E71224"/>
-    </inkml:brush>
-  </inkml:definitions>
-  <inkml:trace contextRef="#ctx0" brushRef="#br0">293 1 24575,'7'0'0,"-1"1"0,0 0 0,0 0 0,0 0 0,0 1 0,0 0 0,0 0 0,-1 1 0,1-1 0,0 1 0,-1 0 0,0 1 0,6 4 0,7 7 0,-2 1 0,20 22 0,-12-12 0,39 59 0,-17-24 0,-27-32 0,16 17 0,-12-17 0,29 51 0,-33-45 0,-3-9 0,-2 1 0,0 1 0,-2 1 0,8 29 0,-13-33 0,-1 0 0,-2 0 0,-1 1 0,1 38 0,-4-62 0,0 19 0,-1 1 0,-6 37 0,5-51 0,0-1 0,0 0 0,-1 0 0,0 0 0,0 0 0,-1 0 0,0-1 0,0 0 0,0 0 0,-1 0 0,-8 9 0,8-10 0,-7 6 0,0 0 0,1 2 0,0-1 0,1 1 0,-14 23 0,19-27 0,0-2 0,-1 1 0,0 0 0,-1-1 0,0-1 0,0 1 0,0-1 0,-1 0 0,0 0 0,-15 7 0,9-4 0,1 0 0,-20 17 0,24-17 0,0-1 0,0 0 0,-1 0 0,0-1 0,-1-1 0,1 0 0,-1 0 0,0-1 0,-23 7 0,6-5 0,0 0 0,1 2 0,1 1 0,-47 23 0,52-22 0,-2-1 0,1-1 0,-34 8 0,-4 2 0,59-18 3,0 0 1,0-1-1,-1 1 0,1-1 0,0 1 1,0-1-1,-1 0 0,1 1 0,0-1 1,-1 0-1,1 0 0,0 0 0,-1 0 1,1 0-1,0 0 0,-1 0 0,1-1 1,0 1-1,0 0 0,-1-1 0,1 1 0,0-1 1,0 0-1,-1 1 0,1-1 0,0 0 1,0 1-1,0-1 0,0 0 0,0 0 1,0 0-1,0 0 0,1 0 0,-1 0 1,0 0-1,-1-3 0,0-1-189,1-1 1,-1 0-1,1 0 0,0 1 1,1-1-1,-1 0 1,2-7-1,-1-5-6640</inkml:trace>
-</inkml:ink>
-</file>
-
-<file path=ppt/ink/ink21.xml><?xml version="1.0" encoding="utf-8"?>
-<inkml:ink xmlns:inkml="http://www.w3.org/2003/InkML">
-  <inkml:definitions>
-    <inkml:context xml:id="ctx0">
-      <inkml:inkSource xml:id="inkSrc0">
-        <inkml:traceFormat>
-          <inkml:channel name="X" type="integer" min="-2.14748E9" max="2.14748E9" units="cm"/>
-          <inkml:channel name="Y" type="integer" min="-2.14748E9" max="2.14748E9" units="cm"/>
-          <inkml:channel name="F" type="integer" max="32767" units="dev"/>
-        </inkml:traceFormat>
-        <inkml:channelProperties>
-          <inkml:channelProperty channel="X" name="resolution" value="1000" units="1/cm"/>
-          <inkml:channelProperty channel="Y" name="resolution" value="1000" units="1/cm"/>
-          <inkml:channelProperty channel="F" name="resolution" value="0" units="1/dev"/>
-        </inkml:channelProperties>
-      </inkml:inkSource>
-      <inkml:timestamp xml:id="ts0" timeString="2023-01-30T14:00:41.623"/>
-    </inkml:context>
-    <inkml:brush xml:id="br0">
-      <inkml:brushProperty name="width" value="0.05" units="cm"/>
-      <inkml:brushProperty name="height" value="0.05" units="cm"/>
-      <inkml:brushProperty name="color" value="#E71224"/>
-    </inkml:brush>
-  </inkml:definitions>
-  <inkml:trace contextRef="#ctx0" brushRef="#br0">78 1 24575,'0'13'0,"-1"1"0,-1-1 0,0 0 0,0 0 0,-2 1 0,1-2 0,-2 1 0,0 0 0,0-1 0,-12 20 0,12-24 0,0 0 0,1 0 0,0 1 0,1 0 0,0-1 0,-3 12 0,6-17 0,-1 0 0,1 0 0,0 0 0,0 0 0,0 0 0,0 0 0,1 0 0,-1 0 0,1-1 0,0 1 0,-1 0 0,1 0 0,0 0 0,1-1 0,-1 1 0,0-1 0,1 1 0,0-1 0,-1 1 0,1-1 0,0 0 0,0 0 0,3 2 0,7 5 0,1 0 0,0-1 0,1 0 0,27 10 0,8 5 0,-15-7 0,-23-11 0,0 0 0,-1 0 0,0 1 0,0 1 0,0 0 0,12 11 0,-14-11 0,0-1 0,0 0 0,0 0 0,1-1 0,0 0 0,0 0 0,1-1 0,-1 0 0,1-1 0,18 4 0,7 4 0,-10-2 0,-1 1 0,24 15 0,15 7 0,-33-16 22,-23-12-254,1 1 1,-1-2 0,1 1 0,-1-1 0,10 2 0,-7-4-6595</inkml:trace>
-</inkml:ink>
-</file>
-
-<file path=ppt/ink/ink22.xml><?xml version="1.0" encoding="utf-8"?>
-<inkml:ink xmlns:inkml="http://www.w3.org/2003/InkML">
-  <inkml:definitions>
-    <inkml:context xml:id="ctx0">
-      <inkml:inkSource xml:id="inkSrc0">
-        <inkml:traceFormat>
-          <inkml:channel name="X" type="integer" min="-2.14748E9" max="2.14748E9" units="cm"/>
-          <inkml:channel name="Y" type="integer" min="-2.14748E9" max="2.14748E9" units="cm"/>
-          <inkml:channel name="F" type="integer" max="32767" units="dev"/>
-        </inkml:traceFormat>
-        <inkml:channelProperties>
-          <inkml:channelProperty channel="X" name="resolution" value="1000" units="1/cm"/>
-          <inkml:channelProperty channel="Y" name="resolution" value="1000" units="1/cm"/>
-          <inkml:channelProperty channel="F" name="resolution" value="0" units="1/dev"/>
-        </inkml:channelProperties>
-      </inkml:inkSource>
       <inkml:timestamp xml:id="ts0" timeString="2023-01-30T14:00:58.023"/>
     </inkml:context>
     <inkml:brush xml:id="br0">
@@ -2351,7 +593,7 @@
 </inkml:ink>
 </file>
 
-<file path=ppt/ink/ink23.xml><?xml version="1.0" encoding="utf-8"?>
+<file path=ppt/ink/ink21.xml><?xml version="1.0" encoding="utf-8"?>
 <inkml:ink xmlns:inkml="http://www.w3.org/2003/InkML">
   <inkml:definitions>
     <inkml:context xml:id="ctx0">
@@ -2379,7 +621,7 @@
 </inkml:ink>
 </file>
 
-<file path=ppt/ink/ink24.xml><?xml version="1.0" encoding="utf-8"?>
+<file path=ppt/ink/ink22.xml><?xml version="1.0" encoding="utf-8"?>
 <inkml:ink xmlns:inkml="http://www.w3.org/2003/InkML">
   <inkml:definitions>
     <inkml:context xml:id="ctx0">
@@ -2407,7 +649,7 @@
 </inkml:ink>
 </file>
 
-<file path=ppt/ink/ink25.xml><?xml version="1.0" encoding="utf-8"?>
+<file path=ppt/ink/ink23.xml><?xml version="1.0" encoding="utf-8"?>
 <inkml:ink xmlns:inkml="http://www.w3.org/2003/InkML">
   <inkml:definitions>
     <inkml:context xml:id="ctx0">
@@ -2435,7 +677,7 @@
 </inkml:ink>
 </file>
 
-<file path=ppt/ink/ink26.xml><?xml version="1.0" encoding="utf-8"?>
+<file path=ppt/ink/ink24.xml><?xml version="1.0" encoding="utf-8"?>
 <inkml:ink xmlns:inkml="http://www.w3.org/2003/InkML">
   <inkml:definitions>
     <inkml:context xml:id="ctx0">
@@ -2463,7 +705,7 @@
 </inkml:ink>
 </file>
 
-<file path=ppt/ink/ink27.xml><?xml version="1.0" encoding="utf-8"?>
+<file path=ppt/ink/ink25.xml><?xml version="1.0" encoding="utf-8"?>
 <inkml:ink xmlns:inkml="http://www.w3.org/2003/InkML">
   <inkml:definitions>
     <inkml:context xml:id="ctx0">
@@ -2491,7 +733,7 @@
 </inkml:ink>
 </file>
 
-<file path=ppt/ink/ink28.xml><?xml version="1.0" encoding="utf-8"?>
+<file path=ppt/ink/ink26.xml><?xml version="1.0" encoding="utf-8"?>
 <inkml:ink xmlns:inkml="http://www.w3.org/2003/InkML">
   <inkml:definitions>
     <inkml:context xml:id="ctx0">
@@ -2519,7 +761,7 @@
 </inkml:ink>
 </file>
 
-<file path=ppt/ink/ink29.xml><?xml version="1.0" encoding="utf-8"?>
+<file path=ppt/ink/ink27.xml><?xml version="1.0" encoding="utf-8"?>
 <inkml:ink xmlns:inkml="http://www.w3.org/2003/InkML">
   <inkml:definitions>
     <inkml:context xml:id="ctx0">
@@ -2547,39 +789,7 @@
 </inkml:ink>
 </file>
 
-<file path=ppt/ink/ink3.xml><?xml version="1.0" encoding="utf-8"?>
-<inkml:ink xmlns:inkml="http://www.w3.org/2003/InkML">
-  <inkml:definitions>
-    <inkml:context xml:id="ctx0">
-      <inkml:inkSource xml:id="inkSrc0">
-        <inkml:traceFormat>
-          <inkml:channel name="X" type="integer" min="-2.14748E9" max="2.14748E9" units="cm"/>
-          <inkml:channel name="Y" type="integer" min="-2.14748E9" max="2.14748E9" units="cm"/>
-          <inkml:channel name="F" type="integer" max="32767" units="dev"/>
-          <inkml:channel name="OA" type="integer" max="360" units="deg"/>
-          <inkml:channel name="OE" type="integer" max="90" units="deg"/>
-        </inkml:traceFormat>
-        <inkml:channelProperties>
-          <inkml:channelProperty channel="X" name="resolution" value="1000" units="1/cm"/>
-          <inkml:channelProperty channel="Y" name="resolution" value="1000" units="1/cm"/>
-          <inkml:channelProperty channel="F" name="resolution" value="0" units="1/dev"/>
-          <inkml:channelProperty channel="OA" name="resolution" value="1000" units="1/deg"/>
-          <inkml:channelProperty channel="OE" name="resolution" value="1000" units="1/deg"/>
-        </inkml:channelProperties>
-      </inkml:inkSource>
-      <inkml:timestamp xml:id="ts0" timeString="2025-09-10T16:36:39.392"/>
-    </inkml:context>
-    <inkml:brush xml:id="br0">
-      <inkml:brushProperty name="width" value="0.1" units="cm"/>
-      <inkml:brushProperty name="height" value="0.1" units="cm"/>
-      <inkml:brushProperty name="color" value="#E71224"/>
-    </inkml:brush>
-  </inkml:definitions>
-  <inkml:trace contextRef="#ctx0" brushRef="#br0">12468 3953 16383 0 0,'0'0'0'0'0</inkml:trace>
-</inkml:ink>
-</file>
-
-<file path=ppt/ink/ink30.xml><?xml version="1.0" encoding="utf-8"?>
+<file path=ppt/ink/ink28.xml><?xml version="1.0" encoding="utf-8"?>
 <inkml:ink xmlns:inkml="http://www.w3.org/2003/InkML">
   <inkml:definitions>
     <inkml:context xml:id="ctx0">
@@ -2607,7 +817,7 @@
 </inkml:ink>
 </file>
 
-<file path=ppt/ink/ink31.xml><?xml version="1.0" encoding="utf-8"?>
+<file path=ppt/ink/ink29.xml><?xml version="1.0" encoding="utf-8"?>
 <inkml:ink xmlns:inkml="http://www.w3.org/2003/InkML">
   <inkml:definitions>
     <inkml:context xml:id="ctx0">
@@ -2635,7 +845,35 @@
 </inkml:ink>
 </file>
 
-<file path=ppt/ink/ink32.xml><?xml version="1.0" encoding="utf-8"?>
+<file path=ppt/ink/ink3.xml><?xml version="1.0" encoding="utf-8"?>
+<inkml:ink xmlns:inkml="http://www.w3.org/2003/InkML">
+  <inkml:definitions>
+    <inkml:context xml:id="ctx0">
+      <inkml:inkSource xml:id="inkSrc0">
+        <inkml:traceFormat>
+          <inkml:channel name="X" type="integer" min="-2.14748E9" max="2.14748E9" units="cm"/>
+          <inkml:channel name="Y" type="integer" min="-2.14748E9" max="2.14748E9" units="cm"/>
+          <inkml:channel name="F" type="integer" max="32767" units="dev"/>
+        </inkml:traceFormat>
+        <inkml:channelProperties>
+          <inkml:channelProperty channel="X" name="resolution" value="1000" units="1/cm"/>
+          <inkml:channelProperty channel="Y" name="resolution" value="1000" units="1/cm"/>
+          <inkml:channelProperty channel="F" name="resolution" value="0" units="1/dev"/>
+        </inkml:channelProperties>
+      </inkml:inkSource>
+      <inkml:timestamp xml:id="ts0" timeString="2022-01-31T13:22:06.270"/>
+    </inkml:context>
+    <inkml:brush xml:id="br0">
+      <inkml:brushProperty name="width" value="0.05" units="cm"/>
+      <inkml:brushProperty name="height" value="0.05" units="cm"/>
+      <inkml:brushProperty name="color" value="#E71224"/>
+    </inkml:brush>
+  </inkml:definitions>
+  <inkml:trace contextRef="#ctx0" brushRef="#br0">0 0 24575,'0'0'-8191</inkml:trace>
+</inkml:ink>
+</file>
+
+<file path=ppt/ink/ink30.xml><?xml version="1.0" encoding="utf-8"?>
 <inkml:ink xmlns:inkml="http://www.w3.org/2003/InkML">
   <inkml:definitions>
     <inkml:context xml:id="ctx0">
@@ -2663,7 +901,7 @@
 </inkml:ink>
 </file>
 
-<file path=ppt/ink/ink33.xml><?xml version="1.0" encoding="utf-8"?>
+<file path=ppt/ink/ink31.xml><?xml version="1.0" encoding="utf-8"?>
 <inkml:ink xmlns:inkml="http://www.w3.org/2003/InkML">
   <inkml:definitions>
     <inkml:context xml:id="ctx0">
@@ -2691,7 +929,7 @@
 </inkml:ink>
 </file>
 
-<file path=ppt/ink/ink34.xml><?xml version="1.0" encoding="utf-8"?>
+<file path=ppt/ink/ink32.xml><?xml version="1.0" encoding="utf-8"?>
 <inkml:ink xmlns:inkml="http://www.w3.org/2003/InkML">
   <inkml:definitions>
     <inkml:context xml:id="ctx0">
@@ -2719,7 +957,7 @@
 </inkml:ink>
 </file>
 
-<file path=ppt/ink/ink35.xml><?xml version="1.0" encoding="utf-8"?>
+<file path=ppt/ink/ink33.xml><?xml version="1.0" encoding="utf-8"?>
 <inkml:ink xmlns:inkml="http://www.w3.org/2003/InkML">
   <inkml:definitions>
     <inkml:context xml:id="ctx0">
@@ -2747,7 +985,7 @@
 </inkml:ink>
 </file>
 
-<file path=ppt/ink/ink36.xml><?xml version="1.0" encoding="utf-8"?>
+<file path=ppt/ink/ink34.xml><?xml version="1.0" encoding="utf-8"?>
 <inkml:ink xmlns:inkml="http://www.w3.org/2003/InkML">
   <inkml:definitions>
     <inkml:context xml:id="ctx0">
@@ -2775,7 +1013,7 @@
 </inkml:ink>
 </file>
 
-<file path=ppt/ink/ink37.xml><?xml version="1.0" encoding="utf-8"?>
+<file path=ppt/ink/ink35.xml><?xml version="1.0" encoding="utf-8"?>
 <inkml:ink xmlns:inkml="http://www.w3.org/2003/InkML">
   <inkml:definitions>
     <inkml:context xml:id="ctx0">
@@ -2803,7 +1041,7 @@
 </inkml:ink>
 </file>
 
-<file path=ppt/ink/ink38.xml><?xml version="1.0" encoding="utf-8"?>
+<file path=ppt/ink/ink36.xml><?xml version="1.0" encoding="utf-8"?>
 <inkml:ink xmlns:inkml="http://www.w3.org/2003/InkML">
   <inkml:definitions>
     <inkml:context xml:id="ctx0">
@@ -2831,7 +1069,7 @@
 </inkml:ink>
 </file>
 
-<file path=ppt/ink/ink39.xml><?xml version="1.0" encoding="utf-8"?>
+<file path=ppt/ink/ink37.xml><?xml version="1.0" encoding="utf-8"?>
 <inkml:ink xmlns:inkml="http://www.w3.org/2003/InkML">
   <inkml:definitions>
     <inkml:context xml:id="ctx0">
@@ -2868,66 +1106,6 @@
           <inkml:channel name="X" type="integer" min="-2.14748E9" max="2.14748E9" units="cm"/>
           <inkml:channel name="Y" type="integer" min="-2.14748E9" max="2.14748E9" units="cm"/>
           <inkml:channel name="F" type="integer" max="32767" units="dev"/>
-          <inkml:channel name="OA" type="integer" max="360" units="deg"/>
-          <inkml:channel name="OE" type="integer" max="90" units="deg"/>
-        </inkml:traceFormat>
-        <inkml:channelProperties>
-          <inkml:channelProperty channel="X" name="resolution" value="1000" units="1/cm"/>
-          <inkml:channelProperty channel="Y" name="resolution" value="1000" units="1/cm"/>
-          <inkml:channelProperty channel="F" name="resolution" value="0" units="1/dev"/>
-          <inkml:channelProperty channel="OA" name="resolution" value="1000" units="1/deg"/>
-          <inkml:channelProperty channel="OE" name="resolution" value="1000" units="1/deg"/>
-        </inkml:channelProperties>
-      </inkml:inkSource>
-      <inkml:timestamp xml:id="ts0" timeString="2025-09-10T16:36:39.393"/>
-    </inkml:context>
-    <inkml:brush xml:id="br0">
-      <inkml:brushProperty name="width" value="0.1" units="cm"/>
-      <inkml:brushProperty name="height" value="0.1" units="cm"/>
-      <inkml:brushProperty name="color" value="#E71224"/>
-    </inkml:brush>
-  </inkml:definitions>
-  <inkml:trace contextRef="#ctx0" brushRef="#br0">11872 1521 16383 0 0,'0'0'0'0'0,"0"0"0"0"0</inkml:trace>
-</inkml:ink>
-</file>
-
-<file path=ppt/ink/ink5.xml><?xml version="1.0" encoding="utf-8"?>
-<inkml:ink xmlns:inkml="http://www.w3.org/2003/InkML">
-  <inkml:definitions>
-    <inkml:context xml:id="ctx0">
-      <inkml:inkSource xml:id="inkSrc0">
-        <inkml:traceFormat>
-          <inkml:channel name="X" type="integer" min="-2.14748E9" max="2.14748E9" units="cm"/>
-          <inkml:channel name="Y" type="integer" min="-2.14748E9" max="2.14748E9" units="cm"/>
-          <inkml:channel name="F" type="integer" max="32767" units="dev"/>
-        </inkml:traceFormat>
-        <inkml:channelProperties>
-          <inkml:channelProperty channel="X" name="resolution" value="1000" units="1/cm"/>
-          <inkml:channelProperty channel="Y" name="resolution" value="1000" units="1/cm"/>
-          <inkml:channelProperty channel="F" name="resolution" value="0" units="1/dev"/>
-        </inkml:channelProperties>
-      </inkml:inkSource>
-      <inkml:timestamp xml:id="ts0" timeString="2022-01-31T13:22:06.270"/>
-    </inkml:context>
-    <inkml:brush xml:id="br0">
-      <inkml:brushProperty name="width" value="0.05" units="cm"/>
-      <inkml:brushProperty name="height" value="0.05" units="cm"/>
-      <inkml:brushProperty name="color" value="#E71224"/>
-    </inkml:brush>
-  </inkml:definitions>
-  <inkml:trace contextRef="#ctx0" brushRef="#br0">0 0 24575,'0'0'-8191</inkml:trace>
-</inkml:ink>
-</file>
-
-<file path=ppt/ink/ink6.xml><?xml version="1.0" encoding="utf-8"?>
-<inkml:ink xmlns:inkml="http://www.w3.org/2003/InkML">
-  <inkml:definitions>
-    <inkml:context xml:id="ctx0">
-      <inkml:inkSource xml:id="inkSrc0">
-        <inkml:traceFormat>
-          <inkml:channel name="X" type="integer" min="-2.14748E9" max="2.14748E9" units="cm"/>
-          <inkml:channel name="Y" type="integer" min="-2.14748E9" max="2.14748E9" units="cm"/>
-          <inkml:channel name="F" type="integer" max="32767" units="dev"/>
         </inkml:traceFormat>
         <inkml:channelProperties>
           <inkml:channelProperty channel="X" name="resolution" value="1000" units="1/cm"/>
@@ -2947,7 +1125,7 @@
 </inkml:ink>
 </file>
 
-<file path=ppt/ink/ink7.xml><?xml version="1.0" encoding="utf-8"?>
+<file path=ppt/ink/ink5.xml><?xml version="1.0" encoding="utf-8"?>
 <inkml:ink xmlns:inkml="http://www.w3.org/2003/InkML">
   <inkml:definitions>
     <inkml:context xml:id="ctx0">
@@ -2975,7 +1153,7 @@
 </inkml:ink>
 </file>
 
-<file path=ppt/ink/ink8.xml><?xml version="1.0" encoding="utf-8"?>
+<file path=ppt/ink/ink6.xml><?xml version="1.0" encoding="utf-8"?>
 <inkml:ink xmlns:inkml="http://www.w3.org/2003/InkML">
   <inkml:definitions>
     <inkml:context xml:id="ctx0">
@@ -3003,7 +1181,7 @@
 </inkml:ink>
 </file>
 
-<file path=ppt/ink/ink9.xml><?xml version="1.0" encoding="utf-8"?>
+<file path=ppt/ink/ink7.xml><?xml version="1.0" encoding="utf-8"?>
 <inkml:ink xmlns:inkml="http://www.w3.org/2003/InkML">
   <inkml:definitions>
     <inkml:context xml:id="ctx0">
@@ -3028,6 +1206,62 @@
     </inkml:brush>
   </inkml:definitions>
   <inkml:trace contextRef="#ctx0" brushRef="#br0">284 0 24575,'-3'0'0,"-1"1"0,0-1 0,0 1 0,1 0 0,-1 0 0,0 0 0,1 1 0,-1-1 0,1 1 0,0 0 0,-1 0 0,1 0 0,0 0 0,0 1 0,0-1 0,0 1 0,-4 5 0,-3 6 0,-1 0 0,-14 27 0,-2 3 0,23-38 0,1 0 0,-1 1 0,1 0 0,1 0 0,-1 0 0,1 0 0,0 0 0,1 0 0,-1 8 0,0-5 0,1-1 0,-2 1 0,1 0 0,-7 12 0,-2 5 0,1 1 0,2 1 0,-7 34 0,5-22 0,-29 145 0,35-153 0,0 0 0,3 0 0,3 58 0,0-84 0,-1 0 0,2 1 0,-1-1 0,1 0 0,0 0 0,0-1 0,1 1 0,0 0 0,9 10 0,-6-8 0,-1 1 0,0 0 0,6 13 0,-10-17-57,0-1 0,0-1 1,1 1-1,-1 0 0,1-1 0,0 1 0,0-1 0,1 0 0,-1 0 0,1 0 0,0 0 1,0-1-1,1 1 0,-1-1 0,0 0 0,1-1 0,0 1 0,0-1 0,0 0 1,0 0-1,0 0 0,0-1 0,6 1 0</inkml:trace>
+</inkml:ink>
+</file>
+
+<file path=ppt/ink/ink8.xml><?xml version="1.0" encoding="utf-8"?>
+<inkml:ink xmlns:inkml="http://www.w3.org/2003/InkML">
+  <inkml:definitions>
+    <inkml:context xml:id="ctx0">
+      <inkml:inkSource xml:id="inkSrc0">
+        <inkml:traceFormat>
+          <inkml:channel name="X" type="integer" min="-2.14748E9" max="2.14748E9" units="cm"/>
+          <inkml:channel name="Y" type="integer" min="-2.14748E9" max="2.14748E9" units="cm"/>
+          <inkml:channel name="F" type="integer" max="32767" units="dev"/>
+        </inkml:traceFormat>
+        <inkml:channelProperties>
+          <inkml:channelProperty channel="X" name="resolution" value="1000" units="1/cm"/>
+          <inkml:channelProperty channel="Y" name="resolution" value="1000" units="1/cm"/>
+          <inkml:channelProperty channel="F" name="resolution" value="0" units="1/dev"/>
+        </inkml:channelProperties>
+      </inkml:inkSource>
+      <inkml:timestamp xml:id="ts0" timeString="2022-08-22T14:48:39.339"/>
+    </inkml:context>
+    <inkml:brush xml:id="br0">
+      <inkml:brushProperty name="width" value="0.1" units="cm"/>
+      <inkml:brushProperty name="height" value="0.1" units="cm"/>
+      <inkml:brushProperty name="color" value="#FF0066"/>
+    </inkml:brush>
+  </inkml:definitions>
+  <inkml:trace contextRef="#ctx0" brushRef="#br0">279 1 24575,'1'6'0,"0"1"0,0 0 0,1-1 0,0 1 0,0-1 0,0 0 0,1 1 0,0-1 0,0 0 0,1-1 0,5 8 0,15 31 0,-20-36 0,1 1 0,0-1 0,0 0 0,1 0 0,0-1 0,0 0 0,10 9 0,20 25 0,-35-39 0,0 0 0,1 0 0,-1 0 0,-1 0 0,1 0 0,0 0 0,0 0 0,-1 0 0,1 0 0,-1 0 0,0 0 0,1 1 0,-1-1 0,0 0 0,0 0 0,-1 0 0,1 0 0,0 1 0,-1-1 0,1 0 0,-1 0 0,0 0 0,0 0 0,1 0 0,-1 0 0,-1 0 0,1 0 0,0-1 0,-3 4 0,-5 5 0,0-1 0,0 1 0,-1-2 0,-12 9 0,-6 6 0,15-13 0,-1 1 0,0-2 0,0 0 0,-1-1 0,-30 13 0,-24 12 0,35-15-19,-41 15 0,35-16-1308</inkml:trace>
+</inkml:ink>
+</file>
+
+<file path=ppt/ink/ink9.xml><?xml version="1.0" encoding="utf-8"?>
+<inkml:ink xmlns:inkml="http://www.w3.org/2003/InkML">
+  <inkml:definitions>
+    <inkml:context xml:id="ctx0">
+      <inkml:inkSource xml:id="inkSrc0">
+        <inkml:traceFormat>
+          <inkml:channel name="X" type="integer" min="-2.14748E9" max="2.14748E9" units="cm"/>
+          <inkml:channel name="Y" type="integer" min="-2.14748E9" max="2.14748E9" units="cm"/>
+          <inkml:channel name="F" type="integer" max="32767" units="dev"/>
+        </inkml:traceFormat>
+        <inkml:channelProperties>
+          <inkml:channelProperty channel="X" name="resolution" value="1000" units="1/cm"/>
+          <inkml:channelProperty channel="Y" name="resolution" value="1000" units="1/cm"/>
+          <inkml:channelProperty channel="F" name="resolution" value="0" units="1/dev"/>
+        </inkml:channelProperties>
+      </inkml:inkSource>
+      <inkml:timestamp xml:id="ts0" timeString="2022-08-22T14:48:40.587"/>
+    </inkml:context>
+    <inkml:brush xml:id="br0">
+      <inkml:brushProperty name="width" value="0.1" units="cm"/>
+      <inkml:brushProperty name="height" value="0.1" units="cm"/>
+      <inkml:brushProperty name="color" value="#FF0066"/>
+    </inkml:brush>
+  </inkml:definitions>
+  <inkml:trace contextRef="#ctx0" brushRef="#br0">0 43 24575,'31'0'0,"-5"1"0,0-1 0,-1-1 0,1-1 0,0-1 0,-1-1 0,46-15 0,-56 15-49,1 1 0,-1 0 0,1 0 0,0 2 0,0 0 0,30 3 0,-18-2-973,-11 0-5804</inkml:trace>
 </inkml:ink>
 </file>
 
@@ -3113,7 +1347,7 @@
           <a:p>
             <a:fld id="{B9658D5F-65FB-4E17-9D5B-8CF1DE5A98DF}" type="datetimeFigureOut">
               <a:rPr lang="en-US" smtClean="0"/>
-              <a:t>9/16/2025</a:t>
+              <a:t>1/28/2026</a:t>
             </a:fld>
             <a:endParaRPr lang="en-US"/>
           </a:p>
@@ -6096,7 +4330,7 @@
           <a:p>
             <a:fld id="{4263717A-E3C1-4BED-ABE0-B7069385E023}" type="datetimeFigureOut">
               <a:rPr lang="en-US" smtClean="0"/>
-              <a:t>9/16/2025</a:t>
+              <a:t>1/28/2026</a:t>
             </a:fld>
             <a:endParaRPr lang="en-US"/>
           </a:p>
@@ -6269,7 +4503,7 @@
           <a:p>
             <a:fld id="{4263717A-E3C1-4BED-ABE0-B7069385E023}" type="datetimeFigureOut">
               <a:rPr lang="en-US" smtClean="0"/>
-              <a:t>9/16/2025</a:t>
+              <a:t>1/28/2026</a:t>
             </a:fld>
             <a:endParaRPr lang="en-US"/>
           </a:p>
@@ -6447,7 +4681,7 @@
           <a:p>
             <a:fld id="{4263717A-E3C1-4BED-ABE0-B7069385E023}" type="datetimeFigureOut">
               <a:rPr lang="en-US" smtClean="0"/>
-              <a:t>9/16/2025</a:t>
+              <a:t>1/28/2026</a:t>
             </a:fld>
             <a:endParaRPr lang="en-US"/>
           </a:p>
@@ -6615,7 +4849,7 @@
           <a:p>
             <a:fld id="{4263717A-E3C1-4BED-ABE0-B7069385E023}" type="datetimeFigureOut">
               <a:rPr lang="en-US" smtClean="0"/>
-              <a:t>9/16/2025</a:t>
+              <a:t>1/28/2026</a:t>
             </a:fld>
             <a:endParaRPr lang="en-US"/>
           </a:p>
@@ -6860,7 +5094,7 @@
           <a:p>
             <a:fld id="{4263717A-E3C1-4BED-ABE0-B7069385E023}" type="datetimeFigureOut">
               <a:rPr lang="en-US" smtClean="0"/>
-              <a:t>9/16/2025</a:t>
+              <a:t>1/28/2026</a:t>
             </a:fld>
             <a:endParaRPr lang="en-US"/>
           </a:p>
@@ -7089,7 +5323,7 @@
           <a:p>
             <a:fld id="{4263717A-E3C1-4BED-ABE0-B7069385E023}" type="datetimeFigureOut">
               <a:rPr lang="en-US" smtClean="0"/>
-              <a:t>9/16/2025</a:t>
+              <a:t>1/28/2026</a:t>
             </a:fld>
             <a:endParaRPr lang="en-US"/>
           </a:p>
@@ -7453,7 +5687,7 @@
           <a:p>
             <a:fld id="{4263717A-E3C1-4BED-ABE0-B7069385E023}" type="datetimeFigureOut">
               <a:rPr lang="en-US" smtClean="0"/>
-              <a:t>9/16/2025</a:t>
+              <a:t>1/28/2026</a:t>
             </a:fld>
             <a:endParaRPr lang="en-US"/>
           </a:p>
@@ -7570,7 +5804,7 @@
           <a:p>
             <a:fld id="{4263717A-E3C1-4BED-ABE0-B7069385E023}" type="datetimeFigureOut">
               <a:rPr lang="en-US" smtClean="0"/>
-              <a:t>9/16/2025</a:t>
+              <a:t>1/28/2026</a:t>
             </a:fld>
             <a:endParaRPr lang="en-US"/>
           </a:p>
@@ -7665,7 +5899,7 @@
           <a:p>
             <a:fld id="{4263717A-E3C1-4BED-ABE0-B7069385E023}" type="datetimeFigureOut">
               <a:rPr lang="en-US" smtClean="0"/>
-              <a:t>9/16/2025</a:t>
+              <a:t>1/28/2026</a:t>
             </a:fld>
             <a:endParaRPr lang="en-US"/>
           </a:p>
@@ -7940,7 +6174,7 @@
           <a:p>
             <a:fld id="{4263717A-E3C1-4BED-ABE0-B7069385E023}" type="datetimeFigureOut">
               <a:rPr lang="en-US" smtClean="0"/>
-              <a:t>9/16/2025</a:t>
+              <a:t>1/28/2026</a:t>
             </a:fld>
             <a:endParaRPr lang="en-US"/>
           </a:p>
@@ -8192,7 +6426,7 @@
           <a:p>
             <a:fld id="{4263717A-E3C1-4BED-ABE0-B7069385E023}" type="datetimeFigureOut">
               <a:rPr lang="en-US" smtClean="0"/>
-              <a:t>9/16/2025</a:t>
+              <a:t>1/28/2026</a:t>
             </a:fld>
             <a:endParaRPr lang="en-US"/>
           </a:p>
@@ -8403,7 +6637,7 @@
           <a:p>
             <a:fld id="{4263717A-E3C1-4BED-ABE0-B7069385E023}" type="datetimeFigureOut">
               <a:rPr lang="en-US" smtClean="0"/>
-              <a:t>9/16/2025</a:t>
+              <a:t>1/28/2026</a:t>
             </a:fld>
             <a:endParaRPr lang="en-US"/>
           </a:p>
@@ -14053,7 +12287,7 @@
           <a:p>
             <a:r>
               <a:rPr lang="en-US" dirty="0"/>
-              <a:t>controls the output as in C </a:t>
+              <a:t>Formatter: controls the output as in C </a:t>
             </a:r>
             <a:r>
               <a:rPr lang="en-US" dirty="0" err="1"/>
@@ -14080,7 +12314,7 @@
             </a:r>
             <a:r>
               <a:rPr lang="en-GB" sz="1600" dirty="0"/>
-              <a:t> - Print the argument as a signed decimal integer.</a:t>
+              <a:t> - turns a number and displays it in base-10</a:t>
             </a:r>
           </a:p>
           <a:p>
@@ -14102,7 +12336,7 @@
             </a:r>
             <a:r>
               <a:rPr lang="en-GB" sz="1600" dirty="0"/>
-              <a:t> - Print the argument as an unsigned hexadecimal integer.</a:t>
+              <a:t> - turns a number and displays it in base-16 </a:t>
             </a:r>
           </a:p>
           <a:p>
@@ -14124,7 +12358,7 @@
             </a:r>
             <a:r>
               <a:rPr lang="en-GB" sz="1600" dirty="0"/>
-              <a:t>- Print the argument as a string.</a:t>
+              <a:t>- turns a number and displays it as a string.</a:t>
             </a:r>
             <a:endParaRPr lang="en-US" sz="1600" dirty="0"/>
           </a:p>
@@ -19258,6 +17492,66 @@
           </a:p>
         </p:txBody>
       </p:sp>
+      <p:sp>
+        <p:nvSpPr>
+          <p:cNvPr id="9" name="TextBox 8">
+            <a:extLst>
+              <a:ext uri="{FF2B5EF4-FFF2-40B4-BE49-F238E27FC236}">
+                <a16:creationId xmlns:a16="http://schemas.microsoft.com/office/drawing/2014/main" id="{85923769-CCA6-6567-6A63-C40FCB5E3E31}"/>
+              </a:ext>
+            </a:extLst>
+          </p:cNvPr>
+          <p:cNvSpPr txBox="1"/>
+          <p:nvPr/>
+        </p:nvSpPr>
+        <p:spPr>
+          <a:xfrm>
+            <a:off x="6793987" y="3267977"/>
+            <a:ext cx="3396833" cy="646331"/>
+          </a:xfrm>
+          <a:prstGeom prst="rect">
+            <a:avLst/>
+          </a:prstGeom>
+          <a:solidFill>
+            <a:schemeClr val="accent4">
+              <a:lumMod val="20000"/>
+              <a:lumOff val="80000"/>
+            </a:schemeClr>
+          </a:solidFill>
+        </p:spPr>
+        <p:txBody>
+          <a:bodyPr wrap="square">
+            <a:spAutoFit/>
+          </a:bodyPr>
+          <a:lstStyle/>
+          <a:p>
+            <a:r>
+              <a:rPr lang="en-GB" sz="1200" b="1" dirty="0">
+                <a:solidFill>
+                  <a:schemeClr val="accent2"/>
+                </a:solidFill>
+                <a:latin typeface="Arial" panose="020B0604020202020204" pitchFamily="34" charset="0"/>
+              </a:rPr>
+              <a:t>\x</a:t>
+            </a:r>
+            <a:r>
+              <a:rPr lang="en-GB" sz="1200" dirty="0">
+                <a:solidFill>
+                  <a:srgbClr val="404040"/>
+                </a:solidFill>
+                <a:latin typeface="Arial" panose="020B0604020202020204" pitchFamily="34" charset="0"/>
+              </a:rPr>
+              <a:t>, it looks at the next two characters as a hex number and converts them into their corresponding ASCII character before printing</a:t>
+            </a:r>
+            <a:endParaRPr lang="en-US" sz="1200" dirty="0">
+              <a:solidFill>
+                <a:srgbClr val="404040"/>
+              </a:solidFill>
+              <a:latin typeface="Arial" panose="020B0604020202020204" pitchFamily="34" charset="0"/>
+            </a:endParaRPr>
+          </a:p>
+        </p:txBody>
+      </p:sp>
     </p:spTree>
     <p:extLst>
       <p:ext uri="{BB962C8B-B14F-4D97-AF65-F5344CB8AC3E}">
@@ -30622,108 +28916,6 @@
               <a:xfrm>
                 <a:off x="11201485" y="4800647"/>
                 <a:ext cx="18000" cy="18000"/>
-              </a:xfrm>
-              <a:prstGeom prst="rect">
-                <a:avLst/>
-              </a:prstGeom>
-            </p:spPr>
-          </p:pic>
-        </mc:Fallback>
-      </mc:AlternateContent>
-      <mc:AlternateContent xmlns:mc="http://schemas.openxmlformats.org/markup-compatibility/2006" xmlns:p14="http://schemas.microsoft.com/office/powerpoint/2010/main">
-        <mc:Choice Requires="p14">
-          <p:contentPart p14:bwMode="auto" r:id="rId8">
-            <p14:nvContentPartPr>
-              <p14:cNvPr id="3" name="Ink 2">
-                <a:extLst>
-                  <a:ext uri="{FF2B5EF4-FFF2-40B4-BE49-F238E27FC236}">
-                    <a16:creationId xmlns:a16="http://schemas.microsoft.com/office/drawing/2014/main" id="{B3F33769-706E-3124-DA80-31BFC0B6FD52}"/>
-                  </a:ext>
-                </a:extLst>
-              </p14:cNvPr>
-              <p14:cNvContentPartPr/>
-              <p14:nvPr/>
-            </p14:nvContentPartPr>
-            <p14:xfrm>
-              <a:off x="3985649" y="-469269"/>
-              <a:ext cx="9094" cy="9094"/>
-            </p14:xfrm>
-          </p:contentPart>
-        </mc:Choice>
-        <mc:Fallback xmlns="">
-          <p:pic>
-            <p:nvPicPr>
-              <p:cNvPr id="3" name="Ink 2">
-                <a:extLst>
-                  <a:ext uri="{FF2B5EF4-FFF2-40B4-BE49-F238E27FC236}">
-                    <a16:creationId xmlns:a16="http://schemas.microsoft.com/office/drawing/2014/main" id="{B3F33769-706E-3124-DA80-31BFC0B6FD52}"/>
-                  </a:ext>
-                </a:extLst>
-              </p:cNvPr>
-              <p:cNvPicPr/>
-              <p:nvPr/>
-            </p:nvPicPr>
-            <p:blipFill>
-              <a:blip r:embed="rId9"/>
-              <a:stretch>
-                <a:fillRect/>
-              </a:stretch>
-            </p:blipFill>
-            <p:spPr>
-              <a:xfrm>
-                <a:off x="3540043" y="-914875"/>
-                <a:ext cx="909400" cy="909400"/>
-              </a:xfrm>
-              <a:prstGeom prst="rect">
-                <a:avLst/>
-              </a:prstGeom>
-            </p:spPr>
-          </p:pic>
-        </mc:Fallback>
-      </mc:AlternateContent>
-      <mc:AlternateContent xmlns:mc="http://schemas.openxmlformats.org/markup-compatibility/2006" xmlns:p14="http://schemas.microsoft.com/office/powerpoint/2010/main">
-        <mc:Choice Requires="p14">
-          <p:contentPart p14:bwMode="auto" r:id="rId10">
-            <p14:nvContentPartPr>
-              <p14:cNvPr id="6" name="Ink 5">
-                <a:extLst>
-                  <a:ext uri="{FF2B5EF4-FFF2-40B4-BE49-F238E27FC236}">
-                    <a16:creationId xmlns:a16="http://schemas.microsoft.com/office/drawing/2014/main" id="{E0501239-EC97-6BD2-A7C2-0BFD7C370D20}"/>
-                  </a:ext>
-                </a:extLst>
-              </p14:cNvPr>
-              <p14:cNvContentPartPr/>
-              <p14:nvPr/>
-            </p14:nvContentPartPr>
-            <p14:xfrm>
-              <a:off x="3780810" y="-1305011"/>
-              <a:ext cx="9094" cy="9094"/>
-            </p14:xfrm>
-          </p:contentPart>
-        </mc:Choice>
-        <mc:Fallback xmlns="">
-          <p:pic>
-            <p:nvPicPr>
-              <p:cNvPr id="6" name="Ink 5">
-                <a:extLst>
-                  <a:ext uri="{FF2B5EF4-FFF2-40B4-BE49-F238E27FC236}">
-                    <a16:creationId xmlns:a16="http://schemas.microsoft.com/office/drawing/2014/main" id="{E0501239-EC97-6BD2-A7C2-0BFD7C370D20}"/>
-                  </a:ext>
-                </a:extLst>
-              </p:cNvPr>
-              <p:cNvPicPr/>
-              <p:nvPr/>
-            </p:nvPicPr>
-            <p:blipFill>
-              <a:blip r:embed="rId9"/>
-              <a:stretch>
-                <a:fillRect/>
-              </a:stretch>
-            </p:blipFill>
-            <p:spPr>
-              <a:xfrm>
-                <a:off x="3335204" y="-1759711"/>
-                <a:ext cx="909400" cy="909400"/>
               </a:xfrm>
               <a:prstGeom prst="rect">
                 <a:avLst/>

</xml_diff>